<commit_message>
Slides from Helsinki user group presentation
</commit_message>
<xml_diff>
--- a/Tales from Tester Developer Collaboration.pptx
+++ b/Tales from Tester Developer Collaboration.pptx
@@ -5,26 +5,35 @@
     <p:sldMasterId id="2147483648" r:id="rId1"/>
   </p:sldMasterIdLst>
   <p:notesMasterIdLst>
-    <p:notesMasterId r:id="rId19"/>
+    <p:notesMasterId r:id="rId28"/>
   </p:notesMasterIdLst>
   <p:sldIdLst>
-    <p:sldId id="256" r:id="rId2"/>
-    <p:sldId id="262" r:id="rId3"/>
-    <p:sldId id="264" r:id="rId4"/>
-    <p:sldId id="263" r:id="rId5"/>
-    <p:sldId id="265" r:id="rId6"/>
-    <p:sldId id="267" r:id="rId7"/>
-    <p:sldId id="266" r:id="rId8"/>
-    <p:sldId id="258" r:id="rId9"/>
-    <p:sldId id="269" r:id="rId10"/>
-    <p:sldId id="257" r:id="rId11"/>
-    <p:sldId id="270" r:id="rId12"/>
-    <p:sldId id="268" r:id="rId13"/>
-    <p:sldId id="271" r:id="rId14"/>
-    <p:sldId id="260" r:id="rId15"/>
-    <p:sldId id="273" r:id="rId16"/>
-    <p:sldId id="274" r:id="rId17"/>
-    <p:sldId id="272" r:id="rId18"/>
+    <p:sldId id="275" r:id="rId2"/>
+    <p:sldId id="283" r:id="rId3"/>
+    <p:sldId id="276" r:id="rId4"/>
+    <p:sldId id="277" r:id="rId5"/>
+    <p:sldId id="280" r:id="rId6"/>
+    <p:sldId id="279" r:id="rId7"/>
+    <p:sldId id="282" r:id="rId8"/>
+    <p:sldId id="284" r:id="rId9"/>
+    <p:sldId id="262" r:id="rId10"/>
+    <p:sldId id="264" r:id="rId11"/>
+    <p:sldId id="285" r:id="rId12"/>
+    <p:sldId id="256" r:id="rId13"/>
+    <p:sldId id="265" r:id="rId14"/>
+    <p:sldId id="267" r:id="rId15"/>
+    <p:sldId id="266" r:id="rId16"/>
+    <p:sldId id="258" r:id="rId17"/>
+    <p:sldId id="269" r:id="rId18"/>
+    <p:sldId id="257" r:id="rId19"/>
+    <p:sldId id="270" r:id="rId20"/>
+    <p:sldId id="268" r:id="rId21"/>
+    <p:sldId id="286" r:id="rId22"/>
+    <p:sldId id="271" r:id="rId23"/>
+    <p:sldId id="260" r:id="rId24"/>
+    <p:sldId id="273" r:id="rId25"/>
+    <p:sldId id="274" r:id="rId26"/>
+    <p:sldId id="272" r:id="rId27"/>
   </p:sldIdLst>
   <p:sldSz cx="9144000" cy="6858000" type="screen4x3"/>
   <p:notesSz cx="6858000" cy="9144000"/>
@@ -208,7 +217,7 @@
           <a:p>
             <a:fld id="{378E7EDD-6406-4A41-9393-8F7AD46F97CF}" type="datetimeFigureOut">
               <a:rPr lang="en-US" smtClean="0"/>
-              <a:t>9/10/15</a:t>
+              <a:t>10/7/15</a:t>
             </a:fld>
             <a:endParaRPr lang="en-US"/>
           </a:p>
@@ -541,7 +550,7 @@
           <a:p>
             <a:fld id="{01C6EE63-5EE6-514E-80CC-4C87CFA5CAFF}" type="slidenum">
               <a:rPr lang="en-US" smtClean="0"/>
-              <a:t>8</a:t>
+              <a:t>16</a:t>
             </a:fld>
             <a:endParaRPr lang="en-US"/>
           </a:p>
@@ -551,6 +560,131 @@
     <p:extLst>
       <p:ext uri="{BB962C8B-B14F-4D97-AF65-F5344CB8AC3E}">
         <p14:creationId xmlns:p14="http://schemas.microsoft.com/office/powerpoint/2010/main" val="1233620044"/>
+      </p:ext>
+    </p:extLst>
+  </p:cSld>
+  <p:clrMapOvr>
+    <a:masterClrMapping/>
+  </p:clrMapOvr>
+</p:notes>
+</file>
+
+<file path=ppt/notesSlides/notesSlide2.xml><?xml version="1.0" encoding="utf-8"?>
+<p:notes xmlns:a="http://schemas.openxmlformats.org/drawingml/2006/main" xmlns:r="http://schemas.openxmlformats.org/officeDocument/2006/relationships" xmlns:p="http://schemas.openxmlformats.org/presentationml/2006/main">
+  <p:cSld>
+    <p:spTree>
+      <p:nvGrpSpPr>
+        <p:cNvPr id="1" name=""/>
+        <p:cNvGrpSpPr/>
+        <p:nvPr/>
+      </p:nvGrpSpPr>
+      <p:grpSpPr>
+        <a:xfrm>
+          <a:off x="0" y="0"/>
+          <a:ext cx="0" cy="0"/>
+          <a:chOff x="0" y="0"/>
+          <a:chExt cx="0" cy="0"/>
+        </a:xfrm>
+      </p:grpSpPr>
+      <p:sp>
+        <p:nvSpPr>
+          <p:cNvPr id="2" name="Slide Image Placeholder 1"/>
+          <p:cNvSpPr>
+            <a:spLocks noGrp="1" noRot="1" noChangeAspect="1"/>
+          </p:cNvSpPr>
+          <p:nvPr>
+            <p:ph type="sldImg"/>
+          </p:nvPr>
+        </p:nvSpPr>
+        <p:spPr/>
+      </p:sp>
+      <p:sp>
+        <p:nvSpPr>
+          <p:cNvPr id="3" name="Notes Placeholder 2"/>
+          <p:cNvSpPr>
+            <a:spLocks noGrp="1"/>
+          </p:cNvSpPr>
+          <p:nvPr>
+            <p:ph type="body" idx="1"/>
+          </p:nvPr>
+        </p:nvSpPr>
+        <p:spPr/>
+        <p:txBody>
+          <a:bodyPr/>
+          <a:lstStyle/>
+          <a:p>
+            <a:r>
+              <a:rPr lang="en-US" dirty="0" smtClean="0"/>
+              <a:t>This is what it</a:t>
+            </a:r>
+            <a:r>
+              <a:rPr lang="en-US" baseline="0" dirty="0" smtClean="0"/>
+              <a:t> is and what it could be. There’s a direction to it, not just statement of what it is. </a:t>
+            </a:r>
+          </a:p>
+          <a:p>
+            <a:r>
+              <a:rPr lang="en-US" baseline="0" dirty="0" smtClean="0"/>
+              <a:t>Coaching is not just feedback, it’s pointing them to the right way. </a:t>
+            </a:r>
+          </a:p>
+          <a:p>
+            <a:endParaRPr lang="en-US" baseline="0" dirty="0" smtClean="0"/>
+          </a:p>
+          <a:p>
+            <a:r>
+              <a:rPr lang="en-US" baseline="0" dirty="0" smtClean="0"/>
+              <a:t>EXPERIENCE (the verb) rather than facts ; emotions over facts. REACTIONS. </a:t>
+            </a:r>
+          </a:p>
+          <a:p>
+            <a:endParaRPr lang="en-US" baseline="0" dirty="0" smtClean="0"/>
+          </a:p>
+          <a:p>
+            <a:r>
+              <a:rPr lang="en-US" baseline="0" dirty="0" smtClean="0"/>
+              <a:t>UNDERSTANDING – where you start (knowing the thing (code &amp; environment), knowing the user, knowing the problems, knowing the developers (how to help them and what they do so that you can efficiently test), knowing the hackers (weird use cases outside common ‘have you tried reading it upside down’) , knowing all stakeholders, knowing the business priorities)</a:t>
+            </a:r>
+          </a:p>
+          <a:p>
+            <a:endParaRPr lang="en-US" baseline="0" dirty="0" smtClean="0"/>
+          </a:p>
+          <a:p>
+            <a:r>
+              <a:rPr lang="en-US" baseline="0" dirty="0" smtClean="0"/>
+              <a:t> </a:t>
+            </a:r>
+          </a:p>
+        </p:txBody>
+      </p:sp>
+      <p:sp>
+        <p:nvSpPr>
+          <p:cNvPr id="4" name="Slide Number Placeholder 3"/>
+          <p:cNvSpPr>
+            <a:spLocks noGrp="1"/>
+          </p:cNvSpPr>
+          <p:nvPr>
+            <p:ph type="sldNum" sz="quarter" idx="10"/>
+          </p:nvPr>
+        </p:nvSpPr>
+        <p:spPr/>
+        <p:txBody>
+          <a:bodyPr/>
+          <a:lstStyle/>
+          <a:p>
+            <a:fld id="{DDB516CE-D814-CC47-9A3A-08F3D723435B}" type="slidenum">
+              <a:rPr lang="en-US" smtClean="0"/>
+              <a:pPr/>
+              <a:t>21</a:t>
+            </a:fld>
+            <a:endParaRPr lang="en-US"/>
+          </a:p>
+        </p:txBody>
+      </p:sp>
+    </p:spTree>
+    <p:extLst>
+      <p:ext uri="{BB962C8B-B14F-4D97-AF65-F5344CB8AC3E}">
+        <p14:creationId xmlns:p14="http://schemas.microsoft.com/office/powerpoint/2010/main" val="3738914185"/>
       </p:ext>
     </p:extLst>
   </p:cSld>
@@ -741,7 +875,7 @@
           <a:p>
             <a:fld id="{B7CABD0F-E43C-9343-80E3-B733E3541CC1}" type="datetimeFigureOut">
               <a:rPr lang="en-US" smtClean="0"/>
-              <a:t>9/10/15</a:t>
+              <a:t>10/7/15</a:t>
             </a:fld>
             <a:endParaRPr lang="en-US"/>
           </a:p>
@@ -911,7 +1045,7 @@
           <a:p>
             <a:fld id="{B7CABD0F-E43C-9343-80E3-B733E3541CC1}" type="datetimeFigureOut">
               <a:rPr lang="en-US" smtClean="0"/>
-              <a:t>9/10/15</a:t>
+              <a:t>10/7/15</a:t>
             </a:fld>
             <a:endParaRPr lang="en-US"/>
           </a:p>
@@ -1091,7 +1225,7 @@
           <a:p>
             <a:fld id="{B7CABD0F-E43C-9343-80E3-B733E3541CC1}" type="datetimeFigureOut">
               <a:rPr lang="en-US" smtClean="0"/>
-              <a:t>9/10/15</a:t>
+              <a:t>10/7/15</a:t>
             </a:fld>
             <a:endParaRPr lang="en-US"/>
           </a:p>
@@ -1261,7 +1395,7 @@
           <a:p>
             <a:fld id="{B7CABD0F-E43C-9343-80E3-B733E3541CC1}" type="datetimeFigureOut">
               <a:rPr lang="en-US" smtClean="0"/>
-              <a:t>9/10/15</a:t>
+              <a:t>10/7/15</a:t>
             </a:fld>
             <a:endParaRPr lang="en-US"/>
           </a:p>
@@ -1507,7 +1641,7 @@
           <a:p>
             <a:fld id="{B7CABD0F-E43C-9343-80E3-B733E3541CC1}" type="datetimeFigureOut">
               <a:rPr lang="en-US" smtClean="0"/>
-              <a:t>9/10/15</a:t>
+              <a:t>10/7/15</a:t>
             </a:fld>
             <a:endParaRPr lang="en-US"/>
           </a:p>
@@ -1795,7 +1929,7 @@
           <a:p>
             <a:fld id="{B7CABD0F-E43C-9343-80E3-B733E3541CC1}" type="datetimeFigureOut">
               <a:rPr lang="en-US" smtClean="0"/>
-              <a:t>9/10/15</a:t>
+              <a:t>10/7/15</a:t>
             </a:fld>
             <a:endParaRPr lang="en-US"/>
           </a:p>
@@ -2217,7 +2351,7 @@
           <a:p>
             <a:fld id="{B7CABD0F-E43C-9343-80E3-B733E3541CC1}" type="datetimeFigureOut">
               <a:rPr lang="en-US" smtClean="0"/>
-              <a:t>9/10/15</a:t>
+              <a:t>10/7/15</a:t>
             </a:fld>
             <a:endParaRPr lang="en-US"/>
           </a:p>
@@ -2335,7 +2469,7 @@
           <a:p>
             <a:fld id="{B7CABD0F-E43C-9343-80E3-B733E3541CC1}" type="datetimeFigureOut">
               <a:rPr lang="en-US" smtClean="0"/>
-              <a:t>9/10/15</a:t>
+              <a:t>10/7/15</a:t>
             </a:fld>
             <a:endParaRPr lang="en-US"/>
           </a:p>
@@ -2430,7 +2564,7 @@
           <a:p>
             <a:fld id="{B7CABD0F-E43C-9343-80E3-B733E3541CC1}" type="datetimeFigureOut">
               <a:rPr lang="en-US" smtClean="0"/>
-              <a:t>9/10/15</a:t>
+              <a:t>10/7/15</a:t>
             </a:fld>
             <a:endParaRPr lang="en-US"/>
           </a:p>
@@ -2707,7 +2841,7 @@
           <a:p>
             <a:fld id="{B7CABD0F-E43C-9343-80E3-B733E3541CC1}" type="datetimeFigureOut">
               <a:rPr lang="en-US" smtClean="0"/>
-              <a:t>9/10/15</a:t>
+              <a:t>10/7/15</a:t>
             </a:fld>
             <a:endParaRPr lang="en-US"/>
           </a:p>
@@ -2960,7 +3094,7 @@
           <a:p>
             <a:fld id="{B7CABD0F-E43C-9343-80E3-B733E3541CC1}" type="datetimeFigureOut">
               <a:rPr lang="en-US" smtClean="0"/>
-              <a:t>9/10/15</a:t>
+              <a:t>10/7/15</a:t>
             </a:fld>
             <a:endParaRPr lang="en-US"/>
           </a:p>
@@ -3173,7 +3307,7 @@
           <a:p>
             <a:fld id="{B7CABD0F-E43C-9343-80E3-B733E3541CC1}" type="datetimeFigureOut">
               <a:rPr lang="en-US" smtClean="0"/>
-              <a:t>9/10/15</a:t>
+              <a:t>10/7/15</a:t>
             </a:fld>
             <a:endParaRPr lang="en-US"/>
           </a:p>
@@ -3548,6 +3682,449 @@
           <a:chExt cx="0" cy="0"/>
         </a:xfrm>
       </p:grpSpPr>
+      <p:pic>
+        <p:nvPicPr>
+          <p:cNvPr id="2" name="Picture 1"/>
+          <p:cNvPicPr>
+            <a:picLocks noChangeAspect="1"/>
+          </p:cNvPicPr>
+          <p:nvPr/>
+        </p:nvPicPr>
+        <p:blipFill>
+          <a:blip r:embed="rId2"/>
+          <a:stretch>
+            <a:fillRect/>
+          </a:stretch>
+        </p:blipFill>
+        <p:spPr>
+          <a:xfrm>
+            <a:off x="0" y="0"/>
+            <a:ext cx="9144000" cy="6858000"/>
+          </a:xfrm>
+          <a:prstGeom prst="rect">
+            <a:avLst/>
+          </a:prstGeom>
+        </p:spPr>
+      </p:pic>
+      <p:sp>
+        <p:nvSpPr>
+          <p:cNvPr id="5" name="Rectangle 4"/>
+          <p:cNvSpPr/>
+          <p:nvPr/>
+        </p:nvSpPr>
+        <p:spPr>
+          <a:xfrm>
+            <a:off x="2862381" y="3886200"/>
+            <a:ext cx="3467111" cy="1273677"/>
+          </a:xfrm>
+          <a:prstGeom prst="rect">
+            <a:avLst/>
+          </a:prstGeom>
+          <a:solidFill>
+            <a:srgbClr val="FFFFFF">
+              <a:alpha val="77000"/>
+            </a:srgbClr>
+          </a:solidFill>
+          <a:ln>
+            <a:solidFill>
+              <a:srgbClr val="FFFFFF"/>
+            </a:solidFill>
+          </a:ln>
+          <a:effectLst/>
+        </p:spPr>
+        <p:style>
+          <a:lnRef idx="1">
+            <a:schemeClr val="accent1"/>
+          </a:lnRef>
+          <a:fillRef idx="3">
+            <a:schemeClr val="accent1"/>
+          </a:fillRef>
+          <a:effectRef idx="2">
+            <a:schemeClr val="accent1"/>
+          </a:effectRef>
+          <a:fontRef idx="minor">
+            <a:schemeClr val="lt1"/>
+          </a:fontRef>
+        </p:style>
+        <p:txBody>
+          <a:bodyPr rtlCol="0" anchor="ctr"/>
+          <a:lstStyle/>
+          <a:p>
+            <a:pPr algn="ctr"/>
+            <a:endParaRPr lang="en-US"/>
+          </a:p>
+        </p:txBody>
+      </p:sp>
+      <p:sp>
+        <p:nvSpPr>
+          <p:cNvPr id="7" name="Subtitle 6"/>
+          <p:cNvSpPr>
+            <a:spLocks noGrp="1"/>
+          </p:cNvSpPr>
+          <p:nvPr>
+            <p:ph type="subTitle" idx="1"/>
+          </p:nvPr>
+        </p:nvSpPr>
+        <p:spPr>
+          <a:xfrm>
+            <a:off x="1371600" y="3886200"/>
+            <a:ext cx="4776474" cy="1273677"/>
+          </a:xfrm>
+        </p:spPr>
+        <p:txBody>
+          <a:bodyPr>
+            <a:normAutofit/>
+          </a:bodyPr>
+          <a:lstStyle/>
+          <a:p>
+            <a:pPr algn="r"/>
+            <a:r>
+              <a:rPr lang="en-US" dirty="0" smtClean="0">
+                <a:solidFill>
+                  <a:schemeClr val="tx1">
+                    <a:lumMod val="75000"/>
+                    <a:lumOff val="25000"/>
+                  </a:schemeClr>
+                </a:solidFill>
+              </a:rPr>
+              <a:t>@</a:t>
+            </a:r>
+            <a:r>
+              <a:rPr lang="en-US" dirty="0" err="1" smtClean="0">
+                <a:solidFill>
+                  <a:schemeClr val="tx1">
+                    <a:lumMod val="75000"/>
+                    <a:lumOff val="25000"/>
+                  </a:schemeClr>
+                </a:solidFill>
+              </a:rPr>
+              <a:t>maaretp</a:t>
+            </a:r>
+            <a:endParaRPr lang="en-US" dirty="0" smtClean="0">
+              <a:solidFill>
+                <a:schemeClr val="tx1">
+                  <a:lumMod val="75000"/>
+                  <a:lumOff val="25000"/>
+                </a:schemeClr>
+              </a:solidFill>
+            </a:endParaRPr>
+          </a:p>
+          <a:p>
+            <a:pPr algn="r"/>
+            <a:r>
+              <a:rPr lang="en-US" dirty="0" smtClean="0">
+                <a:solidFill>
+                  <a:schemeClr val="tx1">
+                    <a:lumMod val="75000"/>
+                    <a:lumOff val="25000"/>
+                  </a:schemeClr>
+                </a:solidFill>
+              </a:rPr>
+              <a:t>@LlewellynFalco</a:t>
+            </a:r>
+          </a:p>
+          <a:p>
+            <a:pPr algn="r"/>
+            <a:endParaRPr lang="en-US" sz="2200" dirty="0" smtClean="0">
+              <a:solidFill>
+                <a:schemeClr val="tx1">
+                  <a:lumMod val="75000"/>
+                  <a:lumOff val="25000"/>
+                </a:schemeClr>
+              </a:solidFill>
+            </a:endParaRPr>
+          </a:p>
+          <a:p>
+            <a:pPr algn="r"/>
+            <a:endParaRPr lang="en-US" sz="2200" dirty="0">
+              <a:solidFill>
+                <a:schemeClr val="tx1">
+                  <a:lumMod val="75000"/>
+                  <a:lumOff val="25000"/>
+                </a:schemeClr>
+              </a:solidFill>
+            </a:endParaRPr>
+          </a:p>
+        </p:txBody>
+      </p:sp>
+    </p:spTree>
+    <p:extLst>
+      <p:ext uri="{BB962C8B-B14F-4D97-AF65-F5344CB8AC3E}">
+        <p14:creationId xmlns:p14="http://schemas.microsoft.com/office/powerpoint/2010/main" val="2203842716"/>
+      </p:ext>
+    </p:extLst>
+  </p:cSld>
+  <p:clrMapOvr>
+    <a:masterClrMapping/>
+  </p:clrMapOvr>
+  <p:timing>
+    <p:tnLst>
+      <p:par>
+        <p:cTn xmlns:p14="http://schemas.microsoft.com/office/powerpoint/2010/main" id="1" dur="indefinite" restart="never" nodeType="tmRoot"/>
+      </p:par>
+    </p:tnLst>
+  </p:timing>
+</p:sld>
+</file>
+
+<file path=ppt/slides/slide10.xml><?xml version="1.0" encoding="utf-8"?>
+<p:sld xmlns:a="http://schemas.openxmlformats.org/drawingml/2006/main" xmlns:r="http://schemas.openxmlformats.org/officeDocument/2006/relationships" xmlns:p="http://schemas.openxmlformats.org/presentationml/2006/main">
+  <p:cSld>
+    <p:spTree>
+      <p:nvGrpSpPr>
+        <p:cNvPr id="1" name=""/>
+        <p:cNvGrpSpPr/>
+        <p:nvPr/>
+      </p:nvGrpSpPr>
+      <p:grpSpPr>
+        <a:xfrm>
+          <a:off x="0" y="0"/>
+          <a:ext cx="0" cy="0"/>
+          <a:chOff x="0" y="0"/>
+          <a:chExt cx="0" cy="0"/>
+        </a:xfrm>
+      </p:grpSpPr>
+      <p:pic>
+        <p:nvPicPr>
+          <p:cNvPr id="5" name="Picture 4" descr="Macintosh HD:Users:llewellyn:Pictures:Koans Randori Images:navigator.png"/>
+          <p:cNvPicPr/>
+          <p:nvPr/>
+        </p:nvPicPr>
+        <p:blipFill rotWithShape="1">
+          <a:blip r:embed="rId2">
+            <a:extLst>
+              <a:ext uri="{28A0092B-C50C-407E-A947-70E740481C1C}">
+                <a14:useLocalDpi xmlns:a14="http://schemas.microsoft.com/office/drawing/2010/main" val="0"/>
+              </a:ext>
+            </a:extLst>
+          </a:blip>
+          <a:srcRect t="13400" b="41812"/>
+          <a:stretch/>
+        </p:blipFill>
+        <p:spPr bwMode="auto">
+          <a:xfrm>
+            <a:off x="844251" y="846541"/>
+            <a:ext cx="7609982" cy="4414113"/>
+          </a:xfrm>
+          <a:prstGeom prst="rect">
+            <a:avLst/>
+          </a:prstGeom>
+          <a:noFill/>
+          <a:ln>
+            <a:noFill/>
+          </a:ln>
+        </p:spPr>
+      </p:pic>
+      <p:sp>
+        <p:nvSpPr>
+          <p:cNvPr id="4" name="Rectangle 3"/>
+          <p:cNvSpPr/>
+          <p:nvPr/>
+        </p:nvSpPr>
+        <p:spPr>
+          <a:xfrm>
+            <a:off x="844251" y="6488668"/>
+            <a:ext cx="8299749" cy="584776"/>
+          </a:xfrm>
+          <a:prstGeom prst="rect">
+            <a:avLst/>
+          </a:prstGeom>
+        </p:spPr>
+        <p:txBody>
+          <a:bodyPr wrap="square">
+            <a:spAutoFit/>
+          </a:bodyPr>
+          <a:lstStyle/>
+          <a:p>
+            <a:pPr algn="r"/>
+            <a:r>
+              <a:rPr lang="en-US" sz="1600" dirty="0" smtClean="0"/>
+              <a:t>* http://visible-</a:t>
+            </a:r>
+            <a:r>
+              <a:rPr lang="en-US" sz="1600" dirty="0" err="1" smtClean="0"/>
+              <a:t>quality.blogspot.fi</a:t>
+            </a:r>
+            <a:r>
+              <a:rPr lang="en-US" sz="1600" dirty="0" smtClean="0"/>
+              <a:t>/2015/09/my-first-full-day-of-mob-</a:t>
+            </a:r>
+            <a:r>
+              <a:rPr lang="en-US" sz="1600" dirty="0" err="1" smtClean="0"/>
+              <a:t>programming.html</a:t>
+            </a:r>
+            <a:endParaRPr lang="en-US" sz="1600" dirty="0" smtClean="0"/>
+          </a:p>
+          <a:p>
+            <a:pPr algn="r"/>
+            <a:endParaRPr lang="en-US" sz="1600" dirty="0"/>
+          </a:p>
+        </p:txBody>
+      </p:sp>
+      <p:sp>
+        <p:nvSpPr>
+          <p:cNvPr id="6" name="Oval Callout 5"/>
+          <p:cNvSpPr/>
+          <p:nvPr/>
+        </p:nvSpPr>
+        <p:spPr>
+          <a:xfrm>
+            <a:off x="985354" y="1027943"/>
+            <a:ext cx="2824436" cy="2217136"/>
+          </a:xfrm>
+          <a:prstGeom prst="wedgeEllipseCallout">
+            <a:avLst/>
+          </a:prstGeom>
+        </p:spPr>
+        <p:style>
+          <a:lnRef idx="1">
+            <a:schemeClr val="dk1"/>
+          </a:lnRef>
+          <a:fillRef idx="2">
+            <a:schemeClr val="dk1"/>
+          </a:fillRef>
+          <a:effectRef idx="1">
+            <a:schemeClr val="dk1"/>
+          </a:effectRef>
+          <a:fontRef idx="minor">
+            <a:schemeClr val="dk1"/>
+          </a:fontRef>
+        </p:style>
+        <p:txBody>
+          <a:bodyPr rtlCol="0" anchor="ctr"/>
+          <a:lstStyle/>
+          <a:p>
+            <a:pPr algn="ctr"/>
+            <a:r>
+              <a:rPr lang="en-US" sz="2400" dirty="0" smtClean="0"/>
+              <a:t>That would’ve been a nasty one to find later</a:t>
+            </a:r>
+            <a:endParaRPr lang="en-US" sz="2400" dirty="0"/>
+          </a:p>
+        </p:txBody>
+      </p:sp>
+    </p:spTree>
+    <p:extLst>
+      <p:ext uri="{BB962C8B-B14F-4D97-AF65-F5344CB8AC3E}">
+        <p14:creationId xmlns:p14="http://schemas.microsoft.com/office/powerpoint/2010/main" val="455515830"/>
+      </p:ext>
+    </p:extLst>
+  </p:cSld>
+  <p:clrMapOvr>
+    <a:masterClrMapping/>
+  </p:clrMapOvr>
+  <p:timing>
+    <p:tnLst>
+      <p:par>
+        <p:cTn xmlns:p14="http://schemas.microsoft.com/office/powerpoint/2010/main" id="1" dur="indefinite" restart="never" nodeType="tmRoot"/>
+      </p:par>
+    </p:tnLst>
+  </p:timing>
+</p:sld>
+</file>
+
+<file path=ppt/slides/slide11.xml><?xml version="1.0" encoding="utf-8"?>
+<p:sld xmlns:a="http://schemas.openxmlformats.org/drawingml/2006/main" xmlns:r="http://schemas.openxmlformats.org/officeDocument/2006/relationships" xmlns:p="http://schemas.openxmlformats.org/presentationml/2006/main">
+  <p:cSld>
+    <p:spTree>
+      <p:nvGrpSpPr>
+        <p:cNvPr id="1" name=""/>
+        <p:cNvGrpSpPr/>
+        <p:nvPr/>
+      </p:nvGrpSpPr>
+      <p:grpSpPr>
+        <a:xfrm>
+          <a:off x="0" y="0"/>
+          <a:ext cx="0" cy="0"/>
+          <a:chOff x="0" y="0"/>
+          <a:chExt cx="0" cy="0"/>
+        </a:xfrm>
+      </p:grpSpPr>
+      <p:sp>
+        <p:nvSpPr>
+          <p:cNvPr id="4" name="Title 3"/>
+          <p:cNvSpPr>
+            <a:spLocks noGrp="1"/>
+          </p:cNvSpPr>
+          <p:nvPr>
+            <p:ph type="title"/>
+          </p:nvPr>
+        </p:nvSpPr>
+        <p:spPr>
+          <a:xfrm>
+            <a:off x="457200" y="274637"/>
+            <a:ext cx="8229600" cy="6162777"/>
+          </a:xfrm>
+        </p:spPr>
+        <p:txBody>
+          <a:bodyPr>
+            <a:normAutofit/>
+          </a:bodyPr>
+          <a:lstStyle/>
+          <a:p>
+            <a:r>
+              <a:rPr lang="en-US" dirty="0" smtClean="0"/>
+              <a:t>Co-creation </a:t>
+            </a:r>
+            <a:br>
+              <a:rPr lang="en-US" dirty="0" smtClean="0"/>
+            </a:br>
+            <a:r>
+              <a:rPr lang="en-US" sz="3200" dirty="0" smtClean="0"/>
+              <a:t>vs. </a:t>
+            </a:r>
+            <a:r>
+              <a:rPr lang="en-US" dirty="0" smtClean="0"/>
+              <a:t/>
+            </a:r>
+            <a:br>
+              <a:rPr lang="en-US" dirty="0" smtClean="0"/>
+            </a:br>
+            <a:r>
+              <a:rPr lang="en-US" dirty="0" smtClean="0"/>
+              <a:t>Collaboration</a:t>
+            </a:r>
+            <a:endParaRPr lang="en-US" dirty="0"/>
+          </a:p>
+        </p:txBody>
+      </p:sp>
+    </p:spTree>
+    <p:extLst>
+      <p:ext uri="{BB962C8B-B14F-4D97-AF65-F5344CB8AC3E}">
+        <p14:creationId xmlns:p14="http://schemas.microsoft.com/office/powerpoint/2010/main" val="710113217"/>
+      </p:ext>
+    </p:extLst>
+  </p:cSld>
+  <p:clrMapOvr>
+    <a:masterClrMapping/>
+  </p:clrMapOvr>
+  <p:timing>
+    <p:tnLst>
+      <p:par>
+        <p:cTn xmlns:p14="http://schemas.microsoft.com/office/powerpoint/2010/main" id="1" dur="indefinite" restart="never" nodeType="tmRoot"/>
+      </p:par>
+    </p:tnLst>
+  </p:timing>
+</p:sld>
+</file>
+
+<file path=ppt/slides/slide12.xml><?xml version="1.0" encoding="utf-8"?>
+<p:sld xmlns:a="http://schemas.openxmlformats.org/drawingml/2006/main" xmlns:r="http://schemas.openxmlformats.org/officeDocument/2006/relationships" xmlns:p="http://schemas.openxmlformats.org/presentationml/2006/main">
+  <p:cSld>
+    <p:spTree>
+      <p:nvGrpSpPr>
+        <p:cNvPr id="1" name=""/>
+        <p:cNvGrpSpPr/>
+        <p:nvPr/>
+      </p:nvGrpSpPr>
+      <p:grpSpPr>
+        <a:xfrm>
+          <a:off x="0" y="0"/>
+          <a:ext cx="0" cy="0"/>
+          <a:chOff x="0" y="0"/>
+          <a:chExt cx="0" cy="0"/>
+        </a:xfrm>
+      </p:grpSpPr>
       <p:sp>
         <p:nvSpPr>
           <p:cNvPr id="2" name="Title 1"/>
@@ -3616,10 +4193,739 @@
   <p:clrMapOvr>
     <a:masterClrMapping/>
   </p:clrMapOvr>
+  <p:timing>
+    <p:tnLst>
+      <p:par>
+        <p:cTn xmlns:p14="http://schemas.microsoft.com/office/powerpoint/2010/main" id="1" dur="indefinite" restart="never" nodeType="tmRoot"/>
+      </p:par>
+    </p:tnLst>
+  </p:timing>
 </p:sld>
 </file>
 
-<file path=ppt/slides/slide10.xml><?xml version="1.0" encoding="utf-8"?>
+<file path=ppt/slides/slide13.xml><?xml version="1.0" encoding="utf-8"?>
+<p:sld xmlns:a="http://schemas.openxmlformats.org/drawingml/2006/main" xmlns:r="http://schemas.openxmlformats.org/officeDocument/2006/relationships" xmlns:p="http://schemas.openxmlformats.org/presentationml/2006/main">
+  <p:cSld>
+    <p:spTree>
+      <p:nvGrpSpPr>
+        <p:cNvPr id="1" name=""/>
+        <p:cNvGrpSpPr/>
+        <p:nvPr/>
+      </p:nvGrpSpPr>
+      <p:grpSpPr>
+        <a:xfrm>
+          <a:off x="0" y="0"/>
+          <a:ext cx="0" cy="0"/>
+          <a:chOff x="0" y="0"/>
+          <a:chExt cx="0" cy="0"/>
+        </a:xfrm>
+      </p:grpSpPr>
+      <p:sp>
+        <p:nvSpPr>
+          <p:cNvPr id="2" name="Title 1"/>
+          <p:cNvSpPr>
+            <a:spLocks noGrp="1"/>
+          </p:cNvSpPr>
+          <p:nvPr>
+            <p:ph type="ctrTitle"/>
+          </p:nvPr>
+        </p:nvSpPr>
+        <p:spPr>
+          <a:xfrm>
+            <a:off x="685800" y="3600450"/>
+            <a:ext cx="7772400" cy="1470025"/>
+          </a:xfrm>
+        </p:spPr>
+        <p:txBody>
+          <a:bodyPr/>
+          <a:lstStyle/>
+          <a:p>
+            <a:r>
+              <a:rPr lang="en-US" dirty="0" smtClean="0"/>
+              <a:t>1</a:t>
+            </a:r>
+            <a:r>
+              <a:rPr lang="en-US" baseline="30000" dirty="0" smtClean="0"/>
+              <a:t>st</a:t>
+            </a:r>
+            <a:r>
+              <a:rPr lang="en-US" dirty="0" smtClean="0"/>
+              <a:t> session on unit testing</a:t>
+            </a:r>
+            <a:endParaRPr lang="en-US" dirty="0"/>
+          </a:p>
+        </p:txBody>
+      </p:sp>
+      <p:pic>
+        <p:nvPicPr>
+          <p:cNvPr id="4" name="Picture 3"/>
+          <p:cNvPicPr>
+            <a:picLocks noChangeAspect="1"/>
+          </p:cNvPicPr>
+          <p:nvPr/>
+        </p:nvPicPr>
+        <p:blipFill>
+          <a:blip r:embed="rId2"/>
+          <a:stretch>
+            <a:fillRect/>
+          </a:stretch>
+        </p:blipFill>
+        <p:spPr>
+          <a:xfrm>
+            <a:off x="5624417" y="553742"/>
+            <a:ext cx="3251200" cy="3251200"/>
+          </a:xfrm>
+          <a:prstGeom prst="rect">
+            <a:avLst/>
+          </a:prstGeom>
+        </p:spPr>
+      </p:pic>
+      <p:sp>
+        <p:nvSpPr>
+          <p:cNvPr id="5" name="Rectangle 4"/>
+          <p:cNvSpPr/>
+          <p:nvPr/>
+        </p:nvSpPr>
+        <p:spPr>
+          <a:xfrm>
+            <a:off x="1411032" y="6418666"/>
+            <a:ext cx="7732967" cy="338554"/>
+          </a:xfrm>
+          <a:prstGeom prst="rect">
+            <a:avLst/>
+          </a:prstGeom>
+        </p:spPr>
+        <p:txBody>
+          <a:bodyPr wrap="square">
+            <a:spAutoFit/>
+          </a:bodyPr>
+          <a:lstStyle/>
+          <a:p>
+            <a:pPr algn="r"/>
+            <a:r>
+              <a:rPr lang="en-US" sz="1600" dirty="0" smtClean="0"/>
+              <a:t>  * http://visible-</a:t>
+            </a:r>
+            <a:r>
+              <a:rPr lang="en-US" sz="1600" dirty="0" err="1" smtClean="0"/>
+              <a:t>quality.blogspot.fi</a:t>
+            </a:r>
+            <a:r>
+              <a:rPr lang="en-US" sz="1600" dirty="0" smtClean="0"/>
+              <a:t>/2015/01/a-learning-journey-with-unit-tests-</a:t>
+            </a:r>
+            <a:r>
+              <a:rPr lang="en-US" sz="1600" dirty="0" err="1" smtClean="0"/>
+              <a:t>just.html</a:t>
+            </a:r>
+            <a:endParaRPr lang="en-US" sz="1600" dirty="0"/>
+          </a:p>
+        </p:txBody>
+      </p:sp>
+    </p:spTree>
+    <p:extLst>
+      <p:ext uri="{BB962C8B-B14F-4D97-AF65-F5344CB8AC3E}">
+        <p14:creationId xmlns:p14="http://schemas.microsoft.com/office/powerpoint/2010/main" val="2975425866"/>
+      </p:ext>
+    </p:extLst>
+  </p:cSld>
+  <p:clrMapOvr>
+    <a:masterClrMapping/>
+  </p:clrMapOvr>
+  <p:timing>
+    <p:tnLst>
+      <p:par>
+        <p:cTn xmlns:p14="http://schemas.microsoft.com/office/powerpoint/2010/main" id="1" dur="indefinite" restart="never" nodeType="tmRoot"/>
+      </p:par>
+    </p:tnLst>
+  </p:timing>
+</p:sld>
+</file>
+
+<file path=ppt/slides/slide14.xml><?xml version="1.0" encoding="utf-8"?>
+<p:sld xmlns:a="http://schemas.openxmlformats.org/drawingml/2006/main" xmlns:r="http://schemas.openxmlformats.org/officeDocument/2006/relationships" xmlns:p="http://schemas.openxmlformats.org/presentationml/2006/main">
+  <p:cSld>
+    <p:spTree>
+      <p:nvGrpSpPr>
+        <p:cNvPr id="1" name=""/>
+        <p:cNvGrpSpPr/>
+        <p:nvPr/>
+      </p:nvGrpSpPr>
+      <p:grpSpPr>
+        <a:xfrm>
+          <a:off x="0" y="0"/>
+          <a:ext cx="0" cy="0"/>
+          <a:chOff x="0" y="0"/>
+          <a:chExt cx="0" cy="0"/>
+        </a:xfrm>
+      </p:grpSpPr>
+      <p:sp>
+        <p:nvSpPr>
+          <p:cNvPr id="2" name="Title 1"/>
+          <p:cNvSpPr>
+            <a:spLocks noGrp="1"/>
+          </p:cNvSpPr>
+          <p:nvPr>
+            <p:ph type="title"/>
+          </p:nvPr>
+        </p:nvSpPr>
+        <p:spPr/>
+        <p:txBody>
+          <a:bodyPr/>
+          <a:lstStyle/>
+          <a:p>
+            <a:r>
+              <a:rPr lang="en-US" dirty="0" smtClean="0"/>
+              <a:t>Strong Style Pairing</a:t>
+            </a:r>
+            <a:endParaRPr lang="en-US" dirty="0"/>
+          </a:p>
+        </p:txBody>
+      </p:sp>
+      <p:pic>
+        <p:nvPicPr>
+          <p:cNvPr id="5" name="Picture 4"/>
+          <p:cNvPicPr>
+            <a:picLocks noChangeAspect="1"/>
+          </p:cNvPicPr>
+          <p:nvPr/>
+        </p:nvPicPr>
+        <p:blipFill>
+          <a:blip r:embed="rId2"/>
+          <a:stretch>
+            <a:fillRect/>
+          </a:stretch>
+        </p:blipFill>
+        <p:spPr>
+          <a:xfrm>
+            <a:off x="1926224" y="3170072"/>
+            <a:ext cx="4507805" cy="3058059"/>
+          </a:xfrm>
+          <a:prstGeom prst="rect">
+            <a:avLst/>
+          </a:prstGeom>
+        </p:spPr>
+      </p:pic>
+      <p:sp>
+        <p:nvSpPr>
+          <p:cNvPr id="6" name="TextBox 5"/>
+          <p:cNvSpPr txBox="1"/>
+          <p:nvPr/>
+        </p:nvSpPr>
+        <p:spPr>
+          <a:xfrm>
+            <a:off x="624886" y="1395590"/>
+            <a:ext cx="7619580" cy="1754327"/>
+          </a:xfrm>
+          <a:prstGeom prst="rect">
+            <a:avLst/>
+          </a:prstGeom>
+          <a:noFill/>
+        </p:spPr>
+        <p:txBody>
+          <a:bodyPr wrap="square" rtlCol="0">
+            <a:spAutoFit/>
+          </a:bodyPr>
+          <a:lstStyle/>
+          <a:p>
+            <a:pPr algn="ctr"/>
+            <a:r>
+              <a:rPr lang="en-US" sz="3600" dirty="0" smtClean="0">
+                <a:latin typeface="Arial"/>
+                <a:cs typeface="Arial"/>
+              </a:rPr>
+              <a:t>“For an idea to go from your head to the computer it </a:t>
+            </a:r>
+            <a:r>
+              <a:rPr lang="en-US" sz="3600" b="1" i="1" dirty="0" smtClean="0">
+                <a:latin typeface="Arial"/>
+                <a:cs typeface="Arial"/>
+              </a:rPr>
+              <a:t>must</a:t>
+            </a:r>
+            <a:r>
+              <a:rPr lang="en-US" sz="3600" dirty="0" smtClean="0">
+                <a:latin typeface="Arial"/>
+                <a:cs typeface="Arial"/>
+              </a:rPr>
+              <a:t> go though someone else’s hands”</a:t>
+            </a:r>
+            <a:endParaRPr lang="en-US" sz="3600" dirty="0">
+              <a:latin typeface="Arial"/>
+              <a:cs typeface="Arial"/>
+            </a:endParaRPr>
+          </a:p>
+        </p:txBody>
+      </p:sp>
+      <p:sp>
+        <p:nvSpPr>
+          <p:cNvPr id="7" name="Rectangle 6"/>
+          <p:cNvSpPr/>
+          <p:nvPr/>
+        </p:nvSpPr>
+        <p:spPr>
+          <a:xfrm>
+            <a:off x="1411032" y="6418666"/>
+            <a:ext cx="7732967" cy="338554"/>
+          </a:xfrm>
+          <a:prstGeom prst="rect">
+            <a:avLst/>
+          </a:prstGeom>
+        </p:spPr>
+        <p:txBody>
+          <a:bodyPr wrap="square">
+            <a:spAutoFit/>
+          </a:bodyPr>
+          <a:lstStyle/>
+          <a:p>
+            <a:pPr algn="r"/>
+            <a:r>
+              <a:rPr lang="en-US" sz="1600" dirty="0" smtClean="0"/>
+              <a:t>  *http://</a:t>
+            </a:r>
+            <a:r>
+              <a:rPr lang="en-US" sz="1600" dirty="0" err="1" smtClean="0"/>
+              <a:t>llewellynfalco.blogspot.fi</a:t>
+            </a:r>
+            <a:r>
+              <a:rPr lang="en-US" sz="1600" dirty="0" smtClean="0"/>
+              <a:t>/2014/06/</a:t>
+            </a:r>
+            <a:r>
+              <a:rPr lang="en-US" sz="1600" dirty="0" err="1" smtClean="0"/>
+              <a:t>llewellyns</a:t>
+            </a:r>
+            <a:r>
+              <a:rPr lang="en-US" sz="1600" dirty="0" smtClean="0"/>
+              <a:t>-strong-style-</a:t>
+            </a:r>
+            <a:r>
+              <a:rPr lang="en-US" sz="1600" dirty="0" err="1" smtClean="0"/>
+              <a:t>pairing.html</a:t>
+            </a:r>
+            <a:endParaRPr lang="en-US" sz="1600" dirty="0"/>
+          </a:p>
+        </p:txBody>
+      </p:sp>
+    </p:spTree>
+    <p:extLst>
+      <p:ext uri="{BB962C8B-B14F-4D97-AF65-F5344CB8AC3E}">
+        <p14:creationId xmlns:p14="http://schemas.microsoft.com/office/powerpoint/2010/main" val="1587320404"/>
+      </p:ext>
+    </p:extLst>
+  </p:cSld>
+  <p:clrMapOvr>
+    <a:masterClrMapping/>
+  </p:clrMapOvr>
+  <p:timing>
+    <p:tnLst>
+      <p:par>
+        <p:cTn xmlns:p14="http://schemas.microsoft.com/office/powerpoint/2010/main" id="1" dur="indefinite" restart="never" nodeType="tmRoot"/>
+      </p:par>
+    </p:tnLst>
+  </p:timing>
+</p:sld>
+</file>
+
+<file path=ppt/slides/slide15.xml><?xml version="1.0" encoding="utf-8"?>
+<p:sld xmlns:a="http://schemas.openxmlformats.org/drawingml/2006/main" xmlns:r="http://schemas.openxmlformats.org/officeDocument/2006/relationships" xmlns:p="http://schemas.openxmlformats.org/presentationml/2006/main">
+  <p:cSld>
+    <p:spTree>
+      <p:nvGrpSpPr>
+        <p:cNvPr id="1" name=""/>
+        <p:cNvGrpSpPr/>
+        <p:nvPr/>
+      </p:nvGrpSpPr>
+      <p:grpSpPr>
+        <a:xfrm>
+          <a:off x="0" y="0"/>
+          <a:ext cx="0" cy="0"/>
+          <a:chOff x="0" y="0"/>
+          <a:chExt cx="0" cy="0"/>
+        </a:xfrm>
+      </p:grpSpPr>
+      <p:sp>
+        <p:nvSpPr>
+          <p:cNvPr id="2" name="Title 1"/>
+          <p:cNvSpPr>
+            <a:spLocks noGrp="1"/>
+          </p:cNvSpPr>
+          <p:nvPr>
+            <p:ph type="title"/>
+          </p:nvPr>
+        </p:nvSpPr>
+        <p:spPr/>
+        <p:txBody>
+          <a:bodyPr/>
+          <a:lstStyle/>
+          <a:p>
+            <a:r>
+              <a:rPr lang="en-US" dirty="0" smtClean="0"/>
+              <a:t>Farming vs. Hunting</a:t>
+            </a:r>
+            <a:endParaRPr lang="en-US" dirty="0"/>
+          </a:p>
+        </p:txBody>
+      </p:sp>
+      <p:pic>
+        <p:nvPicPr>
+          <p:cNvPr id="4" name="Picture 3"/>
+          <p:cNvPicPr>
+            <a:picLocks noChangeAspect="1"/>
+          </p:cNvPicPr>
+          <p:nvPr/>
+        </p:nvPicPr>
+        <p:blipFill rotWithShape="1">
+          <a:blip r:embed="rId2"/>
+          <a:srcRect l="19027" t="3696" r="30887" b="8509"/>
+          <a:stretch/>
+        </p:blipFill>
+        <p:spPr>
+          <a:xfrm>
+            <a:off x="6067443" y="1639352"/>
+            <a:ext cx="2116551" cy="3875018"/>
+          </a:xfrm>
+          <a:prstGeom prst="rect">
+            <a:avLst/>
+          </a:prstGeom>
+        </p:spPr>
+      </p:pic>
+      <p:pic>
+        <p:nvPicPr>
+          <p:cNvPr id="5" name="Picture 4"/>
+          <p:cNvPicPr>
+            <a:picLocks noChangeAspect="1"/>
+          </p:cNvPicPr>
+          <p:nvPr/>
+        </p:nvPicPr>
+        <p:blipFill>
+          <a:blip r:embed="rId3">
+            <a:extLst>
+              <a:ext uri="{BEBA8EAE-BF5A-486C-A8C5-ECC9F3942E4B}">
+                <a14:imgProps xmlns:a14="http://schemas.microsoft.com/office/drawing/2010/main">
+                  <a14:imgLayer r:embed="rId4">
+                    <a14:imgEffect>
+                      <a14:saturation sat="0"/>
+                    </a14:imgEffect>
+                  </a14:imgLayer>
+                </a14:imgProps>
+              </a:ext>
+            </a:extLst>
+          </a:blip>
+          <a:stretch>
+            <a:fillRect/>
+          </a:stretch>
+        </p:blipFill>
+        <p:spPr>
+          <a:xfrm>
+            <a:off x="747307" y="1926353"/>
+            <a:ext cx="3485794" cy="3480431"/>
+          </a:xfrm>
+          <a:prstGeom prst="rect">
+            <a:avLst/>
+          </a:prstGeom>
+        </p:spPr>
+      </p:pic>
+    </p:spTree>
+    <p:extLst>
+      <p:ext uri="{BB962C8B-B14F-4D97-AF65-F5344CB8AC3E}">
+        <p14:creationId xmlns:p14="http://schemas.microsoft.com/office/powerpoint/2010/main" val="2942875328"/>
+      </p:ext>
+    </p:extLst>
+  </p:cSld>
+  <p:clrMapOvr>
+    <a:masterClrMapping/>
+  </p:clrMapOvr>
+  <p:timing>
+    <p:tnLst>
+      <p:par>
+        <p:cTn xmlns:p14="http://schemas.microsoft.com/office/powerpoint/2010/main" id="1" dur="indefinite" restart="never" nodeType="tmRoot"/>
+      </p:par>
+    </p:tnLst>
+  </p:timing>
+</p:sld>
+</file>
+
+<file path=ppt/slides/slide16.xml><?xml version="1.0" encoding="utf-8"?>
+<p:sld xmlns:a="http://schemas.openxmlformats.org/drawingml/2006/main" xmlns:r="http://schemas.openxmlformats.org/officeDocument/2006/relationships" xmlns:p="http://schemas.openxmlformats.org/presentationml/2006/main">
+  <p:cSld>
+    <p:spTree>
+      <p:nvGrpSpPr>
+        <p:cNvPr id="1" name=""/>
+        <p:cNvGrpSpPr/>
+        <p:nvPr/>
+      </p:nvGrpSpPr>
+      <p:grpSpPr>
+        <a:xfrm>
+          <a:off x="0" y="0"/>
+          <a:ext cx="0" cy="0"/>
+          <a:chOff x="0" y="0"/>
+          <a:chExt cx="0" cy="0"/>
+        </a:xfrm>
+      </p:grpSpPr>
+      <p:sp>
+        <p:nvSpPr>
+          <p:cNvPr id="2" name="Title 1"/>
+          <p:cNvSpPr>
+            <a:spLocks noGrp="1"/>
+          </p:cNvSpPr>
+          <p:nvPr>
+            <p:ph type="title"/>
+          </p:nvPr>
+        </p:nvSpPr>
+        <p:spPr/>
+        <p:txBody>
+          <a:bodyPr/>
+          <a:lstStyle/>
+          <a:p>
+            <a:r>
+              <a:rPr lang="en-US" dirty="0" smtClean="0"/>
+              <a:t>“Look at me” Pairing</a:t>
+            </a:r>
+            <a:endParaRPr lang="en-US" dirty="0"/>
+          </a:p>
+        </p:txBody>
+      </p:sp>
+      <p:pic>
+        <p:nvPicPr>
+          <p:cNvPr id="4" name="Picture 3"/>
+          <p:cNvPicPr>
+            <a:picLocks noChangeAspect="1"/>
+          </p:cNvPicPr>
+          <p:nvPr/>
+        </p:nvPicPr>
+        <p:blipFill>
+          <a:blip r:embed="rId3"/>
+          <a:stretch>
+            <a:fillRect/>
+          </a:stretch>
+        </p:blipFill>
+        <p:spPr>
+          <a:xfrm>
+            <a:off x="1600200" y="1417638"/>
+            <a:ext cx="5943600" cy="4787900"/>
+          </a:xfrm>
+          <a:prstGeom prst="rect">
+            <a:avLst/>
+          </a:prstGeom>
+        </p:spPr>
+      </p:pic>
+      <p:pic>
+        <p:nvPicPr>
+          <p:cNvPr id="5" name="Picture 4"/>
+          <p:cNvPicPr>
+            <a:picLocks noChangeAspect="1"/>
+          </p:cNvPicPr>
+          <p:nvPr/>
+        </p:nvPicPr>
+        <p:blipFill>
+          <a:blip r:embed="rId4">
+            <a:extLst>
+              <a:ext uri="{BEBA8EAE-BF5A-486C-A8C5-ECC9F3942E4B}">
+                <a14:imgProps xmlns:a14="http://schemas.microsoft.com/office/drawing/2010/main">
+                  <a14:imgLayer r:embed="rId5">
+                    <a14:imgEffect>
+                      <a14:saturation sat="0"/>
+                    </a14:imgEffect>
+                  </a14:imgLayer>
+                </a14:imgProps>
+              </a:ext>
+            </a:extLst>
+          </a:blip>
+          <a:stretch>
+            <a:fillRect/>
+          </a:stretch>
+        </p:blipFill>
+        <p:spPr>
+          <a:xfrm rot="16200000">
+            <a:off x="-1667245" y="2946147"/>
+            <a:ext cx="5448300" cy="1651000"/>
+          </a:xfrm>
+          <a:prstGeom prst="rect">
+            <a:avLst/>
+          </a:prstGeom>
+        </p:spPr>
+      </p:pic>
+      <p:sp>
+        <p:nvSpPr>
+          <p:cNvPr id="6" name="Rectangle 5"/>
+          <p:cNvSpPr/>
+          <p:nvPr/>
+        </p:nvSpPr>
+        <p:spPr>
+          <a:xfrm>
+            <a:off x="5664290" y="5381590"/>
+            <a:ext cx="2035920" cy="1114207"/>
+          </a:xfrm>
+          <a:prstGeom prst="rect">
+            <a:avLst/>
+          </a:prstGeom>
+          <a:solidFill>
+            <a:srgbClr val="FFFFFF"/>
+          </a:solidFill>
+          <a:ln>
+            <a:solidFill>
+              <a:srgbClr val="FFFFFF"/>
+            </a:solidFill>
+          </a:ln>
+          <a:effectLst/>
+        </p:spPr>
+        <p:style>
+          <a:lnRef idx="1">
+            <a:schemeClr val="accent1"/>
+          </a:lnRef>
+          <a:fillRef idx="3">
+            <a:schemeClr val="accent1"/>
+          </a:fillRef>
+          <a:effectRef idx="2">
+            <a:schemeClr val="accent1"/>
+          </a:effectRef>
+          <a:fontRef idx="minor">
+            <a:schemeClr val="lt1"/>
+          </a:fontRef>
+        </p:style>
+        <p:txBody>
+          <a:bodyPr rtlCol="0" anchor="ctr"/>
+          <a:lstStyle/>
+          <a:p>
+            <a:pPr algn="ctr"/>
+            <a:endParaRPr lang="en-US"/>
+          </a:p>
+        </p:txBody>
+      </p:sp>
+      <p:sp>
+        <p:nvSpPr>
+          <p:cNvPr id="7" name="Rectangle 6"/>
+          <p:cNvSpPr/>
+          <p:nvPr/>
+        </p:nvSpPr>
+        <p:spPr>
+          <a:xfrm>
+            <a:off x="1842096" y="5381590"/>
+            <a:ext cx="2035920" cy="1114207"/>
+          </a:xfrm>
+          <a:prstGeom prst="rect">
+            <a:avLst/>
+          </a:prstGeom>
+          <a:solidFill>
+            <a:srgbClr val="FFFFFF"/>
+          </a:solidFill>
+          <a:ln>
+            <a:solidFill>
+              <a:srgbClr val="FFFFFF"/>
+            </a:solidFill>
+          </a:ln>
+          <a:effectLst/>
+        </p:spPr>
+        <p:style>
+          <a:lnRef idx="1">
+            <a:schemeClr val="accent1"/>
+          </a:lnRef>
+          <a:fillRef idx="3">
+            <a:schemeClr val="accent1"/>
+          </a:fillRef>
+          <a:effectRef idx="2">
+            <a:schemeClr val="accent1"/>
+          </a:effectRef>
+          <a:fontRef idx="minor">
+            <a:schemeClr val="lt1"/>
+          </a:fontRef>
+        </p:style>
+        <p:txBody>
+          <a:bodyPr rtlCol="0" anchor="ctr"/>
+          <a:lstStyle/>
+          <a:p>
+            <a:pPr algn="ctr"/>
+            <a:endParaRPr lang="en-US"/>
+          </a:p>
+        </p:txBody>
+      </p:sp>
+    </p:spTree>
+    <p:extLst>
+      <p:ext uri="{BB962C8B-B14F-4D97-AF65-F5344CB8AC3E}">
+        <p14:creationId xmlns:p14="http://schemas.microsoft.com/office/powerpoint/2010/main" val="3817279308"/>
+      </p:ext>
+    </p:extLst>
+  </p:cSld>
+  <p:clrMapOvr>
+    <a:masterClrMapping/>
+  </p:clrMapOvr>
+  <p:timing>
+    <p:tnLst>
+      <p:par>
+        <p:cTn xmlns:p14="http://schemas.microsoft.com/office/powerpoint/2010/main" id="1" dur="indefinite" restart="never" nodeType="tmRoot"/>
+      </p:par>
+    </p:tnLst>
+  </p:timing>
+</p:sld>
+</file>
+
+<file path=ppt/slides/slide17.xml><?xml version="1.0" encoding="utf-8"?>
+<p:sld xmlns:a="http://schemas.openxmlformats.org/drawingml/2006/main" xmlns:r="http://schemas.openxmlformats.org/officeDocument/2006/relationships" xmlns:p="http://schemas.openxmlformats.org/presentationml/2006/main">
+  <p:cSld>
+    <p:spTree>
+      <p:nvGrpSpPr>
+        <p:cNvPr id="1" name=""/>
+        <p:cNvGrpSpPr/>
+        <p:nvPr/>
+      </p:nvGrpSpPr>
+      <p:grpSpPr>
+        <a:xfrm>
+          <a:off x="0" y="0"/>
+          <a:ext cx="0" cy="0"/>
+          <a:chOff x="0" y="0"/>
+          <a:chExt cx="0" cy="0"/>
+        </a:xfrm>
+      </p:grpSpPr>
+      <p:sp>
+        <p:nvSpPr>
+          <p:cNvPr id="5" name="Title 4"/>
+          <p:cNvSpPr>
+            <a:spLocks noGrp="1"/>
+          </p:cNvSpPr>
+          <p:nvPr>
+            <p:ph type="title"/>
+          </p:nvPr>
+        </p:nvSpPr>
+        <p:spPr>
+          <a:xfrm>
+            <a:off x="457200" y="274638"/>
+            <a:ext cx="8229600" cy="6264048"/>
+          </a:xfrm>
+        </p:spPr>
+        <p:txBody>
+          <a:bodyPr/>
+          <a:lstStyle/>
+          <a:p>
+            <a:r>
+              <a:rPr lang="en-US" dirty="0" smtClean="0"/>
+              <a:t>Why are we having issues?</a:t>
+            </a:r>
+            <a:endParaRPr lang="en-US" dirty="0"/>
+          </a:p>
+        </p:txBody>
+      </p:sp>
+    </p:spTree>
+    <p:extLst>
+      <p:ext uri="{BB962C8B-B14F-4D97-AF65-F5344CB8AC3E}">
+        <p14:creationId xmlns:p14="http://schemas.microsoft.com/office/powerpoint/2010/main" val="3456406612"/>
+      </p:ext>
+    </p:extLst>
+  </p:cSld>
+  <p:clrMapOvr>
+    <a:masterClrMapping/>
+  </p:clrMapOvr>
+  <p:timing>
+    <p:tnLst>
+      <p:par>
+        <p:cTn xmlns:p14="http://schemas.microsoft.com/office/powerpoint/2010/main" id="1" dur="indefinite" restart="never" nodeType="tmRoot"/>
+      </p:par>
+    </p:tnLst>
+  </p:timing>
+</p:sld>
+</file>
+
+<file path=ppt/slides/slide18.xml><?xml version="1.0" encoding="utf-8"?>
 <p:sld xmlns:a="http://schemas.openxmlformats.org/drawingml/2006/main" xmlns:r="http://schemas.openxmlformats.org/officeDocument/2006/relationships" xmlns:p="http://schemas.openxmlformats.org/presentationml/2006/main">
   <p:cSld>
     <p:spTree>
@@ -3700,10 +5006,17 @@
   <p:clrMapOvr>
     <a:masterClrMapping/>
   </p:clrMapOvr>
+  <p:timing>
+    <p:tnLst>
+      <p:par>
+        <p:cTn xmlns:p14="http://schemas.microsoft.com/office/powerpoint/2010/main" id="1" dur="indefinite" restart="never" nodeType="tmRoot"/>
+      </p:par>
+    </p:tnLst>
+  </p:timing>
 </p:sld>
 </file>
 
-<file path=ppt/slides/slide11.xml><?xml version="1.0" encoding="utf-8"?>
+<file path=ppt/slides/slide19.xml><?xml version="1.0" encoding="utf-8"?>
 <p:sld xmlns:a="http://schemas.openxmlformats.org/drawingml/2006/main" xmlns:r="http://schemas.openxmlformats.org/officeDocument/2006/relationships" xmlns:p="http://schemas.openxmlformats.org/presentationml/2006/main">
   <p:cSld>
     <p:spTree>
@@ -3828,10 +5141,84 @@
   <p:clrMapOvr>
     <a:masterClrMapping/>
   </p:clrMapOvr>
+  <p:timing>
+    <p:tnLst>
+      <p:par>
+        <p:cTn xmlns:p14="http://schemas.microsoft.com/office/powerpoint/2010/main" id="1" dur="indefinite" restart="never" nodeType="tmRoot"/>
+      </p:par>
+    </p:tnLst>
+  </p:timing>
 </p:sld>
 </file>
 
-<file path=ppt/slides/slide12.xml><?xml version="1.0" encoding="utf-8"?>
+<file path=ppt/slides/slide2.xml><?xml version="1.0" encoding="utf-8"?>
+<p:sld xmlns:a="http://schemas.openxmlformats.org/drawingml/2006/main" xmlns:r="http://schemas.openxmlformats.org/officeDocument/2006/relationships" xmlns:p="http://schemas.openxmlformats.org/presentationml/2006/main">
+  <p:cSld>
+    <p:spTree>
+      <p:nvGrpSpPr>
+        <p:cNvPr id="1" name=""/>
+        <p:cNvGrpSpPr/>
+        <p:nvPr/>
+      </p:nvGrpSpPr>
+      <p:grpSpPr>
+        <a:xfrm>
+          <a:off x="0" y="0"/>
+          <a:ext cx="0" cy="0"/>
+          <a:chOff x="0" y="0"/>
+          <a:chExt cx="0" cy="0"/>
+        </a:xfrm>
+      </p:grpSpPr>
+      <p:sp>
+        <p:nvSpPr>
+          <p:cNvPr id="4" name="Title 3"/>
+          <p:cNvSpPr>
+            <a:spLocks noGrp="1"/>
+          </p:cNvSpPr>
+          <p:nvPr>
+            <p:ph type="title"/>
+          </p:nvPr>
+        </p:nvSpPr>
+        <p:spPr>
+          <a:xfrm>
+            <a:off x="457200" y="274637"/>
+            <a:ext cx="8229600" cy="6220505"/>
+          </a:xfrm>
+        </p:spPr>
+        <p:txBody>
+          <a:bodyPr>
+            <a:normAutofit/>
+          </a:bodyPr>
+          <a:lstStyle/>
+          <a:p>
+            <a:r>
+              <a:rPr lang="en-US" dirty="0" smtClean="0"/>
+              <a:t>Developing a new feature</a:t>
+            </a:r>
+            <a:endParaRPr lang="en-US" dirty="0"/>
+          </a:p>
+        </p:txBody>
+      </p:sp>
+    </p:spTree>
+    <p:extLst>
+      <p:ext uri="{BB962C8B-B14F-4D97-AF65-F5344CB8AC3E}">
+        <p14:creationId xmlns:p14="http://schemas.microsoft.com/office/powerpoint/2010/main" val="772722120"/>
+      </p:ext>
+    </p:extLst>
+  </p:cSld>
+  <p:clrMapOvr>
+    <a:masterClrMapping/>
+  </p:clrMapOvr>
+  <p:timing>
+    <p:tnLst>
+      <p:par>
+        <p:cTn xmlns:p14="http://schemas.microsoft.com/office/powerpoint/2010/main" id="1" dur="indefinite" restart="never" nodeType="tmRoot"/>
+      </p:par>
+    </p:tnLst>
+  </p:timing>
+</p:sld>
+</file>
+
+<file path=ppt/slides/slide20.xml><?xml version="1.0" encoding="utf-8"?>
 <p:sld xmlns:a="http://schemas.openxmlformats.org/drawingml/2006/main" xmlns:r="http://schemas.openxmlformats.org/officeDocument/2006/relationships" xmlns:p="http://schemas.openxmlformats.org/presentationml/2006/main">
   <p:cSld>
     <p:spTree>
@@ -3947,10 +5334,439 @@
   <p:clrMapOvr>
     <a:masterClrMapping/>
   </p:clrMapOvr>
+  <p:timing>
+    <p:tnLst>
+      <p:par>
+        <p:cTn xmlns:p14="http://schemas.microsoft.com/office/powerpoint/2010/main" id="1" dur="indefinite" restart="never" nodeType="tmRoot"/>
+      </p:par>
+    </p:tnLst>
+  </p:timing>
 </p:sld>
 </file>
 
-<file path=ppt/slides/slide13.xml><?xml version="1.0" encoding="utf-8"?>
+<file path=ppt/slides/slide21.xml><?xml version="1.0" encoding="utf-8"?>
+<p:sld xmlns:a="http://schemas.openxmlformats.org/drawingml/2006/main" xmlns:r="http://schemas.openxmlformats.org/officeDocument/2006/relationships" xmlns:p="http://schemas.openxmlformats.org/presentationml/2006/main">
+  <p:cSld>
+    <p:spTree>
+      <p:nvGrpSpPr>
+        <p:cNvPr id="1" name=""/>
+        <p:cNvGrpSpPr/>
+        <p:nvPr/>
+      </p:nvGrpSpPr>
+      <p:grpSpPr>
+        <a:xfrm>
+          <a:off x="0" y="0"/>
+          <a:ext cx="0" cy="0"/>
+          <a:chOff x="0" y="0"/>
+          <a:chExt cx="0" cy="0"/>
+        </a:xfrm>
+      </p:grpSpPr>
+      <p:sp>
+        <p:nvSpPr>
+          <p:cNvPr id="7" name="Up Arrow 6"/>
+          <p:cNvSpPr/>
+          <p:nvPr/>
+        </p:nvSpPr>
+        <p:spPr>
+          <a:xfrm>
+            <a:off x="1297407" y="1615628"/>
+            <a:ext cx="1036969" cy="3539546"/>
+          </a:xfrm>
+          <a:prstGeom prst="upArrow">
+            <a:avLst/>
+          </a:prstGeom>
+          <a:gradFill>
+            <a:gsLst>
+              <a:gs pos="99000">
+                <a:schemeClr val="tx1"/>
+              </a:gs>
+              <a:gs pos="100000">
+                <a:schemeClr val="accent1">
+                  <a:shade val="93000"/>
+                  <a:satMod val="130000"/>
+                </a:schemeClr>
+              </a:gs>
+              <a:gs pos="53000">
+                <a:srgbClr val="575757"/>
+              </a:gs>
+              <a:gs pos="19000">
+                <a:schemeClr val="bg1"/>
+              </a:gs>
+            </a:gsLst>
+          </a:gradFill>
+          <a:ln>
+            <a:noFill/>
+          </a:ln>
+        </p:spPr>
+        <p:style>
+          <a:lnRef idx="1">
+            <a:schemeClr val="accent1"/>
+          </a:lnRef>
+          <a:fillRef idx="3">
+            <a:schemeClr val="accent1"/>
+          </a:fillRef>
+          <a:effectRef idx="2">
+            <a:schemeClr val="accent1"/>
+          </a:effectRef>
+          <a:fontRef idx="minor">
+            <a:schemeClr val="lt1"/>
+          </a:fontRef>
+        </p:style>
+        <p:txBody>
+          <a:bodyPr rtlCol="0" anchor="ctr"/>
+          <a:lstStyle/>
+          <a:p>
+            <a:pPr algn="ctr"/>
+            <a:endParaRPr lang="en-US" dirty="0"/>
+          </a:p>
+        </p:txBody>
+      </p:sp>
+      <p:sp>
+        <p:nvSpPr>
+          <p:cNvPr id="8" name="Up Arrow 7"/>
+          <p:cNvSpPr/>
+          <p:nvPr/>
+        </p:nvSpPr>
+        <p:spPr>
+          <a:xfrm rot="10800000">
+            <a:off x="6710787" y="1600200"/>
+            <a:ext cx="1036969" cy="4525963"/>
+          </a:xfrm>
+          <a:prstGeom prst="upArrow">
+            <a:avLst/>
+          </a:prstGeom>
+          <a:gradFill>
+            <a:gsLst>
+              <a:gs pos="99000">
+                <a:schemeClr val="tx1"/>
+              </a:gs>
+              <a:gs pos="100000">
+                <a:schemeClr val="accent1">
+                  <a:shade val="93000"/>
+                  <a:satMod val="130000"/>
+                </a:schemeClr>
+              </a:gs>
+              <a:gs pos="53000">
+                <a:srgbClr val="575757"/>
+              </a:gs>
+              <a:gs pos="19000">
+                <a:schemeClr val="bg1"/>
+              </a:gs>
+            </a:gsLst>
+          </a:gradFill>
+          <a:ln>
+            <a:noFill/>
+          </a:ln>
+        </p:spPr>
+        <p:style>
+          <a:lnRef idx="1">
+            <a:schemeClr val="accent1"/>
+          </a:lnRef>
+          <a:fillRef idx="3">
+            <a:schemeClr val="accent1"/>
+          </a:fillRef>
+          <a:effectRef idx="2">
+            <a:schemeClr val="accent1"/>
+          </a:effectRef>
+          <a:fontRef idx="minor">
+            <a:schemeClr val="lt1"/>
+          </a:fontRef>
+        </p:style>
+        <p:txBody>
+          <a:bodyPr rtlCol="0" anchor="ctr"/>
+          <a:lstStyle/>
+          <a:p>
+            <a:pPr algn="ctr"/>
+            <a:endParaRPr lang="en-US" dirty="0"/>
+          </a:p>
+        </p:txBody>
+      </p:sp>
+      <p:sp>
+        <p:nvSpPr>
+          <p:cNvPr id="4" name="Title 3"/>
+          <p:cNvSpPr>
+            <a:spLocks noGrp="1"/>
+          </p:cNvSpPr>
+          <p:nvPr>
+            <p:ph type="title"/>
+          </p:nvPr>
+        </p:nvSpPr>
+        <p:spPr/>
+        <p:txBody>
+          <a:bodyPr/>
+          <a:lstStyle/>
+          <a:p>
+            <a:r>
+              <a:rPr lang="en-US" dirty="0" smtClean="0"/>
+              <a:t>What Testing Gives Us</a:t>
+            </a:r>
+            <a:endParaRPr lang="en-US" dirty="0"/>
+          </a:p>
+        </p:txBody>
+      </p:sp>
+      <p:sp>
+        <p:nvSpPr>
+          <p:cNvPr id="5" name="TextBox 4"/>
+          <p:cNvSpPr txBox="1"/>
+          <p:nvPr/>
+        </p:nvSpPr>
+        <p:spPr>
+          <a:xfrm rot="16200000">
+            <a:off x="963446" y="2556325"/>
+            <a:ext cx="1688683" cy="461665"/>
+          </a:xfrm>
+          <a:prstGeom prst="rect">
+            <a:avLst/>
+          </a:prstGeom>
+          <a:noFill/>
+        </p:spPr>
+        <p:txBody>
+          <a:bodyPr wrap="none" rtlCol="0">
+            <a:spAutoFit/>
+          </a:bodyPr>
+          <a:lstStyle/>
+          <a:p>
+            <a:r>
+              <a:rPr lang="en-US" sz="2400" dirty="0" smtClean="0">
+                <a:solidFill>
+                  <a:srgbClr val="FFFFFF"/>
+                </a:solidFill>
+              </a:rPr>
+              <a:t>Unit Testing</a:t>
+            </a:r>
+            <a:endParaRPr lang="en-US" sz="2400" dirty="0">
+              <a:solidFill>
+                <a:srgbClr val="FFFFFF"/>
+              </a:solidFill>
+            </a:endParaRPr>
+          </a:p>
+        </p:txBody>
+      </p:sp>
+      <p:sp>
+        <p:nvSpPr>
+          <p:cNvPr id="6" name="TextBox 5"/>
+          <p:cNvSpPr txBox="1"/>
+          <p:nvPr/>
+        </p:nvSpPr>
+        <p:spPr>
+          <a:xfrm rot="16200000">
+            <a:off x="5898350" y="4215436"/>
+            <a:ext cx="2582859" cy="461665"/>
+          </a:xfrm>
+          <a:prstGeom prst="rect">
+            <a:avLst/>
+          </a:prstGeom>
+          <a:noFill/>
+        </p:spPr>
+        <p:txBody>
+          <a:bodyPr wrap="none" rtlCol="0">
+            <a:spAutoFit/>
+          </a:bodyPr>
+          <a:lstStyle/>
+          <a:p>
+            <a:r>
+              <a:rPr lang="en-US" sz="2400" dirty="0" smtClean="0"/>
+              <a:t>Exploratory </a:t>
+            </a:r>
+            <a:r>
+              <a:rPr lang="en-US" sz="2400" dirty="0" smtClean="0">
+                <a:solidFill>
+                  <a:schemeClr val="bg1"/>
+                </a:solidFill>
+              </a:rPr>
+              <a:t>Testing</a:t>
+            </a:r>
+            <a:endParaRPr lang="en-US" sz="2400" dirty="0">
+              <a:solidFill>
+                <a:schemeClr val="bg1"/>
+              </a:solidFill>
+            </a:endParaRPr>
+          </a:p>
+        </p:txBody>
+      </p:sp>
+      <p:sp>
+        <p:nvSpPr>
+          <p:cNvPr id="17" name="TextBox 16"/>
+          <p:cNvSpPr txBox="1"/>
+          <p:nvPr/>
+        </p:nvSpPr>
+        <p:spPr>
+          <a:xfrm>
+            <a:off x="2154094" y="2147282"/>
+            <a:ext cx="2597361" cy="1815882"/>
+          </a:xfrm>
+          <a:prstGeom prst="rect">
+            <a:avLst/>
+          </a:prstGeom>
+          <a:noFill/>
+        </p:spPr>
+        <p:txBody>
+          <a:bodyPr wrap="none" rtlCol="0">
+            <a:spAutoFit/>
+          </a:bodyPr>
+          <a:lstStyle/>
+          <a:p>
+            <a:r>
+              <a:rPr lang="en-US" sz="2800" dirty="0" smtClean="0"/>
+              <a:t>SPEC</a:t>
+            </a:r>
+          </a:p>
+          <a:p>
+            <a:r>
+              <a:rPr lang="en-US" sz="2800" dirty="0" smtClean="0"/>
+              <a:t>FEEDBACK</a:t>
+            </a:r>
+          </a:p>
+          <a:p>
+            <a:r>
+              <a:rPr lang="en-US" sz="2800" dirty="0" smtClean="0"/>
+              <a:t>REGRESSION</a:t>
+            </a:r>
+          </a:p>
+          <a:p>
+            <a:r>
+              <a:rPr lang="en-US" sz="2800" dirty="0" smtClean="0"/>
+              <a:t>GRANULARITY</a:t>
+            </a:r>
+            <a:endParaRPr lang="en-US" sz="2800" dirty="0"/>
+          </a:p>
+        </p:txBody>
+      </p:sp>
+      <p:sp>
+        <p:nvSpPr>
+          <p:cNvPr id="18" name="TextBox 17"/>
+          <p:cNvSpPr txBox="1"/>
+          <p:nvPr/>
+        </p:nvSpPr>
+        <p:spPr>
+          <a:xfrm>
+            <a:off x="3174859" y="3829387"/>
+            <a:ext cx="3749878" cy="1815882"/>
+          </a:xfrm>
+          <a:prstGeom prst="rect">
+            <a:avLst/>
+          </a:prstGeom>
+          <a:noFill/>
+        </p:spPr>
+        <p:txBody>
+          <a:bodyPr wrap="square" rtlCol="0">
+            <a:spAutoFit/>
+          </a:bodyPr>
+          <a:lstStyle/>
+          <a:p>
+            <a:pPr algn="r"/>
+            <a:r>
+              <a:rPr lang="en-US" sz="2800" dirty="0" smtClean="0"/>
+              <a:t>GUIDANCE</a:t>
+            </a:r>
+          </a:p>
+          <a:p>
+            <a:pPr algn="r"/>
+            <a:r>
+              <a:rPr lang="en-US" sz="2800" dirty="0" smtClean="0"/>
+              <a:t>UNDERSTANDING</a:t>
+            </a:r>
+          </a:p>
+          <a:p>
+            <a:pPr algn="r"/>
+            <a:r>
+              <a:rPr lang="en-US" sz="2800" dirty="0" smtClean="0"/>
+              <a:t>SERENDIPITY</a:t>
+            </a:r>
+          </a:p>
+          <a:p>
+            <a:pPr algn="r"/>
+            <a:r>
+              <a:rPr lang="en-US" sz="2800" dirty="0" smtClean="0"/>
+              <a:t>MODELS</a:t>
+            </a:r>
+          </a:p>
+        </p:txBody>
+      </p:sp>
+      <p:sp>
+        <p:nvSpPr>
+          <p:cNvPr id="19" name="TextBox 18"/>
+          <p:cNvSpPr txBox="1"/>
+          <p:nvPr/>
+        </p:nvSpPr>
+        <p:spPr>
+          <a:xfrm>
+            <a:off x="759536" y="5155174"/>
+            <a:ext cx="2154093" cy="1384995"/>
+          </a:xfrm>
+          <a:prstGeom prst="rect">
+            <a:avLst/>
+          </a:prstGeom>
+          <a:noFill/>
+        </p:spPr>
+        <p:txBody>
+          <a:bodyPr wrap="square" rtlCol="0">
+            <a:spAutoFit/>
+          </a:bodyPr>
+          <a:lstStyle/>
+          <a:p>
+            <a:pPr algn="ctr"/>
+            <a:r>
+              <a:rPr lang="en-US" sz="2800" dirty="0" smtClean="0">
+                <a:solidFill>
+                  <a:srgbClr val="000000"/>
+                </a:solidFill>
+              </a:rPr>
+              <a:t>Testing as artifact creation</a:t>
+            </a:r>
+            <a:endParaRPr lang="en-US" sz="2800" dirty="0">
+              <a:solidFill>
+                <a:srgbClr val="000000"/>
+              </a:solidFill>
+            </a:endParaRPr>
+          </a:p>
+        </p:txBody>
+      </p:sp>
+      <p:sp>
+        <p:nvSpPr>
+          <p:cNvPr id="20" name="TextBox 19"/>
+          <p:cNvSpPr txBox="1"/>
+          <p:nvPr/>
+        </p:nvSpPr>
+        <p:spPr>
+          <a:xfrm>
+            <a:off x="6069395" y="1397441"/>
+            <a:ext cx="2507918" cy="954107"/>
+          </a:xfrm>
+          <a:prstGeom prst="rect">
+            <a:avLst/>
+          </a:prstGeom>
+          <a:noFill/>
+        </p:spPr>
+        <p:txBody>
+          <a:bodyPr wrap="square" rtlCol="0">
+            <a:spAutoFit/>
+          </a:bodyPr>
+          <a:lstStyle/>
+          <a:p>
+            <a:pPr algn="ctr"/>
+            <a:r>
+              <a:rPr lang="en-US" sz="2800" dirty="0" smtClean="0"/>
+              <a:t>Testing as performance</a:t>
+            </a:r>
+            <a:endParaRPr lang="en-US" sz="2800" dirty="0"/>
+          </a:p>
+        </p:txBody>
+      </p:sp>
+    </p:spTree>
+    <p:extLst>
+      <p:ext uri="{BB962C8B-B14F-4D97-AF65-F5344CB8AC3E}">
+        <p14:creationId xmlns:p14="http://schemas.microsoft.com/office/powerpoint/2010/main" val="3189813857"/>
+      </p:ext>
+    </p:extLst>
+  </p:cSld>
+  <p:clrMapOvr>
+    <a:masterClrMapping/>
+  </p:clrMapOvr>
+</p:sld>
+</file>
+
+<file path=ppt/slides/slide22.xml><?xml version="1.0" encoding="utf-8"?>
 <p:sld xmlns:a="http://schemas.openxmlformats.org/drawingml/2006/main" xmlns:r="http://schemas.openxmlformats.org/officeDocument/2006/relationships" xmlns:p="http://schemas.openxmlformats.org/presentationml/2006/main">
   <p:cSld>
     <p:spTree>
@@ -4070,7 +5886,7 @@
 </p:sld>
 </file>
 
-<file path=ppt/slides/slide14.xml><?xml version="1.0" encoding="utf-8"?>
+<file path=ppt/slides/slide23.xml><?xml version="1.0" encoding="utf-8"?>
 <p:sld xmlns:a="http://schemas.openxmlformats.org/drawingml/2006/main" xmlns:r="http://schemas.openxmlformats.org/officeDocument/2006/relationships" xmlns:p="http://schemas.openxmlformats.org/presentationml/2006/main">
   <p:cSld>
     <p:spTree>
@@ -4469,7 +6285,7 @@
 </p:sld>
 </file>
 
-<file path=ppt/slides/slide15.xml><?xml version="1.0" encoding="utf-8"?>
+<file path=ppt/slides/slide24.xml><?xml version="1.0" encoding="utf-8"?>
 <p:sld xmlns:a="http://schemas.openxmlformats.org/drawingml/2006/main" xmlns:r="http://schemas.openxmlformats.org/officeDocument/2006/relationships" xmlns:p="http://schemas.openxmlformats.org/presentationml/2006/main">
   <p:cSld>
     <p:spTree>
@@ -5358,7 +7174,7 @@
 </p:sld>
 </file>
 
-<file path=ppt/slides/slide16.xml><?xml version="1.0" encoding="utf-8"?>
+<file path=ppt/slides/slide25.xml><?xml version="1.0" encoding="utf-8"?>
 <p:sld xmlns:a="http://schemas.openxmlformats.org/drawingml/2006/main" xmlns:r="http://schemas.openxmlformats.org/officeDocument/2006/relationships" xmlns:p="http://schemas.openxmlformats.org/presentationml/2006/main">
   <p:cSld>
     <p:spTree>
@@ -6112,7 +7928,7 @@
         </p:nvSpPr>
         <p:spPr>
           <a:xfrm>
-            <a:off x="219177" y="394353"/>
+            <a:off x="1830263" y="5060696"/>
             <a:ext cx="2521393" cy="461665"/>
           </a:xfrm>
           <a:prstGeom prst="rect">
@@ -6312,6 +8128,66 @@
             <a:r>
               <a:rPr lang="en-US" sz="2400" dirty="0" smtClean="0"/>
               <a:t>Testers don’t report everything</a:t>
+            </a:r>
+            <a:endParaRPr lang="en-US" sz="2400" dirty="0"/>
+          </a:p>
+        </p:txBody>
+      </p:sp>
+      <p:sp>
+        <p:nvSpPr>
+          <p:cNvPr id="17" name="TextBox 16"/>
+          <p:cNvSpPr txBox="1"/>
+          <p:nvPr/>
+        </p:nvSpPr>
+        <p:spPr>
+          <a:xfrm>
+            <a:off x="263142" y="86577"/>
+            <a:ext cx="2710598" cy="769441"/>
+          </a:xfrm>
+          <a:prstGeom prst="rect">
+            <a:avLst/>
+          </a:prstGeom>
+          <a:noFill/>
+        </p:spPr>
+        <p:txBody>
+          <a:bodyPr wrap="none" rtlCol="0">
+            <a:spAutoFit/>
+          </a:bodyPr>
+          <a:lstStyle/>
+          <a:p>
+            <a:r>
+              <a:rPr lang="en-US" sz="4400" b="1" dirty="0" smtClean="0"/>
+              <a:t>Learning's:</a:t>
+            </a:r>
+            <a:endParaRPr lang="en-US" sz="4400" b="1" dirty="0"/>
+          </a:p>
+        </p:txBody>
+      </p:sp>
+      <p:sp>
+        <p:nvSpPr>
+          <p:cNvPr id="18" name="TextBox 17"/>
+          <p:cNvSpPr txBox="1"/>
+          <p:nvPr/>
+        </p:nvSpPr>
+        <p:spPr>
+          <a:xfrm>
+            <a:off x="774192" y="6170318"/>
+            <a:ext cx="2574743" cy="461665"/>
+          </a:xfrm>
+          <a:prstGeom prst="rect">
+            <a:avLst/>
+          </a:prstGeom>
+          <a:noFill/>
+        </p:spPr>
+        <p:txBody>
+          <a:bodyPr wrap="none" rtlCol="0">
+            <a:spAutoFit/>
+          </a:bodyPr>
+          <a:lstStyle/>
+          <a:p>
+            <a:r>
+              <a:rPr lang="en-US" sz="2400" dirty="0" smtClean="0"/>
+              <a:t>Shortcuts &amp; Cheats </a:t>
             </a:r>
             <a:endParaRPr lang="en-US" sz="2400" dirty="0"/>
           </a:p>
@@ -6695,6 +8571,51 @@
                       </p:childTnLst>
                     </p:cTn>
                   </p:par>
+                  <p:par>
+                    <p:cTn id="35" fill="hold">
+                      <p:stCondLst>
+                        <p:cond delay="indefinite"/>
+                      </p:stCondLst>
+                      <p:childTnLst>
+                        <p:par>
+                          <p:cTn id="36" fill="hold">
+                            <p:stCondLst>
+                              <p:cond delay="0"/>
+                            </p:stCondLst>
+                            <p:childTnLst>
+                              <p:par>
+                                <p:cTn id="37" presetID="1" presetClass="entr" presetSubtype="0" fill="hold" grpId="0" nodeType="clickEffect">
+                                  <p:stCondLst>
+                                    <p:cond delay="0"/>
+                                  </p:stCondLst>
+                                  <p:childTnLst>
+                                    <p:set>
+                                      <p:cBhvr>
+                                        <p:cTn id="38" dur="1" fill="hold">
+                                          <p:stCondLst>
+                                            <p:cond delay="0"/>
+                                          </p:stCondLst>
+                                        </p:cTn>
+                                        <p:tgtEl>
+                                          <p:spTgt spid="18"/>
+                                        </p:tgtEl>
+                                        <p:attrNameLst>
+                                          <p:attrName>style.visibility</p:attrName>
+                                        </p:attrNameLst>
+                                      </p:cBhvr>
+                                      <p:to>
+                                        <p:strVal val="visible"/>
+                                      </p:to>
+                                    </p:set>
+                                  </p:childTnLst>
+                                </p:cTn>
+                              </p:par>
+                            </p:childTnLst>
+                          </p:cTn>
+                        </p:par>
+                      </p:childTnLst>
+                    </p:cTn>
+                  </p:par>
                 </p:childTnLst>
               </p:cTn>
               <p:prevCondLst>
@@ -6725,12 +8646,13 @@
       <p:bldP spid="14" grpId="0"/>
       <p:bldP spid="15" grpId="0"/>
       <p:bldP spid="16" grpId="0"/>
+      <p:bldP spid="18" grpId="0"/>
     </p:bldLst>
   </p:timing>
 </p:sld>
 </file>
 
-<file path=ppt/slides/slide17.xml><?xml version="1.0" encoding="utf-8"?>
+<file path=ppt/slides/slide26.xml><?xml version="1.0" encoding="utf-8"?>
 <p:sld xmlns:a="http://schemas.openxmlformats.org/drawingml/2006/main" xmlns:r="http://schemas.openxmlformats.org/officeDocument/2006/relationships" xmlns:p="http://schemas.openxmlformats.org/presentationml/2006/main">
   <p:cSld>
     <p:spTree>
@@ -7029,7 +8951,892 @@
 </p:sld>
 </file>
 
-<file path=ppt/slides/slide2.xml><?xml version="1.0" encoding="utf-8"?>
+<file path=ppt/slides/slide3.xml><?xml version="1.0" encoding="utf-8"?>
+<p:sld xmlns:a="http://schemas.openxmlformats.org/drawingml/2006/main" xmlns:r="http://schemas.openxmlformats.org/officeDocument/2006/relationships" xmlns:p="http://schemas.openxmlformats.org/presentationml/2006/main">
+  <p:cSld>
+    <p:spTree>
+      <p:nvGrpSpPr>
+        <p:cNvPr id="1" name=""/>
+        <p:cNvGrpSpPr/>
+        <p:nvPr/>
+      </p:nvGrpSpPr>
+      <p:grpSpPr>
+        <a:xfrm>
+          <a:off x="0" y="0"/>
+          <a:ext cx="0" cy="0"/>
+          <a:chOff x="0" y="0"/>
+          <a:chExt cx="0" cy="0"/>
+        </a:xfrm>
+      </p:grpSpPr>
+      <p:pic>
+        <p:nvPicPr>
+          <p:cNvPr id="4" name="Picture 3" descr="Developer.png"/>
+          <p:cNvPicPr>
+            <a:picLocks noChangeAspect="1"/>
+          </p:cNvPicPr>
+          <p:nvPr/>
+        </p:nvPicPr>
+        <p:blipFill>
+          <a:blip r:embed="rId2">
+            <a:extLst>
+              <a:ext uri="{28A0092B-C50C-407E-A947-70E740481C1C}">
+                <a14:useLocalDpi xmlns:a14="http://schemas.microsoft.com/office/drawing/2010/main" val="0"/>
+              </a:ext>
+            </a:extLst>
+          </a:blip>
+          <a:stretch>
+            <a:fillRect/>
+          </a:stretch>
+        </p:blipFill>
+        <p:spPr>
+          <a:xfrm>
+            <a:off x="927251" y="1590757"/>
+            <a:ext cx="4129860" cy="4901196"/>
+          </a:xfrm>
+          <a:prstGeom prst="rect">
+            <a:avLst/>
+          </a:prstGeom>
+        </p:spPr>
+      </p:pic>
+      <p:sp>
+        <p:nvSpPr>
+          <p:cNvPr id="6" name="TextBox 5"/>
+          <p:cNvSpPr txBox="1"/>
+          <p:nvPr/>
+        </p:nvSpPr>
+        <p:spPr>
+          <a:xfrm>
+            <a:off x="5467057" y="1075010"/>
+            <a:ext cx="2549145" cy="769441"/>
+          </a:xfrm>
+          <a:prstGeom prst="rect">
+            <a:avLst/>
+          </a:prstGeom>
+          <a:noFill/>
+        </p:spPr>
+        <p:txBody>
+          <a:bodyPr wrap="none" rtlCol="0">
+            <a:spAutoFit/>
+          </a:bodyPr>
+          <a:lstStyle/>
+          <a:p>
+            <a:r>
+              <a:rPr lang="en-US" sz="4400" dirty="0">
+                <a:latin typeface="+mj-lt"/>
+                <a:ea typeface="+mj-ea"/>
+                <a:cs typeface="+mj-cs"/>
+              </a:rPr>
+              <a:t>Developer</a:t>
+            </a:r>
+            <a:endParaRPr lang="en-US" sz="4400" dirty="0">
+              <a:latin typeface="+mj-lt"/>
+              <a:ea typeface="+mj-ea"/>
+              <a:cs typeface="+mj-cs"/>
+            </a:endParaRPr>
+          </a:p>
+        </p:txBody>
+      </p:sp>
+    </p:spTree>
+    <p:extLst>
+      <p:ext uri="{BB962C8B-B14F-4D97-AF65-F5344CB8AC3E}">
+        <p14:creationId xmlns:p14="http://schemas.microsoft.com/office/powerpoint/2010/main" val="3225476250"/>
+      </p:ext>
+    </p:extLst>
+  </p:cSld>
+  <p:clrMapOvr>
+    <a:masterClrMapping/>
+  </p:clrMapOvr>
+  <p:timing>
+    <p:tnLst>
+      <p:par>
+        <p:cTn xmlns:p14="http://schemas.microsoft.com/office/powerpoint/2010/main" id="1" dur="indefinite" restart="never" nodeType="tmRoot"/>
+      </p:par>
+    </p:tnLst>
+  </p:timing>
+</p:sld>
+</file>
+
+<file path=ppt/slides/slide4.xml><?xml version="1.0" encoding="utf-8"?>
+<p:sld xmlns:a="http://schemas.openxmlformats.org/drawingml/2006/main" xmlns:r="http://schemas.openxmlformats.org/officeDocument/2006/relationships" xmlns:p="http://schemas.openxmlformats.org/presentationml/2006/main">
+  <p:cSld>
+    <p:spTree>
+      <p:nvGrpSpPr>
+        <p:cNvPr id="1" name=""/>
+        <p:cNvGrpSpPr/>
+        <p:nvPr/>
+      </p:nvGrpSpPr>
+      <p:grpSpPr>
+        <a:xfrm>
+          <a:off x="0" y="0"/>
+          <a:ext cx="0" cy="0"/>
+          <a:chOff x="0" y="0"/>
+          <a:chExt cx="0" cy="0"/>
+        </a:xfrm>
+      </p:grpSpPr>
+      <p:pic>
+        <p:nvPicPr>
+          <p:cNvPr id="4" name="Picture 3" descr="Developer.png"/>
+          <p:cNvPicPr>
+            <a:picLocks noChangeAspect="1"/>
+          </p:cNvPicPr>
+          <p:nvPr/>
+        </p:nvPicPr>
+        <p:blipFill>
+          <a:blip r:embed="rId2">
+            <a:extLst>
+              <a:ext uri="{28A0092B-C50C-407E-A947-70E740481C1C}">
+                <a14:useLocalDpi xmlns:a14="http://schemas.microsoft.com/office/drawing/2010/main" val="0"/>
+              </a:ext>
+            </a:extLst>
+          </a:blip>
+          <a:stretch>
+            <a:fillRect/>
+          </a:stretch>
+        </p:blipFill>
+        <p:spPr>
+          <a:xfrm>
+            <a:off x="927251" y="3716947"/>
+            <a:ext cx="2338283" cy="2775005"/>
+          </a:xfrm>
+          <a:prstGeom prst="rect">
+            <a:avLst/>
+          </a:prstGeom>
+        </p:spPr>
+      </p:pic>
+      <p:cxnSp>
+        <p:nvCxnSpPr>
+          <p:cNvPr id="5" name="Straight Connector 4"/>
+          <p:cNvCxnSpPr/>
+          <p:nvPr/>
+        </p:nvCxnSpPr>
+        <p:spPr>
+          <a:xfrm flipV="1">
+            <a:off x="1667393" y="433410"/>
+            <a:ext cx="2077859" cy="3531845"/>
+          </a:xfrm>
+          <a:prstGeom prst="line">
+            <a:avLst/>
+          </a:prstGeom>
+        </p:spPr>
+        <p:style>
+          <a:lnRef idx="1">
+            <a:schemeClr val="dk1"/>
+          </a:lnRef>
+          <a:fillRef idx="0">
+            <a:schemeClr val="dk1"/>
+          </a:fillRef>
+          <a:effectRef idx="0">
+            <a:schemeClr val="dk1"/>
+          </a:effectRef>
+          <a:fontRef idx="minor">
+            <a:schemeClr val="tx1"/>
+          </a:fontRef>
+        </p:style>
+      </p:cxnSp>
+      <p:cxnSp>
+        <p:nvCxnSpPr>
+          <p:cNvPr id="7" name="Straight Connector 6"/>
+          <p:cNvCxnSpPr/>
+          <p:nvPr/>
+        </p:nvCxnSpPr>
+        <p:spPr>
+          <a:xfrm flipH="1">
+            <a:off x="2452618" y="4420920"/>
+            <a:ext cx="6055165" cy="310240"/>
+          </a:xfrm>
+          <a:prstGeom prst="line">
+            <a:avLst/>
+          </a:prstGeom>
+        </p:spPr>
+        <p:style>
+          <a:lnRef idx="1">
+            <a:schemeClr val="dk1"/>
+          </a:lnRef>
+          <a:fillRef idx="0">
+            <a:schemeClr val="dk1"/>
+          </a:fillRef>
+          <a:effectRef idx="0">
+            <a:schemeClr val="dk1"/>
+          </a:effectRef>
+          <a:fontRef idx="minor">
+            <a:schemeClr val="tx1"/>
+          </a:fontRef>
+        </p:style>
+      </p:cxnSp>
+      <p:cxnSp>
+        <p:nvCxnSpPr>
+          <p:cNvPr id="11" name="Straight Connector 10"/>
+          <p:cNvCxnSpPr/>
+          <p:nvPr/>
+        </p:nvCxnSpPr>
+        <p:spPr>
+          <a:xfrm flipH="1">
+            <a:off x="2452618" y="433410"/>
+            <a:ext cx="6055165" cy="3531845"/>
+          </a:xfrm>
+          <a:prstGeom prst="line">
+            <a:avLst/>
+          </a:prstGeom>
+        </p:spPr>
+        <p:style>
+          <a:lnRef idx="1">
+            <a:schemeClr val="dk1"/>
+          </a:lnRef>
+          <a:fillRef idx="0">
+            <a:schemeClr val="dk1"/>
+          </a:fillRef>
+          <a:effectRef idx="0">
+            <a:schemeClr val="dk1"/>
+          </a:effectRef>
+          <a:fontRef idx="minor">
+            <a:schemeClr val="tx1"/>
+          </a:fontRef>
+        </p:style>
+      </p:cxnSp>
+      <p:pic>
+        <p:nvPicPr>
+          <p:cNvPr id="2" name="Picture 1" descr="2015-10-07 15_33_22-H66668.P001  _  Granlund Designer®.png"/>
+          <p:cNvPicPr>
+            <a:picLocks noChangeAspect="1"/>
+          </p:cNvPicPr>
+          <p:nvPr/>
+        </p:nvPicPr>
+        <p:blipFill>
+          <a:blip r:embed="rId3">
+            <a:extLst>
+              <a:ext uri="{BEBA8EAE-BF5A-486C-A8C5-ECC9F3942E4B}">
+                <a14:imgProps xmlns:a14="http://schemas.microsoft.com/office/drawing/2010/main">
+                  <a14:imgLayer r:embed="rId4">
+                    <a14:imgEffect>
+                      <a14:saturation sat="0"/>
+                    </a14:imgEffect>
+                  </a14:imgLayer>
+                </a14:imgProps>
+              </a:ext>
+              <a:ext uri="{28A0092B-C50C-407E-A947-70E740481C1C}">
+                <a14:useLocalDpi xmlns:a14="http://schemas.microsoft.com/office/drawing/2010/main" val="0"/>
+              </a:ext>
+            </a:extLst>
+          </a:blip>
+          <a:stretch>
+            <a:fillRect/>
+          </a:stretch>
+        </p:blipFill>
+        <p:spPr>
+          <a:xfrm>
+            <a:off x="3745252" y="433410"/>
+            <a:ext cx="4762531" cy="3987510"/>
+          </a:xfrm>
+          <a:prstGeom prst="rect">
+            <a:avLst/>
+          </a:prstGeom>
+        </p:spPr>
+      </p:pic>
+    </p:spTree>
+    <p:extLst>
+      <p:ext uri="{BB962C8B-B14F-4D97-AF65-F5344CB8AC3E}">
+        <p14:creationId xmlns:p14="http://schemas.microsoft.com/office/powerpoint/2010/main" val="3833624137"/>
+      </p:ext>
+    </p:extLst>
+  </p:cSld>
+  <p:clrMapOvr>
+    <a:masterClrMapping/>
+  </p:clrMapOvr>
+  <p:timing>
+    <p:tnLst>
+      <p:par>
+        <p:cTn xmlns:p14="http://schemas.microsoft.com/office/powerpoint/2010/main" id="1" dur="indefinite" restart="never" nodeType="tmRoot"/>
+      </p:par>
+    </p:tnLst>
+  </p:timing>
+</p:sld>
+</file>
+
+<file path=ppt/slides/slide5.xml><?xml version="1.0" encoding="utf-8"?>
+<p:sld xmlns:a="http://schemas.openxmlformats.org/drawingml/2006/main" xmlns:r="http://schemas.openxmlformats.org/officeDocument/2006/relationships" xmlns:p="http://schemas.openxmlformats.org/presentationml/2006/main">
+  <p:cSld>
+    <p:spTree>
+      <p:nvGrpSpPr>
+        <p:cNvPr id="1" name=""/>
+        <p:cNvGrpSpPr/>
+        <p:nvPr/>
+      </p:nvGrpSpPr>
+      <p:grpSpPr>
+        <a:xfrm>
+          <a:off x="0" y="0"/>
+          <a:ext cx="0" cy="0"/>
+          <a:chOff x="0" y="0"/>
+          <a:chExt cx="0" cy="0"/>
+        </a:xfrm>
+      </p:grpSpPr>
+      <p:pic>
+        <p:nvPicPr>
+          <p:cNvPr id="4" name="Picture 3" descr="Developer.png"/>
+          <p:cNvPicPr>
+            <a:picLocks noChangeAspect="1"/>
+          </p:cNvPicPr>
+          <p:nvPr/>
+        </p:nvPicPr>
+        <p:blipFill>
+          <a:blip r:embed="rId2">
+            <a:extLst>
+              <a:ext uri="{28A0092B-C50C-407E-A947-70E740481C1C}">
+                <a14:useLocalDpi xmlns:a14="http://schemas.microsoft.com/office/drawing/2010/main" val="0"/>
+              </a:ext>
+            </a:extLst>
+          </a:blip>
+          <a:stretch>
+            <a:fillRect/>
+          </a:stretch>
+        </p:blipFill>
+        <p:spPr>
+          <a:xfrm>
+            <a:off x="927251" y="1590757"/>
+            <a:ext cx="4129860" cy="4901196"/>
+          </a:xfrm>
+          <a:prstGeom prst="rect">
+            <a:avLst/>
+          </a:prstGeom>
+        </p:spPr>
+      </p:pic>
+      <p:sp>
+        <p:nvSpPr>
+          <p:cNvPr id="3" name="TextBox 2"/>
+          <p:cNvSpPr txBox="1"/>
+          <p:nvPr/>
+        </p:nvSpPr>
+        <p:spPr>
+          <a:xfrm>
+            <a:off x="6036390" y="1075010"/>
+            <a:ext cx="1627544" cy="769441"/>
+          </a:xfrm>
+          <a:prstGeom prst="rect">
+            <a:avLst/>
+          </a:prstGeom>
+          <a:noFill/>
+        </p:spPr>
+        <p:txBody>
+          <a:bodyPr wrap="none" rtlCol="0">
+            <a:spAutoFit/>
+          </a:bodyPr>
+          <a:lstStyle/>
+          <a:p>
+            <a:r>
+              <a:rPr lang="en-US" sz="4400" dirty="0" smtClean="0">
+                <a:latin typeface="+mj-lt"/>
+                <a:ea typeface="+mj-ea"/>
+                <a:cs typeface="+mj-cs"/>
+              </a:rPr>
+              <a:t>Tester</a:t>
+            </a:r>
+            <a:endParaRPr lang="en-US" sz="4400" dirty="0">
+              <a:latin typeface="+mj-lt"/>
+              <a:ea typeface="+mj-ea"/>
+              <a:cs typeface="+mj-cs"/>
+            </a:endParaRPr>
+          </a:p>
+        </p:txBody>
+      </p:sp>
+    </p:spTree>
+    <p:extLst>
+      <p:ext uri="{BB962C8B-B14F-4D97-AF65-F5344CB8AC3E}">
+        <p14:creationId xmlns:p14="http://schemas.microsoft.com/office/powerpoint/2010/main" val="212937223"/>
+      </p:ext>
+    </p:extLst>
+  </p:cSld>
+  <p:clrMapOvr>
+    <a:masterClrMapping/>
+  </p:clrMapOvr>
+  <p:timing>
+    <p:tnLst>
+      <p:par>
+        <p:cTn xmlns:p14="http://schemas.microsoft.com/office/powerpoint/2010/main" id="1" dur="indefinite" restart="never" nodeType="tmRoot"/>
+      </p:par>
+    </p:tnLst>
+  </p:timing>
+</p:sld>
+</file>
+
+<file path=ppt/slides/slide6.xml><?xml version="1.0" encoding="utf-8"?>
+<p:sld xmlns:a="http://schemas.openxmlformats.org/drawingml/2006/main" xmlns:r="http://schemas.openxmlformats.org/officeDocument/2006/relationships" xmlns:p="http://schemas.openxmlformats.org/presentationml/2006/main">
+  <p:cSld>
+    <p:spTree>
+      <p:nvGrpSpPr>
+        <p:cNvPr id="1" name=""/>
+        <p:cNvGrpSpPr/>
+        <p:nvPr/>
+      </p:nvGrpSpPr>
+      <p:grpSpPr>
+        <a:xfrm>
+          <a:off x="0" y="0"/>
+          <a:ext cx="0" cy="0"/>
+          <a:chOff x="0" y="0"/>
+          <a:chExt cx="0" cy="0"/>
+        </a:xfrm>
+      </p:grpSpPr>
+      <p:pic>
+        <p:nvPicPr>
+          <p:cNvPr id="4" name="Picture 3" descr="Developer.png"/>
+          <p:cNvPicPr>
+            <a:picLocks noChangeAspect="1"/>
+          </p:cNvPicPr>
+          <p:nvPr/>
+        </p:nvPicPr>
+        <p:blipFill>
+          <a:blip r:embed="rId2">
+            <a:extLst>
+              <a:ext uri="{28A0092B-C50C-407E-A947-70E740481C1C}">
+                <a14:useLocalDpi xmlns:a14="http://schemas.microsoft.com/office/drawing/2010/main" val="0"/>
+              </a:ext>
+            </a:extLst>
+          </a:blip>
+          <a:stretch>
+            <a:fillRect/>
+          </a:stretch>
+        </p:blipFill>
+        <p:spPr>
+          <a:xfrm>
+            <a:off x="927251" y="3716947"/>
+            <a:ext cx="2338283" cy="2775005"/>
+          </a:xfrm>
+          <a:prstGeom prst="rect">
+            <a:avLst/>
+          </a:prstGeom>
+        </p:spPr>
+      </p:pic>
+      <p:cxnSp>
+        <p:nvCxnSpPr>
+          <p:cNvPr id="5" name="Straight Connector 4"/>
+          <p:cNvCxnSpPr/>
+          <p:nvPr/>
+        </p:nvCxnSpPr>
+        <p:spPr>
+          <a:xfrm flipV="1">
+            <a:off x="1667393" y="433410"/>
+            <a:ext cx="1598141" cy="3531846"/>
+          </a:xfrm>
+          <a:prstGeom prst="line">
+            <a:avLst/>
+          </a:prstGeom>
+        </p:spPr>
+        <p:style>
+          <a:lnRef idx="1">
+            <a:schemeClr val="dk1"/>
+          </a:lnRef>
+          <a:fillRef idx="0">
+            <a:schemeClr val="dk1"/>
+          </a:fillRef>
+          <a:effectRef idx="0">
+            <a:schemeClr val="dk1"/>
+          </a:effectRef>
+          <a:fontRef idx="minor">
+            <a:schemeClr val="tx1"/>
+          </a:fontRef>
+        </p:style>
+      </p:cxnSp>
+      <p:cxnSp>
+        <p:nvCxnSpPr>
+          <p:cNvPr id="7" name="Straight Connector 6"/>
+          <p:cNvCxnSpPr/>
+          <p:nvPr/>
+        </p:nvCxnSpPr>
+        <p:spPr>
+          <a:xfrm flipH="1">
+            <a:off x="2452619" y="4420920"/>
+            <a:ext cx="6305324" cy="310240"/>
+          </a:xfrm>
+          <a:prstGeom prst="line">
+            <a:avLst/>
+          </a:prstGeom>
+        </p:spPr>
+        <p:style>
+          <a:lnRef idx="1">
+            <a:schemeClr val="dk1"/>
+          </a:lnRef>
+          <a:fillRef idx="0">
+            <a:schemeClr val="dk1"/>
+          </a:fillRef>
+          <a:effectRef idx="0">
+            <a:schemeClr val="dk1"/>
+          </a:effectRef>
+          <a:fontRef idx="minor">
+            <a:schemeClr val="tx1"/>
+          </a:fontRef>
+        </p:style>
+      </p:cxnSp>
+      <p:cxnSp>
+        <p:nvCxnSpPr>
+          <p:cNvPr id="11" name="Straight Connector 10"/>
+          <p:cNvCxnSpPr/>
+          <p:nvPr/>
+        </p:nvCxnSpPr>
+        <p:spPr>
+          <a:xfrm flipH="1">
+            <a:off x="2452618" y="433410"/>
+            <a:ext cx="6055165" cy="3531845"/>
+          </a:xfrm>
+          <a:prstGeom prst="line">
+            <a:avLst/>
+          </a:prstGeom>
+        </p:spPr>
+        <p:style>
+          <a:lnRef idx="1">
+            <a:schemeClr val="dk1"/>
+          </a:lnRef>
+          <a:fillRef idx="0">
+            <a:schemeClr val="dk1"/>
+          </a:fillRef>
+          <a:effectRef idx="0">
+            <a:schemeClr val="dk1"/>
+          </a:effectRef>
+          <a:fontRef idx="minor">
+            <a:schemeClr val="tx1"/>
+          </a:fontRef>
+        </p:style>
+      </p:cxnSp>
+      <p:grpSp>
+        <p:nvGrpSpPr>
+          <p:cNvPr id="8" name="Group 7"/>
+          <p:cNvGrpSpPr/>
+          <p:nvPr/>
+        </p:nvGrpSpPr>
+        <p:grpSpPr>
+          <a:xfrm>
+            <a:off x="3265534" y="433410"/>
+            <a:ext cx="5492409" cy="3931187"/>
+            <a:chOff x="0" y="546203"/>
+            <a:chExt cx="7522370" cy="4298014"/>
+          </a:xfrm>
+        </p:grpSpPr>
+        <p:pic>
+          <p:nvPicPr>
+            <p:cNvPr id="9" name="Picture 8" descr="2015-10-07 10_52_04-[SIRAI-2231] Incorrect behavior when adding requirements in the case of multiple.png"/>
+            <p:cNvPicPr>
+              <a:picLocks noChangeAspect="1"/>
+            </p:cNvPicPr>
+            <p:nvPr/>
+          </p:nvPicPr>
+          <p:blipFill rotWithShape="1">
+            <a:blip r:embed="rId3">
+              <a:grayscl/>
+              <a:extLst>
+                <a:ext uri="{28A0092B-C50C-407E-A947-70E740481C1C}">
+                  <a14:useLocalDpi xmlns:a14="http://schemas.microsoft.com/office/drawing/2010/main" val="0"/>
+                </a:ext>
+              </a:extLst>
+            </a:blip>
+            <a:srcRect r="23880"/>
+            <a:stretch/>
+          </p:blipFill>
+          <p:spPr>
+            <a:xfrm>
+              <a:off x="0" y="546203"/>
+              <a:ext cx="6960394" cy="4298014"/>
+            </a:xfrm>
+            <a:prstGeom prst="rect">
+              <a:avLst/>
+            </a:prstGeom>
+          </p:spPr>
+        </p:pic>
+        <p:pic>
+          <p:nvPicPr>
+            <p:cNvPr id="10" name="Picture 9" descr="2015-10-07 10_52_04-[SIRAI-2231] Incorrect behavior when adding requirements in the case of multiple.png"/>
+            <p:cNvPicPr>
+              <a:picLocks noChangeAspect="1"/>
+            </p:cNvPicPr>
+            <p:nvPr/>
+          </p:nvPicPr>
+          <p:blipFill rotWithShape="1">
+            <a:blip r:embed="rId3">
+              <a:grayscl/>
+              <a:extLst>
+                <a:ext uri="{28A0092B-C50C-407E-A947-70E740481C1C}">
+                  <a14:useLocalDpi xmlns:a14="http://schemas.microsoft.com/office/drawing/2010/main" val="0"/>
+                </a:ext>
+              </a:extLst>
+            </a:blip>
+            <a:srcRect l="64276"/>
+            <a:stretch/>
+          </p:blipFill>
+          <p:spPr>
+            <a:xfrm>
+              <a:off x="4255727" y="546203"/>
+              <a:ext cx="3266643" cy="4298014"/>
+            </a:xfrm>
+            <a:prstGeom prst="rect">
+              <a:avLst/>
+            </a:prstGeom>
+          </p:spPr>
+        </p:pic>
+      </p:grpSp>
+    </p:spTree>
+    <p:extLst>
+      <p:ext uri="{BB962C8B-B14F-4D97-AF65-F5344CB8AC3E}">
+        <p14:creationId xmlns:p14="http://schemas.microsoft.com/office/powerpoint/2010/main" val="1670621525"/>
+      </p:ext>
+    </p:extLst>
+  </p:cSld>
+  <p:clrMapOvr>
+    <a:masterClrMapping/>
+  </p:clrMapOvr>
+  <p:timing>
+    <p:tnLst>
+      <p:par>
+        <p:cTn xmlns:p14="http://schemas.microsoft.com/office/powerpoint/2010/main" id="1" dur="indefinite" restart="never" nodeType="tmRoot"/>
+      </p:par>
+    </p:tnLst>
+  </p:timing>
+</p:sld>
+</file>
+
+<file path=ppt/slides/slide7.xml><?xml version="1.0" encoding="utf-8"?>
+<p:sld xmlns:a="http://schemas.openxmlformats.org/drawingml/2006/main" xmlns:r="http://schemas.openxmlformats.org/officeDocument/2006/relationships" xmlns:p="http://schemas.openxmlformats.org/presentationml/2006/main">
+  <p:cSld>
+    <p:spTree>
+      <p:nvGrpSpPr>
+        <p:cNvPr id="1" name=""/>
+        <p:cNvGrpSpPr/>
+        <p:nvPr/>
+      </p:nvGrpSpPr>
+      <p:grpSpPr>
+        <a:xfrm>
+          <a:off x="0" y="0"/>
+          <a:ext cx="0" cy="0"/>
+          <a:chOff x="0" y="0"/>
+          <a:chExt cx="0" cy="0"/>
+        </a:xfrm>
+      </p:grpSpPr>
+      <p:pic>
+        <p:nvPicPr>
+          <p:cNvPr id="4" name="Picture 3" descr="Macintosh HD:Users:llewellyn:Pictures:Koans Randori Images:un-sticker.png"/>
+          <p:cNvPicPr/>
+          <p:nvPr/>
+        </p:nvPicPr>
+        <p:blipFill rotWithShape="1">
+          <a:blip r:embed="rId2">
+            <a:extLst>
+              <a:ext uri="{28A0092B-C50C-407E-A947-70E740481C1C}">
+                <a14:useLocalDpi xmlns:a14="http://schemas.microsoft.com/office/drawing/2010/main" val="0"/>
+              </a:ext>
+            </a:extLst>
+          </a:blip>
+          <a:srcRect t="3" b="42502"/>
+          <a:stretch/>
+        </p:blipFill>
+        <p:spPr bwMode="auto">
+          <a:xfrm>
+            <a:off x="1588134" y="907009"/>
+            <a:ext cx="6066513" cy="4514891"/>
+          </a:xfrm>
+          <a:prstGeom prst="rect">
+            <a:avLst/>
+          </a:prstGeom>
+          <a:noFill/>
+          <a:ln>
+            <a:noFill/>
+          </a:ln>
+          <a:extLst>
+            <a:ext uri="{53640926-AAD7-44d8-BBD7-CCE9431645EC}">
+              <a14:shadowObscured xmlns:a14="http://schemas.microsoft.com/office/drawing/2010/main"/>
+            </a:ext>
+          </a:extLst>
+        </p:spPr>
+      </p:pic>
+      <p:sp>
+        <p:nvSpPr>
+          <p:cNvPr id="5" name="Rectangle 4"/>
+          <p:cNvSpPr/>
+          <p:nvPr/>
+        </p:nvSpPr>
+        <p:spPr>
+          <a:xfrm>
+            <a:off x="4751740" y="1924881"/>
+            <a:ext cx="3477859" cy="866698"/>
+          </a:xfrm>
+          <a:prstGeom prst="rect">
+            <a:avLst/>
+          </a:prstGeom>
+          <a:solidFill>
+            <a:schemeClr val="bg1"/>
+          </a:solidFill>
+          <a:ln>
+            <a:noFill/>
+          </a:ln>
+          <a:effectLst/>
+        </p:spPr>
+        <p:style>
+          <a:lnRef idx="1">
+            <a:schemeClr val="accent1"/>
+          </a:lnRef>
+          <a:fillRef idx="3">
+            <a:schemeClr val="accent1"/>
+          </a:fillRef>
+          <a:effectRef idx="2">
+            <a:schemeClr val="accent1"/>
+          </a:effectRef>
+          <a:fontRef idx="minor">
+            <a:schemeClr val="lt1"/>
+          </a:fontRef>
+        </p:style>
+        <p:txBody>
+          <a:bodyPr rtlCol="0" anchor="ctr"/>
+          <a:lstStyle/>
+          <a:p>
+            <a:pPr algn="ctr"/>
+            <a:r>
+              <a:rPr lang="en-US" sz="7200" dirty="0">
+                <a:solidFill>
+                  <a:schemeClr val="tx1"/>
+                </a:solidFill>
+                <a:latin typeface="Brush Script Std"/>
+                <a:cs typeface="Brush Script Std"/>
+              </a:rPr>
+              <a:t>?</a:t>
+            </a:r>
+            <a:r>
+              <a:rPr lang="en-US" sz="7200" dirty="0" smtClean="0">
+                <a:solidFill>
+                  <a:schemeClr val="tx1"/>
+                </a:solidFill>
+                <a:latin typeface="Brush Script Std"/>
+                <a:cs typeface="Brush Script Std"/>
+              </a:rPr>
+              <a:t>!?%#</a:t>
+            </a:r>
+            <a:endParaRPr lang="en-US" sz="7200" dirty="0">
+              <a:solidFill>
+                <a:schemeClr val="tx1"/>
+              </a:solidFill>
+              <a:latin typeface="Brush Script Std"/>
+              <a:cs typeface="Brush Script Std"/>
+            </a:endParaRPr>
+          </a:p>
+        </p:txBody>
+      </p:sp>
+      <p:pic>
+        <p:nvPicPr>
+          <p:cNvPr id="6" name="Picture 5" descr="Macintosh HD:Users:llewellyn:Pictures:Koans Randori Images:un-sticker.png"/>
+          <p:cNvPicPr/>
+          <p:nvPr/>
+        </p:nvPicPr>
+        <p:blipFill rotWithShape="1">
+          <a:blip r:embed="rId2">
+            <a:extLst>
+              <a:ext uri="{28A0092B-C50C-407E-A947-70E740481C1C}">
+                <a14:useLocalDpi xmlns:a14="http://schemas.microsoft.com/office/drawing/2010/main" val="0"/>
+              </a:ext>
+            </a:extLst>
+          </a:blip>
+          <a:srcRect l="63593" t="23504" r="8373" b="42502"/>
+          <a:stretch/>
+        </p:blipFill>
+        <p:spPr bwMode="auto">
+          <a:xfrm>
+            <a:off x="1204359" y="2970554"/>
+            <a:ext cx="1700700" cy="2669435"/>
+          </a:xfrm>
+          <a:prstGeom prst="rect">
+            <a:avLst/>
+          </a:prstGeom>
+          <a:noFill/>
+          <a:ln>
+            <a:noFill/>
+          </a:ln>
+          <a:extLst>
+            <a:ext uri="{53640926-AAD7-44d8-BBD7-CCE9431645EC}">
+              <a14:shadowObscured xmlns:a14="http://schemas.microsoft.com/office/drawing/2010/main"/>
+            </a:ext>
+          </a:extLst>
+        </p:spPr>
+      </p:pic>
+    </p:spTree>
+    <p:extLst>
+      <p:ext uri="{BB962C8B-B14F-4D97-AF65-F5344CB8AC3E}">
+        <p14:creationId xmlns:p14="http://schemas.microsoft.com/office/powerpoint/2010/main" val="3436034267"/>
+      </p:ext>
+    </p:extLst>
+  </p:cSld>
+  <p:clrMapOvr>
+    <a:masterClrMapping/>
+  </p:clrMapOvr>
+  <p:timing>
+    <p:tnLst>
+      <p:par>
+        <p:cTn xmlns:p14="http://schemas.microsoft.com/office/powerpoint/2010/main" id="1" dur="indefinite" restart="never" nodeType="tmRoot"/>
+      </p:par>
+    </p:tnLst>
+  </p:timing>
+</p:sld>
+</file>
+
+<file path=ppt/slides/slide8.xml><?xml version="1.0" encoding="utf-8"?>
+<p:sld xmlns:a="http://schemas.openxmlformats.org/drawingml/2006/main" xmlns:r="http://schemas.openxmlformats.org/officeDocument/2006/relationships" xmlns:p="http://schemas.openxmlformats.org/presentationml/2006/main">
+  <p:cSld>
+    <p:spTree>
+      <p:nvGrpSpPr>
+        <p:cNvPr id="1" name=""/>
+        <p:cNvGrpSpPr/>
+        <p:nvPr/>
+      </p:nvGrpSpPr>
+      <p:grpSpPr>
+        <a:xfrm>
+          <a:off x="0" y="0"/>
+          <a:ext cx="0" cy="0"/>
+          <a:chOff x="0" y="0"/>
+          <a:chExt cx="0" cy="0"/>
+        </a:xfrm>
+      </p:grpSpPr>
+      <p:sp>
+        <p:nvSpPr>
+          <p:cNvPr id="4" name="Title 3"/>
+          <p:cNvSpPr>
+            <a:spLocks noGrp="1"/>
+          </p:cNvSpPr>
+          <p:nvPr>
+            <p:ph type="title"/>
+          </p:nvPr>
+        </p:nvSpPr>
+        <p:spPr>
+          <a:xfrm>
+            <a:off x="457200" y="274637"/>
+            <a:ext cx="8229600" cy="6162777"/>
+          </a:xfrm>
+        </p:spPr>
+        <p:txBody>
+          <a:bodyPr>
+            <a:normAutofit/>
+          </a:bodyPr>
+          <a:lstStyle/>
+          <a:p>
+            <a:r>
+              <a:rPr lang="en-US" dirty="0" smtClean="0"/>
+              <a:t>Except…</a:t>
+            </a:r>
+            <a:endParaRPr lang="en-US" dirty="0"/>
+          </a:p>
+        </p:txBody>
+      </p:sp>
+    </p:spTree>
+    <p:extLst>
+      <p:ext uri="{BB962C8B-B14F-4D97-AF65-F5344CB8AC3E}">
+        <p14:creationId xmlns:p14="http://schemas.microsoft.com/office/powerpoint/2010/main" val="4176282085"/>
+      </p:ext>
+    </p:extLst>
+  </p:cSld>
+  <p:clrMapOvr>
+    <a:masterClrMapping/>
+  </p:clrMapOvr>
+  <p:timing>
+    <p:tnLst>
+      <p:par>
+        <p:cTn xmlns:p14="http://schemas.microsoft.com/office/powerpoint/2010/main" id="1" dur="indefinite" restart="never" nodeType="tmRoot"/>
+      </p:par>
+    </p:tnLst>
+  </p:timing>
+</p:sld>
+</file>
+
+<file path=ppt/slides/slide9.xml><?xml version="1.0" encoding="utf-8"?>
 <p:sld xmlns:a="http://schemas.openxmlformats.org/drawingml/2006/main" xmlns:r="http://schemas.openxmlformats.org/officeDocument/2006/relationships" xmlns:p="http://schemas.openxmlformats.org/presentationml/2006/main">
   <p:cSld>
     <p:spTree>
@@ -7117,1021 +9924,13 @@
   <p:clrMapOvr>
     <a:masterClrMapping/>
   </p:clrMapOvr>
-</p:sld>
-</file>
-
-<file path=ppt/slides/slide3.xml><?xml version="1.0" encoding="utf-8"?>
-<p:sld xmlns:a="http://schemas.openxmlformats.org/drawingml/2006/main" xmlns:r="http://schemas.openxmlformats.org/officeDocument/2006/relationships" xmlns:p="http://schemas.openxmlformats.org/presentationml/2006/main">
-  <p:cSld>
-    <p:spTree>
-      <p:nvGrpSpPr>
-        <p:cNvPr id="1" name=""/>
-        <p:cNvGrpSpPr/>
-        <p:nvPr/>
-      </p:nvGrpSpPr>
-      <p:grpSpPr>
-        <a:xfrm>
-          <a:off x="0" y="0"/>
-          <a:ext cx="0" cy="0"/>
-          <a:chOff x="0" y="0"/>
-          <a:chExt cx="0" cy="0"/>
-        </a:xfrm>
-      </p:grpSpPr>
-      <p:pic>
-        <p:nvPicPr>
-          <p:cNvPr id="5" name="Picture 4" descr="Macintosh HD:Users:llewellyn:Pictures:Koans Randori Images:navigator.png"/>
-          <p:cNvPicPr/>
-          <p:nvPr/>
-        </p:nvPicPr>
-        <p:blipFill rotWithShape="1">
-          <a:blip r:embed="rId2">
-            <a:extLst>
-              <a:ext uri="{28A0092B-C50C-407E-A947-70E740481C1C}">
-                <a14:useLocalDpi xmlns:a14="http://schemas.microsoft.com/office/drawing/2010/main" val="0"/>
-              </a:ext>
-            </a:extLst>
-          </a:blip>
-          <a:srcRect t="13400" b="41812"/>
-          <a:stretch/>
-        </p:blipFill>
-        <p:spPr bwMode="auto">
-          <a:xfrm>
-            <a:off x="844251" y="846541"/>
-            <a:ext cx="7609982" cy="4414113"/>
-          </a:xfrm>
-          <a:prstGeom prst="rect">
-            <a:avLst/>
-          </a:prstGeom>
-          <a:noFill/>
-          <a:ln>
-            <a:noFill/>
-          </a:ln>
-        </p:spPr>
-      </p:pic>
-      <p:sp>
-        <p:nvSpPr>
-          <p:cNvPr id="4" name="Rectangle 3"/>
-          <p:cNvSpPr/>
-          <p:nvPr/>
-        </p:nvSpPr>
-        <p:spPr>
-          <a:xfrm>
-            <a:off x="844251" y="6488668"/>
-            <a:ext cx="8299749" cy="584776"/>
-          </a:xfrm>
-          <a:prstGeom prst="rect">
-            <a:avLst/>
-          </a:prstGeom>
-        </p:spPr>
-        <p:txBody>
-          <a:bodyPr wrap="square">
-            <a:spAutoFit/>
-          </a:bodyPr>
-          <a:lstStyle/>
-          <a:p>
-            <a:pPr algn="r"/>
-            <a:r>
-              <a:rPr lang="en-US" sz="1600" dirty="0" smtClean="0"/>
-              <a:t>* http://visible-</a:t>
-            </a:r>
-            <a:r>
-              <a:rPr lang="en-US" sz="1600" dirty="0" err="1" smtClean="0"/>
-              <a:t>quality.blogspot.fi</a:t>
-            </a:r>
-            <a:r>
-              <a:rPr lang="en-US" sz="1600" dirty="0" smtClean="0"/>
-              <a:t>/2015/09/my-first-full-day-of-mob-</a:t>
-            </a:r>
-            <a:r>
-              <a:rPr lang="en-US" sz="1600" dirty="0" err="1" smtClean="0"/>
-              <a:t>programming.html</a:t>
-            </a:r>
-            <a:endParaRPr lang="en-US" sz="1600" dirty="0" smtClean="0"/>
-          </a:p>
-          <a:p>
-            <a:pPr algn="r"/>
-            <a:endParaRPr lang="en-US" sz="1600" dirty="0"/>
-          </a:p>
-        </p:txBody>
-      </p:sp>
-      <p:sp>
-        <p:nvSpPr>
-          <p:cNvPr id="6" name="Oval Callout 5"/>
-          <p:cNvSpPr/>
-          <p:nvPr/>
-        </p:nvSpPr>
-        <p:spPr>
-          <a:xfrm>
-            <a:off x="985354" y="1027943"/>
-            <a:ext cx="2824436" cy="2217136"/>
-          </a:xfrm>
-          <a:prstGeom prst="wedgeEllipseCallout">
-            <a:avLst/>
-          </a:prstGeom>
-        </p:spPr>
-        <p:style>
-          <a:lnRef idx="1">
-            <a:schemeClr val="dk1"/>
-          </a:lnRef>
-          <a:fillRef idx="2">
-            <a:schemeClr val="dk1"/>
-          </a:fillRef>
-          <a:effectRef idx="1">
-            <a:schemeClr val="dk1"/>
-          </a:effectRef>
-          <a:fontRef idx="minor">
-            <a:schemeClr val="dk1"/>
-          </a:fontRef>
-        </p:style>
-        <p:txBody>
-          <a:bodyPr rtlCol="0" anchor="ctr"/>
-          <a:lstStyle/>
-          <a:p>
-            <a:pPr algn="ctr"/>
-            <a:r>
-              <a:rPr lang="en-US" sz="2400" dirty="0" smtClean="0"/>
-              <a:t>That would’ve been a nasty one to find later</a:t>
-            </a:r>
-            <a:endParaRPr lang="en-US" sz="2400" dirty="0"/>
-          </a:p>
-        </p:txBody>
-      </p:sp>
-    </p:spTree>
-    <p:extLst>
-      <p:ext uri="{BB962C8B-B14F-4D97-AF65-F5344CB8AC3E}">
-        <p14:creationId xmlns:p14="http://schemas.microsoft.com/office/powerpoint/2010/main" val="455515830"/>
-      </p:ext>
-    </p:extLst>
-  </p:cSld>
-  <p:clrMapOvr>
-    <a:masterClrMapping/>
-  </p:clrMapOvr>
-</p:sld>
-</file>
-
-<file path=ppt/slides/slide4.xml><?xml version="1.0" encoding="utf-8"?>
-<p:sld xmlns:a="http://schemas.openxmlformats.org/drawingml/2006/main" xmlns:r="http://schemas.openxmlformats.org/officeDocument/2006/relationships" xmlns:p="http://schemas.openxmlformats.org/presentationml/2006/main">
-  <p:cSld>
-    <p:spTree>
-      <p:nvGrpSpPr>
-        <p:cNvPr id="1" name=""/>
-        <p:cNvGrpSpPr/>
-        <p:nvPr/>
-      </p:nvGrpSpPr>
-      <p:grpSpPr>
-        <a:xfrm>
-          <a:off x="0" y="0"/>
-          <a:ext cx="0" cy="0"/>
-          <a:chOff x="0" y="0"/>
-          <a:chExt cx="0" cy="0"/>
-        </a:xfrm>
-      </p:grpSpPr>
-      <p:sp>
-        <p:nvSpPr>
-          <p:cNvPr id="2" name="Title 1"/>
-          <p:cNvSpPr>
-            <a:spLocks noGrp="1"/>
-          </p:cNvSpPr>
-          <p:nvPr>
-            <p:ph type="title" idx="4294967295"/>
-          </p:nvPr>
-        </p:nvSpPr>
-        <p:spPr>
-          <a:xfrm>
-            <a:off x="0" y="274638"/>
-            <a:ext cx="8229600" cy="1143000"/>
-          </a:xfrm>
-        </p:spPr>
-        <p:txBody>
-          <a:bodyPr/>
-          <a:lstStyle/>
-          <a:p>
-            <a:r>
-              <a:rPr lang="en-US" dirty="0" smtClean="0"/>
-              <a:t>Pair Writing</a:t>
-            </a:r>
-            <a:endParaRPr lang="en-US" dirty="0"/>
-          </a:p>
-        </p:txBody>
-      </p:sp>
-      <p:pic>
-        <p:nvPicPr>
-          <p:cNvPr id="4" name="Picture 3" descr="Macintosh HD:Users:llewellyn:Pictures:Koans Randori Images:un-sticker.png"/>
-          <p:cNvPicPr/>
-          <p:nvPr/>
-        </p:nvPicPr>
-        <p:blipFill rotWithShape="1">
-          <a:blip r:embed="rId2">
-            <a:extLst>
-              <a:ext uri="{28A0092B-C50C-407E-A947-70E740481C1C}">
-                <a14:useLocalDpi xmlns:a14="http://schemas.microsoft.com/office/drawing/2010/main" val="0"/>
-              </a:ext>
-            </a:extLst>
-          </a:blip>
-          <a:srcRect t="3" b="42502"/>
-          <a:stretch/>
-        </p:blipFill>
-        <p:spPr bwMode="auto">
-          <a:xfrm>
-            <a:off x="1588134" y="907009"/>
-            <a:ext cx="6066513" cy="4514891"/>
-          </a:xfrm>
-          <a:prstGeom prst="rect">
-            <a:avLst/>
-          </a:prstGeom>
-          <a:noFill/>
-          <a:ln>
-            <a:noFill/>
-          </a:ln>
-          <a:extLst>
-            <a:ext uri="{53640926-AAD7-44d8-BBD7-CCE9431645EC}">
-              <a14:shadowObscured xmlns:a14="http://schemas.microsoft.com/office/drawing/2010/main"/>
-            </a:ext>
-          </a:extLst>
-        </p:spPr>
-      </p:pic>
-      <p:sp>
-        <p:nvSpPr>
-          <p:cNvPr id="5" name="Rectangle 4"/>
-          <p:cNvSpPr/>
-          <p:nvPr/>
-        </p:nvSpPr>
-        <p:spPr>
-          <a:xfrm>
-            <a:off x="4555622" y="1924881"/>
-            <a:ext cx="3673978" cy="866698"/>
-          </a:xfrm>
-          <a:prstGeom prst="rect">
-            <a:avLst/>
-          </a:prstGeom>
-          <a:solidFill>
-            <a:schemeClr val="bg1"/>
-          </a:solidFill>
-          <a:ln>
-            <a:noFill/>
-          </a:ln>
-          <a:effectLst/>
-        </p:spPr>
-        <p:style>
-          <a:lnRef idx="1">
-            <a:schemeClr val="accent1"/>
-          </a:lnRef>
-          <a:fillRef idx="3">
-            <a:schemeClr val="accent1"/>
-          </a:fillRef>
-          <a:effectRef idx="2">
-            <a:schemeClr val="accent1"/>
-          </a:effectRef>
-          <a:fontRef idx="minor">
-            <a:schemeClr val="lt1"/>
-          </a:fontRef>
-        </p:style>
-        <p:txBody>
-          <a:bodyPr rtlCol="0" anchor="ctr"/>
-          <a:lstStyle/>
-          <a:p>
-            <a:pPr algn="ctr"/>
-            <a:r>
-              <a:rPr lang="en-US" sz="7200" dirty="0">
-                <a:solidFill>
-                  <a:schemeClr val="tx1"/>
-                </a:solidFill>
-                <a:latin typeface="Brush Script Std"/>
-                <a:cs typeface="Brush Script Std"/>
-              </a:rPr>
-              <a:t>?</a:t>
-            </a:r>
-            <a:r>
-              <a:rPr lang="en-US" sz="7200" dirty="0" smtClean="0">
-                <a:solidFill>
-                  <a:schemeClr val="tx1"/>
-                </a:solidFill>
-                <a:latin typeface="Brush Script Std"/>
-                <a:cs typeface="Brush Script Std"/>
-              </a:rPr>
-              <a:t>!?%#</a:t>
-            </a:r>
-            <a:endParaRPr lang="en-US" sz="7200" dirty="0">
-              <a:solidFill>
-                <a:schemeClr val="tx1"/>
-              </a:solidFill>
-              <a:latin typeface="Brush Script Std"/>
-              <a:cs typeface="Brush Script Std"/>
-            </a:endParaRPr>
-          </a:p>
-        </p:txBody>
-      </p:sp>
-    </p:spTree>
-    <p:extLst>
-      <p:ext uri="{BB962C8B-B14F-4D97-AF65-F5344CB8AC3E}">
-        <p14:creationId xmlns:p14="http://schemas.microsoft.com/office/powerpoint/2010/main" val="1765028863"/>
-      </p:ext>
-    </p:extLst>
-  </p:cSld>
-  <p:clrMapOvr>
-    <a:masterClrMapping/>
-  </p:clrMapOvr>
-</p:sld>
-</file>
-
-<file path=ppt/slides/slide5.xml><?xml version="1.0" encoding="utf-8"?>
-<p:sld xmlns:a="http://schemas.openxmlformats.org/drawingml/2006/main" xmlns:r="http://schemas.openxmlformats.org/officeDocument/2006/relationships" xmlns:p="http://schemas.openxmlformats.org/presentationml/2006/main">
-  <p:cSld>
-    <p:spTree>
-      <p:nvGrpSpPr>
-        <p:cNvPr id="1" name=""/>
-        <p:cNvGrpSpPr/>
-        <p:nvPr/>
-      </p:nvGrpSpPr>
-      <p:grpSpPr>
-        <a:xfrm>
-          <a:off x="0" y="0"/>
-          <a:ext cx="0" cy="0"/>
-          <a:chOff x="0" y="0"/>
-          <a:chExt cx="0" cy="0"/>
-        </a:xfrm>
-      </p:grpSpPr>
-      <p:sp>
-        <p:nvSpPr>
-          <p:cNvPr id="2" name="Title 1"/>
-          <p:cNvSpPr>
-            <a:spLocks noGrp="1"/>
-          </p:cNvSpPr>
-          <p:nvPr>
-            <p:ph type="ctrTitle"/>
-          </p:nvPr>
-        </p:nvSpPr>
-        <p:spPr>
-          <a:xfrm>
-            <a:off x="685800" y="3600450"/>
-            <a:ext cx="7772400" cy="1470025"/>
-          </a:xfrm>
-        </p:spPr>
-        <p:txBody>
-          <a:bodyPr/>
-          <a:lstStyle/>
-          <a:p>
-            <a:r>
-              <a:rPr lang="en-US" dirty="0" smtClean="0"/>
-              <a:t>1</a:t>
-            </a:r>
-            <a:r>
-              <a:rPr lang="en-US" baseline="30000" dirty="0" smtClean="0"/>
-              <a:t>st</a:t>
-            </a:r>
-            <a:r>
-              <a:rPr lang="en-US" dirty="0" smtClean="0"/>
-              <a:t> session on unit testing</a:t>
-            </a:r>
-            <a:endParaRPr lang="en-US" dirty="0"/>
-          </a:p>
-        </p:txBody>
-      </p:sp>
-      <p:pic>
-        <p:nvPicPr>
-          <p:cNvPr id="4" name="Picture 3"/>
-          <p:cNvPicPr>
-            <a:picLocks noChangeAspect="1"/>
-          </p:cNvPicPr>
-          <p:nvPr/>
-        </p:nvPicPr>
-        <p:blipFill>
-          <a:blip r:embed="rId2"/>
-          <a:stretch>
-            <a:fillRect/>
-          </a:stretch>
-        </p:blipFill>
-        <p:spPr>
-          <a:xfrm>
-            <a:off x="5624417" y="553742"/>
-            <a:ext cx="3251200" cy="3251200"/>
-          </a:xfrm>
-          <a:prstGeom prst="rect">
-            <a:avLst/>
-          </a:prstGeom>
-        </p:spPr>
-      </p:pic>
-      <p:sp>
-        <p:nvSpPr>
-          <p:cNvPr id="5" name="Rectangle 4"/>
-          <p:cNvSpPr/>
-          <p:nvPr/>
-        </p:nvSpPr>
-        <p:spPr>
-          <a:xfrm>
-            <a:off x="1411032" y="6418666"/>
-            <a:ext cx="7732967" cy="338554"/>
-          </a:xfrm>
-          <a:prstGeom prst="rect">
-            <a:avLst/>
-          </a:prstGeom>
-        </p:spPr>
-        <p:txBody>
-          <a:bodyPr wrap="square">
-            <a:spAutoFit/>
-          </a:bodyPr>
-          <a:lstStyle/>
-          <a:p>
-            <a:pPr algn="r"/>
-            <a:r>
-              <a:rPr lang="en-US" sz="1600" dirty="0" smtClean="0"/>
-              <a:t>  * http://visible-</a:t>
-            </a:r>
-            <a:r>
-              <a:rPr lang="en-US" sz="1600" dirty="0" err="1" smtClean="0"/>
-              <a:t>quality.blogspot.fi</a:t>
-            </a:r>
-            <a:r>
-              <a:rPr lang="en-US" sz="1600" dirty="0" smtClean="0"/>
-              <a:t>/2015/01/a-learning-journey-with-unit-tests-</a:t>
-            </a:r>
-            <a:r>
-              <a:rPr lang="en-US" sz="1600" dirty="0" err="1" smtClean="0"/>
-              <a:t>just.html</a:t>
-            </a:r>
-            <a:endParaRPr lang="en-US" sz="1600" dirty="0"/>
-          </a:p>
-        </p:txBody>
-      </p:sp>
-    </p:spTree>
-    <p:extLst>
-      <p:ext uri="{BB962C8B-B14F-4D97-AF65-F5344CB8AC3E}">
-        <p14:creationId xmlns:p14="http://schemas.microsoft.com/office/powerpoint/2010/main" val="2975425866"/>
-      </p:ext>
-    </p:extLst>
-  </p:cSld>
-  <p:clrMapOvr>
-    <a:masterClrMapping/>
-  </p:clrMapOvr>
-</p:sld>
-</file>
-
-<file path=ppt/slides/slide6.xml><?xml version="1.0" encoding="utf-8"?>
-<p:sld xmlns:a="http://schemas.openxmlformats.org/drawingml/2006/main" xmlns:r="http://schemas.openxmlformats.org/officeDocument/2006/relationships" xmlns:p="http://schemas.openxmlformats.org/presentationml/2006/main">
-  <p:cSld>
-    <p:spTree>
-      <p:nvGrpSpPr>
-        <p:cNvPr id="1" name=""/>
-        <p:cNvGrpSpPr/>
-        <p:nvPr/>
-      </p:nvGrpSpPr>
-      <p:grpSpPr>
-        <a:xfrm>
-          <a:off x="0" y="0"/>
-          <a:ext cx="0" cy="0"/>
-          <a:chOff x="0" y="0"/>
-          <a:chExt cx="0" cy="0"/>
-        </a:xfrm>
-      </p:grpSpPr>
-      <p:sp>
-        <p:nvSpPr>
-          <p:cNvPr id="2" name="Title 1"/>
-          <p:cNvSpPr>
-            <a:spLocks noGrp="1"/>
-          </p:cNvSpPr>
-          <p:nvPr>
-            <p:ph type="title"/>
-          </p:nvPr>
-        </p:nvSpPr>
-        <p:spPr/>
-        <p:txBody>
-          <a:bodyPr/>
-          <a:lstStyle/>
-          <a:p>
-            <a:r>
-              <a:rPr lang="en-US" dirty="0" smtClean="0"/>
-              <a:t>Strong Style Pairing</a:t>
-            </a:r>
-            <a:endParaRPr lang="en-US" dirty="0"/>
-          </a:p>
-        </p:txBody>
-      </p:sp>
-      <p:pic>
-        <p:nvPicPr>
-          <p:cNvPr id="5" name="Picture 4"/>
-          <p:cNvPicPr>
-            <a:picLocks noChangeAspect="1"/>
-          </p:cNvPicPr>
-          <p:nvPr/>
-        </p:nvPicPr>
-        <p:blipFill>
-          <a:blip r:embed="rId2"/>
-          <a:stretch>
-            <a:fillRect/>
-          </a:stretch>
-        </p:blipFill>
-        <p:spPr>
-          <a:xfrm>
-            <a:off x="1926224" y="3170072"/>
-            <a:ext cx="4507805" cy="3058059"/>
-          </a:xfrm>
-          <a:prstGeom prst="rect">
-            <a:avLst/>
-          </a:prstGeom>
-        </p:spPr>
-      </p:pic>
-      <p:sp>
-        <p:nvSpPr>
-          <p:cNvPr id="6" name="TextBox 5"/>
-          <p:cNvSpPr txBox="1"/>
-          <p:nvPr/>
-        </p:nvSpPr>
-        <p:spPr>
-          <a:xfrm>
-            <a:off x="624886" y="1395590"/>
-            <a:ext cx="7619580" cy="1754327"/>
-          </a:xfrm>
-          <a:prstGeom prst="rect">
-            <a:avLst/>
-          </a:prstGeom>
-          <a:noFill/>
-        </p:spPr>
-        <p:txBody>
-          <a:bodyPr wrap="square" rtlCol="0">
-            <a:spAutoFit/>
-          </a:bodyPr>
-          <a:lstStyle/>
-          <a:p>
-            <a:pPr algn="ctr"/>
-            <a:r>
-              <a:rPr lang="en-US" sz="3600" dirty="0" smtClean="0">
-                <a:latin typeface="Arial"/>
-                <a:cs typeface="Arial"/>
-              </a:rPr>
-              <a:t>“For an idea to go from your head to the computer it </a:t>
-            </a:r>
-            <a:r>
-              <a:rPr lang="en-US" sz="3600" b="1" i="1" dirty="0" smtClean="0">
-                <a:latin typeface="Arial"/>
-                <a:cs typeface="Arial"/>
-              </a:rPr>
-              <a:t>must</a:t>
-            </a:r>
-            <a:r>
-              <a:rPr lang="en-US" sz="3600" dirty="0" smtClean="0">
-                <a:latin typeface="Arial"/>
-                <a:cs typeface="Arial"/>
-              </a:rPr>
-              <a:t> go though someone else’s hands”</a:t>
-            </a:r>
-            <a:endParaRPr lang="en-US" sz="3600" dirty="0">
-              <a:latin typeface="Arial"/>
-              <a:cs typeface="Arial"/>
-            </a:endParaRPr>
-          </a:p>
-        </p:txBody>
-      </p:sp>
-      <p:sp>
-        <p:nvSpPr>
-          <p:cNvPr id="7" name="Rectangle 6"/>
-          <p:cNvSpPr/>
-          <p:nvPr/>
-        </p:nvSpPr>
-        <p:spPr>
-          <a:xfrm>
-            <a:off x="1411032" y="6418666"/>
-            <a:ext cx="7732967" cy="338554"/>
-          </a:xfrm>
-          <a:prstGeom prst="rect">
-            <a:avLst/>
-          </a:prstGeom>
-        </p:spPr>
-        <p:txBody>
-          <a:bodyPr wrap="square">
-            <a:spAutoFit/>
-          </a:bodyPr>
-          <a:lstStyle/>
-          <a:p>
-            <a:pPr algn="r"/>
-            <a:r>
-              <a:rPr lang="en-US" sz="1600" dirty="0" smtClean="0"/>
-              <a:t>  *http://</a:t>
-            </a:r>
-            <a:r>
-              <a:rPr lang="en-US" sz="1600" dirty="0" err="1" smtClean="0"/>
-              <a:t>llewellynfalco.blogspot.fi</a:t>
-            </a:r>
-            <a:r>
-              <a:rPr lang="en-US" sz="1600" dirty="0" smtClean="0"/>
-              <a:t>/2014/06/</a:t>
-            </a:r>
-            <a:r>
-              <a:rPr lang="en-US" sz="1600" dirty="0" err="1" smtClean="0"/>
-              <a:t>llewellyns</a:t>
-            </a:r>
-            <a:r>
-              <a:rPr lang="en-US" sz="1600" dirty="0" smtClean="0"/>
-              <a:t>-strong-style-</a:t>
-            </a:r>
-            <a:r>
-              <a:rPr lang="en-US" sz="1600" dirty="0" err="1" smtClean="0"/>
-              <a:t>pairing.html</a:t>
-            </a:r>
-            <a:endParaRPr lang="en-US" sz="1600" dirty="0"/>
-          </a:p>
-        </p:txBody>
-      </p:sp>
-    </p:spTree>
-    <p:extLst>
-      <p:ext uri="{BB962C8B-B14F-4D97-AF65-F5344CB8AC3E}">
-        <p14:creationId xmlns:p14="http://schemas.microsoft.com/office/powerpoint/2010/main" val="1587320404"/>
-      </p:ext>
-    </p:extLst>
-  </p:cSld>
-  <p:clrMapOvr>
-    <a:masterClrMapping/>
-  </p:clrMapOvr>
-</p:sld>
-</file>
-
-<file path=ppt/slides/slide7.xml><?xml version="1.0" encoding="utf-8"?>
-<p:sld xmlns:a="http://schemas.openxmlformats.org/drawingml/2006/main" xmlns:r="http://schemas.openxmlformats.org/officeDocument/2006/relationships" xmlns:p="http://schemas.openxmlformats.org/presentationml/2006/main">
-  <p:cSld>
-    <p:spTree>
-      <p:nvGrpSpPr>
-        <p:cNvPr id="1" name=""/>
-        <p:cNvGrpSpPr/>
-        <p:nvPr/>
-      </p:nvGrpSpPr>
-      <p:grpSpPr>
-        <a:xfrm>
-          <a:off x="0" y="0"/>
-          <a:ext cx="0" cy="0"/>
-          <a:chOff x="0" y="0"/>
-          <a:chExt cx="0" cy="0"/>
-        </a:xfrm>
-      </p:grpSpPr>
-      <p:sp>
-        <p:nvSpPr>
-          <p:cNvPr id="2" name="Title 1"/>
-          <p:cNvSpPr>
-            <a:spLocks noGrp="1"/>
-          </p:cNvSpPr>
-          <p:nvPr>
-            <p:ph type="title"/>
-          </p:nvPr>
-        </p:nvSpPr>
-        <p:spPr/>
-        <p:txBody>
-          <a:bodyPr/>
-          <a:lstStyle/>
-          <a:p>
-            <a:r>
-              <a:rPr lang="en-US" dirty="0" smtClean="0"/>
-              <a:t>Farming vs. Hunting</a:t>
-            </a:r>
-            <a:endParaRPr lang="en-US" dirty="0"/>
-          </a:p>
-        </p:txBody>
-      </p:sp>
-      <p:pic>
-        <p:nvPicPr>
-          <p:cNvPr id="4" name="Picture 3"/>
-          <p:cNvPicPr>
-            <a:picLocks noChangeAspect="1"/>
-          </p:cNvPicPr>
-          <p:nvPr/>
-        </p:nvPicPr>
-        <p:blipFill rotWithShape="1">
-          <a:blip r:embed="rId2"/>
-          <a:srcRect l="19027" t="3696" r="30887" b="8509"/>
-          <a:stretch/>
-        </p:blipFill>
-        <p:spPr>
-          <a:xfrm>
-            <a:off x="6067443" y="1639352"/>
-            <a:ext cx="2116551" cy="3875018"/>
-          </a:xfrm>
-          <a:prstGeom prst="rect">
-            <a:avLst/>
-          </a:prstGeom>
-        </p:spPr>
-      </p:pic>
-      <p:pic>
-        <p:nvPicPr>
-          <p:cNvPr id="5" name="Picture 4"/>
-          <p:cNvPicPr>
-            <a:picLocks noChangeAspect="1"/>
-          </p:cNvPicPr>
-          <p:nvPr/>
-        </p:nvPicPr>
-        <p:blipFill>
-          <a:blip r:embed="rId3">
-            <a:extLst>
-              <a:ext uri="{BEBA8EAE-BF5A-486C-A8C5-ECC9F3942E4B}">
-                <a14:imgProps xmlns:a14="http://schemas.microsoft.com/office/drawing/2010/main">
-                  <a14:imgLayer r:embed="rId4">
-                    <a14:imgEffect>
-                      <a14:saturation sat="0"/>
-                    </a14:imgEffect>
-                  </a14:imgLayer>
-                </a14:imgProps>
-              </a:ext>
-            </a:extLst>
-          </a:blip>
-          <a:stretch>
-            <a:fillRect/>
-          </a:stretch>
-        </p:blipFill>
-        <p:spPr>
-          <a:xfrm>
-            <a:off x="747307" y="1926353"/>
-            <a:ext cx="3485794" cy="3480431"/>
-          </a:xfrm>
-          <a:prstGeom prst="rect">
-            <a:avLst/>
-          </a:prstGeom>
-        </p:spPr>
-      </p:pic>
-    </p:spTree>
-    <p:extLst>
-      <p:ext uri="{BB962C8B-B14F-4D97-AF65-F5344CB8AC3E}">
-        <p14:creationId xmlns:p14="http://schemas.microsoft.com/office/powerpoint/2010/main" val="2942875328"/>
-      </p:ext>
-    </p:extLst>
-  </p:cSld>
-  <p:clrMapOvr>
-    <a:masterClrMapping/>
-  </p:clrMapOvr>
-</p:sld>
-</file>
-
-<file path=ppt/slides/slide8.xml><?xml version="1.0" encoding="utf-8"?>
-<p:sld xmlns:a="http://schemas.openxmlformats.org/drawingml/2006/main" xmlns:r="http://schemas.openxmlformats.org/officeDocument/2006/relationships" xmlns:p="http://schemas.openxmlformats.org/presentationml/2006/main">
-  <p:cSld>
-    <p:spTree>
-      <p:nvGrpSpPr>
-        <p:cNvPr id="1" name=""/>
-        <p:cNvGrpSpPr/>
-        <p:nvPr/>
-      </p:nvGrpSpPr>
-      <p:grpSpPr>
-        <a:xfrm>
-          <a:off x="0" y="0"/>
-          <a:ext cx="0" cy="0"/>
-          <a:chOff x="0" y="0"/>
-          <a:chExt cx="0" cy="0"/>
-        </a:xfrm>
-      </p:grpSpPr>
-      <p:sp>
-        <p:nvSpPr>
-          <p:cNvPr id="2" name="Title 1"/>
-          <p:cNvSpPr>
-            <a:spLocks noGrp="1"/>
-          </p:cNvSpPr>
-          <p:nvPr>
-            <p:ph type="title"/>
-          </p:nvPr>
-        </p:nvSpPr>
-        <p:spPr/>
-        <p:txBody>
-          <a:bodyPr/>
-          <a:lstStyle/>
-          <a:p>
-            <a:r>
-              <a:rPr lang="en-US" dirty="0" smtClean="0"/>
-              <a:t>“Look at me” Pairing</a:t>
-            </a:r>
-            <a:endParaRPr lang="en-US" dirty="0"/>
-          </a:p>
-        </p:txBody>
-      </p:sp>
-      <p:pic>
-        <p:nvPicPr>
-          <p:cNvPr id="4" name="Picture 3"/>
-          <p:cNvPicPr>
-            <a:picLocks noChangeAspect="1"/>
-          </p:cNvPicPr>
-          <p:nvPr/>
-        </p:nvPicPr>
-        <p:blipFill>
-          <a:blip r:embed="rId3"/>
-          <a:stretch>
-            <a:fillRect/>
-          </a:stretch>
-        </p:blipFill>
-        <p:spPr>
-          <a:xfrm>
-            <a:off x="1600200" y="1417638"/>
-            <a:ext cx="5943600" cy="4787900"/>
-          </a:xfrm>
-          <a:prstGeom prst="rect">
-            <a:avLst/>
-          </a:prstGeom>
-        </p:spPr>
-      </p:pic>
-      <p:pic>
-        <p:nvPicPr>
-          <p:cNvPr id="5" name="Picture 4"/>
-          <p:cNvPicPr>
-            <a:picLocks noChangeAspect="1"/>
-          </p:cNvPicPr>
-          <p:nvPr/>
-        </p:nvPicPr>
-        <p:blipFill>
-          <a:blip r:embed="rId4">
-            <a:extLst>
-              <a:ext uri="{BEBA8EAE-BF5A-486C-A8C5-ECC9F3942E4B}">
-                <a14:imgProps xmlns:a14="http://schemas.microsoft.com/office/drawing/2010/main">
-                  <a14:imgLayer r:embed="rId5">
-                    <a14:imgEffect>
-                      <a14:saturation sat="0"/>
-                    </a14:imgEffect>
-                  </a14:imgLayer>
-                </a14:imgProps>
-              </a:ext>
-            </a:extLst>
-          </a:blip>
-          <a:stretch>
-            <a:fillRect/>
-          </a:stretch>
-        </p:blipFill>
-        <p:spPr>
-          <a:xfrm rot="16200000">
-            <a:off x="-1667245" y="2946147"/>
-            <a:ext cx="5448300" cy="1651000"/>
-          </a:xfrm>
-          <a:prstGeom prst="rect">
-            <a:avLst/>
-          </a:prstGeom>
-        </p:spPr>
-      </p:pic>
-      <p:sp>
-        <p:nvSpPr>
-          <p:cNvPr id="6" name="Rectangle 5"/>
-          <p:cNvSpPr/>
-          <p:nvPr/>
-        </p:nvSpPr>
-        <p:spPr>
-          <a:xfrm>
-            <a:off x="5664290" y="5381590"/>
-            <a:ext cx="2035920" cy="1114207"/>
-          </a:xfrm>
-          <a:prstGeom prst="rect">
-            <a:avLst/>
-          </a:prstGeom>
-          <a:solidFill>
-            <a:srgbClr val="FFFFFF"/>
-          </a:solidFill>
-          <a:ln>
-            <a:solidFill>
-              <a:srgbClr val="FFFFFF"/>
-            </a:solidFill>
-          </a:ln>
-          <a:effectLst/>
-        </p:spPr>
-        <p:style>
-          <a:lnRef idx="1">
-            <a:schemeClr val="accent1"/>
-          </a:lnRef>
-          <a:fillRef idx="3">
-            <a:schemeClr val="accent1"/>
-          </a:fillRef>
-          <a:effectRef idx="2">
-            <a:schemeClr val="accent1"/>
-          </a:effectRef>
-          <a:fontRef idx="minor">
-            <a:schemeClr val="lt1"/>
-          </a:fontRef>
-        </p:style>
-        <p:txBody>
-          <a:bodyPr rtlCol="0" anchor="ctr"/>
-          <a:lstStyle/>
-          <a:p>
-            <a:pPr algn="ctr"/>
-            <a:endParaRPr lang="en-US"/>
-          </a:p>
-        </p:txBody>
-      </p:sp>
-      <p:sp>
-        <p:nvSpPr>
-          <p:cNvPr id="7" name="Rectangle 6"/>
-          <p:cNvSpPr/>
-          <p:nvPr/>
-        </p:nvSpPr>
-        <p:spPr>
-          <a:xfrm>
-            <a:off x="1842096" y="5381590"/>
-            <a:ext cx="2035920" cy="1114207"/>
-          </a:xfrm>
-          <a:prstGeom prst="rect">
-            <a:avLst/>
-          </a:prstGeom>
-          <a:solidFill>
-            <a:srgbClr val="FFFFFF"/>
-          </a:solidFill>
-          <a:ln>
-            <a:solidFill>
-              <a:srgbClr val="FFFFFF"/>
-            </a:solidFill>
-          </a:ln>
-          <a:effectLst/>
-        </p:spPr>
-        <p:style>
-          <a:lnRef idx="1">
-            <a:schemeClr val="accent1"/>
-          </a:lnRef>
-          <a:fillRef idx="3">
-            <a:schemeClr val="accent1"/>
-          </a:fillRef>
-          <a:effectRef idx="2">
-            <a:schemeClr val="accent1"/>
-          </a:effectRef>
-          <a:fontRef idx="minor">
-            <a:schemeClr val="lt1"/>
-          </a:fontRef>
-        </p:style>
-        <p:txBody>
-          <a:bodyPr rtlCol="0" anchor="ctr"/>
-          <a:lstStyle/>
-          <a:p>
-            <a:pPr algn="ctr"/>
-            <a:endParaRPr lang="en-US"/>
-          </a:p>
-        </p:txBody>
-      </p:sp>
-    </p:spTree>
-    <p:extLst>
-      <p:ext uri="{BB962C8B-B14F-4D97-AF65-F5344CB8AC3E}">
-        <p14:creationId xmlns:p14="http://schemas.microsoft.com/office/powerpoint/2010/main" val="3817279308"/>
-      </p:ext>
-    </p:extLst>
-  </p:cSld>
-  <p:clrMapOvr>
-    <a:masterClrMapping/>
-  </p:clrMapOvr>
-</p:sld>
-</file>
-
-<file path=ppt/slides/slide9.xml><?xml version="1.0" encoding="utf-8"?>
-<p:sld xmlns:a="http://schemas.openxmlformats.org/drawingml/2006/main" xmlns:r="http://schemas.openxmlformats.org/officeDocument/2006/relationships" xmlns:p="http://schemas.openxmlformats.org/presentationml/2006/main">
-  <p:cSld>
-    <p:spTree>
-      <p:nvGrpSpPr>
-        <p:cNvPr id="1" name=""/>
-        <p:cNvGrpSpPr/>
-        <p:nvPr/>
-      </p:nvGrpSpPr>
-      <p:grpSpPr>
-        <a:xfrm>
-          <a:off x="0" y="0"/>
-          <a:ext cx="0" cy="0"/>
-          <a:chOff x="0" y="0"/>
-          <a:chExt cx="0" cy="0"/>
-        </a:xfrm>
-      </p:grpSpPr>
-      <p:sp>
-        <p:nvSpPr>
-          <p:cNvPr id="5" name="Title 4"/>
-          <p:cNvSpPr>
-            <a:spLocks noGrp="1"/>
-          </p:cNvSpPr>
-          <p:nvPr>
-            <p:ph type="ctrTitle"/>
-          </p:nvPr>
-        </p:nvSpPr>
-        <p:spPr/>
-        <p:txBody>
-          <a:bodyPr/>
-          <a:lstStyle/>
-          <a:p>
-            <a:r>
-              <a:rPr lang="en-US" dirty="0" smtClean="0"/>
-              <a:t>Why are we having issues?</a:t>
-            </a:r>
-            <a:endParaRPr lang="en-US" dirty="0"/>
-          </a:p>
-        </p:txBody>
-      </p:sp>
-      <p:sp>
-        <p:nvSpPr>
-          <p:cNvPr id="6" name="Subtitle 5"/>
-          <p:cNvSpPr>
-            <a:spLocks noGrp="1"/>
-          </p:cNvSpPr>
-          <p:nvPr>
-            <p:ph type="subTitle" idx="1"/>
-          </p:nvPr>
-        </p:nvSpPr>
-        <p:spPr/>
-        <p:txBody>
-          <a:bodyPr/>
-          <a:lstStyle/>
-          <a:p>
-            <a:endParaRPr lang="en-US"/>
-          </a:p>
-        </p:txBody>
-      </p:sp>
-    </p:spTree>
-    <p:extLst>
-      <p:ext uri="{BB962C8B-B14F-4D97-AF65-F5344CB8AC3E}">
-        <p14:creationId xmlns:p14="http://schemas.microsoft.com/office/powerpoint/2010/main" val="3456406612"/>
-      </p:ext>
-    </p:extLst>
-  </p:cSld>
-  <p:clrMapOvr>
-    <a:masterClrMapping/>
-  </p:clrMapOvr>
+  <p:timing>
+    <p:tnLst>
+      <p:par>
+        <p:cTn xmlns:p14="http://schemas.microsoft.com/office/powerpoint/2010/main" id="1" dur="indefinite" restart="never" nodeType="tmRoot"/>
+      </p:par>
+    </p:tnLst>
+  </p:timing>
 </p:sld>
 </file>
 

</xml_diff>

<commit_message>
Added summary points after stories
</commit_message>
<xml_diff>
--- a/Tales from Tester Developer Collaboration.pptx
+++ b/Tales from Tester Developer Collaboration.pptx
@@ -5,7 +5,7 @@
     <p:sldMasterId id="2147483648" r:id="rId1"/>
   </p:sldMasterIdLst>
   <p:notesMasterIdLst>
-    <p:notesMasterId r:id="rId31"/>
+    <p:notesMasterId r:id="rId40"/>
   </p:notesMasterIdLst>
   <p:sldIdLst>
     <p:sldId id="275" r:id="rId2"/>
@@ -18,25 +18,34 @@
     <p:sldId id="284" r:id="rId9"/>
     <p:sldId id="262" r:id="rId10"/>
     <p:sldId id="264" r:id="rId11"/>
-    <p:sldId id="285" r:id="rId12"/>
-    <p:sldId id="256" r:id="rId13"/>
-    <p:sldId id="265" r:id="rId14"/>
-    <p:sldId id="267" r:id="rId15"/>
-    <p:sldId id="266" r:id="rId16"/>
-    <p:sldId id="258" r:id="rId17"/>
-    <p:sldId id="269" r:id="rId18"/>
-    <p:sldId id="257" r:id="rId19"/>
-    <p:sldId id="270" r:id="rId20"/>
-    <p:sldId id="268" r:id="rId21"/>
-    <p:sldId id="286" r:id="rId22"/>
-    <p:sldId id="271" r:id="rId23"/>
-    <p:sldId id="260" r:id="rId24"/>
-    <p:sldId id="273" r:id="rId25"/>
-    <p:sldId id="274" r:id="rId26"/>
-    <p:sldId id="287" r:id="rId27"/>
-    <p:sldId id="288" r:id="rId28"/>
-    <p:sldId id="289" r:id="rId29"/>
-    <p:sldId id="272" r:id="rId30"/>
+    <p:sldId id="291" r:id="rId12"/>
+    <p:sldId id="285" r:id="rId13"/>
+    <p:sldId id="292" r:id="rId14"/>
+    <p:sldId id="293" r:id="rId15"/>
+    <p:sldId id="290" r:id="rId16"/>
+    <p:sldId id="256" r:id="rId17"/>
+    <p:sldId id="265" r:id="rId18"/>
+    <p:sldId id="294" r:id="rId19"/>
+    <p:sldId id="267" r:id="rId20"/>
+    <p:sldId id="266" r:id="rId21"/>
+    <p:sldId id="258" r:id="rId22"/>
+    <p:sldId id="295" r:id="rId23"/>
+    <p:sldId id="269" r:id="rId24"/>
+    <p:sldId id="257" r:id="rId25"/>
+    <p:sldId id="270" r:id="rId26"/>
+    <p:sldId id="268" r:id="rId27"/>
+    <p:sldId id="296" r:id="rId28"/>
+    <p:sldId id="298" r:id="rId29"/>
+    <p:sldId id="297" r:id="rId30"/>
+    <p:sldId id="286" r:id="rId31"/>
+    <p:sldId id="271" r:id="rId32"/>
+    <p:sldId id="260" r:id="rId33"/>
+    <p:sldId id="273" r:id="rId34"/>
+    <p:sldId id="274" r:id="rId35"/>
+    <p:sldId id="287" r:id="rId36"/>
+    <p:sldId id="288" r:id="rId37"/>
+    <p:sldId id="289" r:id="rId38"/>
+    <p:sldId id="272" r:id="rId39"/>
   </p:sldIdLst>
   <p:sldSz cx="9144000" cy="6858000" type="screen4x3"/>
   <p:notesSz cx="6858000" cy="9144000"/>
@@ -220,7 +229,7 @@
           <a:p>
             <a:fld id="{378E7EDD-6406-4A41-9393-8F7AD46F97CF}" type="datetimeFigureOut">
               <a:rPr lang="en-US" smtClean="0"/>
-              <a:t>11/6/15</a:t>
+              <a:t>4/22/16</a:t>
             </a:fld>
             <a:endParaRPr lang="en-US"/>
           </a:p>
@@ -558,7 +567,7 @@
           <a:p>
             <a:fld id="{01C6EE63-5EE6-514E-80CC-4C87CFA5CAFF}" type="slidenum">
               <a:rPr lang="en-US" smtClean="0"/>
-              <a:t>16</a:t>
+              <a:t>21</a:t>
             </a:fld>
             <a:endParaRPr lang="en-US"/>
           </a:p>
@@ -688,7 +697,7 @@
             <a:fld id="{DDB516CE-D814-CC47-9A3A-08F3D723435B}" type="slidenum">
               <a:rPr lang="en-US" smtClean="0"/>
               <a:pPr/>
-              <a:t>21</a:t>
+              <a:t>30</a:t>
             </a:fld>
             <a:endParaRPr lang="en-US"/>
           </a:p>
@@ -772,7 +781,7 @@
           <a:p>
             <a:fld id="{6C157C8D-6C9C-3F41-A598-90F2004D4917}" type="slidenum">
               <a:rPr lang="en-US" smtClean="0"/>
-              <a:t>27</a:t>
+              <a:t>36</a:t>
             </a:fld>
             <a:endParaRPr lang="en-US"/>
           </a:p>
@@ -856,7 +865,7 @@
           <a:p>
             <a:fld id="{6C157C8D-6C9C-3F41-A598-90F2004D4917}" type="slidenum">
               <a:rPr lang="en-US" smtClean="0"/>
-              <a:t>28</a:t>
+              <a:t>37</a:t>
             </a:fld>
             <a:endParaRPr lang="en-US"/>
           </a:p>
@@ -1056,7 +1065,7 @@
           <a:p>
             <a:fld id="{B7CABD0F-E43C-9343-80E3-B733E3541CC1}" type="datetimeFigureOut">
               <a:rPr lang="en-US" smtClean="0"/>
-              <a:t>11/6/15</a:t>
+              <a:t>4/22/16</a:t>
             </a:fld>
             <a:endParaRPr lang="en-US"/>
           </a:p>
@@ -1114,11 +1123,11 @@
   <p:clrMapOvr>
     <a:masterClrMapping/>
   </p:clrMapOvr>
-  <mc:AlternateContent xmlns:mc="http://schemas.openxmlformats.org/markup-compatibility/2006">
-    <mc:Choice xmlns:p14="http://schemas.microsoft.com/office/powerpoint/2010/main" Requires="p14">
+  <mc:AlternateContent xmlns:mc="http://schemas.openxmlformats.org/markup-compatibility/2006" xmlns:p14="http://schemas.microsoft.com/office/powerpoint/2010/main">
+    <mc:Choice Requires="p14">
       <p:transition spd="slow" p14:dur="2000"/>
     </mc:Choice>
-    <mc:Fallback>
+    <mc:Fallback xmlns="">
       <p:transition xmlns:p14="http://schemas.microsoft.com/office/powerpoint/2010/main" spd="slow"/>
     </mc:Fallback>
   </mc:AlternateContent>
@@ -1234,7 +1243,7 @@
           <a:p>
             <a:fld id="{B7CABD0F-E43C-9343-80E3-B733E3541CC1}" type="datetimeFigureOut">
               <a:rPr lang="en-US" smtClean="0"/>
-              <a:t>11/6/15</a:t>
+              <a:t>4/22/16</a:t>
             </a:fld>
             <a:endParaRPr lang="en-US"/>
           </a:p>
@@ -1292,11 +1301,11 @@
   <p:clrMapOvr>
     <a:masterClrMapping/>
   </p:clrMapOvr>
-  <mc:AlternateContent xmlns:mc="http://schemas.openxmlformats.org/markup-compatibility/2006">
-    <mc:Choice xmlns:p14="http://schemas.microsoft.com/office/powerpoint/2010/main" Requires="p14">
+  <mc:AlternateContent xmlns:mc="http://schemas.openxmlformats.org/markup-compatibility/2006" xmlns:p14="http://schemas.microsoft.com/office/powerpoint/2010/main">
+    <mc:Choice Requires="p14">
       <p:transition spd="slow" p14:dur="2000"/>
     </mc:Choice>
-    <mc:Fallback>
+    <mc:Fallback xmlns="">
       <p:transition xmlns:p14="http://schemas.microsoft.com/office/powerpoint/2010/main" spd="slow"/>
     </mc:Fallback>
   </mc:AlternateContent>
@@ -1422,7 +1431,7 @@
           <a:p>
             <a:fld id="{B7CABD0F-E43C-9343-80E3-B733E3541CC1}" type="datetimeFigureOut">
               <a:rPr lang="en-US" smtClean="0"/>
-              <a:t>11/6/15</a:t>
+              <a:t>4/22/16</a:t>
             </a:fld>
             <a:endParaRPr lang="en-US"/>
           </a:p>
@@ -1480,11 +1489,11 @@
   <p:clrMapOvr>
     <a:masterClrMapping/>
   </p:clrMapOvr>
-  <mc:AlternateContent xmlns:mc="http://schemas.openxmlformats.org/markup-compatibility/2006">
-    <mc:Choice xmlns:p14="http://schemas.microsoft.com/office/powerpoint/2010/main" Requires="p14">
+  <mc:AlternateContent xmlns:mc="http://schemas.openxmlformats.org/markup-compatibility/2006" xmlns:p14="http://schemas.microsoft.com/office/powerpoint/2010/main">
+    <mc:Choice Requires="p14">
       <p:transition spd="slow" p14:dur="2000"/>
     </mc:Choice>
-    <mc:Fallback>
+    <mc:Fallback xmlns="">
       <p:transition xmlns:p14="http://schemas.microsoft.com/office/powerpoint/2010/main" spd="slow"/>
     </mc:Fallback>
   </mc:AlternateContent>
@@ -1600,7 +1609,7 @@
           <a:p>
             <a:fld id="{B7CABD0F-E43C-9343-80E3-B733E3541CC1}" type="datetimeFigureOut">
               <a:rPr lang="en-US" smtClean="0"/>
-              <a:t>11/6/15</a:t>
+              <a:t>4/22/16</a:t>
             </a:fld>
             <a:endParaRPr lang="en-US"/>
           </a:p>
@@ -1658,11 +1667,11 @@
   <p:clrMapOvr>
     <a:masterClrMapping/>
   </p:clrMapOvr>
-  <mc:AlternateContent xmlns:mc="http://schemas.openxmlformats.org/markup-compatibility/2006">
-    <mc:Choice xmlns:p14="http://schemas.microsoft.com/office/powerpoint/2010/main" Requires="p14">
+  <mc:AlternateContent xmlns:mc="http://schemas.openxmlformats.org/markup-compatibility/2006" xmlns:p14="http://schemas.microsoft.com/office/powerpoint/2010/main">
+    <mc:Choice Requires="p14">
       <p:transition spd="slow" p14:dur="2000"/>
     </mc:Choice>
-    <mc:Fallback>
+    <mc:Fallback xmlns="">
       <p:transition xmlns:p14="http://schemas.microsoft.com/office/powerpoint/2010/main" spd="slow"/>
     </mc:Fallback>
   </mc:AlternateContent>
@@ -1854,7 +1863,7 @@
           <a:p>
             <a:fld id="{B7CABD0F-E43C-9343-80E3-B733E3541CC1}" type="datetimeFigureOut">
               <a:rPr lang="en-US" smtClean="0"/>
-              <a:t>11/6/15</a:t>
+              <a:t>4/22/16</a:t>
             </a:fld>
             <a:endParaRPr lang="en-US"/>
           </a:p>
@@ -1912,11 +1921,11 @@
   <p:clrMapOvr>
     <a:masterClrMapping/>
   </p:clrMapOvr>
-  <mc:AlternateContent xmlns:mc="http://schemas.openxmlformats.org/markup-compatibility/2006">
-    <mc:Choice xmlns:p14="http://schemas.microsoft.com/office/powerpoint/2010/main" Requires="p14">
+  <mc:AlternateContent xmlns:mc="http://schemas.openxmlformats.org/markup-compatibility/2006" xmlns:p14="http://schemas.microsoft.com/office/powerpoint/2010/main">
+    <mc:Choice Requires="p14">
       <p:transition spd="slow" p14:dur="2000"/>
     </mc:Choice>
-    <mc:Fallback>
+    <mc:Fallback xmlns="">
       <p:transition xmlns:p14="http://schemas.microsoft.com/office/powerpoint/2010/main" spd="slow"/>
     </mc:Fallback>
   </mc:AlternateContent>
@@ -2150,7 +2159,7 @@
           <a:p>
             <a:fld id="{B7CABD0F-E43C-9343-80E3-B733E3541CC1}" type="datetimeFigureOut">
               <a:rPr lang="en-US" smtClean="0"/>
-              <a:t>11/6/15</a:t>
+              <a:t>4/22/16</a:t>
             </a:fld>
             <a:endParaRPr lang="en-US"/>
           </a:p>
@@ -2208,11 +2217,11 @@
   <p:clrMapOvr>
     <a:masterClrMapping/>
   </p:clrMapOvr>
-  <mc:AlternateContent xmlns:mc="http://schemas.openxmlformats.org/markup-compatibility/2006">
-    <mc:Choice xmlns:p14="http://schemas.microsoft.com/office/powerpoint/2010/main" Requires="p14">
+  <mc:AlternateContent xmlns:mc="http://schemas.openxmlformats.org/markup-compatibility/2006" xmlns:p14="http://schemas.microsoft.com/office/powerpoint/2010/main">
+    <mc:Choice Requires="p14">
       <p:transition spd="slow" p14:dur="2000"/>
     </mc:Choice>
-    <mc:Fallback>
+    <mc:Fallback xmlns="">
       <p:transition xmlns:p14="http://schemas.microsoft.com/office/powerpoint/2010/main" spd="slow"/>
     </mc:Fallback>
   </mc:AlternateContent>
@@ -2580,7 +2589,7 @@
           <a:p>
             <a:fld id="{B7CABD0F-E43C-9343-80E3-B733E3541CC1}" type="datetimeFigureOut">
               <a:rPr lang="en-US" smtClean="0"/>
-              <a:t>11/6/15</a:t>
+              <a:t>4/22/16</a:t>
             </a:fld>
             <a:endParaRPr lang="en-US"/>
           </a:p>
@@ -2638,11 +2647,11 @@
   <p:clrMapOvr>
     <a:masterClrMapping/>
   </p:clrMapOvr>
-  <mc:AlternateContent xmlns:mc="http://schemas.openxmlformats.org/markup-compatibility/2006">
-    <mc:Choice xmlns:p14="http://schemas.microsoft.com/office/powerpoint/2010/main" Requires="p14">
+  <mc:AlternateContent xmlns:mc="http://schemas.openxmlformats.org/markup-compatibility/2006" xmlns:p14="http://schemas.microsoft.com/office/powerpoint/2010/main">
+    <mc:Choice Requires="p14">
       <p:transition spd="slow" p14:dur="2000"/>
     </mc:Choice>
-    <mc:Fallback>
+    <mc:Fallback xmlns="">
       <p:transition xmlns:p14="http://schemas.microsoft.com/office/powerpoint/2010/main" spd="slow"/>
     </mc:Fallback>
   </mc:AlternateContent>
@@ -2706,7 +2715,7 @@
           <a:p>
             <a:fld id="{B7CABD0F-E43C-9343-80E3-B733E3541CC1}" type="datetimeFigureOut">
               <a:rPr lang="en-US" smtClean="0"/>
-              <a:t>11/6/15</a:t>
+              <a:t>4/22/16</a:t>
             </a:fld>
             <a:endParaRPr lang="en-US"/>
           </a:p>
@@ -2764,11 +2773,11 @@
   <p:clrMapOvr>
     <a:masterClrMapping/>
   </p:clrMapOvr>
-  <mc:AlternateContent xmlns:mc="http://schemas.openxmlformats.org/markup-compatibility/2006">
-    <mc:Choice xmlns:p14="http://schemas.microsoft.com/office/powerpoint/2010/main" Requires="p14">
+  <mc:AlternateContent xmlns:mc="http://schemas.openxmlformats.org/markup-compatibility/2006" xmlns:p14="http://schemas.microsoft.com/office/powerpoint/2010/main">
+    <mc:Choice Requires="p14">
       <p:transition spd="slow" p14:dur="2000"/>
     </mc:Choice>
-    <mc:Fallback>
+    <mc:Fallback xmlns="">
       <p:transition xmlns:p14="http://schemas.microsoft.com/office/powerpoint/2010/main" spd="slow"/>
     </mc:Fallback>
   </mc:AlternateContent>
@@ -2809,7 +2818,7 @@
           <a:p>
             <a:fld id="{B7CABD0F-E43C-9343-80E3-B733E3541CC1}" type="datetimeFigureOut">
               <a:rPr lang="en-US" smtClean="0"/>
-              <a:t>11/6/15</a:t>
+              <a:t>4/22/16</a:t>
             </a:fld>
             <a:endParaRPr lang="en-US"/>
           </a:p>
@@ -2867,11 +2876,11 @@
   <p:clrMapOvr>
     <a:masterClrMapping/>
   </p:clrMapOvr>
-  <mc:AlternateContent xmlns:mc="http://schemas.openxmlformats.org/markup-compatibility/2006">
-    <mc:Choice xmlns:p14="http://schemas.microsoft.com/office/powerpoint/2010/main" Requires="p14">
+  <mc:AlternateContent xmlns:mc="http://schemas.openxmlformats.org/markup-compatibility/2006" xmlns:p14="http://schemas.microsoft.com/office/powerpoint/2010/main">
+    <mc:Choice Requires="p14">
       <p:transition spd="slow" p14:dur="2000"/>
     </mc:Choice>
-    <mc:Fallback>
+    <mc:Fallback xmlns="">
       <p:transition xmlns:p14="http://schemas.microsoft.com/office/powerpoint/2010/main" spd="slow"/>
     </mc:Fallback>
   </mc:AlternateContent>
@@ -3094,7 +3103,7 @@
           <a:p>
             <a:fld id="{B7CABD0F-E43C-9343-80E3-B733E3541CC1}" type="datetimeFigureOut">
               <a:rPr lang="en-US" smtClean="0"/>
-              <a:t>11/6/15</a:t>
+              <a:t>4/22/16</a:t>
             </a:fld>
             <a:endParaRPr lang="en-US"/>
           </a:p>
@@ -3152,11 +3161,11 @@
   <p:clrMapOvr>
     <a:masterClrMapping/>
   </p:clrMapOvr>
-  <mc:AlternateContent xmlns:mc="http://schemas.openxmlformats.org/markup-compatibility/2006">
-    <mc:Choice xmlns:p14="http://schemas.microsoft.com/office/powerpoint/2010/main" Requires="p14">
+  <mc:AlternateContent xmlns:mc="http://schemas.openxmlformats.org/markup-compatibility/2006" xmlns:p14="http://schemas.microsoft.com/office/powerpoint/2010/main">
+    <mc:Choice Requires="p14">
       <p:transition spd="slow" p14:dur="2000"/>
     </mc:Choice>
-    <mc:Fallback>
+    <mc:Fallback xmlns="">
       <p:transition xmlns:p14="http://schemas.microsoft.com/office/powerpoint/2010/main" spd="slow"/>
     </mc:Fallback>
   </mc:AlternateContent>
@@ -3355,7 +3364,7 @@
           <a:p>
             <a:fld id="{B7CABD0F-E43C-9343-80E3-B733E3541CC1}" type="datetimeFigureOut">
               <a:rPr lang="en-US" smtClean="0"/>
-              <a:t>11/6/15</a:t>
+              <a:t>4/22/16</a:t>
             </a:fld>
             <a:endParaRPr lang="en-US"/>
           </a:p>
@@ -3413,11 +3422,11 @@
   <p:clrMapOvr>
     <a:masterClrMapping/>
   </p:clrMapOvr>
-  <mc:AlternateContent xmlns:mc="http://schemas.openxmlformats.org/markup-compatibility/2006">
-    <mc:Choice xmlns:p14="http://schemas.microsoft.com/office/powerpoint/2010/main" Requires="p14">
+  <mc:AlternateContent xmlns:mc="http://schemas.openxmlformats.org/markup-compatibility/2006" xmlns:p14="http://schemas.microsoft.com/office/powerpoint/2010/main">
+    <mc:Choice Requires="p14">
       <p:transition spd="slow" p14:dur="2000"/>
     </mc:Choice>
-    <mc:Fallback>
+    <mc:Fallback xmlns="">
       <p:transition xmlns:p14="http://schemas.microsoft.com/office/powerpoint/2010/main" spd="slow"/>
     </mc:Fallback>
   </mc:AlternateContent>
@@ -3576,7 +3585,7 @@
           <a:p>
             <a:fld id="{B7CABD0F-E43C-9343-80E3-B733E3541CC1}" type="datetimeFigureOut">
               <a:rPr lang="en-US" smtClean="0"/>
-              <a:t>11/6/15</a:t>
+              <a:t>4/22/16</a:t>
             </a:fld>
             <a:endParaRPr lang="en-US"/>
           </a:p>
@@ -3681,11 +3690,11 @@
     <p:sldLayoutId id="2147483658" r:id="rId10"/>
     <p:sldLayoutId id="2147483659" r:id="rId11"/>
   </p:sldLayoutIdLst>
-  <mc:AlternateContent xmlns:mc="http://schemas.openxmlformats.org/markup-compatibility/2006">
-    <mc:Choice xmlns:p14="http://schemas.microsoft.com/office/powerpoint/2010/main" Requires="p14">
+  <mc:AlternateContent xmlns:mc="http://schemas.openxmlformats.org/markup-compatibility/2006" xmlns:p14="http://schemas.microsoft.com/office/powerpoint/2010/main">
+    <mc:Choice Requires="p14">
       <p:transition spd="slow" p14:dur="2000"/>
     </mc:Choice>
-    <mc:Fallback>
+    <mc:Fallback xmlns="">
       <p:transition xmlns:p14="http://schemas.microsoft.com/office/powerpoint/2010/main" spd="slow"/>
     </mc:Fallback>
   </mc:AlternateContent>
@@ -4134,11 +4143,11 @@
   <p:clrMapOvr>
     <a:masterClrMapping/>
   </p:clrMapOvr>
-  <mc:AlternateContent xmlns:mc="http://schemas.openxmlformats.org/markup-compatibility/2006">
-    <mc:Choice xmlns:p14="http://schemas.microsoft.com/office/powerpoint/2010/main" Requires="p14">
+  <mc:AlternateContent xmlns:mc="http://schemas.openxmlformats.org/markup-compatibility/2006" xmlns:p14="http://schemas.microsoft.com/office/powerpoint/2010/main">
+    <mc:Choice Requires="p14">
       <p:transition spd="slow" p14:dur="2000"/>
     </mc:Choice>
-    <mc:Fallback>
+    <mc:Fallback xmlns="">
       <p:transition xmlns:p14="http://schemas.microsoft.com/office/powerpoint/2010/main" spd="slow"/>
     </mc:Fallback>
   </mc:AlternateContent>
@@ -4284,7 +4293,6 @@
               <a:rPr lang="en-US" sz="2500" dirty="0"/>
               <a:t>That would’ve been a nasty one to find later</a:t>
             </a:r>
-            <a:endParaRPr lang="en-US" sz="2500" dirty="0"/>
           </a:p>
         </p:txBody>
       </p:sp>
@@ -4298,11 +4306,11 @@
   <p:clrMapOvr>
     <a:masterClrMapping/>
   </p:clrMapOvr>
-  <mc:AlternateContent xmlns:mc="http://schemas.openxmlformats.org/markup-compatibility/2006">
-    <mc:Choice xmlns:p14="http://schemas.microsoft.com/office/powerpoint/2010/main" Requires="p14">
+  <mc:AlternateContent xmlns:mc="http://schemas.openxmlformats.org/markup-compatibility/2006" xmlns:p14="http://schemas.microsoft.com/office/powerpoint/2010/main">
+    <mc:Choice Requires="p14">
       <p:transition spd="slow" p14:dur="2000"/>
     </mc:Choice>
-    <mc:Fallback>
+    <mc:Fallback xmlns="">
       <p:transition xmlns:p14="http://schemas.microsoft.com/office/powerpoint/2010/main" spd="slow"/>
     </mc:Fallback>
   </mc:AlternateContent>
@@ -4356,26 +4364,8 @@
           <a:lstStyle/>
           <a:p>
             <a:r>
-              <a:rPr lang="en-US" dirty="0" smtClean="0"/>
-              <a:t>Co-creation </a:t>
-            </a:r>
-            <a:br>
-              <a:rPr lang="en-US" dirty="0" smtClean="0"/>
-            </a:br>
-            <a:r>
-              <a:rPr lang="en-US" sz="3100" dirty="0"/>
-              <a:t>vs. </a:t>
-            </a:r>
-            <a:r>
-              <a:rPr lang="en-US" dirty="0" smtClean="0"/>
-              <a:t/>
-            </a:r>
-            <a:br>
-              <a:rPr lang="en-US" dirty="0" smtClean="0"/>
-            </a:br>
-            <a:r>
               <a:rPr lang="en-US" b="1" dirty="0" smtClean="0"/>
-              <a:t>Collaboration</a:t>
+              <a:t>Benefits of working together</a:t>
             </a:r>
             <a:endParaRPr lang="en-US" b="1" dirty="0"/>
           </a:p>
@@ -4384,18 +4374,18 @@
     </p:spTree>
     <p:extLst>
       <p:ext uri="{BB962C8B-B14F-4D97-AF65-F5344CB8AC3E}">
-        <p14:creationId xmlns:p14="http://schemas.microsoft.com/office/powerpoint/2010/main" val="710113217"/>
+        <p14:creationId xmlns:p14="http://schemas.microsoft.com/office/powerpoint/2010/main" val="3955293609"/>
       </p:ext>
     </p:extLst>
   </p:cSld>
   <p:clrMapOvr>
     <a:masterClrMapping/>
   </p:clrMapOvr>
-  <mc:AlternateContent xmlns:mc="http://schemas.openxmlformats.org/markup-compatibility/2006">
-    <mc:Choice xmlns:p14="http://schemas.microsoft.com/office/powerpoint/2010/main" Requires="p14">
+  <mc:AlternateContent xmlns:mc="http://schemas.openxmlformats.org/markup-compatibility/2006" xmlns:p14="http://schemas.microsoft.com/office/powerpoint/2010/main">
+    <mc:Choice Requires="p14">
       <p:transition spd="slow" p14:dur="2000"/>
     </mc:Choice>
-    <mc:Fallback>
+    <mc:Fallback xmlns="">
       <p:transition xmlns:p14="http://schemas.microsoft.com/office/powerpoint/2010/main" spd="slow"/>
     </mc:Fallback>
   </mc:AlternateContent>
@@ -4428,77 +4418,109 @@
       </p:grpSpPr>
       <p:sp>
         <p:nvSpPr>
-          <p:cNvPr id="2" name="Title 1"/>
+          <p:cNvPr id="4" name="Title 3"/>
           <p:cNvSpPr>
             <a:spLocks noGrp="1"/>
           </p:cNvSpPr>
           <p:nvPr>
-            <p:ph type="ctrTitle"/>
+            <p:ph type="title"/>
           </p:nvPr>
         </p:nvSpPr>
-        <p:spPr/>
-        <p:txBody>
-          <a:bodyPr/>
-          <a:lstStyle/>
-          <a:p>
+        <p:spPr>
+          <a:xfrm>
+            <a:off x="457201" y="274640"/>
+            <a:ext cx="8229599" cy="6162776"/>
+          </a:xfrm>
+        </p:spPr>
+        <p:txBody>
+          <a:bodyPr>
+            <a:normAutofit/>
+          </a:bodyPr>
+          <a:lstStyle/>
+          <a:p>
+            <a:r>
+              <a:rPr lang="en-US" b="1" dirty="0" smtClean="0">
+                <a:solidFill>
+                  <a:srgbClr val="0000FF"/>
+                </a:solidFill>
+              </a:rPr>
+              <a:t>Wasted Effort</a:t>
+            </a:r>
+            <a:br>
+              <a:rPr lang="en-US" b="1" dirty="0" smtClean="0">
+                <a:solidFill>
+                  <a:srgbClr val="0000FF"/>
+                </a:solidFill>
+              </a:rPr>
+            </a:br>
+            <a:r>
+              <a:rPr lang="en-US" b="1" dirty="0" smtClean="0">
+                <a:solidFill>
+                  <a:srgbClr val="0000FF"/>
+                </a:solidFill>
+              </a:rPr>
+              <a:t/>
+            </a:r>
+            <a:br>
+              <a:rPr lang="en-US" b="1" dirty="0" smtClean="0">
+                <a:solidFill>
+                  <a:srgbClr val="0000FF"/>
+                </a:solidFill>
+              </a:rPr>
+            </a:br>
             <a:r>
               <a:rPr lang="en-US" dirty="0" smtClean="0"/>
-              <a:t>Tales from Developer Tester Collaboration</a:t>
-            </a:r>
-            <a:endParaRPr lang="en-US" dirty="0"/>
-          </a:p>
-        </p:txBody>
-      </p:sp>
-      <p:sp>
-        <p:nvSpPr>
-          <p:cNvPr id="3" name="Subtitle 2"/>
-          <p:cNvSpPr>
-            <a:spLocks noGrp="1"/>
-          </p:cNvSpPr>
-          <p:nvPr>
-            <p:ph type="subTitle" idx="1"/>
-          </p:nvPr>
-        </p:nvSpPr>
-        <p:spPr/>
-        <p:txBody>
-          <a:bodyPr/>
-          <a:lstStyle/>
-          <a:p>
-            <a:r>
-              <a:rPr lang="en-US" dirty="0" err="1" smtClean="0"/>
-              <a:t>Maaret</a:t>
-            </a:r>
+              <a:t>effort</a:t>
+            </a:r>
+            <a:r>
+              <a:rPr lang="en-US" b="1" dirty="0" smtClean="0"/>
+              <a:t> </a:t>
+            </a:r>
+            <a:r>
+              <a:rPr lang="en-US" b="1" dirty="0" smtClean="0"/>
+              <a:t>building wrong thing</a:t>
+            </a:r>
+            <a:br>
+              <a:rPr lang="en-US" b="1" dirty="0" smtClean="0"/>
+            </a:br>
             <a:r>
               <a:rPr lang="en-US" dirty="0" smtClean="0"/>
-              <a:t> </a:t>
-            </a:r>
-            <a:r>
-              <a:rPr lang="en-US" dirty="0" err="1" smtClean="0"/>
-              <a:t>Pyhäjärvi</a:t>
-            </a:r>
+              <a:t>effort</a:t>
+            </a:r>
+            <a:r>
+              <a:rPr lang="en-US" b="1" dirty="0" smtClean="0"/>
+              <a:t> testing</a:t>
+            </a:r>
+            <a:br>
+              <a:rPr lang="en-US" b="1" dirty="0" smtClean="0"/>
+            </a:br>
             <a:r>
               <a:rPr lang="en-US" dirty="0" smtClean="0"/>
-              <a:t> &amp; Llewellyn Falco</a:t>
-            </a:r>
-            <a:endParaRPr lang="en-US" dirty="0"/>
+              <a:t>effort</a:t>
+            </a:r>
+            <a:r>
+              <a:rPr lang="en-US" b="1" dirty="0" smtClean="0"/>
+              <a:t> fixing</a:t>
+            </a:r>
+            <a:endParaRPr lang="en-US" b="1" dirty="0"/>
           </a:p>
         </p:txBody>
       </p:sp>
     </p:spTree>
     <p:extLst>
       <p:ext uri="{BB962C8B-B14F-4D97-AF65-F5344CB8AC3E}">
-        <p14:creationId xmlns:p14="http://schemas.microsoft.com/office/powerpoint/2010/main" val="2177454600"/>
+        <p14:creationId xmlns:p14="http://schemas.microsoft.com/office/powerpoint/2010/main" val="710113217"/>
       </p:ext>
     </p:extLst>
   </p:cSld>
   <p:clrMapOvr>
     <a:masterClrMapping/>
   </p:clrMapOvr>
-  <mc:AlternateContent xmlns:mc="http://schemas.openxmlformats.org/markup-compatibility/2006">
-    <mc:Choice xmlns:p14="http://schemas.microsoft.com/office/powerpoint/2010/main" Requires="p14">
+  <mc:AlternateContent xmlns:mc="http://schemas.openxmlformats.org/markup-compatibility/2006" xmlns:p14="http://schemas.microsoft.com/office/powerpoint/2010/main">
+    <mc:Choice Requires="p14">
       <p:transition spd="slow" p14:dur="2000"/>
     </mc:Choice>
-    <mc:Fallback>
+    <mc:Fallback xmlns="">
       <p:transition xmlns:p14="http://schemas.microsoft.com/office/powerpoint/2010/main" spd="slow"/>
     </mc:Fallback>
   </mc:AlternateContent>
@@ -4531,121 +4553,95 @@
       </p:grpSpPr>
       <p:sp>
         <p:nvSpPr>
-          <p:cNvPr id="2" name="Title 1"/>
+          <p:cNvPr id="4" name="Title 3"/>
           <p:cNvSpPr>
             <a:spLocks noGrp="1"/>
           </p:cNvSpPr>
           <p:nvPr>
-            <p:ph type="ctrTitle"/>
+            <p:ph type="title"/>
           </p:nvPr>
         </p:nvSpPr>
         <p:spPr>
           <a:xfrm>
-            <a:off x="685801" y="3600452"/>
-            <a:ext cx="7772399" cy="1470024"/>
-          </a:xfrm>
-        </p:spPr>
-        <p:txBody>
-          <a:bodyPr/>
-          <a:lstStyle/>
-          <a:p>
-            <a:r>
-              <a:rPr lang="en-US" dirty="0" smtClean="0"/>
-              <a:t>1</a:t>
-            </a:r>
-            <a:r>
-              <a:rPr lang="en-US" baseline="30000" dirty="0" smtClean="0"/>
-              <a:t>st</a:t>
-            </a:r>
-            <a:r>
-              <a:rPr lang="en-US" dirty="0" smtClean="0"/>
-              <a:t> session on unit testing</a:t>
-            </a:r>
-            <a:endParaRPr lang="en-US" dirty="0"/>
-          </a:p>
-        </p:txBody>
-      </p:sp>
-      <p:pic>
-        <p:nvPicPr>
-          <p:cNvPr id="4" name="Picture 3"/>
-          <p:cNvPicPr>
-            <a:picLocks noChangeAspect="1"/>
-          </p:cNvPicPr>
-          <p:nvPr/>
-        </p:nvPicPr>
-        <p:blipFill>
-          <a:blip r:embed="rId2"/>
-          <a:stretch>
-            <a:fillRect/>
-          </a:stretch>
-        </p:blipFill>
-        <p:spPr>
-          <a:xfrm>
-            <a:off x="5624418" y="553742"/>
-            <a:ext cx="3251200" cy="3251199"/>
-          </a:xfrm>
-          <a:prstGeom prst="rect">
-            <a:avLst/>
-          </a:prstGeom>
-        </p:spPr>
-      </p:pic>
-      <p:sp>
-        <p:nvSpPr>
-          <p:cNvPr id="5" name="Rectangle 4"/>
-          <p:cNvSpPr/>
-          <p:nvPr/>
-        </p:nvSpPr>
-        <p:spPr>
-          <a:xfrm>
-            <a:off x="1411034" y="6418669"/>
-            <a:ext cx="7732966" cy="323133"/>
-          </a:xfrm>
-          <a:prstGeom prst="rect">
-            <a:avLst/>
-          </a:prstGeom>
-        </p:spPr>
-        <p:txBody>
-          <a:bodyPr wrap="square" lIns="91412" tIns="45704" rIns="91412" bIns="45704">
-            <a:spAutoFit/>
+            <a:off x="457201" y="274640"/>
+            <a:ext cx="8229599" cy="6162776"/>
+          </a:xfrm>
+        </p:spPr>
+        <p:txBody>
+          <a:bodyPr>
+            <a:normAutofit/>
           </a:bodyPr>
           <a:lstStyle/>
           <a:p>
-            <a:pPr algn="r"/>
-            <a:r>
-              <a:rPr lang="en-US" sz="1500" dirty="0"/>
-              <a:t>  * http://visible-</a:t>
-            </a:r>
-            <a:r>
-              <a:rPr lang="en-US" sz="1500" dirty="0" err="1"/>
-              <a:t>quality.blogspot.fi</a:t>
-            </a:r>
-            <a:r>
-              <a:rPr lang="en-US" sz="1500" dirty="0"/>
-              <a:t>/2015/01/a-learning-journey-with-unit-tests-</a:t>
-            </a:r>
-            <a:r>
-              <a:rPr lang="en-US" sz="1500" dirty="0" err="1"/>
-              <a:t>just.html</a:t>
-            </a:r>
-            <a:endParaRPr lang="en-US" sz="1500" dirty="0"/>
+            <a:r>
+              <a:rPr lang="en-US" b="1" dirty="0" smtClean="0">
+                <a:solidFill>
+                  <a:srgbClr val="0000FF"/>
+                </a:solidFill>
+              </a:rPr>
+              <a:t/>
+            </a:r>
+            <a:br>
+              <a:rPr lang="en-US" b="1" dirty="0" smtClean="0">
+                <a:solidFill>
+                  <a:srgbClr val="0000FF"/>
+                </a:solidFill>
+              </a:rPr>
+            </a:br>
+            <a:r>
+              <a:rPr lang="en-US" b="1" dirty="0" smtClean="0">
+                <a:solidFill>
+                  <a:srgbClr val="0000FF"/>
+                </a:solidFill>
+              </a:rPr>
+              <a:t>Time </a:t>
+            </a:r>
+            <a:r>
+              <a:rPr lang="en-US" b="1" dirty="0">
+                <a:solidFill>
+                  <a:srgbClr val="0000FF"/>
+                </a:solidFill>
+              </a:rPr>
+              <a:t>to deliver</a:t>
+            </a:r>
+            <a:r>
+              <a:rPr lang="en-US" b="1" dirty="0" smtClean="0">
+                <a:solidFill>
+                  <a:srgbClr val="0000FF"/>
+                </a:solidFill>
+              </a:rPr>
+              <a:t/>
+            </a:r>
+            <a:br>
+              <a:rPr lang="en-US" b="1" dirty="0" smtClean="0">
+                <a:solidFill>
+                  <a:srgbClr val="0000FF"/>
+                </a:solidFill>
+              </a:rPr>
+            </a:br>
+            <a:endParaRPr lang="en-US" b="1" dirty="0">
+              <a:solidFill>
+                <a:srgbClr val="0000FF"/>
+              </a:solidFill>
+            </a:endParaRPr>
           </a:p>
         </p:txBody>
       </p:sp>
     </p:spTree>
     <p:extLst>
       <p:ext uri="{BB962C8B-B14F-4D97-AF65-F5344CB8AC3E}">
-        <p14:creationId xmlns:p14="http://schemas.microsoft.com/office/powerpoint/2010/main" val="2975425866"/>
+        <p14:creationId xmlns:p14="http://schemas.microsoft.com/office/powerpoint/2010/main" val="3955293609"/>
       </p:ext>
     </p:extLst>
   </p:cSld>
   <p:clrMapOvr>
     <a:masterClrMapping/>
   </p:clrMapOvr>
-  <mc:AlternateContent xmlns:mc="http://schemas.openxmlformats.org/markup-compatibility/2006">
-    <mc:Choice xmlns:p14="http://schemas.microsoft.com/office/powerpoint/2010/main" Requires="p14">
+  <mc:AlternateContent xmlns:mc="http://schemas.openxmlformats.org/markup-compatibility/2006" xmlns:p14="http://schemas.microsoft.com/office/powerpoint/2010/main">
+    <mc:Choice Requires="p14">
       <p:transition spd="slow" p14:dur="2000"/>
     </mc:Choice>
-    <mc:Fallback>
+    <mc:Fallback xmlns="">
       <p:transition xmlns:p14="http://schemas.microsoft.com/office/powerpoint/2010/main" spd="slow"/>
     </mc:Fallback>
   </mc:AlternateContent>
@@ -4678,7 +4674,7 @@
       </p:grpSpPr>
       <p:sp>
         <p:nvSpPr>
-          <p:cNvPr id="2" name="Title 1"/>
+          <p:cNvPr id="4" name="Title 3"/>
           <p:cNvSpPr>
             <a:spLocks noGrp="1"/>
           </p:cNvSpPr>
@@ -4686,159 +4682,49 @@
             <p:ph type="title"/>
           </p:nvPr>
         </p:nvSpPr>
-        <p:spPr/>
-        <p:txBody>
-          <a:bodyPr/>
-          <a:lstStyle/>
-          <a:p>
-            <a:r>
-              <a:rPr lang="en-US" dirty="0" smtClean="0"/>
-              <a:t>Strong Style Pairing</a:t>
-            </a:r>
-            <a:endParaRPr lang="en-US" dirty="0"/>
-          </a:p>
-        </p:txBody>
-      </p:sp>
-      <p:pic>
-        <p:nvPicPr>
-          <p:cNvPr id="5" name="Picture 4"/>
-          <p:cNvPicPr>
-            <a:picLocks noChangeAspect="1"/>
-          </p:cNvPicPr>
-          <p:nvPr/>
-        </p:nvPicPr>
-        <p:blipFill>
-          <a:blip r:embed="rId2"/>
-          <a:stretch>
-            <a:fillRect/>
-          </a:stretch>
-        </p:blipFill>
         <p:spPr>
           <a:xfrm>
-            <a:off x="1926225" y="3170076"/>
-            <a:ext cx="4507806" cy="3058059"/>
-          </a:xfrm>
-          <a:prstGeom prst="rect">
-            <a:avLst/>
-          </a:prstGeom>
-        </p:spPr>
-      </p:pic>
-      <p:sp>
-        <p:nvSpPr>
-          <p:cNvPr id="6" name="TextBox 5"/>
-          <p:cNvSpPr txBox="1"/>
-          <p:nvPr/>
-        </p:nvSpPr>
-        <p:spPr>
-          <a:xfrm>
-            <a:off x="624889" y="1395589"/>
-            <a:ext cx="7619579" cy="1800461"/>
-          </a:xfrm>
-          <a:prstGeom prst="rect">
-            <a:avLst/>
-          </a:prstGeom>
-          <a:noFill/>
-        </p:spPr>
-        <p:txBody>
-          <a:bodyPr wrap="square" lIns="91412" tIns="45704" rIns="91412" bIns="45704" rtlCol="0">
-            <a:spAutoFit/>
+            <a:off x="457201" y="274640"/>
+            <a:ext cx="8229599" cy="6162776"/>
+          </a:xfrm>
+        </p:spPr>
+        <p:txBody>
+          <a:bodyPr>
+            <a:normAutofit/>
           </a:bodyPr>
           <a:lstStyle/>
           <a:p>
-            <a:pPr algn="ctr"/>
-            <a:r>
-              <a:rPr lang="en-US" sz="3700" dirty="0">
-                <a:latin typeface="Arial"/>
-                <a:cs typeface="Arial"/>
+            <a:r>
+              <a:rPr lang="en-US" b="1" dirty="0" smtClean="0">
+                <a:solidFill>
+                  <a:srgbClr val="0000FF"/>
+                </a:solidFill>
               </a:rPr>
-              <a:t>“For an idea to go from your head to the computer it </a:t>
-            </a:r>
-            <a:r>
-              <a:rPr lang="en-US" sz="3700" b="1" i="1" dirty="0">
-                <a:latin typeface="Arial"/>
-                <a:cs typeface="Arial"/>
-              </a:rPr>
-              <a:t>must</a:t>
-            </a:r>
-            <a:r>
-              <a:rPr lang="en-US" sz="3700" dirty="0">
-                <a:latin typeface="Arial"/>
-                <a:cs typeface="Arial"/>
-              </a:rPr>
-              <a:t> go though someone else’s hands”</a:t>
-            </a:r>
-            <a:endParaRPr lang="en-US" sz="3700" dirty="0">
-              <a:latin typeface="Arial"/>
-              <a:cs typeface="Arial"/>
+              <a:t>Ego</a:t>
+            </a:r>
+            <a:endParaRPr lang="en-US" b="1" dirty="0">
+              <a:solidFill>
+                <a:srgbClr val="0000FF"/>
+              </a:solidFill>
             </a:endParaRPr>
-          </a:p>
-        </p:txBody>
-      </p:sp>
-      <p:sp>
-        <p:nvSpPr>
-          <p:cNvPr id="7" name="Rectangle 6"/>
-          <p:cNvSpPr/>
-          <p:nvPr/>
-        </p:nvSpPr>
-        <p:spPr>
-          <a:xfrm>
-            <a:off x="1411034" y="6418669"/>
-            <a:ext cx="7732966" cy="323133"/>
-          </a:xfrm>
-          <a:prstGeom prst="rect">
-            <a:avLst/>
-          </a:prstGeom>
-        </p:spPr>
-        <p:txBody>
-          <a:bodyPr wrap="square" lIns="91412" tIns="45704" rIns="91412" bIns="45704">
-            <a:spAutoFit/>
-          </a:bodyPr>
-          <a:lstStyle/>
-          <a:p>
-            <a:pPr algn="r"/>
-            <a:r>
-              <a:rPr lang="en-US" sz="1500" dirty="0"/>
-              <a:t>  *http://</a:t>
-            </a:r>
-            <a:r>
-              <a:rPr lang="en-US" sz="1500" dirty="0" err="1"/>
-              <a:t>llewellynfalco.blogspot.fi</a:t>
-            </a:r>
-            <a:r>
-              <a:rPr lang="en-US" sz="1500" dirty="0"/>
-              <a:t>/2014/06/</a:t>
-            </a:r>
-            <a:r>
-              <a:rPr lang="en-US" sz="1500" dirty="0" err="1"/>
-              <a:t>llewellyns</a:t>
-            </a:r>
-            <a:r>
-              <a:rPr lang="en-US" sz="1500" dirty="0"/>
-              <a:t>-strong-style-</a:t>
-            </a:r>
-            <a:r>
-              <a:rPr lang="en-US" sz="1500" dirty="0" err="1"/>
-              <a:t>pairing.html</a:t>
-            </a:r>
-            <a:endParaRPr lang="en-US" sz="1500" dirty="0"/>
           </a:p>
         </p:txBody>
       </p:sp>
     </p:spTree>
     <p:extLst>
       <p:ext uri="{BB962C8B-B14F-4D97-AF65-F5344CB8AC3E}">
-        <p14:creationId xmlns:p14="http://schemas.microsoft.com/office/powerpoint/2010/main" val="1587320404"/>
+        <p14:creationId xmlns:p14="http://schemas.microsoft.com/office/powerpoint/2010/main" val="3886447216"/>
       </p:ext>
     </p:extLst>
   </p:cSld>
   <p:clrMapOvr>
     <a:masterClrMapping/>
   </p:clrMapOvr>
-  <mc:AlternateContent xmlns:mc="http://schemas.openxmlformats.org/markup-compatibility/2006">
-    <mc:Choice xmlns:p14="http://schemas.microsoft.com/office/powerpoint/2010/main" Requires="p14">
+  <mc:AlternateContent xmlns:mc="http://schemas.openxmlformats.org/markup-compatibility/2006" xmlns:p14="http://schemas.microsoft.com/office/powerpoint/2010/main">
+    <mc:Choice Requires="p14">
       <p:transition spd="slow" p14:dur="2000"/>
     </mc:Choice>
-    <mc:Fallback>
+    <mc:Fallback xmlns="">
       <p:transition xmlns:p14="http://schemas.microsoft.com/office/powerpoint/2010/main" spd="slow"/>
     </mc:Fallback>
   </mc:AlternateContent>
@@ -4871,7 +4757,7 @@
       </p:grpSpPr>
       <p:sp>
         <p:nvSpPr>
-          <p:cNvPr id="2" name="Title 1"/>
+          <p:cNvPr id="4" name="Title 3"/>
           <p:cNvSpPr>
             <a:spLocks noGrp="1"/>
           </p:cNvSpPr>
@@ -4879,93 +4765,59 @@
             <p:ph type="title"/>
           </p:nvPr>
         </p:nvSpPr>
-        <p:spPr/>
-        <p:txBody>
-          <a:bodyPr/>
+        <p:spPr>
+          <a:xfrm>
+            <a:off x="457201" y="274640"/>
+            <a:ext cx="8229599" cy="6162776"/>
+          </a:xfrm>
+        </p:spPr>
+        <p:txBody>
+          <a:bodyPr>
+            <a:normAutofit/>
+          </a:bodyPr>
           <a:lstStyle/>
           <a:p>
             <a:r>
               <a:rPr lang="en-US" dirty="0" smtClean="0"/>
-              <a:t>Farming vs. Hunting</a:t>
-            </a:r>
-            <a:endParaRPr lang="en-US" dirty="0"/>
-          </a:p>
-        </p:txBody>
-      </p:sp>
-      <p:pic>
-        <p:nvPicPr>
-          <p:cNvPr id="4" name="Picture 3"/>
-          <p:cNvPicPr>
-            <a:picLocks noChangeAspect="1"/>
-          </p:cNvPicPr>
-          <p:nvPr/>
-        </p:nvPicPr>
-        <p:blipFill rotWithShape="1">
-          <a:blip r:embed="rId2"/>
-          <a:srcRect l="19027" t="3696" r="30887" b="8509"/>
-          <a:stretch/>
-        </p:blipFill>
-        <p:spPr>
-          <a:xfrm>
-            <a:off x="6067446" y="1639353"/>
-            <a:ext cx="2116551" cy="3875016"/>
-          </a:xfrm>
-          <a:prstGeom prst="rect">
-            <a:avLst/>
-          </a:prstGeom>
-        </p:spPr>
-      </p:pic>
-      <p:pic>
-        <p:nvPicPr>
-          <p:cNvPr id="5" name="Picture 4"/>
-          <p:cNvPicPr>
-            <a:picLocks noChangeAspect="1"/>
-          </p:cNvPicPr>
-          <p:nvPr/>
-        </p:nvPicPr>
-        <p:blipFill>
-          <a:blip r:embed="rId3">
-            <a:extLst>
-              <a:ext uri="{BEBA8EAE-BF5A-486C-A8C5-ECC9F3942E4B}">
-                <a14:imgProps xmlns:a14="http://schemas.microsoft.com/office/drawing/2010/main">
-                  <a14:imgLayer r:embed="rId4">
-                    <a14:imgEffect>
-                      <a14:saturation sat="0"/>
-                    </a14:imgEffect>
-                  </a14:imgLayer>
-                </a14:imgProps>
-              </a:ext>
-            </a:extLst>
-          </a:blip>
-          <a:stretch>
-            <a:fillRect/>
-          </a:stretch>
-        </p:blipFill>
-        <p:spPr>
-          <a:xfrm>
-            <a:off x="747309" y="1926355"/>
-            <a:ext cx="3485794" cy="3480431"/>
-          </a:xfrm>
-          <a:prstGeom prst="rect">
-            <a:avLst/>
-          </a:prstGeom>
-        </p:spPr>
-      </p:pic>
+              <a:t>Co-creation </a:t>
+            </a:r>
+            <a:br>
+              <a:rPr lang="en-US" dirty="0" smtClean="0"/>
+            </a:br>
+            <a:r>
+              <a:rPr lang="en-US" sz="3100" dirty="0"/>
+              <a:t>vs. </a:t>
+            </a:r>
+            <a:r>
+              <a:rPr lang="en-US" dirty="0" smtClean="0"/>
+              <a:t/>
+            </a:r>
+            <a:br>
+              <a:rPr lang="en-US" dirty="0" smtClean="0"/>
+            </a:br>
+            <a:r>
+              <a:rPr lang="en-US" b="1" dirty="0" smtClean="0"/>
+              <a:t>Collaboration</a:t>
+            </a:r>
+            <a:endParaRPr lang="en-US" b="1" dirty="0"/>
+          </a:p>
+        </p:txBody>
+      </p:sp>
     </p:spTree>
     <p:extLst>
       <p:ext uri="{BB962C8B-B14F-4D97-AF65-F5344CB8AC3E}">
-        <p14:creationId xmlns:p14="http://schemas.microsoft.com/office/powerpoint/2010/main" val="2942875328"/>
+        <p14:creationId xmlns:p14="http://schemas.microsoft.com/office/powerpoint/2010/main" val="4236198090"/>
       </p:ext>
     </p:extLst>
   </p:cSld>
   <p:clrMapOvr>
     <a:masterClrMapping/>
   </p:clrMapOvr>
-  <mc:AlternateContent xmlns:mc="http://schemas.openxmlformats.org/markup-compatibility/2006">
-    <mc:Choice xmlns:p14="http://schemas.microsoft.com/office/powerpoint/2010/main" Requires="p14">
+  <mc:AlternateContent xmlns:mc="http://schemas.openxmlformats.org/markup-compatibility/2006" xmlns:p14="http://schemas.microsoft.com/office/powerpoint/2010/main">
+    <mc:Choice Requires="p14">
       <p:transition spd="slow" p14:dur="2000"/>
     </mc:Choice>
-    <mc:Fallback>
+    <mc:Fallback xmlns="">
       <p:transition xmlns:p14="http://schemas.microsoft.com/office/powerpoint/2010/main" spd="slow"/>
     </mc:Fallback>
   </mc:AlternateContent>
@@ -5003,7 +4855,7 @@
             <a:spLocks noGrp="1"/>
           </p:cNvSpPr>
           <p:nvPr>
-            <p:ph type="title"/>
+            <p:ph type="ctrTitle"/>
           </p:nvPr>
         </p:nvSpPr>
         <p:spPr/>
@@ -5013,181 +4865,62 @@
           <a:p>
             <a:r>
               <a:rPr lang="en-US" dirty="0" smtClean="0"/>
-              <a:t>“Look at me” Pairing</a:t>
+              <a:t>Tales from Developer Tester Collaboration</a:t>
             </a:r>
             <a:endParaRPr lang="en-US" dirty="0"/>
           </a:p>
         </p:txBody>
       </p:sp>
-      <p:pic>
-        <p:nvPicPr>
-          <p:cNvPr id="4" name="Picture 3"/>
-          <p:cNvPicPr>
-            <a:picLocks noChangeAspect="1"/>
-          </p:cNvPicPr>
-          <p:nvPr/>
-        </p:nvPicPr>
-        <p:blipFill>
-          <a:blip r:embed="rId3"/>
-          <a:stretch>
-            <a:fillRect/>
-          </a:stretch>
-        </p:blipFill>
-        <p:spPr>
-          <a:xfrm>
-            <a:off x="1600202" y="1417641"/>
-            <a:ext cx="5943601" cy="4787899"/>
-          </a:xfrm>
-          <a:prstGeom prst="rect">
-            <a:avLst/>
-          </a:prstGeom>
-        </p:spPr>
-      </p:pic>
-      <p:pic>
-        <p:nvPicPr>
-          <p:cNvPr id="5" name="Picture 4"/>
-          <p:cNvPicPr>
-            <a:picLocks noChangeAspect="1"/>
-          </p:cNvPicPr>
-          <p:nvPr/>
-        </p:nvPicPr>
-        <p:blipFill>
-          <a:blip r:embed="rId4">
-            <a:extLst>
-              <a:ext uri="{BEBA8EAE-BF5A-486C-A8C5-ECC9F3942E4B}">
-                <a14:imgProps xmlns:a14="http://schemas.microsoft.com/office/drawing/2010/main">
-                  <a14:imgLayer r:embed="rId5">
-                    <a14:imgEffect>
-                      <a14:saturation sat="0"/>
-                    </a14:imgEffect>
-                  </a14:imgLayer>
-                </a14:imgProps>
-              </a:ext>
-            </a:extLst>
-          </a:blip>
-          <a:stretch>
-            <a:fillRect/>
-          </a:stretch>
-        </p:blipFill>
-        <p:spPr>
-          <a:xfrm rot="16200000">
-            <a:off x="-1667245" y="2946149"/>
-            <a:ext cx="5448302" cy="1650999"/>
-          </a:xfrm>
-          <a:prstGeom prst="rect">
-            <a:avLst/>
-          </a:prstGeom>
-        </p:spPr>
-      </p:pic>
-      <p:sp>
-        <p:nvSpPr>
-          <p:cNvPr id="6" name="Rectangle 5"/>
-          <p:cNvSpPr/>
-          <p:nvPr/>
-        </p:nvSpPr>
-        <p:spPr>
-          <a:xfrm>
-            <a:off x="5664289" y="5381592"/>
-            <a:ext cx="2035919" cy="1114209"/>
-          </a:xfrm>
-          <a:prstGeom prst="rect">
-            <a:avLst/>
-          </a:prstGeom>
-          <a:solidFill>
-            <a:srgbClr val="FFFFFF"/>
-          </a:solidFill>
-          <a:ln>
-            <a:solidFill>
-              <a:srgbClr val="FFFFFF"/>
-            </a:solidFill>
-          </a:ln>
-          <a:effectLst/>
-        </p:spPr>
-        <p:style>
-          <a:lnRef idx="1">
-            <a:schemeClr val="accent1"/>
-          </a:lnRef>
-          <a:fillRef idx="3">
-            <a:schemeClr val="accent1"/>
-          </a:fillRef>
-          <a:effectRef idx="2">
-            <a:schemeClr val="accent1"/>
-          </a:effectRef>
-          <a:fontRef idx="minor">
-            <a:schemeClr val="lt1"/>
-          </a:fontRef>
-        </p:style>
-        <p:txBody>
-          <a:bodyPr lIns="91412" tIns="45704" rIns="91412" bIns="45704" rtlCol="0" anchor="ctr"/>
-          <a:lstStyle/>
-          <a:p>
-            <a:pPr algn="ctr"/>
-            <a:endParaRPr lang="en-US"/>
-          </a:p>
-        </p:txBody>
-      </p:sp>
-      <p:sp>
-        <p:nvSpPr>
-          <p:cNvPr id="7" name="Rectangle 6"/>
-          <p:cNvSpPr/>
-          <p:nvPr/>
-        </p:nvSpPr>
-        <p:spPr>
-          <a:xfrm>
-            <a:off x="1842097" y="5381592"/>
-            <a:ext cx="2035919" cy="1114209"/>
-          </a:xfrm>
-          <a:prstGeom prst="rect">
-            <a:avLst/>
-          </a:prstGeom>
-          <a:solidFill>
-            <a:srgbClr val="FFFFFF"/>
-          </a:solidFill>
-          <a:ln>
-            <a:solidFill>
-              <a:srgbClr val="FFFFFF"/>
-            </a:solidFill>
-          </a:ln>
-          <a:effectLst/>
-        </p:spPr>
-        <p:style>
-          <a:lnRef idx="1">
-            <a:schemeClr val="accent1"/>
-          </a:lnRef>
-          <a:fillRef idx="3">
-            <a:schemeClr val="accent1"/>
-          </a:fillRef>
-          <a:effectRef idx="2">
-            <a:schemeClr val="accent1"/>
-          </a:effectRef>
-          <a:fontRef idx="minor">
-            <a:schemeClr val="lt1"/>
-          </a:fontRef>
-        </p:style>
-        <p:txBody>
-          <a:bodyPr lIns="91412" tIns="45704" rIns="91412" bIns="45704" rtlCol="0" anchor="ctr"/>
-          <a:lstStyle/>
-          <a:p>
-            <a:pPr algn="ctr"/>
-            <a:endParaRPr lang="en-US"/>
+      <p:sp>
+        <p:nvSpPr>
+          <p:cNvPr id="3" name="Subtitle 2"/>
+          <p:cNvSpPr>
+            <a:spLocks noGrp="1"/>
+          </p:cNvSpPr>
+          <p:nvPr>
+            <p:ph type="subTitle" idx="1"/>
+          </p:nvPr>
+        </p:nvSpPr>
+        <p:spPr/>
+        <p:txBody>
+          <a:bodyPr/>
+          <a:lstStyle/>
+          <a:p>
+            <a:r>
+              <a:rPr lang="en-US" dirty="0" err="1" smtClean="0"/>
+              <a:t>Maaret</a:t>
+            </a:r>
+            <a:r>
+              <a:rPr lang="en-US" dirty="0" smtClean="0"/>
+              <a:t> </a:t>
+            </a:r>
+            <a:r>
+              <a:rPr lang="en-US" dirty="0" err="1" smtClean="0"/>
+              <a:t>Pyhäjärvi</a:t>
+            </a:r>
+            <a:r>
+              <a:rPr lang="en-US" dirty="0" smtClean="0"/>
+              <a:t> &amp; Llewellyn Falco</a:t>
+            </a:r>
+            <a:endParaRPr lang="en-US" dirty="0"/>
           </a:p>
         </p:txBody>
       </p:sp>
     </p:spTree>
     <p:extLst>
       <p:ext uri="{BB962C8B-B14F-4D97-AF65-F5344CB8AC3E}">
-        <p14:creationId xmlns:p14="http://schemas.microsoft.com/office/powerpoint/2010/main" val="3817279308"/>
+        <p14:creationId xmlns:p14="http://schemas.microsoft.com/office/powerpoint/2010/main" val="2177454600"/>
       </p:ext>
     </p:extLst>
   </p:cSld>
   <p:clrMapOvr>
     <a:masterClrMapping/>
   </p:clrMapOvr>
-  <mc:AlternateContent xmlns:mc="http://schemas.openxmlformats.org/markup-compatibility/2006">
-    <mc:Choice xmlns:p14="http://schemas.microsoft.com/office/powerpoint/2010/main" Requires="p14">
+  <mc:AlternateContent xmlns:mc="http://schemas.openxmlformats.org/markup-compatibility/2006" xmlns:p14="http://schemas.microsoft.com/office/powerpoint/2010/main">
+    <mc:Choice Requires="p14">
       <p:transition spd="slow" p14:dur="2000"/>
     </mc:Choice>
-    <mc:Fallback>
+    <mc:Fallback xmlns="">
       <p:transition xmlns:p14="http://schemas.microsoft.com/office/powerpoint/2010/main" spd="slow"/>
     </mc:Fallback>
   </mc:AlternateContent>
@@ -5220,18 +4953,18 @@
       </p:grpSpPr>
       <p:sp>
         <p:nvSpPr>
-          <p:cNvPr id="5" name="Title 4"/>
+          <p:cNvPr id="2" name="Title 1"/>
           <p:cNvSpPr>
             <a:spLocks noGrp="1"/>
           </p:cNvSpPr>
           <p:nvPr>
-            <p:ph type="title"/>
+            <p:ph type="ctrTitle"/>
           </p:nvPr>
         </p:nvSpPr>
         <p:spPr>
           <a:xfrm>
-            <a:off x="457201" y="274640"/>
-            <a:ext cx="8229599" cy="6264047"/>
+            <a:off x="685801" y="3600452"/>
+            <a:ext cx="7772399" cy="1470024"/>
           </a:xfrm>
         </p:spPr>
         <p:txBody>
@@ -5240,27 +4973,101 @@
           <a:p>
             <a:r>
               <a:rPr lang="en-US" dirty="0" smtClean="0"/>
-              <a:t>Why are we having issues?</a:t>
+              <a:t>1</a:t>
+            </a:r>
+            <a:r>
+              <a:rPr lang="en-US" baseline="30000" dirty="0" smtClean="0"/>
+              <a:t>st</a:t>
+            </a:r>
+            <a:r>
+              <a:rPr lang="en-US" dirty="0" smtClean="0"/>
+              <a:t> session on unit testing</a:t>
             </a:r>
             <a:endParaRPr lang="en-US" dirty="0"/>
+          </a:p>
+        </p:txBody>
+      </p:sp>
+      <p:pic>
+        <p:nvPicPr>
+          <p:cNvPr id="4" name="Picture 3"/>
+          <p:cNvPicPr>
+            <a:picLocks noChangeAspect="1"/>
+          </p:cNvPicPr>
+          <p:nvPr/>
+        </p:nvPicPr>
+        <p:blipFill>
+          <a:blip r:embed="rId2"/>
+          <a:stretch>
+            <a:fillRect/>
+          </a:stretch>
+        </p:blipFill>
+        <p:spPr>
+          <a:xfrm>
+            <a:off x="5624418" y="553742"/>
+            <a:ext cx="3251200" cy="3251199"/>
+          </a:xfrm>
+          <a:prstGeom prst="rect">
+            <a:avLst/>
+          </a:prstGeom>
+        </p:spPr>
+      </p:pic>
+      <p:sp>
+        <p:nvSpPr>
+          <p:cNvPr id="5" name="Rectangle 4"/>
+          <p:cNvSpPr/>
+          <p:nvPr/>
+        </p:nvSpPr>
+        <p:spPr>
+          <a:xfrm>
+            <a:off x="1411034" y="6418669"/>
+            <a:ext cx="7732966" cy="323133"/>
+          </a:xfrm>
+          <a:prstGeom prst="rect">
+            <a:avLst/>
+          </a:prstGeom>
+        </p:spPr>
+        <p:txBody>
+          <a:bodyPr wrap="square" lIns="91412" tIns="45704" rIns="91412" bIns="45704">
+            <a:spAutoFit/>
+          </a:bodyPr>
+          <a:lstStyle/>
+          <a:p>
+            <a:pPr algn="r"/>
+            <a:r>
+              <a:rPr lang="en-US" sz="1500" dirty="0"/>
+              <a:t>  * http://visible-</a:t>
+            </a:r>
+            <a:r>
+              <a:rPr lang="en-US" sz="1500" dirty="0" err="1"/>
+              <a:t>quality.blogspot.fi</a:t>
+            </a:r>
+            <a:r>
+              <a:rPr lang="en-US" sz="1500" dirty="0"/>
+              <a:t>/2015/01/a-learning-journey-with-unit-tests-</a:t>
+            </a:r>
+            <a:r>
+              <a:rPr lang="en-US" sz="1500" dirty="0" err="1"/>
+              <a:t>just.html</a:t>
+            </a:r>
+            <a:endParaRPr lang="en-US" sz="1500" dirty="0"/>
           </a:p>
         </p:txBody>
       </p:sp>
     </p:spTree>
     <p:extLst>
       <p:ext uri="{BB962C8B-B14F-4D97-AF65-F5344CB8AC3E}">
-        <p14:creationId xmlns:p14="http://schemas.microsoft.com/office/powerpoint/2010/main" val="3456406612"/>
+        <p14:creationId xmlns:p14="http://schemas.microsoft.com/office/powerpoint/2010/main" val="2975425866"/>
       </p:ext>
     </p:extLst>
   </p:cSld>
   <p:clrMapOvr>
     <a:masterClrMapping/>
   </p:clrMapOvr>
-  <mc:AlternateContent xmlns:mc="http://schemas.openxmlformats.org/markup-compatibility/2006">
-    <mc:Choice xmlns:p14="http://schemas.microsoft.com/office/powerpoint/2010/main" Requires="p14">
+  <mc:AlternateContent xmlns:mc="http://schemas.openxmlformats.org/markup-compatibility/2006" xmlns:p14="http://schemas.microsoft.com/office/powerpoint/2010/main">
+    <mc:Choice Requires="p14">
       <p:transition spd="slow" p14:dur="2000"/>
     </mc:Choice>
-    <mc:Fallback>
+    <mc:Fallback xmlns="">
       <p:transition xmlns:p14="http://schemas.microsoft.com/office/powerpoint/2010/main" spd="slow"/>
     </mc:Fallback>
   </mc:AlternateContent>
@@ -5293,7 +5100,7 @@
       </p:grpSpPr>
       <p:sp>
         <p:nvSpPr>
-          <p:cNvPr id="2" name="Title 1"/>
+          <p:cNvPr id="4" name="Title 3"/>
           <p:cNvSpPr>
             <a:spLocks noGrp="1"/>
           </p:cNvSpPr>
@@ -5301,65 +5108,57 @@
             <p:ph type="title"/>
           </p:nvPr>
         </p:nvSpPr>
-        <p:spPr/>
-        <p:txBody>
-          <a:bodyPr/>
-          <a:lstStyle/>
-          <a:p>
-            <a:r>
-              <a:rPr lang="en-US" dirty="0" smtClean="0"/>
-              <a:t>How we became how we are</a:t>
-            </a:r>
-            <a:endParaRPr lang="en-US" dirty="0"/>
-          </a:p>
-        </p:txBody>
-      </p:sp>
-      <p:pic>
-        <p:nvPicPr>
-          <p:cNvPr id="5" name="Picture 4" descr="IMG_0241.PNG"/>
-          <p:cNvPicPr>
-            <a:picLocks noChangeAspect="1"/>
-          </p:cNvPicPr>
-          <p:nvPr/>
-        </p:nvPicPr>
-        <p:blipFill rotWithShape="1">
-          <a:blip r:embed="rId2">
-            <a:alphaModFix amt="77000"/>
-            <a:biLevel thresh="75000"/>
-            <a:extLst>
-              <a:ext uri="{28A0092B-C50C-407E-A947-70E740481C1C}">
-                <a14:useLocalDpi xmlns:a14="http://schemas.microsoft.com/office/drawing/2010/main" val="0"/>
-              </a:ext>
-            </a:extLst>
-          </a:blip>
-          <a:srcRect l="3223" t="7053" b="18296"/>
-          <a:stretch/>
-        </p:blipFill>
         <p:spPr>
           <a:xfrm>
-            <a:off x="947409" y="1744233"/>
-            <a:ext cx="7193018" cy="4161408"/>
-          </a:xfrm>
-          <a:prstGeom prst="rect">
-            <a:avLst/>
-          </a:prstGeom>
-        </p:spPr>
-      </p:pic>
+            <a:off x="457201" y="274640"/>
+            <a:ext cx="8229599" cy="6162776"/>
+          </a:xfrm>
+        </p:spPr>
+        <p:txBody>
+          <a:bodyPr>
+            <a:normAutofit/>
+          </a:bodyPr>
+          <a:lstStyle/>
+          <a:p>
+            <a:r>
+              <a:rPr lang="en-US" b="1" dirty="0" smtClean="0">
+                <a:solidFill>
+                  <a:srgbClr val="0000FF"/>
+                </a:solidFill>
+              </a:rPr>
+              <a:t>Invite </a:t>
+            </a:r>
+            <a:r>
+              <a:rPr lang="en-US" b="1" dirty="0">
+                <a:solidFill>
+                  <a:srgbClr val="0000FF"/>
+                </a:solidFill>
+              </a:rPr>
+              <a:t>trust</a:t>
+            </a:r>
+            <a:endParaRPr lang="en-US" b="1" dirty="0">
+              <a:solidFill>
+                <a:srgbClr val="0000FF"/>
+              </a:solidFill>
+            </a:endParaRPr>
+          </a:p>
+        </p:txBody>
+      </p:sp>
     </p:spTree>
     <p:extLst>
       <p:ext uri="{BB962C8B-B14F-4D97-AF65-F5344CB8AC3E}">
-        <p14:creationId xmlns:p14="http://schemas.microsoft.com/office/powerpoint/2010/main" val="3850683797"/>
+        <p14:creationId xmlns:p14="http://schemas.microsoft.com/office/powerpoint/2010/main" val="532317891"/>
       </p:ext>
     </p:extLst>
   </p:cSld>
   <p:clrMapOvr>
     <a:masterClrMapping/>
   </p:clrMapOvr>
-  <mc:AlternateContent xmlns:mc="http://schemas.openxmlformats.org/markup-compatibility/2006">
-    <mc:Choice xmlns:p14="http://schemas.microsoft.com/office/powerpoint/2010/main" Requires="p14">
+  <mc:AlternateContent xmlns:mc="http://schemas.openxmlformats.org/markup-compatibility/2006" xmlns:p14="http://schemas.microsoft.com/office/powerpoint/2010/main">
+    <mc:Choice Requires="p14">
       <p:transition spd="slow" p14:dur="2000"/>
     </mc:Choice>
-    <mc:Fallback>
+    <mc:Fallback xmlns="">
       <p:transition xmlns:p14="http://schemas.microsoft.com/office/powerpoint/2010/main" spd="slow"/>
     </mc:Fallback>
   </mc:AlternateContent>
@@ -5407,6 +5206,874 @@
           <a:p>
             <a:r>
               <a:rPr lang="en-US" dirty="0" smtClean="0"/>
+              <a:t>Strong Style Pairing</a:t>
+            </a:r>
+            <a:endParaRPr lang="en-US" dirty="0"/>
+          </a:p>
+        </p:txBody>
+      </p:sp>
+      <p:pic>
+        <p:nvPicPr>
+          <p:cNvPr id="5" name="Picture 4"/>
+          <p:cNvPicPr>
+            <a:picLocks noChangeAspect="1"/>
+          </p:cNvPicPr>
+          <p:nvPr/>
+        </p:nvPicPr>
+        <p:blipFill>
+          <a:blip r:embed="rId2"/>
+          <a:stretch>
+            <a:fillRect/>
+          </a:stretch>
+        </p:blipFill>
+        <p:spPr>
+          <a:xfrm>
+            <a:off x="1926225" y="3170076"/>
+            <a:ext cx="4507806" cy="3058059"/>
+          </a:xfrm>
+          <a:prstGeom prst="rect">
+            <a:avLst/>
+          </a:prstGeom>
+        </p:spPr>
+      </p:pic>
+      <p:sp>
+        <p:nvSpPr>
+          <p:cNvPr id="6" name="TextBox 5"/>
+          <p:cNvSpPr txBox="1"/>
+          <p:nvPr/>
+        </p:nvSpPr>
+        <p:spPr>
+          <a:xfrm>
+            <a:off x="624889" y="1395589"/>
+            <a:ext cx="7619579" cy="1800461"/>
+          </a:xfrm>
+          <a:prstGeom prst="rect">
+            <a:avLst/>
+          </a:prstGeom>
+          <a:noFill/>
+        </p:spPr>
+        <p:txBody>
+          <a:bodyPr wrap="square" lIns="91412" tIns="45704" rIns="91412" bIns="45704" rtlCol="0">
+            <a:spAutoFit/>
+          </a:bodyPr>
+          <a:lstStyle/>
+          <a:p>
+            <a:pPr algn="ctr"/>
+            <a:r>
+              <a:rPr lang="en-US" sz="3700" dirty="0">
+                <a:latin typeface="Arial"/>
+                <a:cs typeface="Arial"/>
+              </a:rPr>
+              <a:t>“For an idea to go from your head to the computer it </a:t>
+            </a:r>
+            <a:r>
+              <a:rPr lang="en-US" sz="3700" b="1" i="1" dirty="0">
+                <a:latin typeface="Arial"/>
+                <a:cs typeface="Arial"/>
+              </a:rPr>
+              <a:t>must</a:t>
+            </a:r>
+            <a:r>
+              <a:rPr lang="en-US" sz="3700" dirty="0">
+                <a:latin typeface="Arial"/>
+                <a:cs typeface="Arial"/>
+              </a:rPr>
+              <a:t> go though someone else’s hands”</a:t>
+            </a:r>
+          </a:p>
+        </p:txBody>
+      </p:sp>
+      <p:sp>
+        <p:nvSpPr>
+          <p:cNvPr id="7" name="Rectangle 6"/>
+          <p:cNvSpPr/>
+          <p:nvPr/>
+        </p:nvSpPr>
+        <p:spPr>
+          <a:xfrm>
+            <a:off x="1411034" y="6418669"/>
+            <a:ext cx="7732966" cy="323133"/>
+          </a:xfrm>
+          <a:prstGeom prst="rect">
+            <a:avLst/>
+          </a:prstGeom>
+        </p:spPr>
+        <p:txBody>
+          <a:bodyPr wrap="square" lIns="91412" tIns="45704" rIns="91412" bIns="45704">
+            <a:spAutoFit/>
+          </a:bodyPr>
+          <a:lstStyle/>
+          <a:p>
+            <a:pPr algn="r"/>
+            <a:r>
+              <a:rPr lang="en-US" sz="1500" dirty="0"/>
+              <a:t>  *http://</a:t>
+            </a:r>
+            <a:r>
+              <a:rPr lang="en-US" sz="1500" dirty="0" err="1"/>
+              <a:t>llewellynfalco.blogspot.fi</a:t>
+            </a:r>
+            <a:r>
+              <a:rPr lang="en-US" sz="1500" dirty="0"/>
+              <a:t>/2014/06/</a:t>
+            </a:r>
+            <a:r>
+              <a:rPr lang="en-US" sz="1500" dirty="0" err="1"/>
+              <a:t>llewellyns</a:t>
+            </a:r>
+            <a:r>
+              <a:rPr lang="en-US" sz="1500" dirty="0"/>
+              <a:t>-strong-style-</a:t>
+            </a:r>
+            <a:r>
+              <a:rPr lang="en-US" sz="1500" dirty="0" err="1"/>
+              <a:t>pairing.html</a:t>
+            </a:r>
+            <a:endParaRPr lang="en-US" sz="1500" dirty="0"/>
+          </a:p>
+        </p:txBody>
+      </p:sp>
+    </p:spTree>
+    <p:extLst>
+      <p:ext uri="{BB962C8B-B14F-4D97-AF65-F5344CB8AC3E}">
+        <p14:creationId xmlns:p14="http://schemas.microsoft.com/office/powerpoint/2010/main" val="1587320404"/>
+      </p:ext>
+    </p:extLst>
+  </p:cSld>
+  <p:clrMapOvr>
+    <a:masterClrMapping/>
+  </p:clrMapOvr>
+  <mc:AlternateContent xmlns:mc="http://schemas.openxmlformats.org/markup-compatibility/2006" xmlns:p14="http://schemas.microsoft.com/office/powerpoint/2010/main">
+    <mc:Choice Requires="p14">
+      <p:transition spd="slow" p14:dur="2000"/>
+    </mc:Choice>
+    <mc:Fallback xmlns="">
+      <p:transition xmlns:p14="http://schemas.microsoft.com/office/powerpoint/2010/main" spd="slow"/>
+    </mc:Fallback>
+  </mc:AlternateContent>
+  <p:timing>
+    <p:tnLst>
+      <p:par>
+        <p:cTn xmlns:p14="http://schemas.microsoft.com/office/powerpoint/2010/main" id="1" dur="indefinite" restart="never" nodeType="tmRoot"/>
+      </p:par>
+    </p:tnLst>
+  </p:timing>
+</p:sld>
+</file>
+
+<file path=ppt/slides/slide2.xml><?xml version="1.0" encoding="utf-8"?>
+<p:sld xmlns:a="http://schemas.openxmlformats.org/drawingml/2006/main" xmlns:r="http://schemas.openxmlformats.org/officeDocument/2006/relationships" xmlns:p="http://schemas.openxmlformats.org/presentationml/2006/main">
+  <p:cSld>
+    <p:spTree>
+      <p:nvGrpSpPr>
+        <p:cNvPr id="1" name=""/>
+        <p:cNvGrpSpPr/>
+        <p:nvPr/>
+      </p:nvGrpSpPr>
+      <p:grpSpPr>
+        <a:xfrm>
+          <a:off x="0" y="0"/>
+          <a:ext cx="0" cy="0"/>
+          <a:chOff x="0" y="0"/>
+          <a:chExt cx="0" cy="0"/>
+        </a:xfrm>
+      </p:grpSpPr>
+      <p:sp>
+        <p:nvSpPr>
+          <p:cNvPr id="4" name="Title 3"/>
+          <p:cNvSpPr>
+            <a:spLocks noGrp="1"/>
+          </p:cNvSpPr>
+          <p:nvPr>
+            <p:ph type="title"/>
+          </p:nvPr>
+        </p:nvSpPr>
+        <p:spPr>
+          <a:xfrm>
+            <a:off x="457201" y="274642"/>
+            <a:ext cx="8229599" cy="6220504"/>
+          </a:xfrm>
+        </p:spPr>
+        <p:txBody>
+          <a:bodyPr>
+            <a:normAutofit/>
+          </a:bodyPr>
+          <a:lstStyle/>
+          <a:p>
+            <a:r>
+              <a:rPr lang="en-US" dirty="0" smtClean="0"/>
+              <a:t>Developing a new feature</a:t>
+            </a:r>
+            <a:endParaRPr lang="en-US" dirty="0"/>
+          </a:p>
+        </p:txBody>
+      </p:sp>
+    </p:spTree>
+    <p:extLst>
+      <p:ext uri="{BB962C8B-B14F-4D97-AF65-F5344CB8AC3E}">
+        <p14:creationId xmlns:p14="http://schemas.microsoft.com/office/powerpoint/2010/main" val="772722120"/>
+      </p:ext>
+    </p:extLst>
+  </p:cSld>
+  <p:clrMapOvr>
+    <a:masterClrMapping/>
+  </p:clrMapOvr>
+  <mc:AlternateContent xmlns:mc="http://schemas.openxmlformats.org/markup-compatibility/2006" xmlns:p14="http://schemas.microsoft.com/office/powerpoint/2010/main">
+    <mc:Choice Requires="p14">
+      <p:transition spd="slow" p14:dur="2000"/>
+    </mc:Choice>
+    <mc:Fallback xmlns="">
+      <p:transition xmlns:p14="http://schemas.microsoft.com/office/powerpoint/2010/main" spd="slow"/>
+    </mc:Fallback>
+  </mc:AlternateContent>
+  <p:timing>
+    <p:tnLst>
+      <p:par>
+        <p:cTn xmlns:p14="http://schemas.microsoft.com/office/powerpoint/2010/main" id="1" dur="indefinite" restart="never" nodeType="tmRoot"/>
+      </p:par>
+    </p:tnLst>
+  </p:timing>
+</p:sld>
+</file>
+
+<file path=ppt/slides/slide20.xml><?xml version="1.0" encoding="utf-8"?>
+<p:sld xmlns:a="http://schemas.openxmlformats.org/drawingml/2006/main" xmlns:r="http://schemas.openxmlformats.org/officeDocument/2006/relationships" xmlns:p="http://schemas.openxmlformats.org/presentationml/2006/main">
+  <p:cSld>
+    <p:spTree>
+      <p:nvGrpSpPr>
+        <p:cNvPr id="1" name=""/>
+        <p:cNvGrpSpPr/>
+        <p:nvPr/>
+      </p:nvGrpSpPr>
+      <p:grpSpPr>
+        <a:xfrm>
+          <a:off x="0" y="0"/>
+          <a:ext cx="0" cy="0"/>
+          <a:chOff x="0" y="0"/>
+          <a:chExt cx="0" cy="0"/>
+        </a:xfrm>
+      </p:grpSpPr>
+      <p:sp>
+        <p:nvSpPr>
+          <p:cNvPr id="2" name="Title 1"/>
+          <p:cNvSpPr>
+            <a:spLocks noGrp="1"/>
+          </p:cNvSpPr>
+          <p:nvPr>
+            <p:ph type="title"/>
+          </p:nvPr>
+        </p:nvSpPr>
+        <p:spPr/>
+        <p:txBody>
+          <a:bodyPr/>
+          <a:lstStyle/>
+          <a:p>
+            <a:r>
+              <a:rPr lang="en-US" dirty="0" smtClean="0"/>
+              <a:t>Farming vs. Hunting</a:t>
+            </a:r>
+            <a:endParaRPr lang="en-US" dirty="0"/>
+          </a:p>
+        </p:txBody>
+      </p:sp>
+      <p:pic>
+        <p:nvPicPr>
+          <p:cNvPr id="4" name="Picture 3"/>
+          <p:cNvPicPr>
+            <a:picLocks noChangeAspect="1"/>
+          </p:cNvPicPr>
+          <p:nvPr/>
+        </p:nvPicPr>
+        <p:blipFill rotWithShape="1">
+          <a:blip r:embed="rId2"/>
+          <a:srcRect l="19027" t="3696" r="30887" b="8509"/>
+          <a:stretch/>
+        </p:blipFill>
+        <p:spPr>
+          <a:xfrm>
+            <a:off x="6067446" y="1639353"/>
+            <a:ext cx="2116551" cy="3875016"/>
+          </a:xfrm>
+          <a:prstGeom prst="rect">
+            <a:avLst/>
+          </a:prstGeom>
+        </p:spPr>
+      </p:pic>
+      <p:pic>
+        <p:nvPicPr>
+          <p:cNvPr id="5" name="Picture 4"/>
+          <p:cNvPicPr>
+            <a:picLocks noChangeAspect="1"/>
+          </p:cNvPicPr>
+          <p:nvPr/>
+        </p:nvPicPr>
+        <p:blipFill>
+          <a:blip r:embed="rId3">
+            <a:extLst>
+              <a:ext uri="{BEBA8EAE-BF5A-486C-A8C5-ECC9F3942E4B}">
+                <a14:imgProps xmlns:a14="http://schemas.microsoft.com/office/drawing/2010/main">
+                  <a14:imgLayer r:embed="rId4">
+                    <a14:imgEffect>
+                      <a14:saturation sat="0"/>
+                    </a14:imgEffect>
+                  </a14:imgLayer>
+                </a14:imgProps>
+              </a:ext>
+            </a:extLst>
+          </a:blip>
+          <a:stretch>
+            <a:fillRect/>
+          </a:stretch>
+        </p:blipFill>
+        <p:spPr>
+          <a:xfrm>
+            <a:off x="747309" y="1926355"/>
+            <a:ext cx="3485794" cy="3480431"/>
+          </a:xfrm>
+          <a:prstGeom prst="rect">
+            <a:avLst/>
+          </a:prstGeom>
+        </p:spPr>
+      </p:pic>
+    </p:spTree>
+    <p:extLst>
+      <p:ext uri="{BB962C8B-B14F-4D97-AF65-F5344CB8AC3E}">
+        <p14:creationId xmlns:p14="http://schemas.microsoft.com/office/powerpoint/2010/main" val="2942875328"/>
+      </p:ext>
+    </p:extLst>
+  </p:cSld>
+  <p:clrMapOvr>
+    <a:masterClrMapping/>
+  </p:clrMapOvr>
+  <mc:AlternateContent xmlns:mc="http://schemas.openxmlformats.org/markup-compatibility/2006" xmlns:p14="http://schemas.microsoft.com/office/powerpoint/2010/main">
+    <mc:Choice Requires="p14">
+      <p:transition spd="slow" p14:dur="2000"/>
+    </mc:Choice>
+    <mc:Fallback xmlns="">
+      <p:transition xmlns:p14="http://schemas.microsoft.com/office/powerpoint/2010/main" spd="slow"/>
+    </mc:Fallback>
+  </mc:AlternateContent>
+  <p:timing>
+    <p:tnLst>
+      <p:par>
+        <p:cTn xmlns:p14="http://schemas.microsoft.com/office/powerpoint/2010/main" id="1" dur="indefinite" restart="never" nodeType="tmRoot"/>
+      </p:par>
+    </p:tnLst>
+  </p:timing>
+</p:sld>
+</file>
+
+<file path=ppt/slides/slide21.xml><?xml version="1.0" encoding="utf-8"?>
+<p:sld xmlns:a="http://schemas.openxmlformats.org/drawingml/2006/main" xmlns:r="http://schemas.openxmlformats.org/officeDocument/2006/relationships" xmlns:p="http://schemas.openxmlformats.org/presentationml/2006/main">
+  <p:cSld>
+    <p:spTree>
+      <p:nvGrpSpPr>
+        <p:cNvPr id="1" name=""/>
+        <p:cNvGrpSpPr/>
+        <p:nvPr/>
+      </p:nvGrpSpPr>
+      <p:grpSpPr>
+        <a:xfrm>
+          <a:off x="0" y="0"/>
+          <a:ext cx="0" cy="0"/>
+          <a:chOff x="0" y="0"/>
+          <a:chExt cx="0" cy="0"/>
+        </a:xfrm>
+      </p:grpSpPr>
+      <p:sp>
+        <p:nvSpPr>
+          <p:cNvPr id="2" name="Title 1"/>
+          <p:cNvSpPr>
+            <a:spLocks noGrp="1"/>
+          </p:cNvSpPr>
+          <p:nvPr>
+            <p:ph type="title"/>
+          </p:nvPr>
+        </p:nvSpPr>
+        <p:spPr/>
+        <p:txBody>
+          <a:bodyPr/>
+          <a:lstStyle/>
+          <a:p>
+            <a:r>
+              <a:rPr lang="en-US" dirty="0" smtClean="0"/>
+              <a:t>“Look at me” Pairing</a:t>
+            </a:r>
+            <a:endParaRPr lang="en-US" dirty="0"/>
+          </a:p>
+        </p:txBody>
+      </p:sp>
+      <p:pic>
+        <p:nvPicPr>
+          <p:cNvPr id="4" name="Picture 3"/>
+          <p:cNvPicPr>
+            <a:picLocks noChangeAspect="1"/>
+          </p:cNvPicPr>
+          <p:nvPr/>
+        </p:nvPicPr>
+        <p:blipFill>
+          <a:blip r:embed="rId3"/>
+          <a:stretch>
+            <a:fillRect/>
+          </a:stretch>
+        </p:blipFill>
+        <p:spPr>
+          <a:xfrm>
+            <a:off x="1600202" y="1417641"/>
+            <a:ext cx="5943601" cy="4787899"/>
+          </a:xfrm>
+          <a:prstGeom prst="rect">
+            <a:avLst/>
+          </a:prstGeom>
+        </p:spPr>
+      </p:pic>
+      <p:pic>
+        <p:nvPicPr>
+          <p:cNvPr id="5" name="Picture 4"/>
+          <p:cNvPicPr>
+            <a:picLocks noChangeAspect="1"/>
+          </p:cNvPicPr>
+          <p:nvPr/>
+        </p:nvPicPr>
+        <p:blipFill>
+          <a:blip r:embed="rId4">
+            <a:extLst>
+              <a:ext uri="{BEBA8EAE-BF5A-486C-A8C5-ECC9F3942E4B}">
+                <a14:imgProps xmlns:a14="http://schemas.microsoft.com/office/drawing/2010/main">
+                  <a14:imgLayer r:embed="rId5">
+                    <a14:imgEffect>
+                      <a14:saturation sat="0"/>
+                    </a14:imgEffect>
+                  </a14:imgLayer>
+                </a14:imgProps>
+              </a:ext>
+            </a:extLst>
+          </a:blip>
+          <a:stretch>
+            <a:fillRect/>
+          </a:stretch>
+        </p:blipFill>
+        <p:spPr>
+          <a:xfrm rot="16200000">
+            <a:off x="-1667245" y="2946149"/>
+            <a:ext cx="5448302" cy="1650999"/>
+          </a:xfrm>
+          <a:prstGeom prst="rect">
+            <a:avLst/>
+          </a:prstGeom>
+        </p:spPr>
+      </p:pic>
+      <p:sp>
+        <p:nvSpPr>
+          <p:cNvPr id="6" name="Rectangle 5"/>
+          <p:cNvSpPr/>
+          <p:nvPr/>
+        </p:nvSpPr>
+        <p:spPr>
+          <a:xfrm>
+            <a:off x="5664289" y="5381592"/>
+            <a:ext cx="2035919" cy="1114209"/>
+          </a:xfrm>
+          <a:prstGeom prst="rect">
+            <a:avLst/>
+          </a:prstGeom>
+          <a:solidFill>
+            <a:srgbClr val="FFFFFF"/>
+          </a:solidFill>
+          <a:ln>
+            <a:solidFill>
+              <a:srgbClr val="FFFFFF"/>
+            </a:solidFill>
+          </a:ln>
+          <a:effectLst/>
+        </p:spPr>
+        <p:style>
+          <a:lnRef idx="1">
+            <a:schemeClr val="accent1"/>
+          </a:lnRef>
+          <a:fillRef idx="3">
+            <a:schemeClr val="accent1"/>
+          </a:fillRef>
+          <a:effectRef idx="2">
+            <a:schemeClr val="accent1"/>
+          </a:effectRef>
+          <a:fontRef idx="minor">
+            <a:schemeClr val="lt1"/>
+          </a:fontRef>
+        </p:style>
+        <p:txBody>
+          <a:bodyPr lIns="91412" tIns="45704" rIns="91412" bIns="45704" rtlCol="0" anchor="ctr"/>
+          <a:lstStyle/>
+          <a:p>
+            <a:pPr algn="ctr"/>
+            <a:endParaRPr lang="en-US"/>
+          </a:p>
+        </p:txBody>
+      </p:sp>
+      <p:sp>
+        <p:nvSpPr>
+          <p:cNvPr id="7" name="Rectangle 6"/>
+          <p:cNvSpPr/>
+          <p:nvPr/>
+        </p:nvSpPr>
+        <p:spPr>
+          <a:xfrm>
+            <a:off x="1842097" y="5381592"/>
+            <a:ext cx="2035919" cy="1114209"/>
+          </a:xfrm>
+          <a:prstGeom prst="rect">
+            <a:avLst/>
+          </a:prstGeom>
+          <a:solidFill>
+            <a:srgbClr val="FFFFFF"/>
+          </a:solidFill>
+          <a:ln>
+            <a:solidFill>
+              <a:srgbClr val="FFFFFF"/>
+            </a:solidFill>
+          </a:ln>
+          <a:effectLst/>
+        </p:spPr>
+        <p:style>
+          <a:lnRef idx="1">
+            <a:schemeClr val="accent1"/>
+          </a:lnRef>
+          <a:fillRef idx="3">
+            <a:schemeClr val="accent1"/>
+          </a:fillRef>
+          <a:effectRef idx="2">
+            <a:schemeClr val="accent1"/>
+          </a:effectRef>
+          <a:fontRef idx="minor">
+            <a:schemeClr val="lt1"/>
+          </a:fontRef>
+        </p:style>
+        <p:txBody>
+          <a:bodyPr lIns="91412" tIns="45704" rIns="91412" bIns="45704" rtlCol="0" anchor="ctr"/>
+          <a:lstStyle/>
+          <a:p>
+            <a:pPr algn="ctr"/>
+            <a:endParaRPr lang="en-US"/>
+          </a:p>
+        </p:txBody>
+      </p:sp>
+    </p:spTree>
+    <p:extLst>
+      <p:ext uri="{BB962C8B-B14F-4D97-AF65-F5344CB8AC3E}">
+        <p14:creationId xmlns:p14="http://schemas.microsoft.com/office/powerpoint/2010/main" val="3817279308"/>
+      </p:ext>
+    </p:extLst>
+  </p:cSld>
+  <p:clrMapOvr>
+    <a:masterClrMapping/>
+  </p:clrMapOvr>
+  <mc:AlternateContent xmlns:mc="http://schemas.openxmlformats.org/markup-compatibility/2006" xmlns:p14="http://schemas.microsoft.com/office/powerpoint/2010/main">
+    <mc:Choice Requires="p14">
+      <p:transition spd="slow" p14:dur="2000"/>
+    </mc:Choice>
+    <mc:Fallback xmlns="">
+      <p:transition xmlns:p14="http://schemas.microsoft.com/office/powerpoint/2010/main" spd="slow"/>
+    </mc:Fallback>
+  </mc:AlternateContent>
+  <p:timing>
+    <p:tnLst>
+      <p:par>
+        <p:cTn xmlns:p14="http://schemas.microsoft.com/office/powerpoint/2010/main" id="1" dur="indefinite" restart="never" nodeType="tmRoot"/>
+      </p:par>
+    </p:tnLst>
+  </p:timing>
+</p:sld>
+</file>
+
+<file path=ppt/slides/slide22.xml><?xml version="1.0" encoding="utf-8"?>
+<p:sld xmlns:a="http://schemas.openxmlformats.org/drawingml/2006/main" xmlns:r="http://schemas.openxmlformats.org/officeDocument/2006/relationships" xmlns:p="http://schemas.openxmlformats.org/presentationml/2006/main">
+  <p:cSld>
+    <p:spTree>
+      <p:nvGrpSpPr>
+        <p:cNvPr id="1" name=""/>
+        <p:cNvGrpSpPr/>
+        <p:nvPr/>
+      </p:nvGrpSpPr>
+      <p:grpSpPr>
+        <a:xfrm>
+          <a:off x="0" y="0"/>
+          <a:ext cx="0" cy="0"/>
+          <a:chOff x="0" y="0"/>
+          <a:chExt cx="0" cy="0"/>
+        </a:xfrm>
+      </p:grpSpPr>
+      <p:sp>
+        <p:nvSpPr>
+          <p:cNvPr id="4" name="Title 3"/>
+          <p:cNvSpPr>
+            <a:spLocks noGrp="1"/>
+          </p:cNvSpPr>
+          <p:nvPr>
+            <p:ph type="title"/>
+          </p:nvPr>
+        </p:nvSpPr>
+        <p:spPr>
+          <a:xfrm>
+            <a:off x="457201" y="274640"/>
+            <a:ext cx="8229599" cy="6162776"/>
+          </a:xfrm>
+        </p:spPr>
+        <p:txBody>
+          <a:bodyPr>
+            <a:normAutofit/>
+          </a:bodyPr>
+          <a:lstStyle/>
+          <a:p>
+            <a:r>
+              <a:rPr lang="en-US" b="1" dirty="0" smtClean="0">
+                <a:solidFill>
+                  <a:srgbClr val="0000FF"/>
+                </a:solidFill>
+              </a:rPr>
+              <a:t>Make space for new ideas</a:t>
+            </a:r>
+            <a:endParaRPr lang="en-US" b="1" dirty="0">
+              <a:solidFill>
+                <a:srgbClr val="0000FF"/>
+              </a:solidFill>
+            </a:endParaRPr>
+          </a:p>
+        </p:txBody>
+      </p:sp>
+    </p:spTree>
+    <p:extLst>
+      <p:ext uri="{BB962C8B-B14F-4D97-AF65-F5344CB8AC3E}">
+        <p14:creationId xmlns:p14="http://schemas.microsoft.com/office/powerpoint/2010/main" val="532317891"/>
+      </p:ext>
+    </p:extLst>
+  </p:cSld>
+  <p:clrMapOvr>
+    <a:masterClrMapping/>
+  </p:clrMapOvr>
+  <mc:AlternateContent xmlns:mc="http://schemas.openxmlformats.org/markup-compatibility/2006" xmlns:p14="http://schemas.microsoft.com/office/powerpoint/2010/main">
+    <mc:Choice Requires="p14">
+      <p:transition spd="slow" p14:dur="2000"/>
+    </mc:Choice>
+    <mc:Fallback xmlns="">
+      <p:transition xmlns:p14="http://schemas.microsoft.com/office/powerpoint/2010/main" spd="slow"/>
+    </mc:Fallback>
+  </mc:AlternateContent>
+  <p:timing>
+    <p:tnLst>
+      <p:par>
+        <p:cTn xmlns:p14="http://schemas.microsoft.com/office/powerpoint/2010/main" id="1" dur="indefinite" restart="never" nodeType="tmRoot"/>
+      </p:par>
+    </p:tnLst>
+  </p:timing>
+</p:sld>
+</file>
+
+<file path=ppt/slides/slide23.xml><?xml version="1.0" encoding="utf-8"?>
+<p:sld xmlns:a="http://schemas.openxmlformats.org/drawingml/2006/main" xmlns:r="http://schemas.openxmlformats.org/officeDocument/2006/relationships" xmlns:p="http://schemas.openxmlformats.org/presentationml/2006/main">
+  <p:cSld>
+    <p:spTree>
+      <p:nvGrpSpPr>
+        <p:cNvPr id="1" name=""/>
+        <p:cNvGrpSpPr/>
+        <p:nvPr/>
+      </p:nvGrpSpPr>
+      <p:grpSpPr>
+        <a:xfrm>
+          <a:off x="0" y="0"/>
+          <a:ext cx="0" cy="0"/>
+          <a:chOff x="0" y="0"/>
+          <a:chExt cx="0" cy="0"/>
+        </a:xfrm>
+      </p:grpSpPr>
+      <p:sp>
+        <p:nvSpPr>
+          <p:cNvPr id="5" name="Title 4"/>
+          <p:cNvSpPr>
+            <a:spLocks noGrp="1"/>
+          </p:cNvSpPr>
+          <p:nvPr>
+            <p:ph type="title"/>
+          </p:nvPr>
+        </p:nvSpPr>
+        <p:spPr>
+          <a:xfrm>
+            <a:off x="457201" y="274640"/>
+            <a:ext cx="8229599" cy="6264047"/>
+          </a:xfrm>
+        </p:spPr>
+        <p:txBody>
+          <a:bodyPr/>
+          <a:lstStyle/>
+          <a:p>
+            <a:r>
+              <a:rPr lang="en-US" dirty="0" smtClean="0"/>
+              <a:t>Why are we having issues?</a:t>
+            </a:r>
+            <a:endParaRPr lang="en-US" dirty="0"/>
+          </a:p>
+        </p:txBody>
+      </p:sp>
+    </p:spTree>
+    <p:extLst>
+      <p:ext uri="{BB962C8B-B14F-4D97-AF65-F5344CB8AC3E}">
+        <p14:creationId xmlns:p14="http://schemas.microsoft.com/office/powerpoint/2010/main" val="3456406612"/>
+      </p:ext>
+    </p:extLst>
+  </p:cSld>
+  <p:clrMapOvr>
+    <a:masterClrMapping/>
+  </p:clrMapOvr>
+  <mc:AlternateContent xmlns:mc="http://schemas.openxmlformats.org/markup-compatibility/2006" xmlns:p14="http://schemas.microsoft.com/office/powerpoint/2010/main">
+    <mc:Choice Requires="p14">
+      <p:transition spd="slow" p14:dur="2000"/>
+    </mc:Choice>
+    <mc:Fallback xmlns="">
+      <p:transition xmlns:p14="http://schemas.microsoft.com/office/powerpoint/2010/main" spd="slow"/>
+    </mc:Fallback>
+  </mc:AlternateContent>
+  <p:timing>
+    <p:tnLst>
+      <p:par>
+        <p:cTn xmlns:p14="http://schemas.microsoft.com/office/powerpoint/2010/main" id="1" dur="indefinite" restart="never" nodeType="tmRoot"/>
+      </p:par>
+    </p:tnLst>
+  </p:timing>
+</p:sld>
+</file>
+
+<file path=ppt/slides/slide24.xml><?xml version="1.0" encoding="utf-8"?>
+<p:sld xmlns:a="http://schemas.openxmlformats.org/drawingml/2006/main" xmlns:r="http://schemas.openxmlformats.org/officeDocument/2006/relationships" xmlns:p="http://schemas.openxmlformats.org/presentationml/2006/main">
+  <p:cSld>
+    <p:spTree>
+      <p:nvGrpSpPr>
+        <p:cNvPr id="1" name=""/>
+        <p:cNvGrpSpPr/>
+        <p:nvPr/>
+      </p:nvGrpSpPr>
+      <p:grpSpPr>
+        <a:xfrm>
+          <a:off x="0" y="0"/>
+          <a:ext cx="0" cy="0"/>
+          <a:chOff x="0" y="0"/>
+          <a:chExt cx="0" cy="0"/>
+        </a:xfrm>
+      </p:grpSpPr>
+      <p:sp>
+        <p:nvSpPr>
+          <p:cNvPr id="2" name="Title 1"/>
+          <p:cNvSpPr>
+            <a:spLocks noGrp="1"/>
+          </p:cNvSpPr>
+          <p:nvPr>
+            <p:ph type="title"/>
+          </p:nvPr>
+        </p:nvSpPr>
+        <p:spPr/>
+        <p:txBody>
+          <a:bodyPr/>
+          <a:lstStyle/>
+          <a:p>
+            <a:r>
+              <a:rPr lang="en-US" dirty="0" smtClean="0"/>
+              <a:t>How we became how we are</a:t>
+            </a:r>
+            <a:endParaRPr lang="en-US" dirty="0"/>
+          </a:p>
+        </p:txBody>
+      </p:sp>
+      <p:pic>
+        <p:nvPicPr>
+          <p:cNvPr id="5" name="Picture 4" descr="IMG_0241.PNG"/>
+          <p:cNvPicPr>
+            <a:picLocks noChangeAspect="1"/>
+          </p:cNvPicPr>
+          <p:nvPr/>
+        </p:nvPicPr>
+        <p:blipFill rotWithShape="1">
+          <a:blip r:embed="rId2">
+            <a:alphaModFix amt="77000"/>
+            <a:biLevel thresh="75000"/>
+            <a:extLst>
+              <a:ext uri="{28A0092B-C50C-407E-A947-70E740481C1C}">
+                <a14:useLocalDpi xmlns:a14="http://schemas.microsoft.com/office/drawing/2010/main" val="0"/>
+              </a:ext>
+            </a:extLst>
+          </a:blip>
+          <a:srcRect l="3223" t="7053" b="18296"/>
+          <a:stretch/>
+        </p:blipFill>
+        <p:spPr>
+          <a:xfrm>
+            <a:off x="947409" y="1744233"/>
+            <a:ext cx="7193018" cy="4161408"/>
+          </a:xfrm>
+          <a:prstGeom prst="rect">
+            <a:avLst/>
+          </a:prstGeom>
+        </p:spPr>
+      </p:pic>
+    </p:spTree>
+    <p:extLst>
+      <p:ext uri="{BB962C8B-B14F-4D97-AF65-F5344CB8AC3E}">
+        <p14:creationId xmlns:p14="http://schemas.microsoft.com/office/powerpoint/2010/main" val="3850683797"/>
+      </p:ext>
+    </p:extLst>
+  </p:cSld>
+  <p:clrMapOvr>
+    <a:masterClrMapping/>
+  </p:clrMapOvr>
+  <mc:AlternateContent xmlns:mc="http://schemas.openxmlformats.org/markup-compatibility/2006" xmlns:p14="http://schemas.microsoft.com/office/powerpoint/2010/main">
+    <mc:Choice Requires="p14">
+      <p:transition spd="slow" p14:dur="2000"/>
+    </mc:Choice>
+    <mc:Fallback xmlns="">
+      <p:transition xmlns:p14="http://schemas.microsoft.com/office/powerpoint/2010/main" spd="slow"/>
+    </mc:Fallback>
+  </mc:AlternateContent>
+  <p:timing>
+    <p:tnLst>
+      <p:par>
+        <p:cTn xmlns:p14="http://schemas.microsoft.com/office/powerpoint/2010/main" id="1" dur="indefinite" restart="never" nodeType="tmRoot"/>
+      </p:par>
+    </p:tnLst>
+  </p:timing>
+</p:sld>
+</file>
+
+<file path=ppt/slides/slide25.xml><?xml version="1.0" encoding="utf-8"?>
+<p:sld xmlns:a="http://schemas.openxmlformats.org/drawingml/2006/main" xmlns:r="http://schemas.openxmlformats.org/officeDocument/2006/relationships" xmlns:p="http://schemas.openxmlformats.org/presentationml/2006/main">
+  <p:cSld>
+    <p:spTree>
+      <p:nvGrpSpPr>
+        <p:cNvPr id="1" name=""/>
+        <p:cNvGrpSpPr/>
+        <p:nvPr/>
+      </p:nvGrpSpPr>
+      <p:grpSpPr>
+        <a:xfrm>
+          <a:off x="0" y="0"/>
+          <a:ext cx="0" cy="0"/>
+          <a:chOff x="0" y="0"/>
+          <a:chExt cx="0" cy="0"/>
+        </a:xfrm>
+      </p:grpSpPr>
+      <p:sp>
+        <p:nvSpPr>
+          <p:cNvPr id="2" name="Title 1"/>
+          <p:cNvSpPr>
+            <a:spLocks noGrp="1"/>
+          </p:cNvSpPr>
+          <p:nvPr>
+            <p:ph type="title"/>
+          </p:nvPr>
+        </p:nvSpPr>
+        <p:spPr/>
+        <p:txBody>
+          <a:bodyPr/>
+          <a:lstStyle/>
+          <a:p>
+            <a:r>
+              <a:rPr lang="en-US" dirty="0" smtClean="0"/>
               <a:t>Exploratory Testing</a:t>
             </a:r>
             <a:endParaRPr lang="en-US" dirty="0"/>
@@ -5498,11 +6165,11 @@
   <p:clrMapOvr>
     <a:masterClrMapping/>
   </p:clrMapOvr>
-  <mc:AlternateContent xmlns:mc="http://schemas.openxmlformats.org/markup-compatibility/2006">
-    <mc:Choice xmlns:p14="http://schemas.microsoft.com/office/powerpoint/2010/main" Requires="p14">
+  <mc:AlternateContent xmlns:mc="http://schemas.openxmlformats.org/markup-compatibility/2006" xmlns:p14="http://schemas.microsoft.com/office/powerpoint/2010/main">
+    <mc:Choice Requires="p14">
       <p:transition spd="slow" p14:dur="2000"/>
     </mc:Choice>
-    <mc:Fallback>
+    <mc:Fallback xmlns="">
       <p:transition xmlns:p14="http://schemas.microsoft.com/office/powerpoint/2010/main" spd="slow"/>
     </mc:Fallback>
   </mc:AlternateContent>
@@ -5516,82 +6183,7 @@
 </p:sld>
 </file>
 
-<file path=ppt/slides/slide2.xml><?xml version="1.0" encoding="utf-8"?>
-<p:sld xmlns:a="http://schemas.openxmlformats.org/drawingml/2006/main" xmlns:r="http://schemas.openxmlformats.org/officeDocument/2006/relationships" xmlns:p="http://schemas.openxmlformats.org/presentationml/2006/main">
-  <p:cSld>
-    <p:spTree>
-      <p:nvGrpSpPr>
-        <p:cNvPr id="1" name=""/>
-        <p:cNvGrpSpPr/>
-        <p:nvPr/>
-      </p:nvGrpSpPr>
-      <p:grpSpPr>
-        <a:xfrm>
-          <a:off x="0" y="0"/>
-          <a:ext cx="0" cy="0"/>
-          <a:chOff x="0" y="0"/>
-          <a:chExt cx="0" cy="0"/>
-        </a:xfrm>
-      </p:grpSpPr>
-      <p:sp>
-        <p:nvSpPr>
-          <p:cNvPr id="4" name="Title 3"/>
-          <p:cNvSpPr>
-            <a:spLocks noGrp="1"/>
-          </p:cNvSpPr>
-          <p:nvPr>
-            <p:ph type="title"/>
-          </p:nvPr>
-        </p:nvSpPr>
-        <p:spPr>
-          <a:xfrm>
-            <a:off x="457201" y="274642"/>
-            <a:ext cx="8229599" cy="6220504"/>
-          </a:xfrm>
-        </p:spPr>
-        <p:txBody>
-          <a:bodyPr>
-            <a:normAutofit/>
-          </a:bodyPr>
-          <a:lstStyle/>
-          <a:p>
-            <a:r>
-              <a:rPr lang="en-US" dirty="0" smtClean="0"/>
-              <a:t>Developing a new feature</a:t>
-            </a:r>
-            <a:endParaRPr lang="en-US" dirty="0"/>
-          </a:p>
-        </p:txBody>
-      </p:sp>
-    </p:spTree>
-    <p:extLst>
-      <p:ext uri="{BB962C8B-B14F-4D97-AF65-F5344CB8AC3E}">
-        <p14:creationId xmlns:p14="http://schemas.microsoft.com/office/powerpoint/2010/main" val="772722120"/>
-      </p:ext>
-    </p:extLst>
-  </p:cSld>
-  <p:clrMapOvr>
-    <a:masterClrMapping/>
-  </p:clrMapOvr>
-  <mc:AlternateContent xmlns:mc="http://schemas.openxmlformats.org/markup-compatibility/2006">
-    <mc:Choice xmlns:p14="http://schemas.microsoft.com/office/powerpoint/2010/main" Requires="p14">
-      <p:transition spd="slow" p14:dur="2000"/>
-    </mc:Choice>
-    <mc:Fallback>
-      <p:transition xmlns:p14="http://schemas.microsoft.com/office/powerpoint/2010/main" spd="slow"/>
-    </mc:Fallback>
-  </mc:AlternateContent>
-  <p:timing>
-    <p:tnLst>
-      <p:par>
-        <p:cTn xmlns:p14="http://schemas.microsoft.com/office/powerpoint/2010/main" id="1" dur="indefinite" restart="never" nodeType="tmRoot"/>
-      </p:par>
-    </p:tnLst>
-  </p:timing>
-</p:sld>
-</file>
-
-<file path=ppt/slides/slide20.xml><?xml version="1.0" encoding="utf-8"?>
+<file path=ppt/slides/slide26.xml><?xml version="1.0" encoding="utf-8"?>
 <p:sld xmlns:a="http://schemas.openxmlformats.org/drawingml/2006/main" xmlns:r="http://schemas.openxmlformats.org/officeDocument/2006/relationships" xmlns:p="http://schemas.openxmlformats.org/presentationml/2006/main">
   <p:cSld>
     <p:spTree>
@@ -5707,11 +6299,11 @@
   <p:clrMapOvr>
     <a:masterClrMapping/>
   </p:clrMapOvr>
-  <mc:AlternateContent xmlns:mc="http://schemas.openxmlformats.org/markup-compatibility/2006">
-    <mc:Choice xmlns:p14="http://schemas.microsoft.com/office/powerpoint/2010/main" Requires="p14">
+  <mc:AlternateContent xmlns:mc="http://schemas.openxmlformats.org/markup-compatibility/2006" xmlns:p14="http://schemas.microsoft.com/office/powerpoint/2010/main">
+    <mc:Choice Requires="p14">
       <p:transition spd="slow" p14:dur="2000"/>
     </mc:Choice>
-    <mc:Fallback>
+    <mc:Fallback xmlns="">
       <p:transition xmlns:p14="http://schemas.microsoft.com/office/powerpoint/2010/main" spd="slow"/>
     </mc:Fallback>
   </mc:AlternateContent>
@@ -5725,7 +6317,379 @@
 </p:sld>
 </file>
 
-<file path=ppt/slides/slide21.xml><?xml version="1.0" encoding="utf-8"?>
+<file path=ppt/slides/slide27.xml><?xml version="1.0" encoding="utf-8"?>
+<p:sld xmlns:a="http://schemas.openxmlformats.org/drawingml/2006/main" xmlns:r="http://schemas.openxmlformats.org/officeDocument/2006/relationships" xmlns:p="http://schemas.openxmlformats.org/presentationml/2006/main">
+  <p:cSld>
+    <p:spTree>
+      <p:nvGrpSpPr>
+        <p:cNvPr id="1" name=""/>
+        <p:cNvGrpSpPr/>
+        <p:nvPr/>
+      </p:nvGrpSpPr>
+      <p:grpSpPr>
+        <a:xfrm>
+          <a:off x="0" y="0"/>
+          <a:ext cx="0" cy="0"/>
+          <a:chOff x="0" y="0"/>
+          <a:chExt cx="0" cy="0"/>
+        </a:xfrm>
+      </p:grpSpPr>
+      <p:sp>
+        <p:nvSpPr>
+          <p:cNvPr id="4" name="Title 3"/>
+          <p:cNvSpPr>
+            <a:spLocks noGrp="1"/>
+          </p:cNvSpPr>
+          <p:nvPr>
+            <p:ph type="title"/>
+          </p:nvPr>
+        </p:nvSpPr>
+        <p:spPr>
+          <a:xfrm>
+            <a:off x="457201" y="274640"/>
+            <a:ext cx="8229599" cy="6162776"/>
+          </a:xfrm>
+        </p:spPr>
+        <p:txBody>
+          <a:bodyPr>
+            <a:normAutofit/>
+          </a:bodyPr>
+          <a:lstStyle/>
+          <a:p>
+            <a:r>
+              <a:rPr lang="en-US" b="1" dirty="0" smtClean="0">
+                <a:solidFill>
+                  <a:srgbClr val="0000FF"/>
+                </a:solidFill>
+              </a:rPr>
+              <a:t>Testers &amp; Developers</a:t>
+            </a:r>
+            <a:br>
+              <a:rPr lang="en-US" b="1" dirty="0" smtClean="0">
+                <a:solidFill>
+                  <a:srgbClr val="0000FF"/>
+                </a:solidFill>
+              </a:rPr>
+            </a:br>
+            <a:r>
+              <a:rPr lang="en-US" b="1" dirty="0" smtClean="0">
+                <a:solidFill>
+                  <a:srgbClr val="0000FF"/>
+                </a:solidFill>
+              </a:rPr>
+              <a:t>Think Differently</a:t>
+            </a:r>
+            <a:endParaRPr lang="en-US" b="1" dirty="0">
+              <a:solidFill>
+                <a:srgbClr val="0000FF"/>
+              </a:solidFill>
+            </a:endParaRPr>
+          </a:p>
+        </p:txBody>
+      </p:sp>
+    </p:spTree>
+    <p:extLst>
+      <p:ext uri="{BB962C8B-B14F-4D97-AF65-F5344CB8AC3E}">
+        <p14:creationId xmlns:p14="http://schemas.microsoft.com/office/powerpoint/2010/main" val="2058395770"/>
+      </p:ext>
+    </p:extLst>
+  </p:cSld>
+  <p:clrMapOvr>
+    <a:masterClrMapping/>
+  </p:clrMapOvr>
+  <mc:AlternateContent xmlns:mc="http://schemas.openxmlformats.org/markup-compatibility/2006" xmlns:p14="http://schemas.microsoft.com/office/powerpoint/2010/main">
+    <mc:Choice Requires="p14">
+      <p:transition spd="slow" p14:dur="2000"/>
+    </mc:Choice>
+    <mc:Fallback xmlns="">
+      <p:transition xmlns:p14="http://schemas.microsoft.com/office/powerpoint/2010/main" spd="slow"/>
+    </mc:Fallback>
+  </mc:AlternateContent>
+  <p:timing>
+    <p:tnLst>
+      <p:par>
+        <p:cTn xmlns:p14="http://schemas.microsoft.com/office/powerpoint/2010/main" id="1" dur="indefinite" restart="never" nodeType="tmRoot"/>
+      </p:par>
+    </p:tnLst>
+  </p:timing>
+</p:sld>
+</file>
+
+<file path=ppt/slides/slide28.xml><?xml version="1.0" encoding="utf-8"?>
+<p:sld xmlns:a="http://schemas.openxmlformats.org/drawingml/2006/main" xmlns:r="http://schemas.openxmlformats.org/officeDocument/2006/relationships" xmlns:p="http://schemas.openxmlformats.org/presentationml/2006/main">
+  <p:cSld>
+    <p:spTree>
+      <p:nvGrpSpPr>
+        <p:cNvPr id="1" name=""/>
+        <p:cNvGrpSpPr/>
+        <p:nvPr/>
+      </p:nvGrpSpPr>
+      <p:grpSpPr>
+        <a:xfrm>
+          <a:off x="0" y="0"/>
+          <a:ext cx="0" cy="0"/>
+          <a:chOff x="0" y="0"/>
+          <a:chExt cx="0" cy="0"/>
+        </a:xfrm>
+      </p:grpSpPr>
+      <p:sp>
+        <p:nvSpPr>
+          <p:cNvPr id="4" name="Title 3"/>
+          <p:cNvSpPr>
+            <a:spLocks noGrp="1"/>
+          </p:cNvSpPr>
+          <p:nvPr>
+            <p:ph type="title"/>
+          </p:nvPr>
+        </p:nvSpPr>
+        <p:spPr>
+          <a:xfrm>
+            <a:off x="457201" y="274640"/>
+            <a:ext cx="8229599" cy="6162776"/>
+          </a:xfrm>
+        </p:spPr>
+        <p:txBody>
+          <a:bodyPr>
+            <a:normAutofit/>
+          </a:bodyPr>
+          <a:lstStyle/>
+          <a:p>
+            <a:r>
+              <a:rPr lang="en-US" b="1" dirty="0" smtClean="0">
+                <a:solidFill>
+                  <a:srgbClr val="0000FF"/>
+                </a:solidFill>
+              </a:rPr>
+              <a:t>Developers excel in laziness</a:t>
+            </a:r>
+            <a:endParaRPr lang="en-US" b="1" dirty="0">
+              <a:solidFill>
+                <a:srgbClr val="0000FF"/>
+              </a:solidFill>
+            </a:endParaRPr>
+          </a:p>
+        </p:txBody>
+      </p:sp>
+    </p:spTree>
+    <p:extLst>
+      <p:ext uri="{BB962C8B-B14F-4D97-AF65-F5344CB8AC3E}">
+        <p14:creationId xmlns:p14="http://schemas.microsoft.com/office/powerpoint/2010/main" val="1052622358"/>
+      </p:ext>
+    </p:extLst>
+  </p:cSld>
+  <p:clrMapOvr>
+    <a:masterClrMapping/>
+  </p:clrMapOvr>
+  <mc:AlternateContent xmlns:mc="http://schemas.openxmlformats.org/markup-compatibility/2006" xmlns:p14="http://schemas.microsoft.com/office/powerpoint/2010/main">
+    <mc:Choice Requires="p14">
+      <p:transition spd="slow" p14:dur="2000"/>
+    </mc:Choice>
+    <mc:Fallback xmlns="">
+      <p:transition xmlns:p14="http://schemas.microsoft.com/office/powerpoint/2010/main" spd="slow"/>
+    </mc:Fallback>
+  </mc:AlternateContent>
+  <p:timing>
+    <p:tnLst>
+      <p:par>
+        <p:cTn xmlns:p14="http://schemas.microsoft.com/office/powerpoint/2010/main" id="1" dur="indefinite" restart="never" nodeType="tmRoot"/>
+      </p:par>
+    </p:tnLst>
+  </p:timing>
+</p:sld>
+</file>
+
+<file path=ppt/slides/slide29.xml><?xml version="1.0" encoding="utf-8"?>
+<p:sld xmlns:a="http://schemas.openxmlformats.org/drawingml/2006/main" xmlns:r="http://schemas.openxmlformats.org/officeDocument/2006/relationships" xmlns:p="http://schemas.openxmlformats.org/presentationml/2006/main">
+  <p:cSld>
+    <p:spTree>
+      <p:nvGrpSpPr>
+        <p:cNvPr id="1" name=""/>
+        <p:cNvGrpSpPr/>
+        <p:nvPr/>
+      </p:nvGrpSpPr>
+      <p:grpSpPr>
+        <a:xfrm>
+          <a:off x="0" y="0"/>
+          <a:ext cx="0" cy="0"/>
+          <a:chOff x="0" y="0"/>
+          <a:chExt cx="0" cy="0"/>
+        </a:xfrm>
+      </p:grpSpPr>
+      <p:sp>
+        <p:nvSpPr>
+          <p:cNvPr id="4" name="Title 3"/>
+          <p:cNvSpPr>
+            <a:spLocks noGrp="1"/>
+          </p:cNvSpPr>
+          <p:nvPr>
+            <p:ph type="title"/>
+          </p:nvPr>
+        </p:nvSpPr>
+        <p:spPr>
+          <a:xfrm>
+            <a:off x="457201" y="274640"/>
+            <a:ext cx="8229599" cy="6162776"/>
+          </a:xfrm>
+        </p:spPr>
+        <p:txBody>
+          <a:bodyPr>
+            <a:normAutofit/>
+          </a:bodyPr>
+          <a:lstStyle/>
+          <a:p>
+            <a:r>
+              <a:rPr lang="en-US" b="1" dirty="0" smtClean="0">
+                <a:solidFill>
+                  <a:srgbClr val="0000FF"/>
+                </a:solidFill>
+              </a:rPr>
+              <a:t>Your testers also know your users</a:t>
+            </a:r>
+            <a:endParaRPr lang="en-US" b="1" dirty="0">
+              <a:solidFill>
+                <a:srgbClr val="0000FF"/>
+              </a:solidFill>
+            </a:endParaRPr>
+          </a:p>
+        </p:txBody>
+      </p:sp>
+    </p:spTree>
+    <p:extLst>
+      <p:ext uri="{BB962C8B-B14F-4D97-AF65-F5344CB8AC3E}">
+        <p14:creationId xmlns:p14="http://schemas.microsoft.com/office/powerpoint/2010/main" val="2058395770"/>
+      </p:ext>
+    </p:extLst>
+  </p:cSld>
+  <p:clrMapOvr>
+    <a:masterClrMapping/>
+  </p:clrMapOvr>
+  <mc:AlternateContent xmlns:mc="http://schemas.openxmlformats.org/markup-compatibility/2006" xmlns:p14="http://schemas.microsoft.com/office/powerpoint/2010/main">
+    <mc:Choice Requires="p14">
+      <p:transition spd="slow" p14:dur="2000"/>
+    </mc:Choice>
+    <mc:Fallback xmlns="">
+      <p:transition xmlns:p14="http://schemas.microsoft.com/office/powerpoint/2010/main" spd="slow"/>
+    </mc:Fallback>
+  </mc:AlternateContent>
+  <p:timing>
+    <p:tnLst>
+      <p:par>
+        <p:cTn xmlns:p14="http://schemas.microsoft.com/office/powerpoint/2010/main" id="1" dur="indefinite" restart="never" nodeType="tmRoot"/>
+      </p:par>
+    </p:tnLst>
+  </p:timing>
+</p:sld>
+</file>
+
+<file path=ppt/slides/slide3.xml><?xml version="1.0" encoding="utf-8"?>
+<p:sld xmlns:a="http://schemas.openxmlformats.org/drawingml/2006/main" xmlns:r="http://schemas.openxmlformats.org/officeDocument/2006/relationships" xmlns:p="http://schemas.openxmlformats.org/presentationml/2006/main">
+  <p:cSld>
+    <p:spTree>
+      <p:nvGrpSpPr>
+        <p:cNvPr id="1" name=""/>
+        <p:cNvGrpSpPr/>
+        <p:nvPr/>
+      </p:nvGrpSpPr>
+      <p:grpSpPr>
+        <a:xfrm>
+          <a:off x="0" y="0"/>
+          <a:ext cx="0" cy="0"/>
+          <a:chOff x="0" y="0"/>
+          <a:chExt cx="0" cy="0"/>
+        </a:xfrm>
+      </p:grpSpPr>
+      <p:pic>
+        <p:nvPicPr>
+          <p:cNvPr id="4" name="Picture 3" descr="Developer.png"/>
+          <p:cNvPicPr>
+            <a:picLocks noChangeAspect="1"/>
+          </p:cNvPicPr>
+          <p:nvPr/>
+        </p:nvPicPr>
+        <p:blipFill>
+          <a:blip r:embed="rId2">
+            <a:extLst>
+              <a:ext uri="{28A0092B-C50C-407E-A947-70E740481C1C}">
+                <a14:useLocalDpi xmlns:a14="http://schemas.microsoft.com/office/drawing/2010/main" val="0"/>
+              </a:ext>
+            </a:extLst>
+          </a:blip>
+          <a:stretch>
+            <a:fillRect/>
+          </a:stretch>
+        </p:blipFill>
+        <p:spPr>
+          <a:xfrm>
+            <a:off x="927252" y="1590757"/>
+            <a:ext cx="4129859" cy="4901198"/>
+          </a:xfrm>
+          <a:prstGeom prst="rect">
+            <a:avLst/>
+          </a:prstGeom>
+        </p:spPr>
+      </p:pic>
+      <p:sp>
+        <p:nvSpPr>
+          <p:cNvPr id="6" name="TextBox 5"/>
+          <p:cNvSpPr txBox="1"/>
+          <p:nvPr/>
+        </p:nvSpPr>
+        <p:spPr>
+          <a:xfrm>
+            <a:off x="5467059" y="1075009"/>
+            <a:ext cx="2495351" cy="754020"/>
+          </a:xfrm>
+          <a:prstGeom prst="rect">
+            <a:avLst/>
+          </a:prstGeom>
+          <a:noFill/>
+        </p:spPr>
+        <p:txBody>
+          <a:bodyPr wrap="none" lIns="91412" tIns="45704" rIns="91412" bIns="45704" rtlCol="0">
+            <a:spAutoFit/>
+          </a:bodyPr>
+          <a:lstStyle/>
+          <a:p>
+            <a:r>
+              <a:rPr lang="en-US" sz="4300" dirty="0">
+                <a:latin typeface="+mj-lt"/>
+                <a:ea typeface="+mj-ea"/>
+                <a:cs typeface="+mj-cs"/>
+              </a:rPr>
+              <a:t>Developer</a:t>
+            </a:r>
+          </a:p>
+        </p:txBody>
+      </p:sp>
+    </p:spTree>
+    <p:extLst>
+      <p:ext uri="{BB962C8B-B14F-4D97-AF65-F5344CB8AC3E}">
+        <p14:creationId xmlns:p14="http://schemas.microsoft.com/office/powerpoint/2010/main" val="3225476250"/>
+      </p:ext>
+    </p:extLst>
+  </p:cSld>
+  <p:clrMapOvr>
+    <a:masterClrMapping/>
+  </p:clrMapOvr>
+  <mc:AlternateContent xmlns:mc="http://schemas.openxmlformats.org/markup-compatibility/2006" xmlns:p14="http://schemas.microsoft.com/office/powerpoint/2010/main">
+    <mc:Choice Requires="p14">
+      <p:transition spd="slow" p14:dur="2000"/>
+    </mc:Choice>
+    <mc:Fallback xmlns="">
+      <p:transition xmlns:p14="http://schemas.microsoft.com/office/powerpoint/2010/main" spd="slow"/>
+    </mc:Fallback>
+  </mc:AlternateContent>
+  <p:timing>
+    <p:tnLst>
+      <p:par>
+        <p:cTn xmlns:p14="http://schemas.microsoft.com/office/powerpoint/2010/main" id="1" dur="indefinite" restart="never" nodeType="tmRoot"/>
+      </p:par>
+    </p:tnLst>
+  </p:timing>
+</p:sld>
+</file>
+
+<file path=ppt/slides/slide30.xml><?xml version="1.0" encoding="utf-8"?>
 <p:sld xmlns:a="http://schemas.openxmlformats.org/drawingml/2006/main" xmlns:r="http://schemas.openxmlformats.org/officeDocument/2006/relationships" xmlns:p="http://schemas.openxmlformats.org/presentationml/2006/main">
   <p:cSld>
     <p:spTree>
@@ -5915,11 +6879,6 @@
               </a:rPr>
               <a:t>Unit Testing</a:t>
             </a:r>
-            <a:endParaRPr lang="en-US" sz="2500" dirty="0">
-              <a:solidFill>
-                <a:srgbClr val="FFFFFF"/>
-              </a:solidFill>
-            </a:endParaRPr>
           </a:p>
         </p:txBody>
       </p:sp>
@@ -5945,23 +6904,14 @@
           </a:bodyPr>
           <a:lstStyle/>
           <a:p>
-            <a:r>
-              <a:rPr lang="en-US" sz="2500" dirty="0"/>
-              <a:t>Exploratory </a:t>
-            </a:r>
             <a:r>
               <a:rPr lang="en-US" sz="2500" dirty="0">
                 <a:solidFill>
                   <a:schemeClr val="bg1"/>
                 </a:solidFill>
               </a:rPr>
-              <a:t>Testing</a:t>
-            </a:r>
-            <a:endParaRPr lang="en-US" sz="2500" dirty="0">
-              <a:solidFill>
-                <a:schemeClr val="bg1"/>
-              </a:solidFill>
-            </a:endParaRPr>
+              <a:t>Exploratory Testing</a:t>
+            </a:r>
           </a:p>
         </p:txBody>
       </p:sp>
@@ -6009,7 +6959,6 @@
               <a:rPr lang="en-US" sz="2800" dirty="0"/>
               <a:t>GRANULARITY</a:t>
             </a:r>
-            <a:endParaRPr lang="en-US" sz="2800" dirty="0"/>
           </a:p>
         </p:txBody>
       </p:sp>
@@ -6095,11 +7044,6 @@
               </a:rPr>
               <a:t>Testing as artifact creation</a:t>
             </a:r>
-            <a:endParaRPr lang="en-US" sz="2800" dirty="0">
-              <a:solidFill>
-                <a:srgbClr val="000000"/>
-              </a:solidFill>
-            </a:endParaRPr>
           </a:p>
         </p:txBody>
       </p:sp>
@@ -6130,7 +7074,6 @@
               <a:rPr lang="en-US" sz="2800" dirty="0"/>
               <a:t>Testing as performance</a:t>
             </a:r>
-            <a:endParaRPr lang="en-US" sz="2800" dirty="0"/>
           </a:p>
         </p:txBody>
       </p:sp>
@@ -6144,18 +7087,18 @@
   <p:clrMapOvr>
     <a:masterClrMapping/>
   </p:clrMapOvr>
-  <mc:AlternateContent xmlns:mc="http://schemas.openxmlformats.org/markup-compatibility/2006">
-    <mc:Choice xmlns:p14="http://schemas.microsoft.com/office/powerpoint/2010/main" Requires="p14">
+  <mc:AlternateContent xmlns:mc="http://schemas.openxmlformats.org/markup-compatibility/2006" xmlns:p14="http://schemas.microsoft.com/office/powerpoint/2010/main">
+    <mc:Choice Requires="p14">
       <p:transition spd="slow" p14:dur="2000"/>
     </mc:Choice>
-    <mc:Fallback>
+    <mc:Fallback xmlns="">
       <p:transition xmlns:p14="http://schemas.microsoft.com/office/powerpoint/2010/main" spd="slow"/>
     </mc:Fallback>
   </mc:AlternateContent>
 </p:sld>
 </file>
 
-<file path=ppt/slides/slide22.xml><?xml version="1.0" encoding="utf-8"?>
+<file path=ppt/slides/slide31.xml><?xml version="1.0" encoding="utf-8"?>
 <p:sld xmlns:a="http://schemas.openxmlformats.org/drawingml/2006/main" xmlns:r="http://schemas.openxmlformats.org/officeDocument/2006/relationships" xmlns:p="http://schemas.openxmlformats.org/presentationml/2006/main">
   <p:cSld>
     <p:spTree>
@@ -6265,11 +7208,11 @@
   <p:clrMapOvr>
     <a:masterClrMapping/>
   </p:clrMapOvr>
-  <mc:AlternateContent xmlns:mc="http://schemas.openxmlformats.org/markup-compatibility/2006">
-    <mc:Choice xmlns:p14="http://schemas.microsoft.com/office/powerpoint/2010/main" Requires="p14">
+  <mc:AlternateContent xmlns:mc="http://schemas.openxmlformats.org/markup-compatibility/2006" xmlns:p14="http://schemas.microsoft.com/office/powerpoint/2010/main">
+    <mc:Choice Requires="p14">
       <p:transition spd="slow" p14:dur="2000"/>
     </mc:Choice>
-    <mc:Fallback>
+    <mc:Fallback xmlns="">
       <p:transition xmlns:p14="http://schemas.microsoft.com/office/powerpoint/2010/main" spd="slow"/>
     </mc:Fallback>
   </mc:AlternateContent>
@@ -6283,7 +7226,7 @@
 </p:sld>
 </file>
 
-<file path=ppt/slides/slide23.xml><?xml version="1.0" encoding="utf-8"?>
+<file path=ppt/slides/slide32.xml><?xml version="1.0" encoding="utf-8"?>
 <p:sld xmlns:a="http://schemas.openxmlformats.org/drawingml/2006/main" xmlns:r="http://schemas.openxmlformats.org/officeDocument/2006/relationships" xmlns:p="http://schemas.openxmlformats.org/presentationml/2006/main">
   <p:cSld>
     <p:spTree>
@@ -6329,10 +7272,6 @@
               </a:rPr>
               <a:t>Quality</a:t>
             </a:r>
-            <a:endParaRPr lang="en-US" sz="900" b="1" dirty="0">
-              <a:latin typeface="News Gothic MT"/>
-              <a:cs typeface="News Gothic MT"/>
-            </a:endParaRPr>
           </a:p>
         </p:txBody>
       </p:sp>
@@ -6593,11 +7532,11 @@
   <p:clrMapOvr>
     <a:masterClrMapping/>
   </p:clrMapOvr>
-  <mc:AlternateContent xmlns:mc="http://schemas.openxmlformats.org/markup-compatibility/2006">
-    <mc:Choice xmlns:p14="http://schemas.microsoft.com/office/powerpoint/2010/main" Requires="p14">
+  <mc:AlternateContent xmlns:mc="http://schemas.openxmlformats.org/markup-compatibility/2006" xmlns:p14="http://schemas.microsoft.com/office/powerpoint/2010/main">
+    <mc:Choice Requires="p14">
       <p:transition spd="slow" p14:dur="2000"/>
     </mc:Choice>
-    <mc:Fallback>
+    <mc:Fallback xmlns="">
       <p:transition xmlns:p14="http://schemas.microsoft.com/office/powerpoint/2010/main" spd="slow"/>
     </mc:Fallback>
   </mc:AlternateContent>
@@ -6690,7 +7629,7 @@
 </p:sld>
 </file>
 
-<file path=ppt/slides/slide24.xml><?xml version="1.0" encoding="utf-8"?>
+<file path=ppt/slides/slide33.xml><?xml version="1.0" encoding="utf-8"?>
 <p:sld xmlns:a="http://schemas.openxmlformats.org/drawingml/2006/main" xmlns:r="http://schemas.openxmlformats.org/officeDocument/2006/relationships" xmlns:p="http://schemas.openxmlformats.org/presentationml/2006/main">
   <p:cSld>
     <p:spTree>
@@ -6736,10 +7675,6 @@
               </a:rPr>
               <a:t>Quality</a:t>
             </a:r>
-            <a:endParaRPr lang="en-US" sz="900" b="1" dirty="0">
-              <a:latin typeface="News Gothic MT"/>
-              <a:cs typeface="News Gothic MT"/>
-            </a:endParaRPr>
           </a:p>
         </p:txBody>
       </p:sp>
@@ -7400,11 +8335,11 @@
   <p:clrMapOvr>
     <a:masterClrMapping/>
   </p:clrMapOvr>
-  <mc:AlternateContent xmlns:mc="http://schemas.openxmlformats.org/markup-compatibility/2006">
-    <mc:Choice xmlns:p14="http://schemas.microsoft.com/office/powerpoint/2010/main" Requires="p14">
+  <mc:AlternateContent xmlns:mc="http://schemas.openxmlformats.org/markup-compatibility/2006" xmlns:p14="http://schemas.microsoft.com/office/powerpoint/2010/main">
+    <mc:Choice Requires="p14">
       <p:transition spd="slow" p14:dur="2000"/>
     </mc:Choice>
-    <mc:Fallback>
+    <mc:Fallback xmlns="">
       <p:transition xmlns:p14="http://schemas.microsoft.com/office/powerpoint/2010/main" spd="slow"/>
     </mc:Fallback>
   </mc:AlternateContent>
@@ -7587,7 +8522,7 @@
 </p:sld>
 </file>
 
-<file path=ppt/slides/slide25.xml><?xml version="1.0" encoding="utf-8"?>
+<file path=ppt/slides/slide34.xml><?xml version="1.0" encoding="utf-8"?>
 <p:sld xmlns:a="http://schemas.openxmlformats.org/drawingml/2006/main" xmlns:r="http://schemas.openxmlformats.org/officeDocument/2006/relationships" xmlns:p="http://schemas.openxmlformats.org/presentationml/2006/main">
   <p:cSld>
     <p:spTree>
@@ -7633,10 +8568,6 @@
               </a:rPr>
               <a:t>Quality</a:t>
             </a:r>
-            <a:endParaRPr lang="en-US" sz="900" b="1" dirty="0">
-              <a:latin typeface="News Gothic MT"/>
-              <a:cs typeface="News Gothic MT"/>
-            </a:endParaRPr>
           </a:p>
         </p:txBody>
       </p:sp>
@@ -8329,7 +9260,6 @@
               <a:rPr lang="en-US" sz="2500" dirty="0"/>
               <a:t> about testing</a:t>
             </a:r>
-            <a:endParaRPr lang="en-US" sz="2500" dirty="0"/>
           </a:p>
         </p:txBody>
       </p:sp>
@@ -8359,7 +9289,6 @@
               <a:rPr lang="en-US" sz="2500" dirty="0"/>
               <a:t>Pairing &amp; Mobbing</a:t>
             </a:r>
-            <a:endParaRPr lang="en-US" sz="2500" dirty="0"/>
           </a:p>
         </p:txBody>
       </p:sp>
@@ -8389,7 +9318,6 @@
               <a:rPr lang="en-US" sz="2500" dirty="0"/>
               <a:t>Remote desktop</a:t>
             </a:r>
-            <a:endParaRPr lang="en-US" sz="2500" dirty="0"/>
           </a:p>
         </p:txBody>
       </p:sp>
@@ -8448,7 +9376,6 @@
               <a:rPr lang="en-US" sz="2500" dirty="0"/>
               <a:t>Some testers are great product owners</a:t>
             </a:r>
-            <a:endParaRPr lang="en-US" sz="2500" dirty="0"/>
           </a:p>
         </p:txBody>
       </p:sp>
@@ -8482,7 +9409,6 @@
               <a:rPr lang="en-US" sz="2500" dirty="0"/>
               <a:t> are amazing</a:t>
             </a:r>
-            <a:endParaRPr lang="en-US" sz="2500" dirty="0"/>
           </a:p>
         </p:txBody>
       </p:sp>
@@ -8512,7 +9438,6 @@
               <a:rPr lang="en-US" sz="2500" dirty="0"/>
               <a:t>Skilled tester exist</a:t>
             </a:r>
-            <a:endParaRPr lang="en-US" sz="2500" dirty="0"/>
           </a:p>
         </p:txBody>
       </p:sp>
@@ -8542,7 +9467,6 @@
               <a:rPr lang="en-US" sz="2500" dirty="0"/>
               <a:t>Testers don’t report everything</a:t>
             </a:r>
-            <a:endParaRPr lang="en-US" sz="2500" dirty="0"/>
           </a:p>
         </p:txBody>
       </p:sp>
@@ -8572,7 +9496,6 @@
               <a:rPr lang="en-US" sz="4300" b="1" dirty="0"/>
               <a:t>Learning's:</a:t>
             </a:r>
-            <a:endParaRPr lang="en-US" sz="4300" b="1" dirty="0"/>
           </a:p>
         </p:txBody>
       </p:sp>
@@ -8602,7 +9525,6 @@
               <a:rPr lang="en-US" sz="2500" dirty="0"/>
               <a:t>Shortcuts &amp; Cheats </a:t>
             </a:r>
-            <a:endParaRPr lang="en-US" sz="2500" dirty="0"/>
           </a:p>
         </p:txBody>
       </p:sp>
@@ -8616,11 +9538,11 @@
   <p:clrMapOvr>
     <a:masterClrMapping/>
   </p:clrMapOvr>
-  <mc:AlternateContent xmlns:mc="http://schemas.openxmlformats.org/markup-compatibility/2006">
-    <mc:Choice xmlns:p14="http://schemas.microsoft.com/office/powerpoint/2010/main" Requires="p14">
+  <mc:AlternateContent xmlns:mc="http://schemas.openxmlformats.org/markup-compatibility/2006" xmlns:p14="http://schemas.microsoft.com/office/powerpoint/2010/main">
+    <mc:Choice Requires="p14">
       <p:transition spd="slow" p14:dur="2000"/>
     </mc:Choice>
-    <mc:Fallback>
+    <mc:Fallback xmlns="">
       <p:transition xmlns:p14="http://schemas.microsoft.com/office/powerpoint/2010/main" spd="slow"/>
     </mc:Fallback>
   </mc:AlternateContent>
@@ -9073,7 +9995,7 @@
 </p:sld>
 </file>
 
-<file path=ppt/slides/slide26.xml><?xml version="1.0" encoding="utf-8"?>
+<file path=ppt/slides/slide35.xml><?xml version="1.0" encoding="utf-8"?>
 <p:sld xmlns:a="http://schemas.openxmlformats.org/drawingml/2006/main" xmlns:r="http://schemas.openxmlformats.org/officeDocument/2006/relationships" xmlns:p="http://schemas.openxmlformats.org/presentationml/2006/main">
   <p:cSld>
     <p:spTree>
@@ -9165,11 +10087,11 @@
   <p:clrMapOvr>
     <a:masterClrMapping/>
   </p:clrMapOvr>
-  <mc:AlternateContent xmlns:mc="http://schemas.openxmlformats.org/markup-compatibility/2006">
-    <mc:Choice xmlns:p14="http://schemas.microsoft.com/office/powerpoint/2010/main" Requires="p14">
+  <mc:AlternateContent xmlns:mc="http://schemas.openxmlformats.org/markup-compatibility/2006" xmlns:p14="http://schemas.microsoft.com/office/powerpoint/2010/main">
+    <mc:Choice Requires="p14">
       <p:transition spd="slow" p14:dur="2000"/>
     </mc:Choice>
-    <mc:Fallback>
+    <mc:Fallback xmlns="">
       <p:transition xmlns:p14="http://schemas.microsoft.com/office/powerpoint/2010/main" spd="slow"/>
     </mc:Fallback>
   </mc:AlternateContent>
@@ -9183,7 +10105,7 @@
 </p:sld>
 </file>
 
-<file path=ppt/slides/slide27.xml><?xml version="1.0" encoding="utf-8"?>
+<file path=ppt/slides/slide36.xml><?xml version="1.0" encoding="utf-8"?>
 <p:sld xmlns:a="http://schemas.openxmlformats.org/drawingml/2006/main" xmlns:r="http://schemas.openxmlformats.org/officeDocument/2006/relationships" xmlns:p="http://schemas.openxmlformats.org/presentationml/2006/main">
   <p:cSld>
     <p:spTree>
@@ -9347,10 +10269,6 @@
               </a:rPr>
               <a:t>Output</a:t>
             </a:r>
-            <a:endParaRPr lang="en-US" sz="3200" b="1" dirty="0">
-              <a:latin typeface="News Gothic MT"/>
-              <a:cs typeface="News Gothic MT"/>
-            </a:endParaRPr>
           </a:p>
         </p:txBody>
       </p:sp>
@@ -9788,11 +10706,11 @@
   <p:clrMapOvr>
     <a:masterClrMapping/>
   </p:clrMapOvr>
-  <mc:AlternateContent xmlns:mc="http://schemas.openxmlformats.org/markup-compatibility/2006">
-    <mc:Choice xmlns:p14="http://schemas.microsoft.com/office/powerpoint/2010/main" Requires="p14">
+  <mc:AlternateContent xmlns:mc="http://schemas.openxmlformats.org/markup-compatibility/2006" xmlns:p14="http://schemas.microsoft.com/office/powerpoint/2010/main">
+    <mc:Choice Requires="p14">
       <p:transition spd="slow" p14:dur="2000"/>
     </mc:Choice>
-    <mc:Fallback>
+    <mc:Fallback xmlns="">
       <p:transition xmlns:p14="http://schemas.microsoft.com/office/powerpoint/2010/main" spd="slow"/>
     </mc:Fallback>
   </mc:AlternateContent>
@@ -10199,7 +11117,7 @@
 </p:sld>
 </file>
 
-<file path=ppt/slides/slide28.xml><?xml version="1.0" encoding="utf-8"?>
+<file path=ppt/slides/slide37.xml><?xml version="1.0" encoding="utf-8"?>
 <p:sld xmlns:a="http://schemas.openxmlformats.org/drawingml/2006/main" xmlns:r="http://schemas.openxmlformats.org/officeDocument/2006/relationships" xmlns:p="http://schemas.openxmlformats.org/presentationml/2006/main">
   <p:cSld>
     <p:spTree>
@@ -10363,10 +11281,6 @@
               </a:rPr>
               <a:t>Output</a:t>
             </a:r>
-            <a:endParaRPr lang="en-US" sz="3200" b="1" dirty="0">
-              <a:latin typeface="News Gothic MT"/>
-              <a:cs typeface="News Gothic MT"/>
-            </a:endParaRPr>
           </a:p>
         </p:txBody>
       </p:sp>
@@ -10775,11 +11689,11 @@
   <p:clrMapOvr>
     <a:masterClrMapping/>
   </p:clrMapOvr>
-  <mc:AlternateContent xmlns:mc="http://schemas.openxmlformats.org/markup-compatibility/2006">
-    <mc:Choice xmlns:p14="http://schemas.microsoft.com/office/powerpoint/2010/main" Requires="p14">
+  <mc:AlternateContent xmlns:mc="http://schemas.openxmlformats.org/markup-compatibility/2006" xmlns:p14="http://schemas.microsoft.com/office/powerpoint/2010/main">
+    <mc:Choice Requires="p14">
       <p:transition spd="slow" p14:dur="2000"/>
     </mc:Choice>
-    <mc:Fallback>
+    <mc:Fallback xmlns="">
       <p:transition xmlns:p14="http://schemas.microsoft.com/office/powerpoint/2010/main" spd="slow"/>
     </mc:Fallback>
   </mc:AlternateContent>
@@ -11129,7 +12043,7 @@
 </p:sld>
 </file>
 
-<file path=ppt/slides/slide29.xml><?xml version="1.0" encoding="utf-8"?>
+<file path=ppt/slides/slide38.xml><?xml version="1.0" encoding="utf-8"?>
 <p:sld xmlns:a="http://schemas.openxmlformats.org/drawingml/2006/main" xmlns:r="http://schemas.openxmlformats.org/officeDocument/2006/relationships" xmlns:p="http://schemas.openxmlformats.org/presentationml/2006/main">
   <p:cSld>
     <p:spTree>
@@ -11370,29 +12284,7 @@
                   </a:schemeClr>
                 </a:solidFill>
               </a:rPr>
-              <a:t>(please connect with us through Twitter or </a:t>
-            </a:r>
-            <a:r>
-              <a:rPr lang="en-US" sz="2100" dirty="0">
-                <a:solidFill>
-                  <a:schemeClr val="tx1">
-                    <a:lumMod val="75000"/>
-                    <a:lumOff val="25000"/>
-                  </a:schemeClr>
-                </a:solidFill>
-              </a:rPr>
-              <a:t>L</a:t>
-            </a:r>
-            <a:r>
-              <a:rPr lang="en-US" sz="2100" dirty="0">
-                <a:solidFill>
-                  <a:schemeClr val="tx1">
-                    <a:lumMod val="75000"/>
-                    <a:lumOff val="25000"/>
-                  </a:schemeClr>
-                </a:solidFill>
-              </a:rPr>
-              <a:t>inkedIn)</a:t>
+              <a:t>(please connect with us through Twitter or LinkedIn)</a:t>
             </a:r>
           </a:p>
           <a:p>
@@ -11451,11 +12343,11 @@
   <p:clrMapOvr>
     <a:masterClrMapping/>
   </p:clrMapOvr>
-  <mc:AlternateContent xmlns:mc="http://schemas.openxmlformats.org/markup-compatibility/2006">
-    <mc:Choice xmlns:p14="http://schemas.microsoft.com/office/powerpoint/2010/main" Requires="p14">
+  <mc:AlternateContent xmlns:mc="http://schemas.openxmlformats.org/markup-compatibility/2006" xmlns:p14="http://schemas.microsoft.com/office/powerpoint/2010/main">
+    <mc:Choice Requires="p14">
       <p:transition spd="slow" p14:dur="2000"/>
     </mc:Choice>
-    <mc:Fallback>
+    <mc:Fallback xmlns="">
       <p:transition xmlns:p14="http://schemas.microsoft.com/office/powerpoint/2010/main" spd="slow"/>
     </mc:Fallback>
   </mc:AlternateContent>
@@ -11549,114 +12441,6 @@
 </p:sld>
 </file>
 
-<file path=ppt/slides/slide3.xml><?xml version="1.0" encoding="utf-8"?>
-<p:sld xmlns:a="http://schemas.openxmlformats.org/drawingml/2006/main" xmlns:r="http://schemas.openxmlformats.org/officeDocument/2006/relationships" xmlns:p="http://schemas.openxmlformats.org/presentationml/2006/main">
-  <p:cSld>
-    <p:spTree>
-      <p:nvGrpSpPr>
-        <p:cNvPr id="1" name=""/>
-        <p:cNvGrpSpPr/>
-        <p:nvPr/>
-      </p:nvGrpSpPr>
-      <p:grpSpPr>
-        <a:xfrm>
-          <a:off x="0" y="0"/>
-          <a:ext cx="0" cy="0"/>
-          <a:chOff x="0" y="0"/>
-          <a:chExt cx="0" cy="0"/>
-        </a:xfrm>
-      </p:grpSpPr>
-      <p:pic>
-        <p:nvPicPr>
-          <p:cNvPr id="4" name="Picture 3" descr="Developer.png"/>
-          <p:cNvPicPr>
-            <a:picLocks noChangeAspect="1"/>
-          </p:cNvPicPr>
-          <p:nvPr/>
-        </p:nvPicPr>
-        <p:blipFill>
-          <a:blip r:embed="rId2">
-            <a:extLst>
-              <a:ext uri="{28A0092B-C50C-407E-A947-70E740481C1C}">
-                <a14:useLocalDpi xmlns:a14="http://schemas.microsoft.com/office/drawing/2010/main" val="0"/>
-              </a:ext>
-            </a:extLst>
-          </a:blip>
-          <a:stretch>
-            <a:fillRect/>
-          </a:stretch>
-        </p:blipFill>
-        <p:spPr>
-          <a:xfrm>
-            <a:off x="927252" y="1590757"/>
-            <a:ext cx="4129859" cy="4901198"/>
-          </a:xfrm>
-          <a:prstGeom prst="rect">
-            <a:avLst/>
-          </a:prstGeom>
-        </p:spPr>
-      </p:pic>
-      <p:sp>
-        <p:nvSpPr>
-          <p:cNvPr id="6" name="TextBox 5"/>
-          <p:cNvSpPr txBox="1"/>
-          <p:nvPr/>
-        </p:nvSpPr>
-        <p:spPr>
-          <a:xfrm>
-            <a:off x="5467059" y="1075009"/>
-            <a:ext cx="2495351" cy="754020"/>
-          </a:xfrm>
-          <a:prstGeom prst="rect">
-            <a:avLst/>
-          </a:prstGeom>
-          <a:noFill/>
-        </p:spPr>
-        <p:txBody>
-          <a:bodyPr wrap="none" lIns="91412" tIns="45704" rIns="91412" bIns="45704" rtlCol="0">
-            <a:spAutoFit/>
-          </a:bodyPr>
-          <a:lstStyle/>
-          <a:p>
-            <a:r>
-              <a:rPr lang="en-US" sz="4300" dirty="0">
-                <a:latin typeface="+mj-lt"/>
-                <a:ea typeface="+mj-ea"/>
-                <a:cs typeface="+mj-cs"/>
-              </a:rPr>
-              <a:t>Developer</a:t>
-            </a:r>
-          </a:p>
-        </p:txBody>
-      </p:sp>
-    </p:spTree>
-    <p:extLst>
-      <p:ext uri="{BB962C8B-B14F-4D97-AF65-F5344CB8AC3E}">
-        <p14:creationId xmlns:p14="http://schemas.microsoft.com/office/powerpoint/2010/main" val="3225476250"/>
-      </p:ext>
-    </p:extLst>
-  </p:cSld>
-  <p:clrMapOvr>
-    <a:masterClrMapping/>
-  </p:clrMapOvr>
-  <mc:AlternateContent xmlns:mc="http://schemas.openxmlformats.org/markup-compatibility/2006">
-    <mc:Choice xmlns:p14="http://schemas.microsoft.com/office/powerpoint/2010/main" Requires="p14">
-      <p:transition spd="slow" p14:dur="2000"/>
-    </mc:Choice>
-    <mc:Fallback>
-      <p:transition xmlns:p14="http://schemas.microsoft.com/office/powerpoint/2010/main" spd="slow"/>
-    </mc:Fallback>
-  </mc:AlternateContent>
-  <p:timing>
-    <p:tnLst>
-      <p:par>
-        <p:cTn xmlns:p14="http://schemas.microsoft.com/office/powerpoint/2010/main" id="1" dur="indefinite" restart="never" nodeType="tmRoot"/>
-      </p:par>
-    </p:tnLst>
-  </p:timing>
-</p:sld>
-</file>
-
 <file path=ppt/slides/slide4.xml><?xml version="1.0" encoding="utf-8"?>
 <p:sld xmlns:a="http://schemas.openxmlformats.org/drawingml/2006/main" xmlns:r="http://schemas.openxmlformats.org/officeDocument/2006/relationships" xmlns:p="http://schemas.openxmlformats.org/presentationml/2006/main">
   <p:cSld>
@@ -11843,11 +12627,11 @@
   <p:clrMapOvr>
     <a:masterClrMapping/>
   </p:clrMapOvr>
-  <mc:AlternateContent xmlns:mc="http://schemas.openxmlformats.org/markup-compatibility/2006">
-    <mc:Choice xmlns:p14="http://schemas.microsoft.com/office/powerpoint/2010/main" Requires="p14">
+  <mc:AlternateContent xmlns:mc="http://schemas.openxmlformats.org/markup-compatibility/2006" xmlns:p14="http://schemas.microsoft.com/office/powerpoint/2010/main">
+    <mc:Choice Requires="p14">
       <p:transition spd="slow" p14:dur="2000"/>
     </mc:Choice>
-    <mc:Fallback>
+    <mc:Fallback xmlns="">
       <p:transition xmlns:p14="http://schemas.microsoft.com/office/powerpoint/2010/main" spd="slow"/>
     </mc:Fallback>
   </mc:AlternateContent>
@@ -11938,11 +12722,6 @@
               </a:rPr>
               <a:t>Tester</a:t>
             </a:r>
-            <a:endParaRPr lang="en-US" sz="4300" dirty="0">
-              <a:latin typeface="+mj-lt"/>
-              <a:ea typeface="+mj-ea"/>
-              <a:cs typeface="+mj-cs"/>
-            </a:endParaRPr>
           </a:p>
         </p:txBody>
       </p:sp>
@@ -11956,11 +12735,11 @@
   <p:clrMapOvr>
     <a:masterClrMapping/>
   </p:clrMapOvr>
-  <mc:AlternateContent xmlns:mc="http://schemas.openxmlformats.org/markup-compatibility/2006">
-    <mc:Choice xmlns:p14="http://schemas.microsoft.com/office/powerpoint/2010/main" Requires="p14">
+  <mc:AlternateContent xmlns:mc="http://schemas.openxmlformats.org/markup-compatibility/2006" xmlns:p14="http://schemas.microsoft.com/office/powerpoint/2010/main">
+    <mc:Choice Requires="p14">
       <p:transition spd="slow" p14:dur="2000"/>
     </mc:Choice>
-    <mc:Fallback>
+    <mc:Fallback xmlns="">
       <p:transition xmlns:p14="http://schemas.microsoft.com/office/powerpoint/2010/main" spd="slow"/>
     </mc:Fallback>
   </mc:AlternateContent>
@@ -12196,11 +12975,11 @@
   <p:clrMapOvr>
     <a:masterClrMapping/>
   </p:clrMapOvr>
-  <mc:AlternateContent xmlns:mc="http://schemas.openxmlformats.org/markup-compatibility/2006">
-    <mc:Choice xmlns:p14="http://schemas.microsoft.com/office/powerpoint/2010/main" Requires="p14">
+  <mc:AlternateContent xmlns:mc="http://schemas.openxmlformats.org/markup-compatibility/2006" xmlns:p14="http://schemas.microsoft.com/office/powerpoint/2010/main">
+    <mc:Choice Requires="p14">
       <p:transition spd="slow" p14:dur="2000"/>
     </mc:Choice>
-    <mc:Fallback>
+    <mc:Fallback xmlns="">
       <p:transition xmlns:p14="http://schemas.microsoft.com/office/powerpoint/2010/main" spd="slow"/>
     </mc:Fallback>
   </mc:AlternateContent>
@@ -12316,25 +13095,8 @@
                 <a:latin typeface="Brush Script Std"/>
                 <a:cs typeface="Brush Script Std"/>
               </a:rPr>
-              <a:t>?</a:t>
-            </a:r>
-            <a:r>
-              <a:rPr lang="en-US" sz="7100" dirty="0">
-                <a:solidFill>
-                  <a:schemeClr val="tx1"/>
-                </a:solidFill>
-                <a:latin typeface="Brush Script Std"/>
-                <a:cs typeface="Brush Script Std"/>
-              </a:rPr>
-              <a:t>!?%#</a:t>
-            </a:r>
-            <a:endParaRPr lang="en-US" sz="7100" dirty="0">
-              <a:solidFill>
-                <a:schemeClr val="tx1"/>
-              </a:solidFill>
-              <a:latin typeface="Brush Script Std"/>
-              <a:cs typeface="Brush Script Std"/>
-            </a:endParaRPr>
+              <a:t>?!?%#</a:t>
+            </a:r>
           </a:p>
         </p:txBody>
       </p:sp>
@@ -12384,11 +13146,11 @@
   <p:clrMapOvr>
     <a:masterClrMapping/>
   </p:clrMapOvr>
-  <mc:AlternateContent xmlns:mc="http://schemas.openxmlformats.org/markup-compatibility/2006">
-    <mc:Choice xmlns:p14="http://schemas.microsoft.com/office/powerpoint/2010/main" Requires="p14">
+  <mc:AlternateContent xmlns:mc="http://schemas.openxmlformats.org/markup-compatibility/2006" xmlns:p14="http://schemas.microsoft.com/office/powerpoint/2010/main">
+    <mc:Choice Requires="p14">
       <p:transition spd="slow" p14:dur="2000"/>
     </mc:Choice>
-    <mc:Fallback>
+    <mc:Fallback xmlns="">
       <p:transition xmlns:p14="http://schemas.microsoft.com/office/powerpoint/2010/main" spd="slow"/>
     </mc:Fallback>
   </mc:AlternateContent>
@@ -12459,11 +13221,11 @@
   <p:clrMapOvr>
     <a:masterClrMapping/>
   </p:clrMapOvr>
-  <mc:AlternateContent xmlns:mc="http://schemas.openxmlformats.org/markup-compatibility/2006">
-    <mc:Choice xmlns:p14="http://schemas.microsoft.com/office/powerpoint/2010/main" Requires="p14">
+  <mc:AlternateContent xmlns:mc="http://schemas.openxmlformats.org/markup-compatibility/2006" xmlns:p14="http://schemas.microsoft.com/office/powerpoint/2010/main">
+    <mc:Choice Requires="p14">
       <p:transition spd="slow" p14:dur="2000"/>
     </mc:Choice>
-    <mc:Fallback>
+    <mc:Fallback xmlns="">
       <p:transition xmlns:p14="http://schemas.microsoft.com/office/powerpoint/2010/main" spd="slow"/>
     </mc:Fallback>
   </mc:AlternateContent>
@@ -12565,11 +13327,11 @@
   <p:clrMapOvr>
     <a:masterClrMapping/>
   </p:clrMapOvr>
-  <mc:AlternateContent xmlns:mc="http://schemas.openxmlformats.org/markup-compatibility/2006">
-    <mc:Choice xmlns:p14="http://schemas.microsoft.com/office/powerpoint/2010/main" Requires="p14">
+  <mc:AlternateContent xmlns:mc="http://schemas.openxmlformats.org/markup-compatibility/2006" xmlns:p14="http://schemas.microsoft.com/office/powerpoint/2010/main">
+    <mc:Choice Requires="p14">
       <p:transition spd="slow" p14:dur="2000"/>
     </mc:Choice>
-    <mc:Fallback>
+    <mc:Fallback xmlns="">
       <p:transition xmlns:p14="http://schemas.microsoft.com/office/powerpoint/2010/main" spd="slow"/>
     </mc:Fallback>
   </mc:AlternateContent>

</xml_diff>

<commit_message>
removed 1% growth slides
</commit_message>
<xml_diff>
--- a/Tales from Tester Developer Collaboration.pptx
+++ b/Tales from Tester Developer Collaboration.pptx
@@ -5,7 +5,7 @@
     <p:sldMasterId id="2147483648" r:id="rId1"/>
   </p:sldMasterIdLst>
   <p:notesMasterIdLst>
-    <p:notesMasterId r:id="rId40"/>
+    <p:notesMasterId r:id="rId42"/>
   </p:notesMasterIdLst>
   <p:sldIdLst>
     <p:sldId id="275" r:id="rId2"/>
@@ -33,19 +33,21 @@
     <p:sldId id="269" r:id="rId24"/>
     <p:sldId id="257" r:id="rId25"/>
     <p:sldId id="270" r:id="rId26"/>
-    <p:sldId id="268" r:id="rId27"/>
-    <p:sldId id="296" r:id="rId28"/>
-    <p:sldId id="298" r:id="rId29"/>
-    <p:sldId id="297" r:id="rId30"/>
-    <p:sldId id="286" r:id="rId31"/>
-    <p:sldId id="271" r:id="rId32"/>
-    <p:sldId id="260" r:id="rId33"/>
-    <p:sldId id="273" r:id="rId34"/>
-    <p:sldId id="274" r:id="rId35"/>
-    <p:sldId id="287" r:id="rId36"/>
-    <p:sldId id="288" r:id="rId37"/>
-    <p:sldId id="289" r:id="rId38"/>
-    <p:sldId id="272" r:id="rId39"/>
+    <p:sldId id="299" r:id="rId27"/>
+    <p:sldId id="300" r:id="rId28"/>
+    <p:sldId id="268" r:id="rId29"/>
+    <p:sldId id="296" r:id="rId30"/>
+    <p:sldId id="298" r:id="rId31"/>
+    <p:sldId id="297" r:id="rId32"/>
+    <p:sldId id="286" r:id="rId33"/>
+    <p:sldId id="271" r:id="rId34"/>
+    <p:sldId id="260" r:id="rId35"/>
+    <p:sldId id="273" r:id="rId36"/>
+    <p:sldId id="274" r:id="rId37"/>
+    <p:sldId id="287" r:id="rId38"/>
+    <p:sldId id="288" r:id="rId39"/>
+    <p:sldId id="289" r:id="rId40"/>
+    <p:sldId id="272" r:id="rId41"/>
   </p:sldIdLst>
   <p:sldSz cx="9144000" cy="6858000" type="screen4x3"/>
   <p:notesSz cx="6858000" cy="9144000"/>
@@ -697,7 +699,7 @@
             <a:fld id="{DDB516CE-D814-CC47-9A3A-08F3D723435B}" type="slidenum">
               <a:rPr lang="en-US" smtClean="0"/>
               <a:pPr/>
-              <a:t>30</a:t>
+              <a:t>32</a:t>
             </a:fld>
             <a:endParaRPr lang="en-US"/>
           </a:p>
@@ -781,7 +783,7 @@
           <a:p>
             <a:fld id="{6C157C8D-6C9C-3F41-A598-90F2004D4917}" type="slidenum">
               <a:rPr lang="en-US" smtClean="0"/>
-              <a:t>36</a:t>
+              <a:t>38</a:t>
             </a:fld>
             <a:endParaRPr lang="en-US"/>
           </a:p>
@@ -865,7 +867,7 @@
           <a:p>
             <a:fld id="{6C157C8D-6C9C-3F41-A598-90F2004D4917}" type="slidenum">
               <a:rPr lang="en-US" smtClean="0"/>
-              <a:t>37</a:t>
+              <a:t>39</a:t>
             </a:fld>
             <a:endParaRPr lang="en-US"/>
           </a:p>
@@ -6074,7 +6076,15 @@
           <a:p>
             <a:r>
               <a:rPr lang="en-US" dirty="0" smtClean="0"/>
-              <a:t>Exploratory Testing</a:t>
+              <a:t>Exploratory </a:t>
+            </a:r>
+            <a:r>
+              <a:rPr lang="en-US" dirty="0" smtClean="0"/>
+              <a:t>Testing </a:t>
+            </a:r>
+            <a:r>
+              <a:rPr lang="en-US" dirty="0" err="1" smtClean="0"/>
+              <a:t>DFEditor</a:t>
             </a:r>
             <a:endParaRPr lang="en-US" dirty="0"/>
           </a:p>
@@ -6202,7 +6212,7 @@
       </p:grpSpPr>
       <p:sp>
         <p:nvSpPr>
-          <p:cNvPr id="2" name="Title 1"/>
+          <p:cNvPr id="4" name="Title 3"/>
           <p:cNvSpPr>
             <a:spLocks noGrp="1"/>
           </p:cNvSpPr>
@@ -6210,89 +6220,53 @@
             <p:ph type="title"/>
           </p:nvPr>
         </p:nvSpPr>
-        <p:spPr/>
-        <p:txBody>
-          <a:bodyPr/>
-          <a:lstStyle/>
-          <a:p>
-            <a:r>
-              <a:rPr lang="en-US" dirty="0" smtClean="0"/>
-              <a:t>Testing Excel</a:t>
-            </a:r>
-            <a:endParaRPr lang="en-US" dirty="0"/>
-          </a:p>
-        </p:txBody>
-      </p:sp>
-      <p:pic>
-        <p:nvPicPr>
-          <p:cNvPr id="5" name="Picture 4" descr="small mob.png"/>
-          <p:cNvPicPr>
-            <a:picLocks noChangeAspect="1"/>
-          </p:cNvPicPr>
-          <p:nvPr/>
-        </p:nvPicPr>
-        <p:blipFill>
-          <a:blip r:embed="rId2">
-            <a:extLst>
-              <a:ext uri="{28A0092B-C50C-407E-A947-70E740481C1C}">
-                <a14:useLocalDpi xmlns:a14="http://schemas.microsoft.com/office/drawing/2010/main" val="0"/>
-              </a:ext>
-            </a:extLst>
-          </a:blip>
-          <a:stretch>
-            <a:fillRect/>
-          </a:stretch>
-        </p:blipFill>
         <p:spPr>
           <a:xfrm>
-            <a:off x="1612612" y="1417641"/>
-            <a:ext cx="6269018" cy="5260935"/>
-          </a:xfrm>
-          <a:prstGeom prst="rect">
-            <a:avLst/>
-          </a:prstGeom>
-        </p:spPr>
-      </p:pic>
-      <p:pic>
-        <p:nvPicPr>
-          <p:cNvPr id="6" name="Picture 5"/>
-          <p:cNvPicPr>
-            <a:picLocks noChangeAspect="1"/>
-          </p:cNvPicPr>
-          <p:nvPr/>
-        </p:nvPicPr>
-        <p:blipFill>
-          <a:blip r:embed="rId3">
-            <a:extLst>
-              <a:ext uri="{BEBA8EAE-BF5A-486C-A8C5-ECC9F3942E4B}">
-                <a14:imgProps xmlns:a14="http://schemas.microsoft.com/office/drawing/2010/main">
-                  <a14:imgLayer r:embed="rId4">
-                    <a14:imgEffect>
-                      <a14:saturation sat="33000"/>
-                    </a14:imgEffect>
-                  </a14:imgLayer>
-                </a14:imgProps>
-              </a:ext>
-            </a:extLst>
-          </a:blip>
-          <a:stretch>
-            <a:fillRect/>
-          </a:stretch>
-        </p:blipFill>
-        <p:spPr>
-          <a:xfrm>
-            <a:off x="4282237" y="2090313"/>
-            <a:ext cx="1503299" cy="1503301"/>
-          </a:xfrm>
-          <a:prstGeom prst="rect">
-            <a:avLst/>
-          </a:prstGeom>
-        </p:spPr>
-      </p:pic>
+            <a:off x="457201" y="274640"/>
+            <a:ext cx="8229599" cy="6162776"/>
+          </a:xfrm>
+        </p:spPr>
+        <p:txBody>
+          <a:bodyPr>
+            <a:normAutofit/>
+          </a:bodyPr>
+          <a:lstStyle/>
+          <a:p>
+            <a:r>
+              <a:rPr lang="en-US" b="1" dirty="0" smtClean="0">
+                <a:solidFill>
+                  <a:srgbClr val="0000FF"/>
+                </a:solidFill>
+              </a:rPr>
+              <a:t>‘Obvious to you’</a:t>
+            </a:r>
+            <a:br>
+              <a:rPr lang="en-US" b="1" dirty="0" smtClean="0">
+                <a:solidFill>
+                  <a:srgbClr val="0000FF"/>
+                </a:solidFill>
+              </a:rPr>
+            </a:br>
+            <a:r>
+              <a:rPr lang="en-US" b="1" dirty="0" smtClean="0">
+                <a:solidFill>
+                  <a:srgbClr val="0000FF"/>
+                </a:solidFill>
+              </a:rPr>
+              <a:t> might be ‘special to me’ </a:t>
+            </a:r>
+            <a:endParaRPr lang="en-US" b="1" dirty="0">
+              <a:solidFill>
+                <a:srgbClr val="0000FF"/>
+              </a:solidFill>
+            </a:endParaRPr>
+          </a:p>
+        </p:txBody>
+      </p:sp>
     </p:spTree>
     <p:extLst>
       <p:ext uri="{BB962C8B-B14F-4D97-AF65-F5344CB8AC3E}">
-        <p14:creationId xmlns:p14="http://schemas.microsoft.com/office/powerpoint/2010/main" val="4164120177"/>
+        <p14:creationId xmlns:p14="http://schemas.microsoft.com/office/powerpoint/2010/main" val="2611919679"/>
       </p:ext>
     </p:extLst>
   </p:cSld>
@@ -6362,7 +6336,7 @@
                   <a:srgbClr val="0000FF"/>
                 </a:solidFill>
               </a:rPr>
-              <a:t>Testers &amp; Developers</a:t>
+              <a:t>You can be active </a:t>
             </a:r>
             <a:br>
               <a:rPr lang="en-US" b="1" dirty="0" smtClean="0">
@@ -6377,7 +6351,7 @@
                   <a:srgbClr val="0000FF"/>
                 </a:solidFill>
               </a:rPr>
-              <a:t>Think Differently</a:t>
+              <a:t>without taking over</a:t>
             </a:r>
             <a:endParaRPr lang="en-US" b="1" dirty="0">
               <a:solidFill>
@@ -6390,7 +6364,7 @@
     </p:spTree>
     <p:extLst>
       <p:ext uri="{BB962C8B-B14F-4D97-AF65-F5344CB8AC3E}">
-        <p14:creationId xmlns:p14="http://schemas.microsoft.com/office/powerpoint/2010/main" val="2058395770"/>
+        <p14:creationId xmlns:p14="http://schemas.microsoft.com/office/powerpoint/2010/main" val="3113475853"/>
       </p:ext>
     </p:extLst>
   </p:cSld>
@@ -6434,7 +6408,7 @@
       </p:grpSpPr>
       <p:sp>
         <p:nvSpPr>
-          <p:cNvPr id="4" name="Title 3"/>
+          <p:cNvPr id="2" name="Title 1"/>
           <p:cNvSpPr>
             <a:spLocks noGrp="1"/>
           </p:cNvSpPr>
@@ -6442,38 +6416,89 @@
             <p:ph type="title"/>
           </p:nvPr>
         </p:nvSpPr>
+        <p:spPr/>
+        <p:txBody>
+          <a:bodyPr/>
+          <a:lstStyle/>
+          <a:p>
+            <a:r>
+              <a:rPr lang="en-US" dirty="0" smtClean="0"/>
+              <a:t>Testing Excel</a:t>
+            </a:r>
+            <a:endParaRPr lang="en-US" dirty="0"/>
+          </a:p>
+        </p:txBody>
+      </p:sp>
+      <p:pic>
+        <p:nvPicPr>
+          <p:cNvPr id="5" name="Picture 4" descr="small mob.png"/>
+          <p:cNvPicPr>
+            <a:picLocks noChangeAspect="1"/>
+          </p:cNvPicPr>
+          <p:nvPr/>
+        </p:nvPicPr>
+        <p:blipFill>
+          <a:blip r:embed="rId2">
+            <a:extLst>
+              <a:ext uri="{28A0092B-C50C-407E-A947-70E740481C1C}">
+                <a14:useLocalDpi xmlns:a14="http://schemas.microsoft.com/office/drawing/2010/main" val="0"/>
+              </a:ext>
+            </a:extLst>
+          </a:blip>
+          <a:stretch>
+            <a:fillRect/>
+          </a:stretch>
+        </p:blipFill>
         <p:spPr>
           <a:xfrm>
-            <a:off x="457201" y="274640"/>
-            <a:ext cx="8229599" cy="6162776"/>
-          </a:xfrm>
-        </p:spPr>
-        <p:txBody>
-          <a:bodyPr>
-            <a:normAutofit/>
-          </a:bodyPr>
-          <a:lstStyle/>
-          <a:p>
-            <a:r>
-              <a:rPr lang="en-US" b="1" dirty="0" smtClean="0">
-                <a:solidFill>
-                  <a:srgbClr val="0000FF"/>
-                </a:solidFill>
-              </a:rPr>
-              <a:t>Developers excel in laziness</a:t>
-            </a:r>
-            <a:endParaRPr lang="en-US" b="1" dirty="0">
-              <a:solidFill>
-                <a:srgbClr val="0000FF"/>
-              </a:solidFill>
-            </a:endParaRPr>
-          </a:p>
-        </p:txBody>
-      </p:sp>
+            <a:off x="1612612" y="1417641"/>
+            <a:ext cx="6269018" cy="5260935"/>
+          </a:xfrm>
+          <a:prstGeom prst="rect">
+            <a:avLst/>
+          </a:prstGeom>
+        </p:spPr>
+      </p:pic>
+      <p:pic>
+        <p:nvPicPr>
+          <p:cNvPr id="6" name="Picture 5"/>
+          <p:cNvPicPr>
+            <a:picLocks noChangeAspect="1"/>
+          </p:cNvPicPr>
+          <p:nvPr/>
+        </p:nvPicPr>
+        <p:blipFill>
+          <a:blip r:embed="rId3">
+            <a:extLst>
+              <a:ext uri="{BEBA8EAE-BF5A-486C-A8C5-ECC9F3942E4B}">
+                <a14:imgProps xmlns:a14="http://schemas.microsoft.com/office/drawing/2010/main">
+                  <a14:imgLayer r:embed="rId4">
+                    <a14:imgEffect>
+                      <a14:saturation sat="33000"/>
+                    </a14:imgEffect>
+                  </a14:imgLayer>
+                </a14:imgProps>
+              </a:ext>
+            </a:extLst>
+          </a:blip>
+          <a:stretch>
+            <a:fillRect/>
+          </a:stretch>
+        </p:blipFill>
+        <p:spPr>
+          <a:xfrm>
+            <a:off x="4282237" y="2090313"/>
+            <a:ext cx="1503299" cy="1503301"/>
+          </a:xfrm>
+          <a:prstGeom prst="rect">
+            <a:avLst/>
+          </a:prstGeom>
+        </p:spPr>
+      </p:pic>
     </p:spTree>
     <p:extLst>
       <p:ext uri="{BB962C8B-B14F-4D97-AF65-F5344CB8AC3E}">
-        <p14:creationId xmlns:p14="http://schemas.microsoft.com/office/powerpoint/2010/main" val="1052622358"/>
+        <p14:creationId xmlns:p14="http://schemas.microsoft.com/office/powerpoint/2010/main" val="4164120177"/>
       </p:ext>
     </p:extLst>
   </p:cSld>
@@ -6543,7 +6568,22 @@
                   <a:srgbClr val="0000FF"/>
                 </a:solidFill>
               </a:rPr>
-              <a:t>Your testers also know your users</a:t>
+              <a:t>Testers &amp; Developers</a:t>
+            </a:r>
+            <a:br>
+              <a:rPr lang="en-US" b="1" dirty="0" smtClean="0">
+                <a:solidFill>
+                  <a:srgbClr val="0000FF"/>
+                </a:solidFill>
+              </a:rPr>
+            </a:br>
+            <a:r>
+              <a:rPr lang="en-US" b="1" dirty="0" smtClean="0">
+                <a:solidFill>
+                  <a:srgbClr val="0000FF"/>
+                </a:solidFill>
+              </a:rPr>
+              <a:t>Think Differently</a:t>
             </a:r>
             <a:endParaRPr lang="en-US" b="1" dirty="0">
               <a:solidFill>
@@ -6708,6 +6748,172 @@
       </p:grpSpPr>
       <p:sp>
         <p:nvSpPr>
+          <p:cNvPr id="4" name="Title 3"/>
+          <p:cNvSpPr>
+            <a:spLocks noGrp="1"/>
+          </p:cNvSpPr>
+          <p:nvPr>
+            <p:ph type="title"/>
+          </p:nvPr>
+        </p:nvSpPr>
+        <p:spPr>
+          <a:xfrm>
+            <a:off x="457201" y="274640"/>
+            <a:ext cx="8229599" cy="6162776"/>
+          </a:xfrm>
+        </p:spPr>
+        <p:txBody>
+          <a:bodyPr>
+            <a:normAutofit/>
+          </a:bodyPr>
+          <a:lstStyle/>
+          <a:p>
+            <a:r>
+              <a:rPr lang="en-US" b="1" dirty="0" smtClean="0">
+                <a:solidFill>
+                  <a:srgbClr val="0000FF"/>
+                </a:solidFill>
+              </a:rPr>
+              <a:t>Developers excel in laziness</a:t>
+            </a:r>
+            <a:endParaRPr lang="en-US" b="1" dirty="0">
+              <a:solidFill>
+                <a:srgbClr val="0000FF"/>
+              </a:solidFill>
+            </a:endParaRPr>
+          </a:p>
+        </p:txBody>
+      </p:sp>
+    </p:spTree>
+    <p:extLst>
+      <p:ext uri="{BB962C8B-B14F-4D97-AF65-F5344CB8AC3E}">
+        <p14:creationId xmlns:p14="http://schemas.microsoft.com/office/powerpoint/2010/main" val="1052622358"/>
+      </p:ext>
+    </p:extLst>
+  </p:cSld>
+  <p:clrMapOvr>
+    <a:masterClrMapping/>
+  </p:clrMapOvr>
+  <mc:AlternateContent xmlns:mc="http://schemas.openxmlformats.org/markup-compatibility/2006" xmlns:p14="http://schemas.microsoft.com/office/powerpoint/2010/main">
+    <mc:Choice Requires="p14">
+      <p:transition spd="slow" p14:dur="2000"/>
+    </mc:Choice>
+    <mc:Fallback xmlns="">
+      <p:transition xmlns:p14="http://schemas.microsoft.com/office/powerpoint/2010/main" spd="slow"/>
+    </mc:Fallback>
+  </mc:AlternateContent>
+  <p:timing>
+    <p:tnLst>
+      <p:par>
+        <p:cTn xmlns:p14="http://schemas.microsoft.com/office/powerpoint/2010/main" id="1" dur="indefinite" restart="never" nodeType="tmRoot"/>
+      </p:par>
+    </p:tnLst>
+  </p:timing>
+</p:sld>
+</file>
+
+<file path=ppt/slides/slide31.xml><?xml version="1.0" encoding="utf-8"?>
+<p:sld xmlns:a="http://schemas.openxmlformats.org/drawingml/2006/main" xmlns:r="http://schemas.openxmlformats.org/officeDocument/2006/relationships" xmlns:p="http://schemas.openxmlformats.org/presentationml/2006/main">
+  <p:cSld>
+    <p:spTree>
+      <p:nvGrpSpPr>
+        <p:cNvPr id="1" name=""/>
+        <p:cNvGrpSpPr/>
+        <p:nvPr/>
+      </p:nvGrpSpPr>
+      <p:grpSpPr>
+        <a:xfrm>
+          <a:off x="0" y="0"/>
+          <a:ext cx="0" cy="0"/>
+          <a:chOff x="0" y="0"/>
+          <a:chExt cx="0" cy="0"/>
+        </a:xfrm>
+      </p:grpSpPr>
+      <p:sp>
+        <p:nvSpPr>
+          <p:cNvPr id="4" name="Title 3"/>
+          <p:cNvSpPr>
+            <a:spLocks noGrp="1"/>
+          </p:cNvSpPr>
+          <p:nvPr>
+            <p:ph type="title"/>
+          </p:nvPr>
+        </p:nvSpPr>
+        <p:spPr>
+          <a:xfrm>
+            <a:off x="457201" y="274640"/>
+            <a:ext cx="8229599" cy="6162776"/>
+          </a:xfrm>
+        </p:spPr>
+        <p:txBody>
+          <a:bodyPr>
+            <a:normAutofit/>
+          </a:bodyPr>
+          <a:lstStyle/>
+          <a:p>
+            <a:r>
+              <a:rPr lang="en-US" b="1" dirty="0" smtClean="0">
+                <a:solidFill>
+                  <a:srgbClr val="0000FF"/>
+                </a:solidFill>
+              </a:rPr>
+              <a:t>Your testers also know your users</a:t>
+            </a:r>
+            <a:endParaRPr lang="en-US" b="1" dirty="0">
+              <a:solidFill>
+                <a:srgbClr val="0000FF"/>
+              </a:solidFill>
+            </a:endParaRPr>
+          </a:p>
+        </p:txBody>
+      </p:sp>
+    </p:spTree>
+    <p:extLst>
+      <p:ext uri="{BB962C8B-B14F-4D97-AF65-F5344CB8AC3E}">
+        <p14:creationId xmlns:p14="http://schemas.microsoft.com/office/powerpoint/2010/main" val="2058395770"/>
+      </p:ext>
+    </p:extLst>
+  </p:cSld>
+  <p:clrMapOvr>
+    <a:masterClrMapping/>
+  </p:clrMapOvr>
+  <mc:AlternateContent xmlns:mc="http://schemas.openxmlformats.org/markup-compatibility/2006" xmlns:p14="http://schemas.microsoft.com/office/powerpoint/2010/main">
+    <mc:Choice Requires="p14">
+      <p:transition spd="slow" p14:dur="2000"/>
+    </mc:Choice>
+    <mc:Fallback xmlns="">
+      <p:transition xmlns:p14="http://schemas.microsoft.com/office/powerpoint/2010/main" spd="slow"/>
+    </mc:Fallback>
+  </mc:AlternateContent>
+  <p:timing>
+    <p:tnLst>
+      <p:par>
+        <p:cTn xmlns:p14="http://schemas.microsoft.com/office/powerpoint/2010/main" id="1" dur="indefinite" restart="never" nodeType="tmRoot"/>
+      </p:par>
+    </p:tnLst>
+  </p:timing>
+</p:sld>
+</file>
+
+<file path=ppt/slides/slide32.xml><?xml version="1.0" encoding="utf-8"?>
+<p:sld xmlns:a="http://schemas.openxmlformats.org/drawingml/2006/main" xmlns:r="http://schemas.openxmlformats.org/officeDocument/2006/relationships" xmlns:p="http://schemas.openxmlformats.org/presentationml/2006/main">
+  <p:cSld>
+    <p:spTree>
+      <p:nvGrpSpPr>
+        <p:cNvPr id="1" name=""/>
+        <p:cNvGrpSpPr/>
+        <p:nvPr/>
+      </p:nvGrpSpPr>
+      <p:grpSpPr>
+        <a:xfrm>
+          <a:off x="0" y="0"/>
+          <a:ext cx="0" cy="0"/>
+          <a:chOff x="0" y="0"/>
+          <a:chExt cx="0" cy="0"/>
+        </a:xfrm>
+      </p:grpSpPr>
+      <p:sp>
+        <p:nvSpPr>
           <p:cNvPr id="7" name="Up Arrow 6"/>
           <p:cNvSpPr/>
           <p:nvPr/>
@@ -7098,7 +7304,7 @@
 </p:sld>
 </file>
 
-<file path=ppt/slides/slide31.xml><?xml version="1.0" encoding="utf-8"?>
+<file path=ppt/slides/slide33.xml><?xml version="1.0" encoding="utf-8"?>
 <p:sld xmlns:a="http://schemas.openxmlformats.org/drawingml/2006/main" xmlns:r="http://schemas.openxmlformats.org/officeDocument/2006/relationships" xmlns:p="http://schemas.openxmlformats.org/presentationml/2006/main">
   <p:cSld>
     <p:spTree>
@@ -7226,7 +7432,7 @@
 </p:sld>
 </file>
 
-<file path=ppt/slides/slide32.xml><?xml version="1.0" encoding="utf-8"?>
+<file path=ppt/slides/slide34.xml><?xml version="1.0" encoding="utf-8"?>
 <p:sld xmlns:a="http://schemas.openxmlformats.org/drawingml/2006/main" xmlns:r="http://schemas.openxmlformats.org/officeDocument/2006/relationships" xmlns:p="http://schemas.openxmlformats.org/presentationml/2006/main">
   <p:cSld>
     <p:spTree>
@@ -7629,7 +7835,7 @@
 </p:sld>
 </file>
 
-<file path=ppt/slides/slide33.xml><?xml version="1.0" encoding="utf-8"?>
+<file path=ppt/slides/slide35.xml><?xml version="1.0" encoding="utf-8"?>
 <p:sld xmlns:a="http://schemas.openxmlformats.org/drawingml/2006/main" xmlns:r="http://schemas.openxmlformats.org/officeDocument/2006/relationships" xmlns:p="http://schemas.openxmlformats.org/presentationml/2006/main">
   <p:cSld>
     <p:spTree>
@@ -8522,7 +8728,7 @@
 </p:sld>
 </file>
 
-<file path=ppt/slides/slide34.xml><?xml version="1.0" encoding="utf-8"?>
+<file path=ppt/slides/slide36.xml><?xml version="1.0" encoding="utf-8"?>
 <p:sld xmlns:a="http://schemas.openxmlformats.org/drawingml/2006/main" xmlns:r="http://schemas.openxmlformats.org/officeDocument/2006/relationships" xmlns:p="http://schemas.openxmlformats.org/presentationml/2006/main">
   <p:cSld>
     <p:spTree>
@@ -9995,7 +10201,7 @@
 </p:sld>
 </file>
 
-<file path=ppt/slides/slide35.xml><?xml version="1.0" encoding="utf-8"?>
+<file path=ppt/slides/slide37.xml><?xml version="1.0" encoding="utf-8"?>
 <p:sld xmlns:a="http://schemas.openxmlformats.org/drawingml/2006/main" xmlns:r="http://schemas.openxmlformats.org/officeDocument/2006/relationships" xmlns:p="http://schemas.openxmlformats.org/presentationml/2006/main">
   <p:cSld>
     <p:spTree>
@@ -10105,7 +10311,7 @@
 </p:sld>
 </file>
 
-<file path=ppt/slides/slide36.xml><?xml version="1.0" encoding="utf-8"?>
+<file path=ppt/slides/slide38.xml><?xml version="1.0" encoding="utf-8"?>
 <p:sld xmlns:a="http://schemas.openxmlformats.org/drawingml/2006/main" xmlns:r="http://schemas.openxmlformats.org/officeDocument/2006/relationships" xmlns:p="http://schemas.openxmlformats.org/presentationml/2006/main">
   <p:cSld>
     <p:spTree>
@@ -11117,7 +11323,7 @@
 </p:sld>
 </file>
 
-<file path=ppt/slides/slide37.xml><?xml version="1.0" encoding="utf-8"?>
+<file path=ppt/slides/slide39.xml><?xml version="1.0" encoding="utf-8"?>
 <p:sld xmlns:a="http://schemas.openxmlformats.org/drawingml/2006/main" xmlns:r="http://schemas.openxmlformats.org/officeDocument/2006/relationships" xmlns:p="http://schemas.openxmlformats.org/presentationml/2006/main">
   <p:cSld>
     <p:spTree>
@@ -12043,7 +12249,211 @@
 </p:sld>
 </file>
 
-<file path=ppt/slides/slide38.xml><?xml version="1.0" encoding="utf-8"?>
+<file path=ppt/slides/slide4.xml><?xml version="1.0" encoding="utf-8"?>
+<p:sld xmlns:a="http://schemas.openxmlformats.org/drawingml/2006/main" xmlns:r="http://schemas.openxmlformats.org/officeDocument/2006/relationships" xmlns:p="http://schemas.openxmlformats.org/presentationml/2006/main">
+  <p:cSld>
+    <p:spTree>
+      <p:nvGrpSpPr>
+        <p:cNvPr id="1" name=""/>
+        <p:cNvGrpSpPr/>
+        <p:nvPr/>
+      </p:nvGrpSpPr>
+      <p:grpSpPr>
+        <a:xfrm>
+          <a:off x="0" y="0"/>
+          <a:ext cx="0" cy="0"/>
+          <a:chOff x="0" y="0"/>
+          <a:chExt cx="0" cy="0"/>
+        </a:xfrm>
+      </p:grpSpPr>
+      <p:pic>
+        <p:nvPicPr>
+          <p:cNvPr id="4" name="Picture 3" descr="Developer.png"/>
+          <p:cNvPicPr>
+            <a:picLocks noChangeAspect="1"/>
+          </p:cNvPicPr>
+          <p:nvPr/>
+        </p:nvPicPr>
+        <p:blipFill>
+          <a:blip r:embed="rId2">
+            <a:extLst>
+              <a:ext uri="{28A0092B-C50C-407E-A947-70E740481C1C}">
+                <a14:useLocalDpi xmlns:a14="http://schemas.microsoft.com/office/drawing/2010/main" val="0"/>
+              </a:ext>
+            </a:extLst>
+          </a:blip>
+          <a:stretch>
+            <a:fillRect/>
+          </a:stretch>
+        </p:blipFill>
+        <p:spPr>
+          <a:xfrm>
+            <a:off x="927253" y="3716949"/>
+            <a:ext cx="2338283" cy="2775004"/>
+          </a:xfrm>
+          <a:prstGeom prst="rect">
+            <a:avLst/>
+          </a:prstGeom>
+        </p:spPr>
+      </p:pic>
+      <p:cxnSp>
+        <p:nvCxnSpPr>
+          <p:cNvPr id="5" name="Straight Connector 4"/>
+          <p:cNvCxnSpPr/>
+          <p:nvPr/>
+        </p:nvCxnSpPr>
+        <p:spPr>
+          <a:xfrm flipV="1">
+            <a:off x="1667393" y="433412"/>
+            <a:ext cx="2077860" cy="3531845"/>
+          </a:xfrm>
+          <a:prstGeom prst="line">
+            <a:avLst/>
+          </a:prstGeom>
+        </p:spPr>
+        <p:style>
+          <a:lnRef idx="1">
+            <a:schemeClr val="dk1"/>
+          </a:lnRef>
+          <a:fillRef idx="0">
+            <a:schemeClr val="dk1"/>
+          </a:fillRef>
+          <a:effectRef idx="0">
+            <a:schemeClr val="dk1"/>
+          </a:effectRef>
+          <a:fontRef idx="minor">
+            <a:schemeClr val="tx1"/>
+          </a:fontRef>
+        </p:style>
+      </p:cxnSp>
+      <p:cxnSp>
+        <p:nvCxnSpPr>
+          <p:cNvPr id="7" name="Straight Connector 6"/>
+          <p:cNvCxnSpPr/>
+          <p:nvPr/>
+        </p:nvCxnSpPr>
+        <p:spPr>
+          <a:xfrm flipH="1">
+            <a:off x="2452619" y="4420922"/>
+            <a:ext cx="6055164" cy="310238"/>
+          </a:xfrm>
+          <a:prstGeom prst="line">
+            <a:avLst/>
+          </a:prstGeom>
+        </p:spPr>
+        <p:style>
+          <a:lnRef idx="1">
+            <a:schemeClr val="dk1"/>
+          </a:lnRef>
+          <a:fillRef idx="0">
+            <a:schemeClr val="dk1"/>
+          </a:fillRef>
+          <a:effectRef idx="0">
+            <a:schemeClr val="dk1"/>
+          </a:effectRef>
+          <a:fontRef idx="minor">
+            <a:schemeClr val="tx1"/>
+          </a:fontRef>
+        </p:style>
+      </p:cxnSp>
+      <p:cxnSp>
+        <p:nvCxnSpPr>
+          <p:cNvPr id="11" name="Straight Connector 10"/>
+          <p:cNvCxnSpPr/>
+          <p:nvPr/>
+        </p:nvCxnSpPr>
+        <p:spPr>
+          <a:xfrm flipH="1">
+            <a:off x="2452619" y="433412"/>
+            <a:ext cx="6055164" cy="3531845"/>
+          </a:xfrm>
+          <a:prstGeom prst="line">
+            <a:avLst/>
+          </a:prstGeom>
+        </p:spPr>
+        <p:style>
+          <a:lnRef idx="1">
+            <a:schemeClr val="dk1"/>
+          </a:lnRef>
+          <a:fillRef idx="0">
+            <a:schemeClr val="dk1"/>
+          </a:fillRef>
+          <a:effectRef idx="0">
+            <a:schemeClr val="dk1"/>
+          </a:effectRef>
+          <a:fontRef idx="minor">
+            <a:schemeClr val="tx1"/>
+          </a:fontRef>
+        </p:style>
+      </p:cxnSp>
+      <p:pic>
+        <p:nvPicPr>
+          <p:cNvPr id="2" name="Picture 1" descr="2015-10-07 15_33_22-H66668.P001  _  Granlund Designer®.png"/>
+          <p:cNvPicPr>
+            <a:picLocks noChangeAspect="1"/>
+          </p:cNvPicPr>
+          <p:nvPr/>
+        </p:nvPicPr>
+        <p:blipFill>
+          <a:blip r:embed="rId3">
+            <a:extLst>
+              <a:ext uri="{BEBA8EAE-BF5A-486C-A8C5-ECC9F3942E4B}">
+                <a14:imgProps xmlns:a14="http://schemas.microsoft.com/office/drawing/2010/main">
+                  <a14:imgLayer r:embed="rId4">
+                    <a14:imgEffect>
+                      <a14:saturation sat="0"/>
+                    </a14:imgEffect>
+                  </a14:imgLayer>
+                </a14:imgProps>
+              </a:ext>
+              <a:ext uri="{28A0092B-C50C-407E-A947-70E740481C1C}">
+                <a14:useLocalDpi xmlns:a14="http://schemas.microsoft.com/office/drawing/2010/main" val="0"/>
+              </a:ext>
+            </a:extLst>
+          </a:blip>
+          <a:stretch>
+            <a:fillRect/>
+          </a:stretch>
+        </p:blipFill>
+        <p:spPr>
+          <a:xfrm>
+            <a:off x="3745253" y="433410"/>
+            <a:ext cx="4762530" cy="3987510"/>
+          </a:xfrm>
+          <a:prstGeom prst="rect">
+            <a:avLst/>
+          </a:prstGeom>
+        </p:spPr>
+      </p:pic>
+    </p:spTree>
+    <p:extLst>
+      <p:ext uri="{BB962C8B-B14F-4D97-AF65-F5344CB8AC3E}">
+        <p14:creationId xmlns:p14="http://schemas.microsoft.com/office/powerpoint/2010/main" val="3833624137"/>
+      </p:ext>
+    </p:extLst>
+  </p:cSld>
+  <p:clrMapOvr>
+    <a:masterClrMapping/>
+  </p:clrMapOvr>
+  <mc:AlternateContent xmlns:mc="http://schemas.openxmlformats.org/markup-compatibility/2006" xmlns:p14="http://schemas.microsoft.com/office/powerpoint/2010/main">
+    <mc:Choice Requires="p14">
+      <p:transition spd="slow" p14:dur="2000"/>
+    </mc:Choice>
+    <mc:Fallback xmlns="">
+      <p:transition xmlns:p14="http://schemas.microsoft.com/office/powerpoint/2010/main" spd="slow"/>
+    </mc:Fallback>
+  </mc:AlternateContent>
+  <p:timing>
+    <p:tnLst>
+      <p:par>
+        <p:cTn xmlns:p14="http://schemas.microsoft.com/office/powerpoint/2010/main" id="1" dur="indefinite" restart="never" nodeType="tmRoot"/>
+      </p:par>
+    </p:tnLst>
+  </p:timing>
+</p:sld>
+</file>
+
+<file path=ppt/slides/slide40.xml><?xml version="1.0" encoding="utf-8"?>
 <p:sld xmlns:a="http://schemas.openxmlformats.org/drawingml/2006/main" xmlns:r="http://schemas.openxmlformats.org/officeDocument/2006/relationships" xmlns:p="http://schemas.openxmlformats.org/presentationml/2006/main">
   <p:cSld>
     <p:spTree>
@@ -12435,210 +12845,6 @@
             </p:audio>
           </p:childTnLst>
         </p:cTn>
-      </p:par>
-    </p:tnLst>
-  </p:timing>
-</p:sld>
-</file>
-
-<file path=ppt/slides/slide4.xml><?xml version="1.0" encoding="utf-8"?>
-<p:sld xmlns:a="http://schemas.openxmlformats.org/drawingml/2006/main" xmlns:r="http://schemas.openxmlformats.org/officeDocument/2006/relationships" xmlns:p="http://schemas.openxmlformats.org/presentationml/2006/main">
-  <p:cSld>
-    <p:spTree>
-      <p:nvGrpSpPr>
-        <p:cNvPr id="1" name=""/>
-        <p:cNvGrpSpPr/>
-        <p:nvPr/>
-      </p:nvGrpSpPr>
-      <p:grpSpPr>
-        <a:xfrm>
-          <a:off x="0" y="0"/>
-          <a:ext cx="0" cy="0"/>
-          <a:chOff x="0" y="0"/>
-          <a:chExt cx="0" cy="0"/>
-        </a:xfrm>
-      </p:grpSpPr>
-      <p:pic>
-        <p:nvPicPr>
-          <p:cNvPr id="4" name="Picture 3" descr="Developer.png"/>
-          <p:cNvPicPr>
-            <a:picLocks noChangeAspect="1"/>
-          </p:cNvPicPr>
-          <p:nvPr/>
-        </p:nvPicPr>
-        <p:blipFill>
-          <a:blip r:embed="rId2">
-            <a:extLst>
-              <a:ext uri="{28A0092B-C50C-407E-A947-70E740481C1C}">
-                <a14:useLocalDpi xmlns:a14="http://schemas.microsoft.com/office/drawing/2010/main" val="0"/>
-              </a:ext>
-            </a:extLst>
-          </a:blip>
-          <a:stretch>
-            <a:fillRect/>
-          </a:stretch>
-        </p:blipFill>
-        <p:spPr>
-          <a:xfrm>
-            <a:off x="927253" y="3716949"/>
-            <a:ext cx="2338283" cy="2775004"/>
-          </a:xfrm>
-          <a:prstGeom prst="rect">
-            <a:avLst/>
-          </a:prstGeom>
-        </p:spPr>
-      </p:pic>
-      <p:cxnSp>
-        <p:nvCxnSpPr>
-          <p:cNvPr id="5" name="Straight Connector 4"/>
-          <p:cNvCxnSpPr/>
-          <p:nvPr/>
-        </p:nvCxnSpPr>
-        <p:spPr>
-          <a:xfrm flipV="1">
-            <a:off x="1667393" y="433412"/>
-            <a:ext cx="2077860" cy="3531845"/>
-          </a:xfrm>
-          <a:prstGeom prst="line">
-            <a:avLst/>
-          </a:prstGeom>
-        </p:spPr>
-        <p:style>
-          <a:lnRef idx="1">
-            <a:schemeClr val="dk1"/>
-          </a:lnRef>
-          <a:fillRef idx="0">
-            <a:schemeClr val="dk1"/>
-          </a:fillRef>
-          <a:effectRef idx="0">
-            <a:schemeClr val="dk1"/>
-          </a:effectRef>
-          <a:fontRef idx="minor">
-            <a:schemeClr val="tx1"/>
-          </a:fontRef>
-        </p:style>
-      </p:cxnSp>
-      <p:cxnSp>
-        <p:nvCxnSpPr>
-          <p:cNvPr id="7" name="Straight Connector 6"/>
-          <p:cNvCxnSpPr/>
-          <p:nvPr/>
-        </p:nvCxnSpPr>
-        <p:spPr>
-          <a:xfrm flipH="1">
-            <a:off x="2452619" y="4420922"/>
-            <a:ext cx="6055164" cy="310238"/>
-          </a:xfrm>
-          <a:prstGeom prst="line">
-            <a:avLst/>
-          </a:prstGeom>
-        </p:spPr>
-        <p:style>
-          <a:lnRef idx="1">
-            <a:schemeClr val="dk1"/>
-          </a:lnRef>
-          <a:fillRef idx="0">
-            <a:schemeClr val="dk1"/>
-          </a:fillRef>
-          <a:effectRef idx="0">
-            <a:schemeClr val="dk1"/>
-          </a:effectRef>
-          <a:fontRef idx="minor">
-            <a:schemeClr val="tx1"/>
-          </a:fontRef>
-        </p:style>
-      </p:cxnSp>
-      <p:cxnSp>
-        <p:nvCxnSpPr>
-          <p:cNvPr id="11" name="Straight Connector 10"/>
-          <p:cNvCxnSpPr/>
-          <p:nvPr/>
-        </p:nvCxnSpPr>
-        <p:spPr>
-          <a:xfrm flipH="1">
-            <a:off x="2452619" y="433412"/>
-            <a:ext cx="6055164" cy="3531845"/>
-          </a:xfrm>
-          <a:prstGeom prst="line">
-            <a:avLst/>
-          </a:prstGeom>
-        </p:spPr>
-        <p:style>
-          <a:lnRef idx="1">
-            <a:schemeClr val="dk1"/>
-          </a:lnRef>
-          <a:fillRef idx="0">
-            <a:schemeClr val="dk1"/>
-          </a:fillRef>
-          <a:effectRef idx="0">
-            <a:schemeClr val="dk1"/>
-          </a:effectRef>
-          <a:fontRef idx="minor">
-            <a:schemeClr val="tx1"/>
-          </a:fontRef>
-        </p:style>
-      </p:cxnSp>
-      <p:pic>
-        <p:nvPicPr>
-          <p:cNvPr id="2" name="Picture 1" descr="2015-10-07 15_33_22-H66668.P001  _  Granlund Designer®.png"/>
-          <p:cNvPicPr>
-            <a:picLocks noChangeAspect="1"/>
-          </p:cNvPicPr>
-          <p:nvPr/>
-        </p:nvPicPr>
-        <p:blipFill>
-          <a:blip r:embed="rId3">
-            <a:extLst>
-              <a:ext uri="{BEBA8EAE-BF5A-486C-A8C5-ECC9F3942E4B}">
-                <a14:imgProps xmlns:a14="http://schemas.microsoft.com/office/drawing/2010/main">
-                  <a14:imgLayer r:embed="rId4">
-                    <a14:imgEffect>
-                      <a14:saturation sat="0"/>
-                    </a14:imgEffect>
-                  </a14:imgLayer>
-                </a14:imgProps>
-              </a:ext>
-              <a:ext uri="{28A0092B-C50C-407E-A947-70E740481C1C}">
-                <a14:useLocalDpi xmlns:a14="http://schemas.microsoft.com/office/drawing/2010/main" val="0"/>
-              </a:ext>
-            </a:extLst>
-          </a:blip>
-          <a:stretch>
-            <a:fillRect/>
-          </a:stretch>
-        </p:blipFill>
-        <p:spPr>
-          <a:xfrm>
-            <a:off x="3745253" y="433410"/>
-            <a:ext cx="4762530" cy="3987510"/>
-          </a:xfrm>
-          <a:prstGeom prst="rect">
-            <a:avLst/>
-          </a:prstGeom>
-        </p:spPr>
-      </p:pic>
-    </p:spTree>
-    <p:extLst>
-      <p:ext uri="{BB962C8B-B14F-4D97-AF65-F5344CB8AC3E}">
-        <p14:creationId xmlns:p14="http://schemas.microsoft.com/office/powerpoint/2010/main" val="3833624137"/>
-      </p:ext>
-    </p:extLst>
-  </p:cSld>
-  <p:clrMapOvr>
-    <a:masterClrMapping/>
-  </p:clrMapOvr>
-  <mc:AlternateContent xmlns:mc="http://schemas.openxmlformats.org/markup-compatibility/2006" xmlns:p14="http://schemas.microsoft.com/office/powerpoint/2010/main">
-    <mc:Choice Requires="p14">
-      <p:transition spd="slow" p14:dur="2000"/>
-    </mc:Choice>
-    <mc:Fallback xmlns="">
-      <p:transition xmlns:p14="http://schemas.microsoft.com/office/powerpoint/2010/main" spd="slow"/>
-    </mc:Fallback>
-  </mc:AlternateContent>
-  <p:timing>
-    <p:tnLst>
-      <p:par>
-        <p:cTn xmlns:p14="http://schemas.microsoft.com/office/powerpoint/2010/main" id="1" dur="indefinite" restart="never" nodeType="tmRoot"/>
       </p:par>
     </p:tnLst>
   </p:timing>

</xml_diff>

<commit_message>
Added twitter handles to lessons learned
</commit_message>
<xml_diff>
--- a/Tales from Tester Developer Collaboration.pptx
+++ b/Tales from Tester Developer Collaboration.pptx
@@ -5,7 +5,7 @@
     <p:sldMasterId id="2147483648" r:id="rId1"/>
   </p:sldMasterIdLst>
   <p:notesMasterIdLst>
-    <p:notesMasterId r:id="rId42"/>
+    <p:notesMasterId r:id="rId40"/>
   </p:notesMasterIdLst>
   <p:sldIdLst>
     <p:sldId id="275" r:id="rId2"/>
@@ -45,9 +45,7 @@
     <p:sldId id="273" r:id="rId36"/>
     <p:sldId id="274" r:id="rId37"/>
     <p:sldId id="287" r:id="rId38"/>
-    <p:sldId id="288" r:id="rId39"/>
-    <p:sldId id="289" r:id="rId40"/>
-    <p:sldId id="272" r:id="rId41"/>
+    <p:sldId id="272" r:id="rId39"/>
   </p:sldIdLst>
   <p:sldSz cx="9144000" cy="6858000" type="screen4x3"/>
   <p:notesSz cx="6858000" cy="9144000"/>
@@ -231,7 +229,7 @@
           <a:p>
             <a:fld id="{378E7EDD-6406-4A41-9393-8F7AD46F97CF}" type="datetimeFigureOut">
               <a:rPr lang="en-US" smtClean="0"/>
-              <a:t>4/22/16</a:t>
+              <a:t>4/23/16</a:t>
             </a:fld>
             <a:endParaRPr lang="en-US"/>
           </a:p>
@@ -718,174 +716,6 @@
 </p:notes>
 </file>
 
-<file path=ppt/notesSlides/notesSlide3.xml><?xml version="1.0" encoding="utf-8"?>
-<p:notes xmlns:a="http://schemas.openxmlformats.org/drawingml/2006/main" xmlns:r="http://schemas.openxmlformats.org/officeDocument/2006/relationships" xmlns:p="http://schemas.openxmlformats.org/presentationml/2006/main">
-  <p:cSld>
-    <p:spTree>
-      <p:nvGrpSpPr>
-        <p:cNvPr id="1" name=""/>
-        <p:cNvGrpSpPr/>
-        <p:nvPr/>
-      </p:nvGrpSpPr>
-      <p:grpSpPr>
-        <a:xfrm>
-          <a:off x="0" y="0"/>
-          <a:ext cx="0" cy="0"/>
-          <a:chOff x="0" y="0"/>
-          <a:chExt cx="0" cy="0"/>
-        </a:xfrm>
-      </p:grpSpPr>
-      <p:sp>
-        <p:nvSpPr>
-          <p:cNvPr id="2" name="Slide Image Placeholder 1"/>
-          <p:cNvSpPr>
-            <a:spLocks noGrp="1" noRot="1" noChangeAspect="1"/>
-          </p:cNvSpPr>
-          <p:nvPr>
-            <p:ph type="sldImg"/>
-          </p:nvPr>
-        </p:nvSpPr>
-        <p:spPr/>
-      </p:sp>
-      <p:sp>
-        <p:nvSpPr>
-          <p:cNvPr id="3" name="Notes Placeholder 2"/>
-          <p:cNvSpPr>
-            <a:spLocks noGrp="1"/>
-          </p:cNvSpPr>
-          <p:nvPr>
-            <p:ph type="body" idx="1"/>
-          </p:nvPr>
-        </p:nvSpPr>
-        <p:spPr/>
-        <p:txBody>
-          <a:bodyPr/>
-          <a:lstStyle/>
-          <a:p>
-            <a:endParaRPr lang="en-US"/>
-          </a:p>
-        </p:txBody>
-      </p:sp>
-      <p:sp>
-        <p:nvSpPr>
-          <p:cNvPr id="4" name="Slide Number Placeholder 3"/>
-          <p:cNvSpPr>
-            <a:spLocks noGrp="1"/>
-          </p:cNvSpPr>
-          <p:nvPr>
-            <p:ph type="sldNum" sz="quarter" idx="10"/>
-          </p:nvPr>
-        </p:nvSpPr>
-        <p:spPr/>
-        <p:txBody>
-          <a:bodyPr/>
-          <a:lstStyle/>
-          <a:p>
-            <a:fld id="{6C157C8D-6C9C-3F41-A598-90F2004D4917}" type="slidenum">
-              <a:rPr lang="en-US" smtClean="0"/>
-              <a:t>38</a:t>
-            </a:fld>
-            <a:endParaRPr lang="en-US"/>
-          </a:p>
-        </p:txBody>
-      </p:sp>
-    </p:spTree>
-    <p:extLst>
-      <p:ext uri="{BB962C8B-B14F-4D97-AF65-F5344CB8AC3E}">
-        <p14:creationId xmlns:p14="http://schemas.microsoft.com/office/powerpoint/2010/main" val="1443528722"/>
-      </p:ext>
-    </p:extLst>
-  </p:cSld>
-  <p:clrMapOvr>
-    <a:masterClrMapping/>
-  </p:clrMapOvr>
-</p:notes>
-</file>
-
-<file path=ppt/notesSlides/notesSlide4.xml><?xml version="1.0" encoding="utf-8"?>
-<p:notes xmlns:a="http://schemas.openxmlformats.org/drawingml/2006/main" xmlns:r="http://schemas.openxmlformats.org/officeDocument/2006/relationships" xmlns:p="http://schemas.openxmlformats.org/presentationml/2006/main">
-  <p:cSld>
-    <p:spTree>
-      <p:nvGrpSpPr>
-        <p:cNvPr id="1" name=""/>
-        <p:cNvGrpSpPr/>
-        <p:nvPr/>
-      </p:nvGrpSpPr>
-      <p:grpSpPr>
-        <a:xfrm>
-          <a:off x="0" y="0"/>
-          <a:ext cx="0" cy="0"/>
-          <a:chOff x="0" y="0"/>
-          <a:chExt cx="0" cy="0"/>
-        </a:xfrm>
-      </p:grpSpPr>
-      <p:sp>
-        <p:nvSpPr>
-          <p:cNvPr id="2" name="Slide Image Placeholder 1"/>
-          <p:cNvSpPr>
-            <a:spLocks noGrp="1" noRot="1" noChangeAspect="1"/>
-          </p:cNvSpPr>
-          <p:nvPr>
-            <p:ph type="sldImg"/>
-          </p:nvPr>
-        </p:nvSpPr>
-        <p:spPr/>
-      </p:sp>
-      <p:sp>
-        <p:nvSpPr>
-          <p:cNvPr id="3" name="Notes Placeholder 2"/>
-          <p:cNvSpPr>
-            <a:spLocks noGrp="1"/>
-          </p:cNvSpPr>
-          <p:nvPr>
-            <p:ph type="body" idx="1"/>
-          </p:nvPr>
-        </p:nvSpPr>
-        <p:spPr/>
-        <p:txBody>
-          <a:bodyPr/>
-          <a:lstStyle/>
-          <a:p>
-            <a:endParaRPr lang="en-US"/>
-          </a:p>
-        </p:txBody>
-      </p:sp>
-      <p:sp>
-        <p:nvSpPr>
-          <p:cNvPr id="4" name="Slide Number Placeholder 3"/>
-          <p:cNvSpPr>
-            <a:spLocks noGrp="1"/>
-          </p:cNvSpPr>
-          <p:nvPr>
-            <p:ph type="sldNum" sz="quarter" idx="10"/>
-          </p:nvPr>
-        </p:nvSpPr>
-        <p:spPr/>
-        <p:txBody>
-          <a:bodyPr/>
-          <a:lstStyle/>
-          <a:p>
-            <a:fld id="{6C157C8D-6C9C-3F41-A598-90F2004D4917}" type="slidenum">
-              <a:rPr lang="en-US" smtClean="0"/>
-              <a:t>39</a:t>
-            </a:fld>
-            <a:endParaRPr lang="en-US"/>
-          </a:p>
-        </p:txBody>
-      </p:sp>
-    </p:spTree>
-    <p:extLst>
-      <p:ext uri="{BB962C8B-B14F-4D97-AF65-F5344CB8AC3E}">
-        <p14:creationId xmlns:p14="http://schemas.microsoft.com/office/powerpoint/2010/main" val="1443528722"/>
-      </p:ext>
-    </p:extLst>
-  </p:cSld>
-  <p:clrMapOvr>
-    <a:masterClrMapping/>
-  </p:clrMapOvr>
-</p:notes>
-</file>
-
 <file path=ppt/slideLayouts/slideLayout1.xml><?xml version="1.0" encoding="utf-8"?>
 <p:sldLayout xmlns:a="http://schemas.openxmlformats.org/drawingml/2006/main" xmlns:r="http://schemas.openxmlformats.org/officeDocument/2006/relationships" xmlns:p="http://schemas.openxmlformats.org/presentationml/2006/main" type="title" preserve="1">
   <p:cSld name="Title Slide">
@@ -1067,7 +897,7 @@
           <a:p>
             <a:fld id="{B7CABD0F-E43C-9343-80E3-B733E3541CC1}" type="datetimeFigureOut">
               <a:rPr lang="en-US" smtClean="0"/>
-              <a:t>4/22/16</a:t>
+              <a:t>4/23/16</a:t>
             </a:fld>
             <a:endParaRPr lang="en-US"/>
           </a:p>
@@ -1245,7 +1075,7 @@
           <a:p>
             <a:fld id="{B7CABD0F-E43C-9343-80E3-B733E3541CC1}" type="datetimeFigureOut">
               <a:rPr lang="en-US" smtClean="0"/>
-              <a:t>4/22/16</a:t>
+              <a:t>4/23/16</a:t>
             </a:fld>
             <a:endParaRPr lang="en-US"/>
           </a:p>
@@ -1433,7 +1263,7 @@
           <a:p>
             <a:fld id="{B7CABD0F-E43C-9343-80E3-B733E3541CC1}" type="datetimeFigureOut">
               <a:rPr lang="en-US" smtClean="0"/>
-              <a:t>4/22/16</a:t>
+              <a:t>4/23/16</a:t>
             </a:fld>
             <a:endParaRPr lang="en-US"/>
           </a:p>
@@ -1611,7 +1441,7 @@
           <a:p>
             <a:fld id="{B7CABD0F-E43C-9343-80E3-B733E3541CC1}" type="datetimeFigureOut">
               <a:rPr lang="en-US" smtClean="0"/>
-              <a:t>4/22/16</a:t>
+              <a:t>4/23/16</a:t>
             </a:fld>
             <a:endParaRPr lang="en-US"/>
           </a:p>
@@ -1865,7 +1695,7 @@
           <a:p>
             <a:fld id="{B7CABD0F-E43C-9343-80E3-B733E3541CC1}" type="datetimeFigureOut">
               <a:rPr lang="en-US" smtClean="0"/>
-              <a:t>4/22/16</a:t>
+              <a:t>4/23/16</a:t>
             </a:fld>
             <a:endParaRPr lang="en-US"/>
           </a:p>
@@ -2161,7 +1991,7 @@
           <a:p>
             <a:fld id="{B7CABD0F-E43C-9343-80E3-B733E3541CC1}" type="datetimeFigureOut">
               <a:rPr lang="en-US" smtClean="0"/>
-              <a:t>4/22/16</a:t>
+              <a:t>4/23/16</a:t>
             </a:fld>
             <a:endParaRPr lang="en-US"/>
           </a:p>
@@ -2591,7 +2421,7 @@
           <a:p>
             <a:fld id="{B7CABD0F-E43C-9343-80E3-B733E3541CC1}" type="datetimeFigureOut">
               <a:rPr lang="en-US" smtClean="0"/>
-              <a:t>4/22/16</a:t>
+              <a:t>4/23/16</a:t>
             </a:fld>
             <a:endParaRPr lang="en-US"/>
           </a:p>
@@ -2717,7 +2547,7 @@
           <a:p>
             <a:fld id="{B7CABD0F-E43C-9343-80E3-B733E3541CC1}" type="datetimeFigureOut">
               <a:rPr lang="en-US" smtClean="0"/>
-              <a:t>4/22/16</a:t>
+              <a:t>4/23/16</a:t>
             </a:fld>
             <a:endParaRPr lang="en-US"/>
           </a:p>
@@ -2820,7 +2650,7 @@
           <a:p>
             <a:fld id="{B7CABD0F-E43C-9343-80E3-B733E3541CC1}" type="datetimeFigureOut">
               <a:rPr lang="en-US" smtClean="0"/>
-              <a:t>4/22/16</a:t>
+              <a:t>4/23/16</a:t>
             </a:fld>
             <a:endParaRPr lang="en-US"/>
           </a:p>
@@ -3105,7 +2935,7 @@
           <a:p>
             <a:fld id="{B7CABD0F-E43C-9343-80E3-B733E3541CC1}" type="datetimeFigureOut">
               <a:rPr lang="en-US" smtClean="0"/>
-              <a:t>4/22/16</a:t>
+              <a:t>4/23/16</a:t>
             </a:fld>
             <a:endParaRPr lang="en-US"/>
           </a:p>
@@ -3366,7 +3196,7 @@
           <a:p>
             <a:fld id="{B7CABD0F-E43C-9343-80E3-B733E3541CC1}" type="datetimeFigureOut">
               <a:rPr lang="en-US" smtClean="0"/>
-              <a:t>4/22/16</a:t>
+              <a:t>4/23/16</a:t>
             </a:fld>
             <a:endParaRPr lang="en-US"/>
           </a:p>
@@ -3587,7 +3417,7 @@
           <a:p>
             <a:fld id="{B7CABD0F-E43C-9343-80E3-B733E3541CC1}" type="datetimeFigureOut">
               <a:rPr lang="en-US" smtClean="0"/>
-              <a:t>4/22/16</a:t>
+              <a:t>4/23/16</a:t>
             </a:fld>
             <a:endParaRPr lang="en-US"/>
           </a:p>
@@ -4476,11 +4306,7 @@
             </a:r>
             <a:r>
               <a:rPr lang="en-US" b="1" dirty="0" smtClean="0"/>
-              <a:t> </a:t>
-            </a:r>
-            <a:r>
-              <a:rPr lang="en-US" b="1" dirty="0" smtClean="0"/>
-              <a:t>building wrong thing</a:t>
+              <a:t> building wrong thing</a:t>
             </a:r>
             <a:br>
               <a:rPr lang="en-US" b="1" dirty="0" smtClean="0"/>
@@ -4505,6 +4331,64 @@
               <a:t> fixing</a:t>
             </a:r>
             <a:endParaRPr lang="en-US" b="1" dirty="0"/>
+          </a:p>
+        </p:txBody>
+      </p:sp>
+      <p:sp>
+        <p:nvSpPr>
+          <p:cNvPr id="3" name="TextBox 2"/>
+          <p:cNvSpPr txBox="1"/>
+          <p:nvPr/>
+        </p:nvSpPr>
+        <p:spPr>
+          <a:xfrm>
+            <a:off x="6779451" y="6273224"/>
+            <a:ext cx="2364549" cy="584776"/>
+          </a:xfrm>
+          <a:prstGeom prst="rect">
+            <a:avLst/>
+          </a:prstGeom>
+          <a:noFill/>
+        </p:spPr>
+        <p:txBody>
+          <a:bodyPr wrap="none" rtlCol="0">
+            <a:spAutoFit/>
+          </a:bodyPr>
+          <a:lstStyle/>
+          <a:p>
+            <a:r>
+              <a:rPr lang="en-US" sz="3200" b="1" dirty="0" smtClean="0">
+                <a:solidFill>
+                  <a:schemeClr val="bg1">
+                    <a:lumMod val="75000"/>
+                  </a:schemeClr>
+                </a:solidFill>
+                <a:latin typeface="Arial Black"/>
+                <a:cs typeface="Arial Black"/>
+              </a:rPr>
+              <a:t>@</a:t>
+            </a:r>
+            <a:r>
+              <a:rPr lang="en-US" sz="3200" b="1" dirty="0" err="1" smtClean="0">
+                <a:solidFill>
+                  <a:schemeClr val="bg1">
+                    <a:lumMod val="75000"/>
+                  </a:schemeClr>
+                </a:solidFill>
+                <a:latin typeface="Arial Black"/>
+                <a:cs typeface="Arial Black"/>
+              </a:rPr>
+              <a:t>maaretp</a:t>
+            </a:r>
+            <a:endParaRPr lang="en-US" sz="3200" b="1" dirty="0">
+              <a:solidFill>
+                <a:schemeClr val="bg1">
+                  <a:lumMod val="75000"/>
+                </a:schemeClr>
+              </a:solidFill>
+              <a:latin typeface="Arial Black"/>
+              <a:cs typeface="Arial Black"/>
+            </a:endParaRPr>
           </a:p>
         </p:txBody>
       </p:sp>
@@ -4629,6 +4513,53 @@
           </a:p>
         </p:txBody>
       </p:sp>
+      <p:sp>
+        <p:nvSpPr>
+          <p:cNvPr id="3" name="TextBox 2"/>
+          <p:cNvSpPr txBox="1"/>
+          <p:nvPr/>
+        </p:nvSpPr>
+        <p:spPr>
+          <a:xfrm>
+            <a:off x="5289459" y="6273224"/>
+            <a:ext cx="3854541" cy="584776"/>
+          </a:xfrm>
+          <a:prstGeom prst="rect">
+            <a:avLst/>
+          </a:prstGeom>
+          <a:noFill/>
+        </p:spPr>
+        <p:txBody>
+          <a:bodyPr wrap="none" rtlCol="0">
+            <a:spAutoFit/>
+          </a:bodyPr>
+          <a:lstStyle/>
+          <a:p>
+            <a:pPr algn="r"/>
+            <a:r>
+              <a:rPr lang="en-US" sz="3200" b="1" dirty="0" smtClean="0">
+                <a:solidFill>
+                  <a:schemeClr val="bg1">
+                    <a:lumMod val="75000"/>
+                  </a:schemeClr>
+                </a:solidFill>
+                <a:latin typeface="Arial Black"/>
+                <a:cs typeface="Arial Black"/>
+              </a:rPr>
+              <a:t>@LlewellynFalco</a:t>
+            </a:r>
+            <a:endParaRPr lang="en-US" sz="3200" b="1" dirty="0">
+              <a:solidFill>
+                <a:schemeClr val="bg1">
+                  <a:lumMod val="75000"/>
+                </a:schemeClr>
+              </a:solidFill>
+              <a:latin typeface="Arial Black"/>
+              <a:cs typeface="Arial Black"/>
+            </a:endParaRPr>
+          </a:p>
+        </p:txBody>
+      </p:sp>
     </p:spTree>
     <p:extLst>
       <p:ext uri="{BB962C8B-B14F-4D97-AF65-F5344CB8AC3E}">
@@ -4712,6 +4643,64 @@
           </a:p>
         </p:txBody>
       </p:sp>
+      <p:sp>
+        <p:nvSpPr>
+          <p:cNvPr id="5" name="TextBox 4"/>
+          <p:cNvSpPr txBox="1"/>
+          <p:nvPr/>
+        </p:nvSpPr>
+        <p:spPr>
+          <a:xfrm>
+            <a:off x="6779451" y="6273224"/>
+            <a:ext cx="2364549" cy="584776"/>
+          </a:xfrm>
+          <a:prstGeom prst="rect">
+            <a:avLst/>
+          </a:prstGeom>
+          <a:noFill/>
+        </p:spPr>
+        <p:txBody>
+          <a:bodyPr wrap="none" rtlCol="0">
+            <a:spAutoFit/>
+          </a:bodyPr>
+          <a:lstStyle/>
+          <a:p>
+            <a:r>
+              <a:rPr lang="en-US" sz="3200" b="1" dirty="0" smtClean="0">
+                <a:solidFill>
+                  <a:schemeClr val="bg1">
+                    <a:lumMod val="75000"/>
+                  </a:schemeClr>
+                </a:solidFill>
+                <a:latin typeface="Arial Black"/>
+                <a:cs typeface="Arial Black"/>
+              </a:rPr>
+              <a:t>@</a:t>
+            </a:r>
+            <a:r>
+              <a:rPr lang="en-US" sz="3200" b="1" dirty="0" err="1" smtClean="0">
+                <a:solidFill>
+                  <a:schemeClr val="bg1">
+                    <a:lumMod val="75000"/>
+                  </a:schemeClr>
+                </a:solidFill>
+                <a:latin typeface="Arial Black"/>
+                <a:cs typeface="Arial Black"/>
+              </a:rPr>
+              <a:t>maaretp</a:t>
+            </a:r>
+            <a:endParaRPr lang="en-US" sz="3200" b="1" dirty="0">
+              <a:solidFill>
+                <a:schemeClr val="bg1">
+                  <a:lumMod val="75000"/>
+                </a:schemeClr>
+              </a:solidFill>
+              <a:latin typeface="Arial Black"/>
+              <a:cs typeface="Arial Black"/>
+            </a:endParaRPr>
+          </a:p>
+        </p:txBody>
+      </p:sp>
     </p:spTree>
     <p:extLst>
       <p:ext uri="{BB962C8B-B14F-4D97-AF65-F5344CB8AC3E}">
@@ -5138,10 +5127,63 @@
               </a:rPr>
               <a:t>trust</a:t>
             </a:r>
-            <a:endParaRPr lang="en-US" b="1" dirty="0">
+          </a:p>
+        </p:txBody>
+      </p:sp>
+      <p:sp>
+        <p:nvSpPr>
+          <p:cNvPr id="3" name="TextBox 2"/>
+          <p:cNvSpPr txBox="1"/>
+          <p:nvPr/>
+        </p:nvSpPr>
+        <p:spPr>
+          <a:xfrm>
+            <a:off x="6779451" y="6273224"/>
+            <a:ext cx="2364549" cy="584776"/>
+          </a:xfrm>
+          <a:prstGeom prst="rect">
+            <a:avLst/>
+          </a:prstGeom>
+          <a:noFill/>
+        </p:spPr>
+        <p:txBody>
+          <a:bodyPr wrap="none" rtlCol="0">
+            <a:spAutoFit/>
+          </a:bodyPr>
+          <a:lstStyle/>
+          <a:p>
+            <a:r>
+              <a:rPr lang="en-US" sz="3200" b="1" dirty="0" smtClean="0">
+                <a:solidFill>
+                  <a:schemeClr val="bg1">
+                    <a:lumMod val="75000"/>
+                  </a:schemeClr>
+                </a:solidFill>
+                <a:latin typeface="Arial Black"/>
+                <a:cs typeface="Arial Black"/>
+              </a:rPr>
+              <a:t>@</a:t>
+            </a:r>
+            <a:r>
+              <a:rPr lang="en-US" sz="3200" b="1" dirty="0" err="1" smtClean="0">
+                <a:solidFill>
+                  <a:schemeClr val="bg1">
+                    <a:lumMod val="75000"/>
+                  </a:schemeClr>
+                </a:solidFill>
+                <a:latin typeface="Arial Black"/>
+                <a:cs typeface="Arial Black"/>
+              </a:rPr>
+              <a:t>maaretp</a:t>
+            </a:r>
+            <a:endParaRPr lang="en-US" sz="3200" b="1" dirty="0">
               <a:solidFill>
-                <a:srgbClr val="0000FF"/>
+                <a:schemeClr val="bg1">
+                  <a:lumMod val="75000"/>
+                </a:schemeClr>
               </a:solidFill>
+              <a:latin typeface="Arial Black"/>
+              <a:cs typeface="Arial Black"/>
             </a:endParaRPr>
           </a:p>
         </p:txBody>
@@ -5842,6 +5884,53 @@
           </a:p>
         </p:txBody>
       </p:sp>
+      <p:sp>
+        <p:nvSpPr>
+          <p:cNvPr id="3" name="TextBox 2"/>
+          <p:cNvSpPr txBox="1"/>
+          <p:nvPr/>
+        </p:nvSpPr>
+        <p:spPr>
+          <a:xfrm>
+            <a:off x="5289459" y="6273224"/>
+            <a:ext cx="3854541" cy="584776"/>
+          </a:xfrm>
+          <a:prstGeom prst="rect">
+            <a:avLst/>
+          </a:prstGeom>
+          <a:noFill/>
+        </p:spPr>
+        <p:txBody>
+          <a:bodyPr wrap="none" rtlCol="0">
+            <a:spAutoFit/>
+          </a:bodyPr>
+          <a:lstStyle/>
+          <a:p>
+            <a:pPr algn="r"/>
+            <a:r>
+              <a:rPr lang="en-US" sz="3200" b="1" dirty="0" smtClean="0">
+                <a:solidFill>
+                  <a:schemeClr val="bg1">
+                    <a:lumMod val="75000"/>
+                  </a:schemeClr>
+                </a:solidFill>
+                <a:latin typeface="Arial Black"/>
+                <a:cs typeface="Arial Black"/>
+              </a:rPr>
+              <a:t>@LlewellynFalco</a:t>
+            </a:r>
+            <a:endParaRPr lang="en-US" sz="3200" b="1" dirty="0">
+              <a:solidFill>
+                <a:schemeClr val="bg1">
+                  <a:lumMod val="75000"/>
+                </a:schemeClr>
+              </a:solidFill>
+              <a:latin typeface="Arial Black"/>
+              <a:cs typeface="Arial Black"/>
+            </a:endParaRPr>
+          </a:p>
+        </p:txBody>
+      </p:sp>
     </p:spTree>
     <p:extLst>
       <p:ext uri="{BB962C8B-B14F-4D97-AF65-F5344CB8AC3E}">
@@ -6076,11 +6165,7 @@
           <a:p>
             <a:r>
               <a:rPr lang="en-US" dirty="0" smtClean="0"/>
-              <a:t>Exploratory </a:t>
-            </a:r>
-            <a:r>
-              <a:rPr lang="en-US" dirty="0" smtClean="0"/>
-              <a:t>Testing </a:t>
+              <a:t>Exploratory Testing </a:t>
             </a:r>
             <a:r>
               <a:rPr lang="en-US" dirty="0" err="1" smtClean="0"/>
@@ -6263,6 +6348,64 @@
           </a:p>
         </p:txBody>
       </p:sp>
+      <p:sp>
+        <p:nvSpPr>
+          <p:cNvPr id="3" name="TextBox 2"/>
+          <p:cNvSpPr txBox="1"/>
+          <p:nvPr/>
+        </p:nvSpPr>
+        <p:spPr>
+          <a:xfrm>
+            <a:off x="6779451" y="6273224"/>
+            <a:ext cx="2364549" cy="584776"/>
+          </a:xfrm>
+          <a:prstGeom prst="rect">
+            <a:avLst/>
+          </a:prstGeom>
+          <a:noFill/>
+        </p:spPr>
+        <p:txBody>
+          <a:bodyPr wrap="none" rtlCol="0">
+            <a:spAutoFit/>
+          </a:bodyPr>
+          <a:lstStyle/>
+          <a:p>
+            <a:r>
+              <a:rPr lang="en-US" sz="3200" b="1" dirty="0" smtClean="0">
+                <a:solidFill>
+                  <a:schemeClr val="bg1">
+                    <a:lumMod val="75000"/>
+                  </a:schemeClr>
+                </a:solidFill>
+                <a:latin typeface="Arial Black"/>
+                <a:cs typeface="Arial Black"/>
+              </a:rPr>
+              <a:t>@</a:t>
+            </a:r>
+            <a:r>
+              <a:rPr lang="en-US" sz="3200" b="1" dirty="0" err="1" smtClean="0">
+                <a:solidFill>
+                  <a:schemeClr val="bg1">
+                    <a:lumMod val="75000"/>
+                  </a:schemeClr>
+                </a:solidFill>
+                <a:latin typeface="Arial Black"/>
+                <a:cs typeface="Arial Black"/>
+              </a:rPr>
+              <a:t>maaretp</a:t>
+            </a:r>
+            <a:endParaRPr lang="en-US" sz="3200" b="1" dirty="0">
+              <a:solidFill>
+                <a:schemeClr val="bg1">
+                  <a:lumMod val="75000"/>
+                </a:schemeClr>
+              </a:solidFill>
+              <a:latin typeface="Arial Black"/>
+              <a:cs typeface="Arial Black"/>
+            </a:endParaRPr>
+          </a:p>
+        </p:txBody>
+      </p:sp>
     </p:spTree>
     <p:extLst>
       <p:ext uri="{BB962C8B-B14F-4D97-AF65-F5344CB8AC3E}">
@@ -6357,6 +6500,53 @@
               <a:solidFill>
                 <a:srgbClr val="0000FF"/>
               </a:solidFill>
+            </a:endParaRPr>
+          </a:p>
+        </p:txBody>
+      </p:sp>
+      <p:sp>
+        <p:nvSpPr>
+          <p:cNvPr id="3" name="TextBox 2"/>
+          <p:cNvSpPr txBox="1"/>
+          <p:nvPr/>
+        </p:nvSpPr>
+        <p:spPr>
+          <a:xfrm>
+            <a:off x="5289459" y="6273224"/>
+            <a:ext cx="3854541" cy="584776"/>
+          </a:xfrm>
+          <a:prstGeom prst="rect">
+            <a:avLst/>
+          </a:prstGeom>
+          <a:noFill/>
+        </p:spPr>
+        <p:txBody>
+          <a:bodyPr wrap="none" rtlCol="0">
+            <a:spAutoFit/>
+          </a:bodyPr>
+          <a:lstStyle/>
+          <a:p>
+            <a:pPr algn="r"/>
+            <a:r>
+              <a:rPr lang="en-US" sz="3200" b="1" dirty="0" smtClean="0">
+                <a:solidFill>
+                  <a:schemeClr val="bg1">
+                    <a:lumMod val="75000"/>
+                  </a:schemeClr>
+                </a:solidFill>
+                <a:latin typeface="Arial Black"/>
+                <a:cs typeface="Arial Black"/>
+              </a:rPr>
+              <a:t>@LlewellynFalco</a:t>
+            </a:r>
+            <a:endParaRPr lang="en-US" sz="3200" b="1" dirty="0">
+              <a:solidFill>
+                <a:schemeClr val="bg1">
+                  <a:lumMod val="75000"/>
+                </a:schemeClr>
+              </a:solidFill>
+              <a:latin typeface="Arial Black"/>
+              <a:cs typeface="Arial Black"/>
             </a:endParaRPr>
           </a:p>
         </p:txBody>
@@ -6589,6 +6779,64 @@
               <a:solidFill>
                 <a:srgbClr val="0000FF"/>
               </a:solidFill>
+            </a:endParaRPr>
+          </a:p>
+        </p:txBody>
+      </p:sp>
+      <p:sp>
+        <p:nvSpPr>
+          <p:cNvPr id="3" name="TextBox 2"/>
+          <p:cNvSpPr txBox="1"/>
+          <p:nvPr/>
+        </p:nvSpPr>
+        <p:spPr>
+          <a:xfrm>
+            <a:off x="6779451" y="6273224"/>
+            <a:ext cx="2364549" cy="584776"/>
+          </a:xfrm>
+          <a:prstGeom prst="rect">
+            <a:avLst/>
+          </a:prstGeom>
+          <a:noFill/>
+        </p:spPr>
+        <p:txBody>
+          <a:bodyPr wrap="none" rtlCol="0">
+            <a:spAutoFit/>
+          </a:bodyPr>
+          <a:lstStyle/>
+          <a:p>
+            <a:r>
+              <a:rPr lang="en-US" sz="3200" b="1" dirty="0" smtClean="0">
+                <a:solidFill>
+                  <a:schemeClr val="bg1">
+                    <a:lumMod val="75000"/>
+                  </a:schemeClr>
+                </a:solidFill>
+                <a:latin typeface="Arial Black"/>
+                <a:cs typeface="Arial Black"/>
+              </a:rPr>
+              <a:t>@</a:t>
+            </a:r>
+            <a:r>
+              <a:rPr lang="en-US" sz="3200" b="1" dirty="0" err="1" smtClean="0">
+                <a:solidFill>
+                  <a:schemeClr val="bg1">
+                    <a:lumMod val="75000"/>
+                  </a:schemeClr>
+                </a:solidFill>
+                <a:latin typeface="Arial Black"/>
+                <a:cs typeface="Arial Black"/>
+              </a:rPr>
+              <a:t>maaretp</a:t>
+            </a:r>
+            <a:endParaRPr lang="en-US" sz="3200" b="1" dirty="0">
+              <a:solidFill>
+                <a:schemeClr val="bg1">
+                  <a:lumMod val="75000"/>
+                </a:schemeClr>
+              </a:solidFill>
+              <a:latin typeface="Arial Black"/>
+              <a:cs typeface="Arial Black"/>
             </a:endParaRPr>
           </a:p>
         </p:txBody>
@@ -6784,6 +7032,53 @@
           </a:p>
         </p:txBody>
       </p:sp>
+      <p:sp>
+        <p:nvSpPr>
+          <p:cNvPr id="3" name="TextBox 2"/>
+          <p:cNvSpPr txBox="1"/>
+          <p:nvPr/>
+        </p:nvSpPr>
+        <p:spPr>
+          <a:xfrm>
+            <a:off x="5289459" y="6273224"/>
+            <a:ext cx="3854541" cy="584776"/>
+          </a:xfrm>
+          <a:prstGeom prst="rect">
+            <a:avLst/>
+          </a:prstGeom>
+          <a:noFill/>
+        </p:spPr>
+        <p:txBody>
+          <a:bodyPr wrap="none" rtlCol="0">
+            <a:spAutoFit/>
+          </a:bodyPr>
+          <a:lstStyle/>
+          <a:p>
+            <a:pPr algn="r"/>
+            <a:r>
+              <a:rPr lang="en-US" sz="3200" b="1" dirty="0" smtClean="0">
+                <a:solidFill>
+                  <a:schemeClr val="bg1">
+                    <a:lumMod val="75000"/>
+                  </a:schemeClr>
+                </a:solidFill>
+                <a:latin typeface="Arial Black"/>
+                <a:cs typeface="Arial Black"/>
+              </a:rPr>
+              <a:t>@LlewellynFalco</a:t>
+            </a:r>
+            <a:endParaRPr lang="en-US" sz="3200" b="1" dirty="0">
+              <a:solidFill>
+                <a:schemeClr val="bg1">
+                  <a:lumMod val="75000"/>
+                </a:schemeClr>
+              </a:solidFill>
+              <a:latin typeface="Arial Black"/>
+              <a:cs typeface="Arial Black"/>
+            </a:endParaRPr>
+          </a:p>
+        </p:txBody>
+      </p:sp>
     </p:spTree>
     <p:extLst>
       <p:ext uri="{BB962C8B-B14F-4D97-AF65-F5344CB8AC3E}">
@@ -6863,6 +7158,64 @@
               <a:solidFill>
                 <a:srgbClr val="0000FF"/>
               </a:solidFill>
+            </a:endParaRPr>
+          </a:p>
+        </p:txBody>
+      </p:sp>
+      <p:sp>
+        <p:nvSpPr>
+          <p:cNvPr id="3" name="TextBox 2"/>
+          <p:cNvSpPr txBox="1"/>
+          <p:nvPr/>
+        </p:nvSpPr>
+        <p:spPr>
+          <a:xfrm>
+            <a:off x="6779451" y="6273224"/>
+            <a:ext cx="2364549" cy="584776"/>
+          </a:xfrm>
+          <a:prstGeom prst="rect">
+            <a:avLst/>
+          </a:prstGeom>
+          <a:noFill/>
+        </p:spPr>
+        <p:txBody>
+          <a:bodyPr wrap="none" rtlCol="0">
+            <a:spAutoFit/>
+          </a:bodyPr>
+          <a:lstStyle/>
+          <a:p>
+            <a:r>
+              <a:rPr lang="en-US" sz="3200" b="1" dirty="0" smtClean="0">
+                <a:solidFill>
+                  <a:schemeClr val="bg1">
+                    <a:lumMod val="75000"/>
+                  </a:schemeClr>
+                </a:solidFill>
+                <a:latin typeface="Arial Black"/>
+                <a:cs typeface="Arial Black"/>
+              </a:rPr>
+              <a:t>@</a:t>
+            </a:r>
+            <a:r>
+              <a:rPr lang="en-US" sz="3200" b="1" dirty="0" err="1" smtClean="0">
+                <a:solidFill>
+                  <a:schemeClr val="bg1">
+                    <a:lumMod val="75000"/>
+                  </a:schemeClr>
+                </a:solidFill>
+                <a:latin typeface="Arial Black"/>
+                <a:cs typeface="Arial Black"/>
+              </a:rPr>
+              <a:t>maaretp</a:t>
+            </a:r>
+            <a:endParaRPr lang="en-US" sz="3200" b="1" dirty="0">
+              <a:solidFill>
+                <a:schemeClr val="bg1">
+                  <a:lumMod val="75000"/>
+                </a:schemeClr>
+              </a:solidFill>
+              <a:latin typeface="Arial Black"/>
+              <a:cs typeface="Arial Black"/>
             </a:endParaRPr>
           </a:p>
         </p:txBody>
@@ -10328,32 +10681,55 @@
           <a:chExt cx="0" cy="0"/>
         </a:xfrm>
       </p:grpSpPr>
-      <p:sp>
-        <p:nvSpPr>
-          <p:cNvPr id="9" name="Rounded Rectangle 8"/>
+      <p:pic>
+        <p:nvPicPr>
+          <p:cNvPr id="2" name="Picture 1"/>
+          <p:cNvPicPr>
+            <a:picLocks noChangeAspect="1"/>
+          </p:cNvPicPr>
+          <p:nvPr/>
+        </p:nvPicPr>
+        <p:blipFill>
+          <a:blip r:embed="rId2"/>
+          <a:stretch>
+            <a:fillRect/>
+          </a:stretch>
+        </p:blipFill>
+        <p:spPr>
+          <a:xfrm>
+            <a:off x="0" y="2"/>
+            <a:ext cx="9144000" cy="6858000"/>
+          </a:xfrm>
+          <a:prstGeom prst="rect">
+            <a:avLst/>
+          </a:prstGeom>
+        </p:spPr>
+      </p:pic>
+      <p:sp>
+        <p:nvSpPr>
+          <p:cNvPr id="5" name="Rectangle 4"/>
           <p:cNvSpPr/>
           <p:nvPr/>
         </p:nvSpPr>
         <p:spPr>
           <a:xfrm>
-            <a:off x="19560" y="31466"/>
-            <a:ext cx="9107732" cy="6788919"/>
-          </a:xfrm>
-          <a:prstGeom prst="roundRect">
-            <a:avLst>
-              <a:gd name="adj" fmla="val 0"/>
-            </a:avLst>
+            <a:off x="1572297" y="3886199"/>
+            <a:ext cx="6329492" cy="1535701"/>
+          </a:xfrm>
+          <a:prstGeom prst="rect">
+            <a:avLst/>
           </a:prstGeom>
           <a:solidFill>
-            <a:schemeClr val="bg1"/>
+            <a:srgbClr val="FFFFFF">
+              <a:alpha val="77000"/>
+            </a:srgbClr>
           </a:solidFill>
-          <a:ln w="19050" cmpd="sng">
+          <a:ln>
             <a:solidFill>
-              <a:schemeClr val="bg1">
-                <a:lumMod val="75000"/>
-              </a:schemeClr>
+              <a:srgbClr val="FFFFFF"/>
             </a:solidFill>
           </a:ln>
+          <a:effectLst/>
         </p:spPr>
         <p:style>
           <a:lnRef idx="1">
@@ -10370,253 +10746,39 @@
           </a:fontRef>
         </p:style>
         <p:txBody>
-          <a:bodyPr lIns="91354" tIns="45677" rIns="91354" bIns="45677" rtlCol="0" anchor="ctr"/>
+          <a:bodyPr lIns="91412" tIns="45704" rIns="91412" bIns="45704" rtlCol="0" anchor="ctr"/>
           <a:lstStyle/>
           <a:p>
             <a:pPr algn="ctr"/>
-            <a:endParaRPr lang="en-US" dirty="0">
-              <a:ln>
-                <a:solidFill>
-                  <a:schemeClr val="bg1">
-                    <a:lumMod val="75000"/>
-                  </a:schemeClr>
-                </a:solidFill>
-              </a:ln>
-            </a:endParaRPr>
-          </a:p>
-        </p:txBody>
-      </p:sp>
-      <p:sp>
-        <p:nvSpPr>
-          <p:cNvPr id="2" name="Rectangle 1"/>
+            <a:endParaRPr lang="en-US"/>
+          </a:p>
+        </p:txBody>
+      </p:sp>
+      <p:sp>
+        <p:nvSpPr>
+          <p:cNvPr id="8" name="Rectangle 7"/>
           <p:cNvSpPr/>
           <p:nvPr/>
         </p:nvSpPr>
         <p:spPr>
           <a:xfrm>
-            <a:off x="852724" y="495865"/>
-            <a:ext cx="6319851" cy="1422263"/>
-          </a:xfrm>
-          <a:prstGeom prst="rect">
-            <a:avLst/>
-          </a:prstGeom>
-        </p:spPr>
-        <p:txBody>
-          <a:bodyPr wrap="square" lIns="280748" tIns="140374" rIns="280748" bIns="140374">
-            <a:spAutoFit/>
-          </a:bodyPr>
-          <a:lstStyle/>
-          <a:p>
-            <a:pPr algn="ctr"/>
-            <a:r>
-              <a:rPr lang="en-US" sz="2500" b="1" dirty="0">
-                <a:latin typeface="News Gothic MT"/>
-                <a:cs typeface="News Gothic MT"/>
-              </a:rPr>
-              <a:t>ROI of spending </a:t>
-            </a:r>
-            <a:r>
-              <a:rPr lang="en-US" sz="4900" dirty="0">
-                <a:latin typeface="Futura"/>
-                <a:cs typeface="Futura"/>
-              </a:rPr>
-              <a:t>1 hour </a:t>
-            </a:r>
-            <a:r>
-              <a:rPr lang="en-US" sz="2500" b="1" dirty="0">
-                <a:latin typeface="News Gothic MT"/>
-                <a:cs typeface="News Gothic MT"/>
-              </a:rPr>
-              <a:t>a day </a:t>
-            </a:r>
-          </a:p>
-          <a:p>
-            <a:pPr algn="ctr"/>
-            <a:r>
-              <a:rPr lang="en-US" sz="2500" b="1" dirty="0">
-                <a:latin typeface="News Gothic MT"/>
-                <a:cs typeface="News Gothic MT"/>
-              </a:rPr>
-              <a:t>learning for a 1% increase</a:t>
-            </a:r>
-            <a:endParaRPr lang="en-US" sz="3200" b="1" dirty="0">
-              <a:latin typeface="News Gothic MT"/>
-              <a:cs typeface="News Gothic MT"/>
-            </a:endParaRPr>
-          </a:p>
-        </p:txBody>
-      </p:sp>
-      <p:sp>
-        <p:nvSpPr>
-          <p:cNvPr id="4" name="Rectangle 3"/>
-          <p:cNvSpPr/>
-          <p:nvPr/>
-        </p:nvSpPr>
-        <p:spPr>
-          <a:xfrm rot="16200000">
-            <a:off x="-3589231" y="3065511"/>
-            <a:ext cx="8107977" cy="775932"/>
-          </a:xfrm>
-          <a:prstGeom prst="rect">
-            <a:avLst/>
-          </a:prstGeom>
-        </p:spPr>
-        <p:txBody>
-          <a:bodyPr wrap="square" lIns="280748" tIns="140374" rIns="280748" bIns="140374">
-            <a:spAutoFit/>
-          </a:bodyPr>
-          <a:lstStyle/>
-          <a:p>
-            <a:pPr algn="ctr"/>
-            <a:r>
-              <a:rPr lang="en-US" sz="3200" b="1" dirty="0">
-                <a:latin typeface="News Gothic MT"/>
-                <a:cs typeface="News Gothic MT"/>
-              </a:rPr>
-              <a:t>Output</a:t>
-            </a:r>
-          </a:p>
-        </p:txBody>
-      </p:sp>
-      <p:cxnSp>
-        <p:nvCxnSpPr>
-          <p:cNvPr id="5" name="Straight Connector 4"/>
-          <p:cNvCxnSpPr/>
-          <p:nvPr/>
-        </p:nvCxnSpPr>
-        <p:spPr>
-          <a:xfrm>
-            <a:off x="798830" y="486517"/>
-            <a:ext cx="0" cy="6083121"/>
-          </a:xfrm>
-          <a:prstGeom prst="line">
-            <a:avLst/>
-          </a:prstGeom>
-          <a:ln w="28575" cmpd="sng">
-            <a:solidFill>
-              <a:schemeClr val="tx1">
-                <a:lumMod val="65000"/>
-                <a:lumOff val="35000"/>
-              </a:schemeClr>
-            </a:solidFill>
-          </a:ln>
-        </p:spPr>
-        <p:style>
-          <a:lnRef idx="3">
-            <a:schemeClr val="accent1"/>
-          </a:lnRef>
-          <a:fillRef idx="0">
-            <a:schemeClr val="accent1"/>
-          </a:fillRef>
-          <a:effectRef idx="2">
-            <a:schemeClr val="accent1"/>
-          </a:effectRef>
-          <a:fontRef idx="minor">
-            <a:schemeClr val="tx1"/>
-          </a:fontRef>
-        </p:style>
-      </p:cxnSp>
-      <p:cxnSp>
-        <p:nvCxnSpPr>
-          <p:cNvPr id="7" name="Straight Connector 6"/>
-          <p:cNvCxnSpPr/>
-          <p:nvPr/>
-        </p:nvCxnSpPr>
-        <p:spPr>
-          <a:xfrm>
-            <a:off x="305264" y="5915863"/>
-            <a:ext cx="7088467" cy="42983"/>
-          </a:xfrm>
-          <a:prstGeom prst="line">
-            <a:avLst/>
-          </a:prstGeom>
-          <a:ln w="28575" cmpd="sng">
-            <a:solidFill>
-              <a:schemeClr val="tx1">
-                <a:lumMod val="65000"/>
-                <a:lumOff val="35000"/>
-              </a:schemeClr>
-            </a:solidFill>
-          </a:ln>
-        </p:spPr>
-        <p:style>
-          <a:lnRef idx="3">
-            <a:schemeClr val="accent1"/>
-          </a:lnRef>
-          <a:fillRef idx="0">
-            <a:schemeClr val="accent1"/>
-          </a:fillRef>
-          <a:effectRef idx="2">
-            <a:schemeClr val="accent1"/>
-          </a:effectRef>
-          <a:fontRef idx="minor">
-            <a:schemeClr val="tx1"/>
-          </a:fontRef>
-        </p:style>
-      </p:cxnSp>
-      <p:sp>
-        <p:nvSpPr>
-          <p:cNvPr id="29" name="Rectangle 28"/>
-          <p:cNvSpPr/>
-          <p:nvPr/>
-        </p:nvSpPr>
-        <p:spPr>
-          <a:xfrm>
-            <a:off x="929620" y="5165444"/>
-            <a:ext cx="77059" cy="750420"/>
+            <a:off x="3276829" y="2699355"/>
+            <a:ext cx="2568881" cy="646503"/>
           </a:xfrm>
           <a:prstGeom prst="rect">
             <a:avLst/>
           </a:prstGeom>
           <a:solidFill>
-            <a:schemeClr val="accent6"/>
+            <a:srgbClr val="FFFFFF">
+              <a:alpha val="78000"/>
+            </a:srgbClr>
           </a:solidFill>
           <a:ln>
             <a:solidFill>
-              <a:schemeClr val="accent6"/>
+              <a:srgbClr val="FFFFFF"/>
             </a:solidFill>
           </a:ln>
-        </p:spPr>
-        <p:style>
-          <a:lnRef idx="2">
-            <a:schemeClr val="accent1"/>
-          </a:lnRef>
-          <a:fillRef idx="0">
-            <a:schemeClr val="accent1"/>
-          </a:fillRef>
-          <a:effectRef idx="1">
-            <a:schemeClr val="accent1"/>
-          </a:effectRef>
-          <a:fontRef idx="minor">
-            <a:schemeClr val="tx1"/>
-          </a:fontRef>
-        </p:style>
-        <p:txBody>
-          <a:bodyPr rtlCol="0" anchor="ctr"/>
-          <a:lstStyle/>
-          <a:p>
-            <a:pPr algn="ctr"/>
-            <a:endParaRPr lang="en-US"/>
-          </a:p>
-        </p:txBody>
-      </p:sp>
-      <p:sp>
-        <p:nvSpPr>
-          <p:cNvPr id="3" name="Rectangle 2"/>
-          <p:cNvSpPr/>
-          <p:nvPr/>
-        </p:nvSpPr>
-        <p:spPr>
-          <a:xfrm>
-            <a:off x="918995" y="5366040"/>
-            <a:ext cx="87684" cy="549823"/>
-          </a:xfrm>
-          <a:prstGeom prst="rect">
-            <a:avLst/>
-          </a:prstGeom>
-          <a:solidFill>
-            <a:srgbClr val="0000FF"/>
-          </a:solidFill>
+          <a:effectLst/>
         </p:spPr>
         <p:style>
           <a:lnRef idx="1">
@@ -10633,7 +10795,7 @@
           </a:fontRef>
         </p:style>
         <p:txBody>
-          <a:bodyPr rtlCol="0" anchor="ctr"/>
+          <a:bodyPr lIns="91412" tIns="45704" rIns="91412" bIns="45704" rtlCol="0" anchor="ctr"/>
           <a:lstStyle/>
           <a:p>
             <a:pPr algn="ctr"/>
@@ -10643,269 +10805,126 @@
       </p:sp>
       <p:sp>
         <p:nvSpPr>
-          <p:cNvPr id="30" name="Rectangle 29"/>
-          <p:cNvSpPr/>
-          <p:nvPr/>
-        </p:nvSpPr>
-        <p:spPr>
-          <a:xfrm>
-            <a:off x="1028004" y="5165443"/>
-            <a:ext cx="77059" cy="750420"/>
-          </a:xfrm>
-          <a:prstGeom prst="rect">
-            <a:avLst/>
-          </a:prstGeom>
-          <a:solidFill>
-            <a:schemeClr val="accent6"/>
-          </a:solidFill>
-          <a:ln>
-            <a:solidFill>
-              <a:schemeClr val="accent6"/>
-            </a:solidFill>
-          </a:ln>
-        </p:spPr>
-        <p:style>
-          <a:lnRef idx="2">
-            <a:schemeClr val="accent1"/>
-          </a:lnRef>
-          <a:fillRef idx="0">
-            <a:schemeClr val="accent1"/>
-          </a:fillRef>
-          <a:effectRef idx="1">
-            <a:schemeClr val="accent1"/>
-          </a:effectRef>
-          <a:fontRef idx="minor">
-            <a:schemeClr val="tx1"/>
-          </a:fontRef>
-        </p:style>
-        <p:txBody>
-          <a:bodyPr rtlCol="0" anchor="ctr"/>
-          <a:lstStyle/>
-          <a:p>
-            <a:pPr algn="ctr"/>
-            <a:endParaRPr lang="en-US"/>
-          </a:p>
-        </p:txBody>
-      </p:sp>
-      <p:sp>
-        <p:nvSpPr>
-          <p:cNvPr id="31" name="Rectangle 30"/>
-          <p:cNvSpPr/>
-          <p:nvPr/>
-        </p:nvSpPr>
-        <p:spPr>
-          <a:xfrm>
-            <a:off x="1017003" y="5312417"/>
-            <a:ext cx="87684" cy="605125"/>
-          </a:xfrm>
-          <a:prstGeom prst="rect">
-            <a:avLst/>
-          </a:prstGeom>
-          <a:solidFill>
-            <a:srgbClr val="0000FF"/>
-          </a:solidFill>
-        </p:spPr>
-        <p:style>
-          <a:lnRef idx="1">
-            <a:schemeClr val="accent1"/>
-          </a:lnRef>
-          <a:fillRef idx="3">
-            <a:schemeClr val="accent1"/>
-          </a:fillRef>
-          <a:effectRef idx="2">
-            <a:schemeClr val="accent1"/>
-          </a:effectRef>
-          <a:fontRef idx="minor">
-            <a:schemeClr val="lt1"/>
-          </a:fontRef>
-        </p:style>
-        <p:txBody>
-          <a:bodyPr rtlCol="0" anchor="ctr"/>
-          <a:lstStyle/>
-          <a:p>
-            <a:pPr algn="ctr"/>
-            <a:endParaRPr lang="en-US"/>
-          </a:p>
-        </p:txBody>
-      </p:sp>
-      <p:sp>
-        <p:nvSpPr>
-          <p:cNvPr id="33" name="Rectangle 32"/>
-          <p:cNvSpPr/>
-          <p:nvPr/>
-        </p:nvSpPr>
-        <p:spPr>
-          <a:xfrm>
-            <a:off x="1130873" y="5163764"/>
-            <a:ext cx="77059" cy="750420"/>
-          </a:xfrm>
-          <a:prstGeom prst="rect">
-            <a:avLst/>
-          </a:prstGeom>
-          <a:solidFill>
-            <a:schemeClr val="accent6"/>
-          </a:solidFill>
-          <a:ln>
-            <a:solidFill>
-              <a:schemeClr val="accent6"/>
-            </a:solidFill>
-          </a:ln>
-        </p:spPr>
-        <p:style>
-          <a:lnRef idx="2">
-            <a:schemeClr val="accent1"/>
-          </a:lnRef>
-          <a:fillRef idx="0">
-            <a:schemeClr val="accent1"/>
-          </a:fillRef>
-          <a:effectRef idx="1">
-            <a:schemeClr val="accent1"/>
-          </a:effectRef>
-          <a:fontRef idx="minor">
-            <a:schemeClr val="tx1"/>
-          </a:fontRef>
-        </p:style>
-        <p:txBody>
-          <a:bodyPr rtlCol="0" anchor="ctr"/>
-          <a:lstStyle/>
-          <a:p>
-            <a:pPr algn="ctr"/>
-            <a:endParaRPr lang="en-US"/>
-          </a:p>
-        </p:txBody>
-      </p:sp>
-      <p:sp>
-        <p:nvSpPr>
-          <p:cNvPr id="34" name="Rectangle 33"/>
-          <p:cNvSpPr/>
-          <p:nvPr/>
-        </p:nvSpPr>
-        <p:spPr>
-          <a:xfrm>
-            <a:off x="1119872" y="5271116"/>
-            <a:ext cx="88060" cy="644748"/>
-          </a:xfrm>
-          <a:prstGeom prst="rect">
-            <a:avLst/>
-          </a:prstGeom>
-          <a:solidFill>
-            <a:srgbClr val="0000FF"/>
-          </a:solidFill>
-        </p:spPr>
-        <p:style>
-          <a:lnRef idx="1">
-            <a:schemeClr val="accent1"/>
-          </a:lnRef>
-          <a:fillRef idx="3">
-            <a:schemeClr val="accent1"/>
-          </a:fillRef>
-          <a:effectRef idx="2">
-            <a:schemeClr val="accent1"/>
-          </a:effectRef>
-          <a:fontRef idx="minor">
-            <a:schemeClr val="lt1"/>
-          </a:fontRef>
-        </p:style>
-        <p:txBody>
-          <a:bodyPr rtlCol="0" anchor="ctr"/>
-          <a:lstStyle/>
-          <a:p>
-            <a:pPr algn="ctr"/>
-            <a:endParaRPr lang="en-US"/>
-          </a:p>
-        </p:txBody>
-      </p:sp>
-      <p:sp>
-        <p:nvSpPr>
-          <p:cNvPr id="35" name="Rectangle 34"/>
-          <p:cNvSpPr/>
-          <p:nvPr/>
-        </p:nvSpPr>
-        <p:spPr>
-          <a:xfrm>
-            <a:off x="1233742" y="5158917"/>
-            <a:ext cx="77059" cy="750420"/>
-          </a:xfrm>
-          <a:prstGeom prst="rect">
-            <a:avLst/>
-          </a:prstGeom>
-          <a:solidFill>
-            <a:schemeClr val="accent6"/>
-          </a:solidFill>
-          <a:ln>
-            <a:solidFill>
-              <a:schemeClr val="accent6"/>
-            </a:solidFill>
-          </a:ln>
-        </p:spPr>
-        <p:style>
-          <a:lnRef idx="2">
-            <a:schemeClr val="accent1"/>
-          </a:lnRef>
-          <a:fillRef idx="0">
-            <a:schemeClr val="accent1"/>
-          </a:fillRef>
-          <a:effectRef idx="1">
-            <a:schemeClr val="accent1"/>
-          </a:effectRef>
-          <a:fontRef idx="minor">
-            <a:schemeClr val="tx1"/>
-          </a:fontRef>
-        </p:style>
-        <p:txBody>
-          <a:bodyPr rtlCol="0" anchor="ctr"/>
-          <a:lstStyle/>
-          <a:p>
-            <a:pPr algn="ctr"/>
-            <a:endParaRPr lang="en-US"/>
-          </a:p>
-        </p:txBody>
-      </p:sp>
-      <p:sp>
-        <p:nvSpPr>
-          <p:cNvPr id="37" name="Rectangle 36"/>
-          <p:cNvSpPr/>
-          <p:nvPr/>
-        </p:nvSpPr>
-        <p:spPr>
-          <a:xfrm>
-            <a:off x="1222741" y="5229814"/>
-            <a:ext cx="88060" cy="681203"/>
-          </a:xfrm>
-          <a:prstGeom prst="rect">
-            <a:avLst/>
-          </a:prstGeom>
-          <a:solidFill>
-            <a:srgbClr val="0000FF"/>
-          </a:solidFill>
-        </p:spPr>
-        <p:style>
-          <a:lnRef idx="1">
-            <a:schemeClr val="accent1"/>
-          </a:lnRef>
-          <a:fillRef idx="3">
-            <a:schemeClr val="accent1"/>
-          </a:fillRef>
-          <a:effectRef idx="2">
-            <a:schemeClr val="accent1"/>
-          </a:effectRef>
-          <a:fontRef idx="minor">
-            <a:schemeClr val="lt1"/>
-          </a:fontRef>
-        </p:style>
-        <p:txBody>
-          <a:bodyPr rtlCol="0" anchor="ctr"/>
-          <a:lstStyle/>
-          <a:p>
-            <a:pPr algn="ctr"/>
-            <a:endParaRPr lang="en-US"/>
+          <p:cNvPr id="6" name="Title 5"/>
+          <p:cNvSpPr>
+            <a:spLocks noGrp="1"/>
+          </p:cNvSpPr>
+          <p:nvPr>
+            <p:ph type="ctrTitle"/>
+          </p:nvPr>
+        </p:nvSpPr>
+        <p:spPr>
+          <a:xfrm>
+            <a:off x="685801" y="2262910"/>
+            <a:ext cx="7772399" cy="1470024"/>
+          </a:xfrm>
+        </p:spPr>
+        <p:txBody>
+          <a:bodyPr/>
+          <a:lstStyle/>
+          <a:p>
+            <a:r>
+              <a:rPr lang="en-US" b="1" dirty="0" smtClean="0"/>
+              <a:t>Thank you.</a:t>
+            </a:r>
+            <a:endParaRPr lang="en-US" b="1" dirty="0"/>
+          </a:p>
+        </p:txBody>
+      </p:sp>
+      <p:sp>
+        <p:nvSpPr>
+          <p:cNvPr id="7" name="Subtitle 6"/>
+          <p:cNvSpPr>
+            <a:spLocks noGrp="1"/>
+          </p:cNvSpPr>
+          <p:nvPr>
+            <p:ph type="subTitle" idx="1"/>
+          </p:nvPr>
+        </p:nvSpPr>
+        <p:spPr/>
+        <p:txBody>
+          <a:bodyPr>
+            <a:normAutofit/>
+          </a:bodyPr>
+          <a:lstStyle/>
+          <a:p>
+            <a:pPr algn="r"/>
+            <a:r>
+              <a:rPr lang="en-US" dirty="0" smtClean="0">
+                <a:solidFill>
+                  <a:schemeClr val="tx1">
+                    <a:lumMod val="75000"/>
+                    <a:lumOff val="25000"/>
+                  </a:schemeClr>
+                </a:solidFill>
+              </a:rPr>
+              <a:t>@</a:t>
+            </a:r>
+            <a:r>
+              <a:rPr lang="en-US" dirty="0" err="1" smtClean="0">
+                <a:solidFill>
+                  <a:schemeClr val="tx1">
+                    <a:lumMod val="75000"/>
+                    <a:lumOff val="25000"/>
+                  </a:schemeClr>
+                </a:solidFill>
+              </a:rPr>
+              <a:t>maaretp</a:t>
+            </a:r>
+            <a:endParaRPr lang="en-US" dirty="0" smtClean="0">
+              <a:solidFill>
+                <a:schemeClr val="tx1">
+                  <a:lumMod val="75000"/>
+                  <a:lumOff val="25000"/>
+                </a:schemeClr>
+              </a:solidFill>
+            </a:endParaRPr>
+          </a:p>
+          <a:p>
+            <a:pPr algn="r"/>
+            <a:r>
+              <a:rPr lang="en-US" dirty="0" smtClean="0">
+                <a:solidFill>
+                  <a:schemeClr val="tx1">
+                    <a:lumMod val="75000"/>
+                    <a:lumOff val="25000"/>
+                  </a:schemeClr>
+                </a:solidFill>
+              </a:rPr>
+              <a:t>@LlewellynFalco</a:t>
+            </a:r>
+          </a:p>
+          <a:p>
+            <a:pPr algn="r"/>
+            <a:r>
+              <a:rPr lang="en-US" sz="2100" dirty="0">
+                <a:solidFill>
+                  <a:schemeClr val="tx1">
+                    <a:lumMod val="75000"/>
+                    <a:lumOff val="25000"/>
+                  </a:schemeClr>
+                </a:solidFill>
+              </a:rPr>
+              <a:t>(please connect with us through Twitter or LinkedIn)</a:t>
+            </a:r>
+          </a:p>
+          <a:p>
+            <a:pPr algn="r"/>
+            <a:endParaRPr lang="en-US" sz="2100" dirty="0">
+              <a:solidFill>
+                <a:schemeClr val="tx1">
+                  <a:lumMod val="75000"/>
+                  <a:lumOff val="25000"/>
+                </a:schemeClr>
+              </a:solidFill>
+            </a:endParaRPr>
           </a:p>
         </p:txBody>
       </p:sp>
     </p:spTree>
     <p:extLst>
       <p:ext uri="{BB962C8B-B14F-4D97-AF65-F5344CB8AC3E}">
-        <p14:creationId xmlns:p14="http://schemas.microsoft.com/office/powerpoint/2010/main" val="2301809861"/>
+        <p14:creationId xmlns:p14="http://schemas.microsoft.com/office/powerpoint/2010/main" val="1060893599"/>
       </p:ext>
     </p:extLst>
   </p:cSld>
@@ -10923,1328 +10942,9 @@
   <p:timing>
     <p:tnLst>
       <p:par>
-        <p:cTn xmlns:p14="http://schemas.microsoft.com/office/powerpoint/2010/main" id="1" dur="indefinite" restart="never" nodeType="tmRoot">
-          <p:childTnLst>
-            <p:seq concurrent="1" nextAc="seek">
-              <p:cTn id="2" dur="indefinite" nodeType="mainSeq">
-                <p:childTnLst>
-                  <p:par>
-                    <p:cTn id="3" fill="hold">
-                      <p:stCondLst>
-                        <p:cond delay="indefinite"/>
-                      </p:stCondLst>
-                      <p:childTnLst>
-                        <p:par>
-                          <p:cTn id="4" fill="hold">
-                            <p:stCondLst>
-                              <p:cond delay="0"/>
-                            </p:stCondLst>
-                            <p:childTnLst>
-                              <p:par>
-                                <p:cTn id="5" presetID="1" presetClass="entr" presetSubtype="0" fill="hold" grpId="0" nodeType="clickEffect">
-                                  <p:stCondLst>
-                                    <p:cond delay="0"/>
-                                  </p:stCondLst>
-                                  <p:childTnLst>
-                                    <p:set>
-                                      <p:cBhvr>
-                                        <p:cTn id="6" dur="1" fill="hold">
-                                          <p:stCondLst>
-                                            <p:cond delay="0"/>
-                                          </p:stCondLst>
-                                        </p:cTn>
-                                        <p:tgtEl>
-                                          <p:spTgt spid="29"/>
-                                        </p:tgtEl>
-                                        <p:attrNameLst>
-                                          <p:attrName>style.visibility</p:attrName>
-                                        </p:attrNameLst>
-                                      </p:cBhvr>
-                                      <p:to>
-                                        <p:strVal val="visible"/>
-                                      </p:to>
-                                    </p:set>
-                                  </p:childTnLst>
-                                </p:cTn>
-                              </p:par>
-                            </p:childTnLst>
-                          </p:cTn>
-                        </p:par>
-                      </p:childTnLst>
-                    </p:cTn>
-                  </p:par>
-                  <p:par>
-                    <p:cTn id="7" fill="hold">
-                      <p:stCondLst>
-                        <p:cond delay="indefinite"/>
-                      </p:stCondLst>
-                      <p:childTnLst>
-                        <p:par>
-                          <p:cTn id="8" fill="hold">
-                            <p:stCondLst>
-                              <p:cond delay="0"/>
-                            </p:stCondLst>
-                            <p:childTnLst>
-                              <p:par>
-                                <p:cTn id="9" presetID="1" presetClass="entr" presetSubtype="0" fill="hold" grpId="0" nodeType="clickEffect">
-                                  <p:stCondLst>
-                                    <p:cond delay="0"/>
-                                  </p:stCondLst>
-                                  <p:childTnLst>
-                                    <p:set>
-                                      <p:cBhvr>
-                                        <p:cTn id="10" dur="1" fill="hold">
-                                          <p:stCondLst>
-                                            <p:cond delay="0"/>
-                                          </p:stCondLst>
-                                        </p:cTn>
-                                        <p:tgtEl>
-                                          <p:spTgt spid="3"/>
-                                        </p:tgtEl>
-                                        <p:attrNameLst>
-                                          <p:attrName>style.visibility</p:attrName>
-                                        </p:attrNameLst>
-                                      </p:cBhvr>
-                                      <p:to>
-                                        <p:strVal val="visible"/>
-                                      </p:to>
-                                    </p:set>
-                                  </p:childTnLst>
-                                </p:cTn>
-                              </p:par>
-                            </p:childTnLst>
-                          </p:cTn>
-                        </p:par>
-                      </p:childTnLst>
-                    </p:cTn>
-                  </p:par>
-                  <p:par>
-                    <p:cTn id="11" fill="hold">
-                      <p:stCondLst>
-                        <p:cond delay="indefinite"/>
-                      </p:stCondLst>
-                      <p:childTnLst>
-                        <p:par>
-                          <p:cTn id="12" fill="hold">
-                            <p:stCondLst>
-                              <p:cond delay="0"/>
-                            </p:stCondLst>
-                            <p:childTnLst>
-                              <p:par>
-                                <p:cTn id="13" presetID="1" presetClass="entr" presetSubtype="0" fill="hold" grpId="0" nodeType="clickEffect">
-                                  <p:stCondLst>
-                                    <p:cond delay="0"/>
-                                  </p:stCondLst>
-                                  <p:childTnLst>
-                                    <p:set>
-                                      <p:cBhvr>
-                                        <p:cTn id="14" dur="1" fill="hold">
-                                          <p:stCondLst>
-                                            <p:cond delay="0"/>
-                                          </p:stCondLst>
-                                        </p:cTn>
-                                        <p:tgtEl>
-                                          <p:spTgt spid="30"/>
-                                        </p:tgtEl>
-                                        <p:attrNameLst>
-                                          <p:attrName>style.visibility</p:attrName>
-                                        </p:attrNameLst>
-                                      </p:cBhvr>
-                                      <p:to>
-                                        <p:strVal val="visible"/>
-                                      </p:to>
-                                    </p:set>
-                                  </p:childTnLst>
-                                </p:cTn>
-                              </p:par>
-                            </p:childTnLst>
-                          </p:cTn>
-                        </p:par>
-                      </p:childTnLst>
-                    </p:cTn>
-                  </p:par>
-                  <p:par>
-                    <p:cTn id="15" fill="hold">
-                      <p:stCondLst>
-                        <p:cond delay="indefinite"/>
-                      </p:stCondLst>
-                      <p:childTnLst>
-                        <p:par>
-                          <p:cTn id="16" fill="hold">
-                            <p:stCondLst>
-                              <p:cond delay="0"/>
-                            </p:stCondLst>
-                            <p:childTnLst>
-                              <p:par>
-                                <p:cTn id="17" presetID="1" presetClass="entr" presetSubtype="0" fill="hold" grpId="0" nodeType="clickEffect">
-                                  <p:stCondLst>
-                                    <p:cond delay="0"/>
-                                  </p:stCondLst>
-                                  <p:childTnLst>
-                                    <p:set>
-                                      <p:cBhvr>
-                                        <p:cTn id="18" dur="1" fill="hold">
-                                          <p:stCondLst>
-                                            <p:cond delay="0"/>
-                                          </p:stCondLst>
-                                        </p:cTn>
-                                        <p:tgtEl>
-                                          <p:spTgt spid="31"/>
-                                        </p:tgtEl>
-                                        <p:attrNameLst>
-                                          <p:attrName>style.visibility</p:attrName>
-                                        </p:attrNameLst>
-                                      </p:cBhvr>
-                                      <p:to>
-                                        <p:strVal val="visible"/>
-                                      </p:to>
-                                    </p:set>
-                                  </p:childTnLst>
-                                </p:cTn>
-                              </p:par>
-                            </p:childTnLst>
-                          </p:cTn>
-                        </p:par>
-                      </p:childTnLst>
-                    </p:cTn>
-                  </p:par>
-                  <p:par>
-                    <p:cTn id="19" fill="hold">
-                      <p:stCondLst>
-                        <p:cond delay="indefinite"/>
-                      </p:stCondLst>
-                      <p:childTnLst>
-                        <p:par>
-                          <p:cTn id="20" fill="hold">
-                            <p:stCondLst>
-                              <p:cond delay="0"/>
-                            </p:stCondLst>
-                            <p:childTnLst>
-                              <p:par>
-                                <p:cTn id="21" presetID="1" presetClass="entr" presetSubtype="0" fill="hold" grpId="0" nodeType="clickEffect">
-                                  <p:stCondLst>
-                                    <p:cond delay="0"/>
-                                  </p:stCondLst>
-                                  <p:childTnLst>
-                                    <p:set>
-                                      <p:cBhvr>
-                                        <p:cTn id="22" dur="1" fill="hold">
-                                          <p:stCondLst>
-                                            <p:cond delay="0"/>
-                                          </p:stCondLst>
-                                        </p:cTn>
-                                        <p:tgtEl>
-                                          <p:spTgt spid="33"/>
-                                        </p:tgtEl>
-                                        <p:attrNameLst>
-                                          <p:attrName>style.visibility</p:attrName>
-                                        </p:attrNameLst>
-                                      </p:cBhvr>
-                                      <p:to>
-                                        <p:strVal val="visible"/>
-                                      </p:to>
-                                    </p:set>
-                                  </p:childTnLst>
-                                </p:cTn>
-                              </p:par>
-                            </p:childTnLst>
-                          </p:cTn>
-                        </p:par>
-                      </p:childTnLst>
-                    </p:cTn>
-                  </p:par>
-                  <p:par>
-                    <p:cTn id="23" fill="hold">
-                      <p:stCondLst>
-                        <p:cond delay="indefinite"/>
-                      </p:stCondLst>
-                      <p:childTnLst>
-                        <p:par>
-                          <p:cTn id="24" fill="hold">
-                            <p:stCondLst>
-                              <p:cond delay="0"/>
-                            </p:stCondLst>
-                            <p:childTnLst>
-                              <p:par>
-                                <p:cTn id="25" presetID="1" presetClass="entr" presetSubtype="0" fill="hold" grpId="0" nodeType="clickEffect">
-                                  <p:stCondLst>
-                                    <p:cond delay="0"/>
-                                  </p:stCondLst>
-                                  <p:childTnLst>
-                                    <p:set>
-                                      <p:cBhvr>
-                                        <p:cTn id="26" dur="1" fill="hold">
-                                          <p:stCondLst>
-                                            <p:cond delay="0"/>
-                                          </p:stCondLst>
-                                        </p:cTn>
-                                        <p:tgtEl>
-                                          <p:spTgt spid="34"/>
-                                        </p:tgtEl>
-                                        <p:attrNameLst>
-                                          <p:attrName>style.visibility</p:attrName>
-                                        </p:attrNameLst>
-                                      </p:cBhvr>
-                                      <p:to>
-                                        <p:strVal val="visible"/>
-                                      </p:to>
-                                    </p:set>
-                                  </p:childTnLst>
-                                </p:cTn>
-                              </p:par>
-                            </p:childTnLst>
-                          </p:cTn>
-                        </p:par>
-                      </p:childTnLst>
-                    </p:cTn>
-                  </p:par>
-                  <p:par>
-                    <p:cTn id="27" fill="hold">
-                      <p:stCondLst>
-                        <p:cond delay="indefinite"/>
-                      </p:stCondLst>
-                      <p:childTnLst>
-                        <p:par>
-                          <p:cTn id="28" fill="hold">
-                            <p:stCondLst>
-                              <p:cond delay="0"/>
-                            </p:stCondLst>
-                            <p:childTnLst>
-                              <p:par>
-                                <p:cTn id="29" presetID="1" presetClass="entr" presetSubtype="0" fill="hold" grpId="0" nodeType="clickEffect">
-                                  <p:stCondLst>
-                                    <p:cond delay="0"/>
-                                  </p:stCondLst>
-                                  <p:childTnLst>
-                                    <p:set>
-                                      <p:cBhvr>
-                                        <p:cTn id="30" dur="1" fill="hold">
-                                          <p:stCondLst>
-                                            <p:cond delay="0"/>
-                                          </p:stCondLst>
-                                        </p:cTn>
-                                        <p:tgtEl>
-                                          <p:spTgt spid="35"/>
-                                        </p:tgtEl>
-                                        <p:attrNameLst>
-                                          <p:attrName>style.visibility</p:attrName>
-                                        </p:attrNameLst>
-                                      </p:cBhvr>
-                                      <p:to>
-                                        <p:strVal val="visible"/>
-                                      </p:to>
-                                    </p:set>
-                                  </p:childTnLst>
-                                </p:cTn>
-                              </p:par>
-                            </p:childTnLst>
-                          </p:cTn>
-                        </p:par>
-                      </p:childTnLst>
-                    </p:cTn>
-                  </p:par>
-                  <p:par>
-                    <p:cTn id="31" fill="hold">
-                      <p:stCondLst>
-                        <p:cond delay="indefinite"/>
-                      </p:stCondLst>
-                      <p:childTnLst>
-                        <p:par>
-                          <p:cTn id="32" fill="hold">
-                            <p:stCondLst>
-                              <p:cond delay="0"/>
-                            </p:stCondLst>
-                            <p:childTnLst>
-                              <p:par>
-                                <p:cTn id="33" presetID="1" presetClass="entr" presetSubtype="0" fill="hold" grpId="0" nodeType="clickEffect">
-                                  <p:stCondLst>
-                                    <p:cond delay="0"/>
-                                  </p:stCondLst>
-                                  <p:childTnLst>
-                                    <p:set>
-                                      <p:cBhvr>
-                                        <p:cTn id="34" dur="1" fill="hold">
-                                          <p:stCondLst>
-                                            <p:cond delay="0"/>
-                                          </p:stCondLst>
-                                        </p:cTn>
-                                        <p:tgtEl>
-                                          <p:spTgt spid="37"/>
-                                        </p:tgtEl>
-                                        <p:attrNameLst>
-                                          <p:attrName>style.visibility</p:attrName>
-                                        </p:attrNameLst>
-                                      </p:cBhvr>
-                                      <p:to>
-                                        <p:strVal val="visible"/>
-                                      </p:to>
-                                    </p:set>
-                                  </p:childTnLst>
-                                </p:cTn>
-                              </p:par>
-                            </p:childTnLst>
-                          </p:cTn>
-                        </p:par>
-                      </p:childTnLst>
-                    </p:cTn>
-                  </p:par>
-                </p:childTnLst>
-              </p:cTn>
-              <p:prevCondLst>
-                <p:cond evt="onPrev" delay="0">
-                  <p:tgtEl>
-                    <p:sldTgt/>
-                  </p:tgtEl>
-                </p:cond>
-              </p:prevCondLst>
-              <p:nextCondLst>
-                <p:cond evt="onNext" delay="0">
-                  <p:tgtEl>
-                    <p:sldTgt/>
-                  </p:tgtEl>
-                </p:cond>
-              </p:nextCondLst>
-            </p:seq>
-          </p:childTnLst>
-        </p:cTn>
+        <p:cTn xmlns:p14="http://schemas.microsoft.com/office/powerpoint/2010/main" id="1" dur="indefinite" restart="never" nodeType="tmRoot"/>
       </p:par>
     </p:tnLst>
-    <p:bldLst>
-      <p:bldP spid="29" grpId="0" animBg="1"/>
-      <p:bldP spid="3" grpId="0" animBg="1"/>
-      <p:bldP spid="30" grpId="0" animBg="1"/>
-      <p:bldP spid="31" grpId="0" animBg="1"/>
-      <p:bldP spid="33" grpId="0" animBg="1"/>
-      <p:bldP spid="34" grpId="0" animBg="1"/>
-      <p:bldP spid="35" grpId="0" animBg="1"/>
-      <p:bldP spid="37" grpId="0" animBg="1"/>
-    </p:bldLst>
-  </p:timing>
-</p:sld>
-</file>
-
-<file path=ppt/slides/slide39.xml><?xml version="1.0" encoding="utf-8"?>
-<p:sld xmlns:a="http://schemas.openxmlformats.org/drawingml/2006/main" xmlns:r="http://schemas.openxmlformats.org/officeDocument/2006/relationships" xmlns:p="http://schemas.openxmlformats.org/presentationml/2006/main">
-  <p:cSld>
-    <p:spTree>
-      <p:nvGrpSpPr>
-        <p:cNvPr id="1" name=""/>
-        <p:cNvGrpSpPr/>
-        <p:nvPr/>
-      </p:nvGrpSpPr>
-      <p:grpSpPr>
-        <a:xfrm>
-          <a:off x="0" y="0"/>
-          <a:ext cx="0" cy="0"/>
-          <a:chOff x="0" y="0"/>
-          <a:chExt cx="0" cy="0"/>
-        </a:xfrm>
-      </p:grpSpPr>
-      <p:sp>
-        <p:nvSpPr>
-          <p:cNvPr id="9" name="Rounded Rectangle 8"/>
-          <p:cNvSpPr/>
-          <p:nvPr/>
-        </p:nvSpPr>
-        <p:spPr>
-          <a:xfrm>
-            <a:off x="19560" y="31466"/>
-            <a:ext cx="9107732" cy="6788919"/>
-          </a:xfrm>
-          <a:prstGeom prst="roundRect">
-            <a:avLst>
-              <a:gd name="adj" fmla="val 0"/>
-            </a:avLst>
-          </a:prstGeom>
-          <a:solidFill>
-            <a:schemeClr val="bg1"/>
-          </a:solidFill>
-          <a:ln w="19050" cmpd="sng">
-            <a:solidFill>
-              <a:schemeClr val="bg1">
-                <a:lumMod val="75000"/>
-              </a:schemeClr>
-            </a:solidFill>
-          </a:ln>
-        </p:spPr>
-        <p:style>
-          <a:lnRef idx="1">
-            <a:schemeClr val="accent1"/>
-          </a:lnRef>
-          <a:fillRef idx="3">
-            <a:schemeClr val="accent1"/>
-          </a:fillRef>
-          <a:effectRef idx="2">
-            <a:schemeClr val="accent1"/>
-          </a:effectRef>
-          <a:fontRef idx="minor">
-            <a:schemeClr val="lt1"/>
-          </a:fontRef>
-        </p:style>
-        <p:txBody>
-          <a:bodyPr lIns="91354" tIns="45677" rIns="91354" bIns="45677" rtlCol="0" anchor="ctr"/>
-          <a:lstStyle/>
-          <a:p>
-            <a:pPr algn="ctr"/>
-            <a:endParaRPr lang="en-US" dirty="0">
-              <a:ln>
-                <a:solidFill>
-                  <a:schemeClr val="bg1">
-                    <a:lumMod val="75000"/>
-                  </a:schemeClr>
-                </a:solidFill>
-              </a:ln>
-            </a:endParaRPr>
-          </a:p>
-        </p:txBody>
-      </p:sp>
-      <p:sp>
-        <p:nvSpPr>
-          <p:cNvPr id="2" name="Rectangle 1"/>
-          <p:cNvSpPr/>
-          <p:nvPr/>
-        </p:nvSpPr>
-        <p:spPr>
-          <a:xfrm>
-            <a:off x="852724" y="495865"/>
-            <a:ext cx="6319851" cy="1422263"/>
-          </a:xfrm>
-          <a:prstGeom prst="rect">
-            <a:avLst/>
-          </a:prstGeom>
-        </p:spPr>
-        <p:txBody>
-          <a:bodyPr wrap="square" lIns="280748" tIns="140374" rIns="280748" bIns="140374">
-            <a:spAutoFit/>
-          </a:bodyPr>
-          <a:lstStyle/>
-          <a:p>
-            <a:pPr algn="ctr"/>
-            <a:r>
-              <a:rPr lang="en-US" sz="2500" b="1" dirty="0">
-                <a:latin typeface="News Gothic MT"/>
-                <a:cs typeface="News Gothic MT"/>
-              </a:rPr>
-              <a:t>ROI of spending </a:t>
-            </a:r>
-            <a:r>
-              <a:rPr lang="en-US" sz="4900" dirty="0">
-                <a:latin typeface="Futura"/>
-                <a:cs typeface="Futura"/>
-              </a:rPr>
-              <a:t>1 hour </a:t>
-            </a:r>
-            <a:r>
-              <a:rPr lang="en-US" sz="2500" b="1" dirty="0">
-                <a:latin typeface="News Gothic MT"/>
-                <a:cs typeface="News Gothic MT"/>
-              </a:rPr>
-              <a:t>a day </a:t>
-            </a:r>
-          </a:p>
-          <a:p>
-            <a:pPr algn="ctr"/>
-            <a:r>
-              <a:rPr lang="en-US" sz="2500" b="1" dirty="0">
-                <a:latin typeface="News Gothic MT"/>
-                <a:cs typeface="News Gothic MT"/>
-              </a:rPr>
-              <a:t>learning for a 1% increase</a:t>
-            </a:r>
-            <a:endParaRPr lang="en-US" sz="3200" b="1" dirty="0">
-              <a:latin typeface="News Gothic MT"/>
-              <a:cs typeface="News Gothic MT"/>
-            </a:endParaRPr>
-          </a:p>
-        </p:txBody>
-      </p:sp>
-      <p:sp>
-        <p:nvSpPr>
-          <p:cNvPr id="4" name="Rectangle 3"/>
-          <p:cNvSpPr/>
-          <p:nvPr/>
-        </p:nvSpPr>
-        <p:spPr>
-          <a:xfrm rot="16200000">
-            <a:off x="-3589231" y="3065511"/>
-            <a:ext cx="8107977" cy="775932"/>
-          </a:xfrm>
-          <a:prstGeom prst="rect">
-            <a:avLst/>
-          </a:prstGeom>
-        </p:spPr>
-        <p:txBody>
-          <a:bodyPr wrap="square" lIns="280748" tIns="140374" rIns="280748" bIns="140374">
-            <a:spAutoFit/>
-          </a:bodyPr>
-          <a:lstStyle/>
-          <a:p>
-            <a:pPr algn="ctr"/>
-            <a:r>
-              <a:rPr lang="en-US" sz="3200" b="1" dirty="0">
-                <a:latin typeface="News Gothic MT"/>
-                <a:cs typeface="News Gothic MT"/>
-              </a:rPr>
-              <a:t>Output</a:t>
-            </a:r>
-          </a:p>
-        </p:txBody>
-      </p:sp>
-      <p:cxnSp>
-        <p:nvCxnSpPr>
-          <p:cNvPr id="5" name="Straight Connector 4"/>
-          <p:cNvCxnSpPr/>
-          <p:nvPr/>
-        </p:nvCxnSpPr>
-        <p:spPr>
-          <a:xfrm>
-            <a:off x="798830" y="486517"/>
-            <a:ext cx="0" cy="6083121"/>
-          </a:xfrm>
-          <a:prstGeom prst="line">
-            <a:avLst/>
-          </a:prstGeom>
-          <a:ln w="28575" cmpd="sng">
-            <a:solidFill>
-              <a:schemeClr val="tx1">
-                <a:lumMod val="65000"/>
-                <a:lumOff val="35000"/>
-              </a:schemeClr>
-            </a:solidFill>
-          </a:ln>
-        </p:spPr>
-        <p:style>
-          <a:lnRef idx="3">
-            <a:schemeClr val="accent1"/>
-          </a:lnRef>
-          <a:fillRef idx="0">
-            <a:schemeClr val="accent1"/>
-          </a:fillRef>
-          <a:effectRef idx="2">
-            <a:schemeClr val="accent1"/>
-          </a:effectRef>
-          <a:fontRef idx="minor">
-            <a:schemeClr val="tx1"/>
-          </a:fontRef>
-        </p:style>
-      </p:cxnSp>
-      <p:cxnSp>
-        <p:nvCxnSpPr>
-          <p:cNvPr id="7" name="Straight Connector 6"/>
-          <p:cNvCxnSpPr/>
-          <p:nvPr/>
-        </p:nvCxnSpPr>
-        <p:spPr>
-          <a:xfrm>
-            <a:off x="305264" y="5915863"/>
-            <a:ext cx="7088467" cy="42983"/>
-          </a:xfrm>
-          <a:prstGeom prst="line">
-            <a:avLst/>
-          </a:prstGeom>
-          <a:ln w="28575" cmpd="sng">
-            <a:solidFill>
-              <a:schemeClr val="tx1">
-                <a:lumMod val="65000"/>
-                <a:lumOff val="35000"/>
-              </a:schemeClr>
-            </a:solidFill>
-          </a:ln>
-        </p:spPr>
-        <p:style>
-          <a:lnRef idx="3">
-            <a:schemeClr val="accent1"/>
-          </a:lnRef>
-          <a:fillRef idx="0">
-            <a:schemeClr val="accent1"/>
-          </a:fillRef>
-          <a:effectRef idx="2">
-            <a:schemeClr val="accent1"/>
-          </a:effectRef>
-          <a:fontRef idx="minor">
-            <a:schemeClr val="tx1"/>
-          </a:fontRef>
-        </p:style>
-      </p:cxnSp>
-      <p:cxnSp>
-        <p:nvCxnSpPr>
-          <p:cNvPr id="11" name="Straight Connector 10"/>
-          <p:cNvCxnSpPr/>
-          <p:nvPr/>
-        </p:nvCxnSpPr>
-        <p:spPr>
-          <a:xfrm>
-            <a:off x="935704" y="5165443"/>
-            <a:ext cx="7596515" cy="12537"/>
-          </a:xfrm>
-          <a:prstGeom prst="line">
-            <a:avLst/>
-          </a:prstGeom>
-          <a:ln>
-            <a:solidFill>
-              <a:srgbClr val="FF6600"/>
-            </a:solidFill>
-          </a:ln>
-        </p:spPr>
-        <p:style>
-          <a:lnRef idx="2">
-            <a:schemeClr val="accent1"/>
-          </a:lnRef>
-          <a:fillRef idx="0">
-            <a:schemeClr val="accent1"/>
-          </a:fillRef>
-          <a:effectRef idx="1">
-            <a:schemeClr val="accent1"/>
-          </a:effectRef>
-          <a:fontRef idx="minor">
-            <a:schemeClr val="tx1"/>
-          </a:fontRef>
-        </p:style>
-      </p:cxnSp>
-      <p:sp>
-        <p:nvSpPr>
-          <p:cNvPr id="13" name="Freeform 12"/>
-          <p:cNvSpPr/>
-          <p:nvPr/>
-        </p:nvSpPr>
-        <p:spPr>
-          <a:xfrm>
-            <a:off x="918995" y="376124"/>
-            <a:ext cx="7585885" cy="4989916"/>
-          </a:xfrm>
-          <a:custGeom>
-            <a:avLst/>
-            <a:gdLst>
-              <a:gd name="connsiteX0" fmla="*/ 0 w 2882900"/>
-              <a:gd name="connsiteY0" fmla="*/ 1263650 h 1263650"/>
-              <a:gd name="connsiteX1" fmla="*/ 2882900 w 2882900"/>
-              <a:gd name="connsiteY1" fmla="*/ 0 h 1263650"/>
-              <a:gd name="connsiteX0" fmla="*/ 0 w 2882900"/>
-              <a:gd name="connsiteY0" fmla="*/ 1263650 h 1263650"/>
-              <a:gd name="connsiteX1" fmla="*/ 2882900 w 2882900"/>
-              <a:gd name="connsiteY1" fmla="*/ 0 h 1263650"/>
-              <a:gd name="connsiteX0" fmla="*/ 0 w 2882900"/>
-              <a:gd name="connsiteY0" fmla="*/ 1263650 h 1263650"/>
-              <a:gd name="connsiteX1" fmla="*/ 2882900 w 2882900"/>
-              <a:gd name="connsiteY1" fmla="*/ 0 h 1263650"/>
-              <a:gd name="connsiteX0" fmla="*/ 0 w 2882900"/>
-              <a:gd name="connsiteY0" fmla="*/ 1263650 h 1263650"/>
-              <a:gd name="connsiteX1" fmla="*/ 2882900 w 2882900"/>
-              <a:gd name="connsiteY1" fmla="*/ 0 h 1263650"/>
-            </a:gdLst>
-            <a:ahLst/>
-            <a:cxnLst>
-              <a:cxn ang="0">
-                <a:pos x="connsiteX0" y="connsiteY0"/>
-              </a:cxn>
-              <a:cxn ang="0">
-                <a:pos x="connsiteX1" y="connsiteY1"/>
-              </a:cxn>
-            </a:cxnLst>
-            <a:rect l="l" t="t" r="r" b="b"/>
-            <a:pathLst>
-              <a:path w="2882900" h="1263650">
-                <a:moveTo>
-                  <a:pt x="0" y="1263650"/>
-                </a:moveTo>
-                <a:cubicBezTo>
-                  <a:pt x="741362" y="1109662"/>
-                  <a:pt x="1993900" y="1054100"/>
-                  <a:pt x="2882900" y="0"/>
-                </a:cubicBezTo>
-              </a:path>
-            </a:pathLst>
-          </a:custGeom>
-          <a:ln>
-            <a:solidFill>
-              <a:srgbClr val="0000FF"/>
-            </a:solidFill>
-          </a:ln>
-        </p:spPr>
-        <p:style>
-          <a:lnRef idx="2">
-            <a:schemeClr val="accent1"/>
-          </a:lnRef>
-          <a:fillRef idx="0">
-            <a:schemeClr val="accent1"/>
-          </a:fillRef>
-          <a:effectRef idx="1">
-            <a:schemeClr val="accent1"/>
-          </a:effectRef>
-          <a:fontRef idx="minor">
-            <a:schemeClr val="tx1"/>
-          </a:fontRef>
-        </p:style>
-        <p:txBody>
-          <a:bodyPr lIns="280748" tIns="140374" rIns="280748" bIns="140374" rtlCol="0" anchor="ctr"/>
-          <a:lstStyle/>
-          <a:p>
-            <a:pPr algn="ctr"/>
-            <a:endParaRPr lang="en-US"/>
-          </a:p>
-        </p:txBody>
-      </p:sp>
-      <p:sp>
-        <p:nvSpPr>
-          <p:cNvPr id="17" name="Rectangle 16"/>
-          <p:cNvSpPr/>
-          <p:nvPr/>
-        </p:nvSpPr>
-        <p:spPr>
-          <a:xfrm>
-            <a:off x="802032" y="3980726"/>
-            <a:ext cx="1832838" cy="560489"/>
-          </a:xfrm>
-          <a:prstGeom prst="rect">
-            <a:avLst/>
-          </a:prstGeom>
-        </p:spPr>
-        <p:txBody>
-          <a:bodyPr wrap="square" lIns="280748" tIns="140374" rIns="280748" bIns="140374">
-            <a:spAutoFit/>
-          </a:bodyPr>
-          <a:lstStyle/>
-          <a:p>
-            <a:pPr algn="ctr"/>
-            <a:r>
-              <a:rPr lang="en-US" b="1" dirty="0" smtClean="0">
-                <a:latin typeface="News Gothic MT"/>
-                <a:cs typeface="News Gothic MT"/>
-              </a:rPr>
-              <a:t>28 days</a:t>
-            </a:r>
-            <a:endParaRPr lang="en-US" b="1" dirty="0">
-              <a:latin typeface="News Gothic MT"/>
-              <a:cs typeface="News Gothic MT"/>
-            </a:endParaRPr>
-          </a:p>
-        </p:txBody>
-      </p:sp>
-      <p:cxnSp>
-        <p:nvCxnSpPr>
-          <p:cNvPr id="18" name="Straight Connector 17"/>
-          <p:cNvCxnSpPr/>
-          <p:nvPr/>
-        </p:nvCxnSpPr>
-        <p:spPr>
-          <a:xfrm>
-            <a:off x="1625925" y="4620256"/>
-            <a:ext cx="0" cy="557722"/>
-          </a:xfrm>
-          <a:prstGeom prst="line">
-            <a:avLst/>
-          </a:prstGeom>
-          <a:ln w="9525" cmpd="sng"/>
-        </p:spPr>
-        <p:style>
-          <a:lnRef idx="2">
-            <a:schemeClr val="dk1"/>
-          </a:lnRef>
-          <a:fillRef idx="0">
-            <a:schemeClr val="dk1"/>
-          </a:fillRef>
-          <a:effectRef idx="1">
-            <a:schemeClr val="dk1"/>
-          </a:effectRef>
-          <a:fontRef idx="minor">
-            <a:schemeClr val="tx1"/>
-          </a:fontRef>
-        </p:style>
-      </p:cxnSp>
-      <p:sp>
-        <p:nvSpPr>
-          <p:cNvPr id="21" name="Rectangle 20"/>
-          <p:cNvSpPr/>
-          <p:nvPr/>
-        </p:nvSpPr>
-        <p:spPr>
-          <a:xfrm>
-            <a:off x="3542307" y="3128178"/>
-            <a:ext cx="1832838" cy="837487"/>
-          </a:xfrm>
-          <a:prstGeom prst="rect">
-            <a:avLst/>
-          </a:prstGeom>
-        </p:spPr>
-        <p:txBody>
-          <a:bodyPr wrap="square" lIns="280748" tIns="140374" rIns="280748" bIns="140374">
-            <a:spAutoFit/>
-          </a:bodyPr>
-          <a:lstStyle/>
-          <a:p>
-            <a:pPr algn="ctr"/>
-            <a:r>
-              <a:rPr lang="en-US" b="1" dirty="0" smtClean="0">
-                <a:latin typeface="News Gothic MT"/>
-                <a:cs typeface="News Gothic MT"/>
-              </a:rPr>
-              <a:t>2x (6 months)</a:t>
-            </a:r>
-            <a:endParaRPr lang="en-US" b="1" dirty="0">
-              <a:latin typeface="News Gothic MT"/>
-              <a:cs typeface="News Gothic MT"/>
-            </a:endParaRPr>
-          </a:p>
-        </p:txBody>
-      </p:sp>
-      <p:cxnSp>
-        <p:nvCxnSpPr>
-          <p:cNvPr id="22" name="Straight Connector 21"/>
-          <p:cNvCxnSpPr/>
-          <p:nvPr/>
-        </p:nvCxnSpPr>
-        <p:spPr>
-          <a:xfrm>
-            <a:off x="4366200" y="3767707"/>
-            <a:ext cx="0" cy="557722"/>
-          </a:xfrm>
-          <a:prstGeom prst="line">
-            <a:avLst/>
-          </a:prstGeom>
-          <a:ln w="9525" cmpd="sng"/>
-        </p:spPr>
-        <p:style>
-          <a:lnRef idx="2">
-            <a:schemeClr val="dk1"/>
-          </a:lnRef>
-          <a:fillRef idx="0">
-            <a:schemeClr val="dk1"/>
-          </a:fillRef>
-          <a:effectRef idx="1">
-            <a:schemeClr val="dk1"/>
-          </a:effectRef>
-          <a:fontRef idx="minor">
-            <a:schemeClr val="tx1"/>
-          </a:fontRef>
-        </p:style>
-      </p:cxnSp>
-      <p:sp>
-        <p:nvSpPr>
-          <p:cNvPr id="27" name="Rectangle 26"/>
-          <p:cNvSpPr/>
-          <p:nvPr/>
-        </p:nvSpPr>
-        <p:spPr>
-          <a:xfrm>
-            <a:off x="7170109" y="1800224"/>
-            <a:ext cx="1832838" cy="560489"/>
-          </a:xfrm>
-          <a:prstGeom prst="rect">
-            <a:avLst/>
-          </a:prstGeom>
-        </p:spPr>
-        <p:txBody>
-          <a:bodyPr wrap="square" lIns="280748" tIns="140374" rIns="280748" bIns="140374">
-            <a:spAutoFit/>
-          </a:bodyPr>
-          <a:lstStyle/>
-          <a:p>
-            <a:pPr algn="ctr"/>
-            <a:r>
-              <a:rPr lang="en-US" b="1" dirty="0" smtClean="0">
-                <a:latin typeface="News Gothic MT"/>
-                <a:cs typeface="News Gothic MT"/>
-              </a:rPr>
-              <a:t>5x (1 year)</a:t>
-            </a:r>
-            <a:endParaRPr lang="en-US" b="1" dirty="0">
-              <a:latin typeface="News Gothic MT"/>
-              <a:cs typeface="News Gothic MT"/>
-            </a:endParaRPr>
-          </a:p>
-        </p:txBody>
-      </p:sp>
-      <p:cxnSp>
-        <p:nvCxnSpPr>
-          <p:cNvPr id="28" name="Straight Connector 27"/>
-          <p:cNvCxnSpPr/>
-          <p:nvPr/>
-        </p:nvCxnSpPr>
-        <p:spPr>
-          <a:xfrm>
-            <a:off x="7858381" y="1427432"/>
-            <a:ext cx="0" cy="557722"/>
-          </a:xfrm>
-          <a:prstGeom prst="line">
-            <a:avLst/>
-          </a:prstGeom>
-          <a:ln w="9525" cmpd="sng"/>
-        </p:spPr>
-        <p:style>
-          <a:lnRef idx="2">
-            <a:schemeClr val="dk1"/>
-          </a:lnRef>
-          <a:fillRef idx="0">
-            <a:schemeClr val="dk1"/>
-          </a:fillRef>
-          <a:effectRef idx="1">
-            <a:schemeClr val="dk1"/>
-          </a:effectRef>
-          <a:fontRef idx="minor">
-            <a:schemeClr val="tx1"/>
-          </a:fontRef>
-        </p:style>
-      </p:cxnSp>
-    </p:spTree>
-    <p:extLst>
-      <p:ext uri="{BB962C8B-B14F-4D97-AF65-F5344CB8AC3E}">
-        <p14:creationId xmlns:p14="http://schemas.microsoft.com/office/powerpoint/2010/main" val="4035811012"/>
-      </p:ext>
-    </p:extLst>
-  </p:cSld>
-  <p:clrMapOvr>
-    <a:masterClrMapping/>
-  </p:clrMapOvr>
-  <mc:AlternateContent xmlns:mc="http://schemas.openxmlformats.org/markup-compatibility/2006" xmlns:p14="http://schemas.microsoft.com/office/powerpoint/2010/main">
-    <mc:Choice Requires="p14">
-      <p:transition spd="slow" p14:dur="2000"/>
-    </mc:Choice>
-    <mc:Fallback xmlns="">
-      <p:transition xmlns:p14="http://schemas.microsoft.com/office/powerpoint/2010/main" spd="slow"/>
-    </mc:Fallback>
-  </mc:AlternateContent>
-  <p:timing>
-    <p:tnLst>
-      <p:par>
-        <p:cTn xmlns:p14="http://schemas.microsoft.com/office/powerpoint/2010/main" id="1" dur="indefinite" restart="never" nodeType="tmRoot">
-          <p:childTnLst>
-            <p:seq concurrent="1" nextAc="seek">
-              <p:cTn id="2" dur="indefinite" nodeType="mainSeq">
-                <p:childTnLst>
-                  <p:par>
-                    <p:cTn id="3" fill="hold">
-                      <p:stCondLst>
-                        <p:cond delay="indefinite"/>
-                        <p:cond evt="onBegin" delay="0">
-                          <p:tn val="2"/>
-                        </p:cond>
-                      </p:stCondLst>
-                      <p:childTnLst>
-                        <p:par>
-                          <p:cTn id="4" fill="hold">
-                            <p:stCondLst>
-                              <p:cond delay="0"/>
-                            </p:stCondLst>
-                            <p:childTnLst>
-                              <p:par>
-                                <p:cTn id="5" presetID="22" presetClass="entr" presetSubtype="8" fill="hold" nodeType="withEffect">
-                                  <p:stCondLst>
-                                    <p:cond delay="0"/>
-                                  </p:stCondLst>
-                                  <p:childTnLst>
-                                    <p:set>
-                                      <p:cBhvr>
-                                        <p:cTn id="6" dur="1" fill="hold">
-                                          <p:stCondLst>
-                                            <p:cond delay="0"/>
-                                          </p:stCondLst>
-                                        </p:cTn>
-                                        <p:tgtEl>
-                                          <p:spTgt spid="11"/>
-                                        </p:tgtEl>
-                                        <p:attrNameLst>
-                                          <p:attrName>style.visibility</p:attrName>
-                                        </p:attrNameLst>
-                                      </p:cBhvr>
-                                      <p:to>
-                                        <p:strVal val="visible"/>
-                                      </p:to>
-                                    </p:set>
-                                    <p:animEffect transition="in" filter="wipe(left)">
-                                      <p:cBhvr>
-                                        <p:cTn id="7" dur="5000"/>
-                                        <p:tgtEl>
-                                          <p:spTgt spid="11"/>
-                                        </p:tgtEl>
-                                      </p:cBhvr>
-                                    </p:animEffect>
-                                  </p:childTnLst>
-                                </p:cTn>
-                              </p:par>
-                              <p:par>
-                                <p:cTn id="8" presetID="22" presetClass="entr" presetSubtype="4" fill="hold" grpId="0" nodeType="withEffect">
-                                  <p:stCondLst>
-                                    <p:cond delay="0"/>
-                                  </p:stCondLst>
-                                  <p:childTnLst>
-                                    <p:set>
-                                      <p:cBhvr>
-                                        <p:cTn id="9" dur="1" fill="hold">
-                                          <p:stCondLst>
-                                            <p:cond delay="0"/>
-                                          </p:stCondLst>
-                                        </p:cTn>
-                                        <p:tgtEl>
-                                          <p:spTgt spid="13"/>
-                                        </p:tgtEl>
-                                        <p:attrNameLst>
-                                          <p:attrName>style.visibility</p:attrName>
-                                        </p:attrNameLst>
-                                      </p:cBhvr>
-                                      <p:to>
-                                        <p:strVal val="visible"/>
-                                      </p:to>
-                                    </p:set>
-                                    <p:animEffect transition="in" filter="wipe(down)">
-                                      <p:cBhvr>
-                                        <p:cTn id="10" dur="5000"/>
-                                        <p:tgtEl>
-                                          <p:spTgt spid="13"/>
-                                        </p:tgtEl>
-                                      </p:cBhvr>
-                                    </p:animEffect>
-                                  </p:childTnLst>
-                                </p:cTn>
-                              </p:par>
-                            </p:childTnLst>
-                          </p:cTn>
-                        </p:par>
-                      </p:childTnLst>
-                    </p:cTn>
-                  </p:par>
-                  <p:par>
-                    <p:cTn id="11" fill="hold">
-                      <p:stCondLst>
-                        <p:cond delay="indefinite"/>
-                      </p:stCondLst>
-                      <p:childTnLst>
-                        <p:par>
-                          <p:cTn id="12" fill="hold">
-                            <p:stCondLst>
-                              <p:cond delay="0"/>
-                            </p:stCondLst>
-                            <p:childTnLst>
-                              <p:par>
-                                <p:cTn id="13" presetID="1" presetClass="entr" presetSubtype="0" fill="hold" nodeType="clickEffect">
-                                  <p:stCondLst>
-                                    <p:cond delay="0"/>
-                                  </p:stCondLst>
-                                  <p:childTnLst>
-                                    <p:set>
-                                      <p:cBhvr>
-                                        <p:cTn id="14" dur="1" fill="hold">
-                                          <p:stCondLst>
-                                            <p:cond delay="0"/>
-                                          </p:stCondLst>
-                                        </p:cTn>
-                                        <p:tgtEl>
-                                          <p:spTgt spid="18"/>
-                                        </p:tgtEl>
-                                        <p:attrNameLst>
-                                          <p:attrName>style.visibility</p:attrName>
-                                        </p:attrNameLst>
-                                      </p:cBhvr>
-                                      <p:to>
-                                        <p:strVal val="visible"/>
-                                      </p:to>
-                                    </p:set>
-                                  </p:childTnLst>
-                                </p:cTn>
-                              </p:par>
-                              <p:par>
-                                <p:cTn id="15" presetID="1" presetClass="entr" presetSubtype="0" fill="hold" grpId="0" nodeType="withEffect">
-                                  <p:stCondLst>
-                                    <p:cond delay="0"/>
-                                  </p:stCondLst>
-                                  <p:childTnLst>
-                                    <p:set>
-                                      <p:cBhvr>
-                                        <p:cTn id="16" dur="1" fill="hold">
-                                          <p:stCondLst>
-                                            <p:cond delay="0"/>
-                                          </p:stCondLst>
-                                        </p:cTn>
-                                        <p:tgtEl>
-                                          <p:spTgt spid="17"/>
-                                        </p:tgtEl>
-                                        <p:attrNameLst>
-                                          <p:attrName>style.visibility</p:attrName>
-                                        </p:attrNameLst>
-                                      </p:cBhvr>
-                                      <p:to>
-                                        <p:strVal val="visible"/>
-                                      </p:to>
-                                    </p:set>
-                                  </p:childTnLst>
-                                </p:cTn>
-                              </p:par>
-                            </p:childTnLst>
-                          </p:cTn>
-                        </p:par>
-                      </p:childTnLst>
-                    </p:cTn>
-                  </p:par>
-                  <p:par>
-                    <p:cTn id="17" fill="hold">
-                      <p:stCondLst>
-                        <p:cond delay="indefinite"/>
-                      </p:stCondLst>
-                      <p:childTnLst>
-                        <p:par>
-                          <p:cTn id="18" fill="hold">
-                            <p:stCondLst>
-                              <p:cond delay="0"/>
-                            </p:stCondLst>
-                            <p:childTnLst>
-                              <p:par>
-                                <p:cTn id="19" presetID="1" presetClass="entr" presetSubtype="0" fill="hold" nodeType="clickEffect">
-                                  <p:stCondLst>
-                                    <p:cond delay="0"/>
-                                  </p:stCondLst>
-                                  <p:childTnLst>
-                                    <p:set>
-                                      <p:cBhvr>
-                                        <p:cTn id="20" dur="1" fill="hold">
-                                          <p:stCondLst>
-                                            <p:cond delay="0"/>
-                                          </p:stCondLst>
-                                        </p:cTn>
-                                        <p:tgtEl>
-                                          <p:spTgt spid="22"/>
-                                        </p:tgtEl>
-                                        <p:attrNameLst>
-                                          <p:attrName>style.visibility</p:attrName>
-                                        </p:attrNameLst>
-                                      </p:cBhvr>
-                                      <p:to>
-                                        <p:strVal val="visible"/>
-                                      </p:to>
-                                    </p:set>
-                                  </p:childTnLst>
-                                </p:cTn>
-                              </p:par>
-                              <p:par>
-                                <p:cTn id="21" presetID="1" presetClass="entr" presetSubtype="0" fill="hold" grpId="0" nodeType="withEffect">
-                                  <p:stCondLst>
-                                    <p:cond delay="0"/>
-                                  </p:stCondLst>
-                                  <p:childTnLst>
-                                    <p:set>
-                                      <p:cBhvr>
-                                        <p:cTn id="22" dur="1" fill="hold">
-                                          <p:stCondLst>
-                                            <p:cond delay="0"/>
-                                          </p:stCondLst>
-                                        </p:cTn>
-                                        <p:tgtEl>
-                                          <p:spTgt spid="21"/>
-                                        </p:tgtEl>
-                                        <p:attrNameLst>
-                                          <p:attrName>style.visibility</p:attrName>
-                                        </p:attrNameLst>
-                                      </p:cBhvr>
-                                      <p:to>
-                                        <p:strVal val="visible"/>
-                                      </p:to>
-                                    </p:set>
-                                  </p:childTnLst>
-                                </p:cTn>
-                              </p:par>
-                            </p:childTnLst>
-                          </p:cTn>
-                        </p:par>
-                      </p:childTnLst>
-                    </p:cTn>
-                  </p:par>
-                  <p:par>
-                    <p:cTn id="23" fill="hold">
-                      <p:stCondLst>
-                        <p:cond delay="indefinite"/>
-                      </p:stCondLst>
-                      <p:childTnLst>
-                        <p:par>
-                          <p:cTn id="24" fill="hold">
-                            <p:stCondLst>
-                              <p:cond delay="0"/>
-                            </p:stCondLst>
-                            <p:childTnLst>
-                              <p:par>
-                                <p:cTn id="25" presetID="1" presetClass="entr" presetSubtype="0" fill="hold" grpId="0" nodeType="clickEffect">
-                                  <p:stCondLst>
-                                    <p:cond delay="0"/>
-                                  </p:stCondLst>
-                                  <p:childTnLst>
-                                    <p:set>
-                                      <p:cBhvr>
-                                        <p:cTn id="26" dur="1" fill="hold">
-                                          <p:stCondLst>
-                                            <p:cond delay="0"/>
-                                          </p:stCondLst>
-                                        </p:cTn>
-                                        <p:tgtEl>
-                                          <p:spTgt spid="27"/>
-                                        </p:tgtEl>
-                                        <p:attrNameLst>
-                                          <p:attrName>style.visibility</p:attrName>
-                                        </p:attrNameLst>
-                                      </p:cBhvr>
-                                      <p:to>
-                                        <p:strVal val="visible"/>
-                                      </p:to>
-                                    </p:set>
-                                  </p:childTnLst>
-                                </p:cTn>
-                              </p:par>
-                              <p:par>
-                                <p:cTn id="27" presetID="1" presetClass="entr" presetSubtype="0" fill="hold" nodeType="withEffect">
-                                  <p:stCondLst>
-                                    <p:cond delay="0"/>
-                                  </p:stCondLst>
-                                  <p:childTnLst>
-                                    <p:set>
-                                      <p:cBhvr>
-                                        <p:cTn id="28" dur="1" fill="hold">
-                                          <p:stCondLst>
-                                            <p:cond delay="0"/>
-                                          </p:stCondLst>
-                                        </p:cTn>
-                                        <p:tgtEl>
-                                          <p:spTgt spid="28"/>
-                                        </p:tgtEl>
-                                        <p:attrNameLst>
-                                          <p:attrName>style.visibility</p:attrName>
-                                        </p:attrNameLst>
-                                      </p:cBhvr>
-                                      <p:to>
-                                        <p:strVal val="visible"/>
-                                      </p:to>
-                                    </p:set>
-                                  </p:childTnLst>
-                                </p:cTn>
-                              </p:par>
-                            </p:childTnLst>
-                          </p:cTn>
-                        </p:par>
-                      </p:childTnLst>
-                    </p:cTn>
-                  </p:par>
-                </p:childTnLst>
-              </p:cTn>
-              <p:prevCondLst>
-                <p:cond evt="onPrev" delay="0">
-                  <p:tgtEl>
-                    <p:sldTgt/>
-                  </p:tgtEl>
-                </p:cond>
-              </p:prevCondLst>
-              <p:nextCondLst>
-                <p:cond evt="onNext" delay="0">
-                  <p:tgtEl>
-                    <p:sldTgt/>
-                  </p:tgtEl>
-                </p:cond>
-              </p:nextCondLst>
-            </p:seq>
-          </p:childTnLst>
-        </p:cTn>
-      </p:par>
-    </p:tnLst>
-    <p:bldLst>
-      <p:bldP spid="13" grpId="0" animBg="1"/>
-      <p:bldP spid="17" grpId="0"/>
-      <p:bldP spid="21" grpId="0"/>
-      <p:bldP spid="27" grpId="0"/>
-    </p:bldLst>
   </p:timing>
 </p:sld>
 </file>
@@ -12447,404 +11147,6 @@
     <p:tnLst>
       <p:par>
         <p:cTn xmlns:p14="http://schemas.microsoft.com/office/powerpoint/2010/main" id="1" dur="indefinite" restart="never" nodeType="tmRoot"/>
-      </p:par>
-    </p:tnLst>
-  </p:timing>
-</p:sld>
-</file>
-
-<file path=ppt/slides/slide40.xml><?xml version="1.0" encoding="utf-8"?>
-<p:sld xmlns:a="http://schemas.openxmlformats.org/drawingml/2006/main" xmlns:r="http://schemas.openxmlformats.org/officeDocument/2006/relationships" xmlns:p="http://schemas.openxmlformats.org/presentationml/2006/main">
-  <p:cSld>
-    <p:spTree>
-      <p:nvGrpSpPr>
-        <p:cNvPr id="1" name=""/>
-        <p:cNvGrpSpPr/>
-        <p:nvPr/>
-      </p:nvGrpSpPr>
-      <p:grpSpPr>
-        <a:xfrm>
-          <a:off x="0" y="0"/>
-          <a:ext cx="0" cy="0"/>
-          <a:chOff x="0" y="0"/>
-          <a:chExt cx="0" cy="0"/>
-        </a:xfrm>
-      </p:grpSpPr>
-      <p:pic>
-        <p:nvPicPr>
-          <p:cNvPr id="2" name="Picture 1"/>
-          <p:cNvPicPr>
-            <a:picLocks noChangeAspect="1"/>
-          </p:cNvPicPr>
-          <p:nvPr/>
-        </p:nvPicPr>
-        <p:blipFill>
-          <a:blip r:embed="rId4"/>
-          <a:stretch>
-            <a:fillRect/>
-          </a:stretch>
-        </p:blipFill>
-        <p:spPr>
-          <a:xfrm>
-            <a:off x="0" y="2"/>
-            <a:ext cx="9144000" cy="6858000"/>
-          </a:xfrm>
-          <a:prstGeom prst="rect">
-            <a:avLst/>
-          </a:prstGeom>
-        </p:spPr>
-      </p:pic>
-      <p:sp>
-        <p:nvSpPr>
-          <p:cNvPr id="5" name="Rectangle 4"/>
-          <p:cNvSpPr/>
-          <p:nvPr/>
-        </p:nvSpPr>
-        <p:spPr>
-          <a:xfrm>
-            <a:off x="1572297" y="3886199"/>
-            <a:ext cx="6329492" cy="1535701"/>
-          </a:xfrm>
-          <a:prstGeom prst="rect">
-            <a:avLst/>
-          </a:prstGeom>
-          <a:solidFill>
-            <a:srgbClr val="FFFFFF">
-              <a:alpha val="77000"/>
-            </a:srgbClr>
-          </a:solidFill>
-          <a:ln>
-            <a:solidFill>
-              <a:srgbClr val="FFFFFF"/>
-            </a:solidFill>
-          </a:ln>
-          <a:effectLst/>
-        </p:spPr>
-        <p:style>
-          <a:lnRef idx="1">
-            <a:schemeClr val="accent1"/>
-          </a:lnRef>
-          <a:fillRef idx="3">
-            <a:schemeClr val="accent1"/>
-          </a:fillRef>
-          <a:effectRef idx="2">
-            <a:schemeClr val="accent1"/>
-          </a:effectRef>
-          <a:fontRef idx="minor">
-            <a:schemeClr val="lt1"/>
-          </a:fontRef>
-        </p:style>
-        <p:txBody>
-          <a:bodyPr lIns="91412" tIns="45704" rIns="91412" bIns="45704" rtlCol="0" anchor="ctr"/>
-          <a:lstStyle/>
-          <a:p>
-            <a:pPr algn="ctr"/>
-            <a:endParaRPr lang="en-US"/>
-          </a:p>
-        </p:txBody>
-      </p:sp>
-      <p:sp>
-        <p:nvSpPr>
-          <p:cNvPr id="8" name="Rectangle 7"/>
-          <p:cNvSpPr/>
-          <p:nvPr/>
-        </p:nvSpPr>
-        <p:spPr>
-          <a:xfrm>
-            <a:off x="3276829" y="2699355"/>
-            <a:ext cx="2568881" cy="646503"/>
-          </a:xfrm>
-          <a:prstGeom prst="rect">
-            <a:avLst/>
-          </a:prstGeom>
-          <a:solidFill>
-            <a:srgbClr val="FFFFFF">
-              <a:alpha val="78000"/>
-            </a:srgbClr>
-          </a:solidFill>
-          <a:ln>
-            <a:solidFill>
-              <a:srgbClr val="FFFFFF"/>
-            </a:solidFill>
-          </a:ln>
-          <a:effectLst/>
-        </p:spPr>
-        <p:style>
-          <a:lnRef idx="1">
-            <a:schemeClr val="accent1"/>
-          </a:lnRef>
-          <a:fillRef idx="3">
-            <a:schemeClr val="accent1"/>
-          </a:fillRef>
-          <a:effectRef idx="2">
-            <a:schemeClr val="accent1"/>
-          </a:effectRef>
-          <a:fontRef idx="minor">
-            <a:schemeClr val="lt1"/>
-          </a:fontRef>
-        </p:style>
-        <p:txBody>
-          <a:bodyPr lIns="91412" tIns="45704" rIns="91412" bIns="45704" rtlCol="0" anchor="ctr"/>
-          <a:lstStyle/>
-          <a:p>
-            <a:pPr algn="ctr"/>
-            <a:endParaRPr lang="en-US"/>
-          </a:p>
-        </p:txBody>
-      </p:sp>
-      <p:sp>
-        <p:nvSpPr>
-          <p:cNvPr id="6" name="Title 5"/>
-          <p:cNvSpPr>
-            <a:spLocks noGrp="1"/>
-          </p:cNvSpPr>
-          <p:nvPr>
-            <p:ph type="ctrTitle"/>
-          </p:nvPr>
-        </p:nvSpPr>
-        <p:spPr>
-          <a:xfrm>
-            <a:off x="685801" y="2262910"/>
-            <a:ext cx="7772399" cy="1470024"/>
-          </a:xfrm>
-        </p:spPr>
-        <p:txBody>
-          <a:bodyPr/>
-          <a:lstStyle/>
-          <a:p>
-            <a:r>
-              <a:rPr lang="en-US" b="1" dirty="0" smtClean="0"/>
-              <a:t>Thank you.</a:t>
-            </a:r>
-            <a:endParaRPr lang="en-US" b="1" dirty="0"/>
-          </a:p>
-        </p:txBody>
-      </p:sp>
-      <p:sp>
-        <p:nvSpPr>
-          <p:cNvPr id="7" name="Subtitle 6"/>
-          <p:cNvSpPr>
-            <a:spLocks noGrp="1"/>
-          </p:cNvSpPr>
-          <p:nvPr>
-            <p:ph type="subTitle" idx="1"/>
-          </p:nvPr>
-        </p:nvSpPr>
-        <p:spPr/>
-        <p:txBody>
-          <a:bodyPr>
-            <a:normAutofit/>
-          </a:bodyPr>
-          <a:lstStyle/>
-          <a:p>
-            <a:pPr algn="r"/>
-            <a:r>
-              <a:rPr lang="en-US" dirty="0" smtClean="0">
-                <a:solidFill>
-                  <a:schemeClr val="tx1">
-                    <a:lumMod val="75000"/>
-                    <a:lumOff val="25000"/>
-                  </a:schemeClr>
-                </a:solidFill>
-              </a:rPr>
-              <a:t>@</a:t>
-            </a:r>
-            <a:r>
-              <a:rPr lang="en-US" dirty="0" err="1" smtClean="0">
-                <a:solidFill>
-                  <a:schemeClr val="tx1">
-                    <a:lumMod val="75000"/>
-                    <a:lumOff val="25000"/>
-                  </a:schemeClr>
-                </a:solidFill>
-              </a:rPr>
-              <a:t>maaretp</a:t>
-            </a:r>
-            <a:endParaRPr lang="en-US" dirty="0" smtClean="0">
-              <a:solidFill>
-                <a:schemeClr val="tx1">
-                  <a:lumMod val="75000"/>
-                  <a:lumOff val="25000"/>
-                </a:schemeClr>
-              </a:solidFill>
-            </a:endParaRPr>
-          </a:p>
-          <a:p>
-            <a:pPr algn="r"/>
-            <a:r>
-              <a:rPr lang="en-US" dirty="0" smtClean="0">
-                <a:solidFill>
-                  <a:schemeClr val="tx1">
-                    <a:lumMod val="75000"/>
-                    <a:lumOff val="25000"/>
-                  </a:schemeClr>
-                </a:solidFill>
-              </a:rPr>
-              <a:t>@LlewellynFalco</a:t>
-            </a:r>
-          </a:p>
-          <a:p>
-            <a:pPr algn="r"/>
-            <a:r>
-              <a:rPr lang="en-US" sz="2100" dirty="0">
-                <a:solidFill>
-                  <a:schemeClr val="tx1">
-                    <a:lumMod val="75000"/>
-                    <a:lumOff val="25000"/>
-                  </a:schemeClr>
-                </a:solidFill>
-              </a:rPr>
-              <a:t>(please connect with us through Twitter or LinkedIn)</a:t>
-            </a:r>
-          </a:p>
-          <a:p>
-            <a:pPr algn="r"/>
-            <a:endParaRPr lang="en-US" sz="2100" dirty="0">
-              <a:solidFill>
-                <a:schemeClr val="tx1">
-                  <a:lumMod val="75000"/>
-                  <a:lumOff val="25000"/>
-                </a:schemeClr>
-              </a:solidFill>
-            </a:endParaRPr>
-          </a:p>
-        </p:txBody>
-      </p:sp>
-      <p:pic>
-        <p:nvPicPr>
-          <p:cNvPr id="3" name="Sound 2">
-            <a:hlinkClick r:id="" action="ppaction://media"/>
-          </p:cNvPr>
-          <p:cNvPicPr>
-            <a:picLocks noChangeAspect="1"/>
-          </p:cNvPicPr>
-          <p:nvPr>
-            <a:audioFile r:link="rId2"/>
-            <p:extLst>
-              <p:ext uri="{DAA4B4D4-6D71-4841-9C94-3DE7FCFB9230}">
-                <p14:media xmlns:p14="http://schemas.microsoft.com/office/powerpoint/2010/main" r:embed="rId1"/>
-              </p:ext>
-            </p:extLst>
-          </p:nvPr>
-        </p:nvPicPr>
-        <p:blipFill>
-          <a:blip r:embed="rId5"/>
-          <a:stretch>
-            <a:fillRect/>
-          </a:stretch>
-        </p:blipFill>
-        <p:spPr>
-          <a:xfrm>
-            <a:off x="8178800" y="5892800"/>
-            <a:ext cx="812800" cy="812800"/>
-          </a:xfrm>
-          <a:prstGeom prst="rect">
-            <a:avLst/>
-          </a:prstGeom>
-        </p:spPr>
-      </p:pic>
-    </p:spTree>
-    <p:extLst>
-      <p:ext uri="{BB962C8B-B14F-4D97-AF65-F5344CB8AC3E}">
-        <p14:creationId xmlns:p14="http://schemas.microsoft.com/office/powerpoint/2010/main" val="1060893599"/>
-      </p:ext>
-    </p:extLst>
-  </p:cSld>
-  <p:clrMapOvr>
-    <a:masterClrMapping/>
-  </p:clrMapOvr>
-  <mc:AlternateContent xmlns:mc="http://schemas.openxmlformats.org/markup-compatibility/2006" xmlns:p14="http://schemas.microsoft.com/office/powerpoint/2010/main">
-    <mc:Choice Requires="p14">
-      <p:transition spd="slow" p14:dur="2000"/>
-    </mc:Choice>
-    <mc:Fallback xmlns="">
-      <p:transition xmlns:p14="http://schemas.microsoft.com/office/powerpoint/2010/main" spd="slow"/>
-    </mc:Fallback>
-  </mc:AlternateContent>
-  <p:timing>
-    <p:tnLst>
-      <p:par>
-        <p:cTn xmlns:p14="http://schemas.microsoft.com/office/powerpoint/2010/main" id="1" dur="indefinite" restart="never" nodeType="tmRoot">
-          <p:childTnLst>
-            <p:seq concurrent="1" nextAc="seek">
-              <p:cTn id="2" dur="indefinite" nodeType="mainSeq">
-                <p:childTnLst>
-                  <p:par>
-                    <p:cTn id="3" fill="hold">
-                      <p:stCondLst>
-                        <p:cond delay="indefinite"/>
-                        <p:cond evt="onBegin" delay="0">
-                          <p:tn val="2"/>
-                        </p:cond>
-                      </p:stCondLst>
-                      <p:childTnLst>
-                        <p:par>
-                          <p:cTn id="4" fill="hold">
-                            <p:stCondLst>
-                              <p:cond delay="0"/>
-                            </p:stCondLst>
-                            <p:childTnLst>
-                              <p:par>
-                                <p:cTn id="5" presetID="1" presetClass="mediacall" presetSubtype="0" fill="hold" nodeType="afterEffect">
-                                  <p:stCondLst>
-                                    <p:cond delay="0"/>
-                                  </p:stCondLst>
-                                  <p:childTnLst>
-                                    <p:cmd type="call" cmd="playFrom(0.0)">
-                                      <p:cBhvr>
-                                        <p:cTn id="6" dur="1" fill="hold"/>
-                                        <p:tgtEl>
-                                          <p:spTgt spid="3"/>
-                                        </p:tgtEl>
-                                      </p:cBhvr>
-                                    </p:cmd>
-                                  </p:childTnLst>
-                                </p:cTn>
-                              </p:par>
-                            </p:childTnLst>
-                          </p:cTn>
-                        </p:par>
-                      </p:childTnLst>
-                    </p:cTn>
-                  </p:par>
-                </p:childTnLst>
-              </p:cTn>
-              <p:prevCondLst>
-                <p:cond evt="onPrev" delay="0">
-                  <p:tgtEl>
-                    <p:sldTgt/>
-                  </p:tgtEl>
-                </p:cond>
-              </p:prevCondLst>
-              <p:nextCondLst>
-                <p:cond evt="onNext" delay="0">
-                  <p:tgtEl>
-                    <p:sldTgt/>
-                  </p:tgtEl>
-                </p:cond>
-              </p:nextCondLst>
-            </p:seq>
-            <p:audio isNarration="1">
-              <p:cMediaNode vol="80000" showWhenStopped="0">
-                <p:cTn id="7" fill="hold" display="0">
-                  <p:stCondLst>
-                    <p:cond delay="indefinite"/>
-                  </p:stCondLst>
-                  <p:endCondLst>
-                    <p:cond evt="onStopAudio" delay="0">
-                      <p:tgtEl>
-                        <p:sldTgt/>
-                      </p:tgtEl>
-                    </p:cond>
-                  </p:endCondLst>
-                </p:cTn>
-                <p:tgtEl>
-                  <p:spTgt spid="3"/>
-                </p:tgtEl>
-              </p:cMediaNode>
-            </p:audio>
-          </p:childTnLst>
-        </p:cTn>
       </p:par>
     </p:tnLst>
   </p:timing>

</xml_diff>